<commit_message>
Atualização da apresentacao ate o final da parte teorica
</commit_message>
<xml_diff>
--- a/workshop-aspnet-core-mvc.pptx
+++ b/workshop-aspnet-core-mvc.pptx
@@ -10,8 +10,15 @@
     <p:sldId id="258" r:id="rId4"/>
     <p:sldId id="259" r:id="rId5"/>
     <p:sldId id="260" r:id="rId6"/>
-    <p:sldId id="261" r:id="rId7"/>
+    <p:sldId id="263" r:id="rId7"/>
     <p:sldId id="262" r:id="rId8"/>
+    <p:sldId id="265" r:id="rId9"/>
+    <p:sldId id="266" r:id="rId10"/>
+    <p:sldId id="267" r:id="rId11"/>
+    <p:sldId id="268" r:id="rId12"/>
+    <p:sldId id="269" r:id="rId13"/>
+    <p:sldId id="270" r:id="rId14"/>
+    <p:sldId id="271" r:id="rId15"/>
   </p:sldIdLst>
   <p:sldSz cx="12192000" cy="6858000"/>
   <p:notesSz cx="6858000" cy="9144000"/>
@@ -1633,7 +1640,7 @@
             <a:fld id="{B24C654B-750A-47A0-AE34-444BB51CE4F3}" type="datetimeFigureOut">
               <a:rPr lang="pt-BR" smtClean="0"/>
               <a:pPr/>
-              <a:t>19/09/2017</a:t>
+              <a:t>20/09/2017</a:t>
             </a:fld>
             <a:endParaRPr lang="pt-BR"/>
           </a:p>
@@ -2164,6 +2171,2532 @@
   <p:clrMapOvr>
     <a:masterClrMapping/>
   </p:clrMapOvr>
+  <p:timing>
+    <p:tnLst>
+      <p:par>
+        <p:cTn id="1" dur="indefinite" restart="never" nodeType="tmRoot"/>
+      </p:par>
+    </p:tnLst>
+  </p:timing>
+</p:sld>
+</file>
+
+<file path=ppt/slides/slide10.xml><?xml version="1.0" encoding="utf-8"?>
+<p:sld xmlns:a="http://schemas.openxmlformats.org/drawingml/2006/main" xmlns:r="http://schemas.openxmlformats.org/officeDocument/2006/relationships" xmlns:p="http://schemas.openxmlformats.org/presentationml/2006/main">
+  <p:cSld>
+    <p:spTree>
+      <p:nvGrpSpPr>
+        <p:cNvPr id="1" name=""/>
+        <p:cNvGrpSpPr/>
+        <p:nvPr/>
+      </p:nvGrpSpPr>
+      <p:grpSpPr>
+        <a:xfrm>
+          <a:off x="0" y="0"/>
+          <a:ext cx="0" cy="0"/>
+          <a:chOff x="0" y="0"/>
+          <a:chExt cx="0" cy="0"/>
+        </a:xfrm>
+      </p:grpSpPr>
+      <p:sp>
+        <p:nvSpPr>
+          <p:cNvPr id="2" name="Espaço Reservado para Texto 1"/>
+          <p:cNvSpPr>
+            <a:spLocks noGrp="1"/>
+          </p:cNvSpPr>
+          <p:nvPr>
+            <p:ph type="body" sz="quarter" idx="10"/>
+          </p:nvPr>
+        </p:nvSpPr>
+        <p:spPr/>
+        <p:txBody>
+          <a:bodyPr/>
+          <a:lstStyle/>
+          <a:p>
+            <a:r>
+              <a:rPr lang="pt-BR" dirty="0" err="1" smtClean="0"/>
+              <a:t>Models</a:t>
+            </a:r>
+            <a:endParaRPr lang="pt-BR" dirty="0"/>
+          </a:p>
+        </p:txBody>
+      </p:sp>
+      <p:sp>
+        <p:nvSpPr>
+          <p:cNvPr id="3" name="Espaço Reservado para Texto 2"/>
+          <p:cNvSpPr>
+            <a:spLocks noGrp="1"/>
+          </p:cNvSpPr>
+          <p:nvPr>
+            <p:ph type="body" sz="quarter" idx="11"/>
+          </p:nvPr>
+        </p:nvSpPr>
+        <p:spPr/>
+        <p:txBody>
+          <a:bodyPr>
+            <a:normAutofit/>
+          </a:bodyPr>
+          <a:lstStyle/>
+          <a:p>
+            <a:pPr marL="342900" indent="-342900">
+              <a:buFont typeface="Arial" panose="020B0604020202020204" pitchFamily="34" charset="0"/>
+              <a:buChar char="•"/>
+            </a:pPr>
+            <a:r>
+              <a:rPr lang="pt-BR" dirty="0" err="1" smtClean="0"/>
+              <a:t>ViewModels</a:t>
+            </a:r>
+            <a:endParaRPr lang="pt-BR" dirty="0" smtClean="0"/>
+          </a:p>
+          <a:p>
+            <a:pPr marL="1085850" lvl="1" indent="-342900">
+              <a:buFont typeface="Arial" panose="020B0604020202020204" pitchFamily="34" charset="0"/>
+              <a:buChar char="•"/>
+            </a:pPr>
+            <a:r>
+              <a:rPr lang="pt-BR" sz="2400" dirty="0">
+                <a:latin typeface="Arial" panose="020B0604020202020204" pitchFamily="34" charset="0"/>
+                <a:cs typeface="Arial" panose="020B0604020202020204" pitchFamily="34" charset="0"/>
+              </a:rPr>
+              <a:t>R</a:t>
+            </a:r>
+            <a:r>
+              <a:rPr lang="pt-BR" sz="2400" dirty="0" smtClean="0">
+                <a:latin typeface="Arial" panose="020B0604020202020204" pitchFamily="34" charset="0"/>
+                <a:cs typeface="Arial" panose="020B0604020202020204" pitchFamily="34" charset="0"/>
+              </a:rPr>
+              <a:t>epresentação da informação transferida do controlador para a </a:t>
+            </a:r>
+            <a:r>
+              <a:rPr lang="pt-BR" sz="2400" dirty="0" err="1" smtClean="0">
+                <a:latin typeface="Arial" panose="020B0604020202020204" pitchFamily="34" charset="0"/>
+                <a:cs typeface="Arial" panose="020B0604020202020204" pitchFamily="34" charset="0"/>
+              </a:rPr>
+              <a:t>view</a:t>
+            </a:r>
+            <a:endParaRPr lang="pt-BR" sz="2400" dirty="0" smtClean="0">
+              <a:latin typeface="Arial" panose="020B0604020202020204" pitchFamily="34" charset="0"/>
+              <a:cs typeface="Arial" panose="020B0604020202020204" pitchFamily="34" charset="0"/>
+            </a:endParaRPr>
+          </a:p>
+          <a:p>
+            <a:pPr marL="342900" indent="-342900">
+              <a:buFont typeface="Arial" panose="020B0604020202020204" pitchFamily="34" charset="0"/>
+              <a:buChar char="•"/>
+            </a:pPr>
+            <a:r>
+              <a:rPr lang="pt-BR" dirty="0" smtClean="0"/>
+              <a:t>Domain </a:t>
+            </a:r>
+            <a:r>
+              <a:rPr lang="pt-BR" dirty="0" err="1" smtClean="0"/>
+              <a:t>Models</a:t>
+            </a:r>
+            <a:endParaRPr lang="pt-BR" dirty="0"/>
+          </a:p>
+          <a:p>
+            <a:pPr marL="1085850" lvl="1" indent="-342900">
+              <a:buFont typeface="Arial" panose="020B0604020202020204" pitchFamily="34" charset="0"/>
+              <a:buChar char="•"/>
+            </a:pPr>
+            <a:r>
+              <a:rPr lang="pt-BR" sz="2400" dirty="0" smtClean="0">
+                <a:latin typeface="Arial" panose="020B0604020202020204" pitchFamily="34" charset="0"/>
+                <a:cs typeface="Arial" panose="020B0604020202020204" pitchFamily="34" charset="0"/>
+              </a:rPr>
+              <a:t>Informação na camada de negócio</a:t>
+            </a:r>
+          </a:p>
+          <a:p>
+            <a:pPr marL="1085850" lvl="1" indent="-342900">
+              <a:buFont typeface="Arial" panose="020B0604020202020204" pitchFamily="34" charset="0"/>
+              <a:buChar char="•"/>
+            </a:pPr>
+            <a:r>
+              <a:rPr lang="pt-BR" sz="2400" dirty="0" smtClean="0">
+                <a:latin typeface="Arial" panose="020B0604020202020204" pitchFamily="34" charset="0"/>
+                <a:cs typeface="Arial" panose="020B0604020202020204" pitchFamily="34" charset="0"/>
+              </a:rPr>
+              <a:t>Operações, regras de criação, lógica de manipulação dos dados</a:t>
+            </a:r>
+            <a:endParaRPr lang="pt-BR" sz="2400" dirty="0">
+              <a:latin typeface="Arial" panose="020B0604020202020204" pitchFamily="34" charset="0"/>
+              <a:cs typeface="Arial" panose="020B0604020202020204" pitchFamily="34" charset="0"/>
+            </a:endParaRPr>
+          </a:p>
+          <a:p>
+            <a:pPr marL="342900" indent="-342900">
+              <a:buFont typeface="Arial" panose="020B0604020202020204" pitchFamily="34" charset="0"/>
+              <a:buChar char="•"/>
+            </a:pPr>
+            <a:endParaRPr lang="pt-BR" dirty="0" smtClean="0">
+              <a:latin typeface="Arial" panose="020B0604020202020204" pitchFamily="34" charset="0"/>
+              <a:cs typeface="Arial" panose="020B0604020202020204" pitchFamily="34" charset="0"/>
+            </a:endParaRPr>
+          </a:p>
+          <a:p>
+            <a:pPr marL="342900" indent="-342900">
+              <a:buFont typeface="Arial" panose="020B0604020202020204" pitchFamily="34" charset="0"/>
+              <a:buChar char="•"/>
+            </a:pPr>
+            <a:r>
+              <a:rPr lang="pt-BR" dirty="0" smtClean="0"/>
+              <a:t>Modelos são a definição do universo da aplicação.</a:t>
+            </a:r>
+            <a:endParaRPr lang="pt-BR" dirty="0" smtClean="0">
+              <a:latin typeface="Arial" panose="020B0604020202020204" pitchFamily="34" charset="0"/>
+              <a:cs typeface="Arial" panose="020B0604020202020204" pitchFamily="34" charset="0"/>
+            </a:endParaRPr>
+          </a:p>
+          <a:p>
+            <a:pPr marL="1085850" lvl="1" indent="-342900">
+              <a:buFont typeface="Arial" panose="020B0604020202020204" pitchFamily="34" charset="0"/>
+              <a:buChar char="•"/>
+            </a:pPr>
+            <a:endParaRPr lang="pt-BR" sz="2400" dirty="0">
+              <a:latin typeface="Arial" panose="020B0604020202020204" pitchFamily="34" charset="0"/>
+              <a:cs typeface="Arial" panose="020B0604020202020204" pitchFamily="34" charset="0"/>
+            </a:endParaRPr>
+          </a:p>
+          <a:p>
+            <a:pPr marL="1085850" lvl="1" indent="-342900">
+              <a:buFont typeface="Arial" panose="020B0604020202020204" pitchFamily="34" charset="0"/>
+              <a:buChar char="•"/>
+            </a:pPr>
+            <a:endParaRPr lang="pt-BR" sz="2400" dirty="0" smtClean="0">
+              <a:latin typeface="Arial" panose="020B0604020202020204" pitchFamily="34" charset="0"/>
+              <a:cs typeface="Arial" panose="020B0604020202020204" pitchFamily="34" charset="0"/>
+            </a:endParaRPr>
+          </a:p>
+        </p:txBody>
+      </p:sp>
+    </p:spTree>
+    <p:extLst>
+      <p:ext uri="{BB962C8B-B14F-4D97-AF65-F5344CB8AC3E}">
+        <p14:creationId xmlns:p14="http://schemas.microsoft.com/office/powerpoint/2010/main" val="2204631377"/>
+      </p:ext>
+    </p:extLst>
+  </p:cSld>
+  <p:clrMapOvr>
+    <a:masterClrMapping/>
+  </p:clrMapOvr>
+  <p:timing>
+    <p:tnLst>
+      <p:par>
+        <p:cTn id="1" dur="indefinite" restart="never" nodeType="tmRoot"/>
+      </p:par>
+    </p:tnLst>
+  </p:timing>
+</p:sld>
+</file>
+
+<file path=ppt/slides/slide11.xml><?xml version="1.0" encoding="utf-8"?>
+<p:sld xmlns:a="http://schemas.openxmlformats.org/drawingml/2006/main" xmlns:r="http://schemas.openxmlformats.org/officeDocument/2006/relationships" xmlns:p="http://schemas.openxmlformats.org/presentationml/2006/main">
+  <p:cSld>
+    <p:spTree>
+      <p:nvGrpSpPr>
+        <p:cNvPr id="1" name=""/>
+        <p:cNvGrpSpPr/>
+        <p:nvPr/>
+      </p:nvGrpSpPr>
+      <p:grpSpPr>
+        <a:xfrm>
+          <a:off x="0" y="0"/>
+          <a:ext cx="0" cy="0"/>
+          <a:chOff x="0" y="0"/>
+          <a:chExt cx="0" cy="0"/>
+        </a:xfrm>
+      </p:grpSpPr>
+      <p:sp>
+        <p:nvSpPr>
+          <p:cNvPr id="2" name="Espaço Reservado para Texto 1"/>
+          <p:cNvSpPr>
+            <a:spLocks noGrp="1"/>
+          </p:cNvSpPr>
+          <p:nvPr>
+            <p:ph type="body" sz="quarter" idx="10"/>
+          </p:nvPr>
+        </p:nvSpPr>
+        <p:spPr>
+          <a:xfrm>
+            <a:off x="0" y="235862"/>
+            <a:ext cx="11909425" cy="759502"/>
+          </a:xfrm>
+        </p:spPr>
+        <p:txBody>
+          <a:bodyPr/>
+          <a:lstStyle/>
+          <a:p>
+            <a:r>
+              <a:rPr lang="pt-BR" dirty="0" err="1" smtClean="0"/>
+              <a:t>Controller</a:t>
+            </a:r>
+            <a:endParaRPr lang="pt-BR" dirty="0"/>
+          </a:p>
+        </p:txBody>
+      </p:sp>
+      <p:sp>
+        <p:nvSpPr>
+          <p:cNvPr id="3" name="Espaço Reservado para Texto 2"/>
+          <p:cNvSpPr>
+            <a:spLocks noGrp="1"/>
+          </p:cNvSpPr>
+          <p:nvPr>
+            <p:ph type="body" sz="quarter" idx="11"/>
+          </p:nvPr>
+        </p:nvSpPr>
+        <p:spPr>
+          <a:xfrm>
+            <a:off x="106363" y="995364"/>
+            <a:ext cx="11909425" cy="1070504"/>
+          </a:xfrm>
+        </p:spPr>
+        <p:txBody>
+          <a:bodyPr/>
+          <a:lstStyle/>
+          <a:p>
+            <a:pPr marL="342900" indent="-342900">
+              <a:buFont typeface="Arial" panose="020B0604020202020204" pitchFamily="34" charset="0"/>
+              <a:buChar char="•"/>
+            </a:pPr>
+            <a:r>
+              <a:rPr lang="pt-BR" dirty="0" smtClean="0"/>
+              <a:t>Comunicação entre os modelos e as </a:t>
+            </a:r>
+            <a:r>
+              <a:rPr lang="pt-BR" dirty="0" err="1" smtClean="0"/>
+              <a:t>views</a:t>
+            </a:r>
+            <a:endParaRPr lang="pt-BR" dirty="0" smtClean="0"/>
+          </a:p>
+          <a:p>
+            <a:pPr marL="342900" indent="-342900">
+              <a:buFont typeface="Arial" panose="020B0604020202020204" pitchFamily="34" charset="0"/>
+              <a:buChar char="•"/>
+            </a:pPr>
+            <a:r>
+              <a:rPr lang="pt-BR" dirty="0" smtClean="0"/>
+              <a:t>Coordena o fluxo de dados da aplicação</a:t>
+            </a:r>
+            <a:endParaRPr lang="pt-BR" dirty="0"/>
+          </a:p>
+          <a:p>
+            <a:endParaRPr lang="pt-BR" dirty="0" smtClean="0"/>
+          </a:p>
+        </p:txBody>
+      </p:sp>
+      <p:sp>
+        <p:nvSpPr>
+          <p:cNvPr id="4" name="Espaço Reservado para Texto 1"/>
+          <p:cNvSpPr txBox="1">
+            <a:spLocks/>
+          </p:cNvSpPr>
+          <p:nvPr/>
+        </p:nvSpPr>
+        <p:spPr>
+          <a:xfrm>
+            <a:off x="207965" y="2065868"/>
+            <a:ext cx="11909425" cy="759502"/>
+          </a:xfrm>
+          <a:prstGeom prst="rect">
+            <a:avLst/>
+          </a:prstGeom>
+        </p:spPr>
+        <p:txBody>
+          <a:bodyPr vert="horz" lIns="91440" tIns="45720" rIns="91440" bIns="45720" rtlCol="0" anchor="ctr">
+            <a:normAutofit/>
+          </a:bodyPr>
+          <a:lstStyle>
+            <a:lvl1pPr marL="0" indent="0" algn="ctr" defTabSz="914400" rtl="0" eaLnBrk="1" latinLnBrk="0" hangingPunct="1">
+              <a:spcBef>
+                <a:spcPct val="20000"/>
+              </a:spcBef>
+              <a:buFont typeface="Arial" panose="020B0604020202020204" pitchFamily="34" charset="0"/>
+              <a:buNone/>
+              <a:defRPr sz="3200" kern="1200" baseline="0">
+                <a:solidFill>
+                  <a:schemeClr val="tx1"/>
+                </a:solidFill>
+                <a:latin typeface="Arial" panose="020B0604020202020204" pitchFamily="34" charset="0"/>
+                <a:ea typeface="+mn-ea"/>
+                <a:cs typeface="Arial" panose="020B0604020202020204" pitchFamily="34" charset="0"/>
+              </a:defRPr>
+            </a:lvl1pPr>
+            <a:lvl2pPr marL="457200" indent="0" algn="l" defTabSz="914400" rtl="0" eaLnBrk="1" latinLnBrk="0" hangingPunct="1">
+              <a:spcBef>
+                <a:spcPct val="20000"/>
+              </a:spcBef>
+              <a:buFont typeface="Arial" panose="020B0604020202020204" pitchFamily="34" charset="0"/>
+              <a:buNone/>
+              <a:defRPr sz="2800" kern="1200">
+                <a:solidFill>
+                  <a:schemeClr val="tx1"/>
+                </a:solidFill>
+                <a:latin typeface="+mn-lt"/>
+                <a:ea typeface="+mn-ea"/>
+                <a:cs typeface="+mn-cs"/>
+              </a:defRPr>
+            </a:lvl2pPr>
+            <a:lvl3pPr marL="914400" indent="0" algn="l" defTabSz="914400" rtl="0" eaLnBrk="1" latinLnBrk="0" hangingPunct="1">
+              <a:spcBef>
+                <a:spcPct val="20000"/>
+              </a:spcBef>
+              <a:buFont typeface="Arial" panose="020B0604020202020204" pitchFamily="34" charset="0"/>
+              <a:buNone/>
+              <a:defRPr sz="2400" kern="1200">
+                <a:solidFill>
+                  <a:schemeClr val="tx1"/>
+                </a:solidFill>
+                <a:latin typeface="+mn-lt"/>
+                <a:ea typeface="+mn-ea"/>
+                <a:cs typeface="+mn-cs"/>
+              </a:defRPr>
+            </a:lvl3pPr>
+            <a:lvl4pPr marL="1371600" indent="0" algn="l" defTabSz="914400" rtl="0" eaLnBrk="1" latinLnBrk="0" hangingPunct="1">
+              <a:spcBef>
+                <a:spcPct val="20000"/>
+              </a:spcBef>
+              <a:buFont typeface="Arial" panose="020B0604020202020204" pitchFamily="34" charset="0"/>
+              <a:buNone/>
+              <a:defRPr sz="2000" kern="1200">
+                <a:solidFill>
+                  <a:schemeClr val="tx1"/>
+                </a:solidFill>
+                <a:latin typeface="+mn-lt"/>
+                <a:ea typeface="+mn-ea"/>
+                <a:cs typeface="+mn-cs"/>
+              </a:defRPr>
+            </a:lvl4pPr>
+            <a:lvl5pPr marL="1828800" indent="0" algn="l" defTabSz="914400" rtl="0" eaLnBrk="1" latinLnBrk="0" hangingPunct="1">
+              <a:spcBef>
+                <a:spcPct val="20000"/>
+              </a:spcBef>
+              <a:buFont typeface="Arial" panose="020B0604020202020204" pitchFamily="34" charset="0"/>
+              <a:buNone/>
+              <a:defRPr sz="2000" kern="1200">
+                <a:solidFill>
+                  <a:schemeClr val="tx1"/>
+                </a:solidFill>
+                <a:latin typeface="+mn-lt"/>
+                <a:ea typeface="+mn-ea"/>
+                <a:cs typeface="+mn-cs"/>
+              </a:defRPr>
+            </a:lvl5pPr>
+            <a:lvl6pPr marL="2514600" indent="-228600" algn="l" defTabSz="914400" rtl="0" eaLnBrk="1" latinLnBrk="0" hangingPunct="1">
+              <a:spcBef>
+                <a:spcPct val="20000"/>
+              </a:spcBef>
+              <a:buFont typeface="Arial" panose="020B0604020202020204" pitchFamily="34" charset="0"/>
+              <a:buChar char="•"/>
+              <a:defRPr sz="2000" kern="1200">
+                <a:solidFill>
+                  <a:schemeClr val="tx1"/>
+                </a:solidFill>
+                <a:latin typeface="+mn-lt"/>
+                <a:ea typeface="+mn-ea"/>
+                <a:cs typeface="+mn-cs"/>
+              </a:defRPr>
+            </a:lvl6pPr>
+            <a:lvl7pPr marL="2971800" indent="-228600" algn="l" defTabSz="914400" rtl="0" eaLnBrk="1" latinLnBrk="0" hangingPunct="1">
+              <a:spcBef>
+                <a:spcPct val="20000"/>
+              </a:spcBef>
+              <a:buFont typeface="Arial" panose="020B0604020202020204" pitchFamily="34" charset="0"/>
+              <a:buChar char="•"/>
+              <a:defRPr sz="2000" kern="1200">
+                <a:solidFill>
+                  <a:schemeClr val="tx1"/>
+                </a:solidFill>
+                <a:latin typeface="+mn-lt"/>
+                <a:ea typeface="+mn-ea"/>
+                <a:cs typeface="+mn-cs"/>
+              </a:defRPr>
+            </a:lvl7pPr>
+            <a:lvl8pPr marL="3429000" indent="-228600" algn="l" defTabSz="914400" rtl="0" eaLnBrk="1" latinLnBrk="0" hangingPunct="1">
+              <a:spcBef>
+                <a:spcPct val="20000"/>
+              </a:spcBef>
+              <a:buFont typeface="Arial" panose="020B0604020202020204" pitchFamily="34" charset="0"/>
+              <a:buChar char="•"/>
+              <a:defRPr sz="2000" kern="1200">
+                <a:solidFill>
+                  <a:schemeClr val="tx1"/>
+                </a:solidFill>
+                <a:latin typeface="+mn-lt"/>
+                <a:ea typeface="+mn-ea"/>
+                <a:cs typeface="+mn-cs"/>
+              </a:defRPr>
+            </a:lvl8pPr>
+            <a:lvl9pPr marL="3886200" indent="-228600" algn="l" defTabSz="914400" rtl="0" eaLnBrk="1" latinLnBrk="0" hangingPunct="1">
+              <a:spcBef>
+                <a:spcPct val="20000"/>
+              </a:spcBef>
+              <a:buFont typeface="Arial" panose="020B0604020202020204" pitchFamily="34" charset="0"/>
+              <a:buChar char="•"/>
+              <a:defRPr sz="2000" kern="1200">
+                <a:solidFill>
+                  <a:schemeClr val="tx1"/>
+                </a:solidFill>
+                <a:latin typeface="+mn-lt"/>
+                <a:ea typeface="+mn-ea"/>
+                <a:cs typeface="+mn-cs"/>
+              </a:defRPr>
+            </a:lvl9pPr>
+          </a:lstStyle>
+          <a:p>
+            <a:r>
+              <a:rPr lang="pt-BR" dirty="0" err="1" smtClean="0"/>
+              <a:t>Views</a:t>
+            </a:r>
+            <a:endParaRPr lang="pt-BR" dirty="0"/>
+          </a:p>
+        </p:txBody>
+      </p:sp>
+      <p:sp>
+        <p:nvSpPr>
+          <p:cNvPr id="5" name="Espaço Reservado para Texto 2"/>
+          <p:cNvSpPr txBox="1">
+            <a:spLocks/>
+          </p:cNvSpPr>
+          <p:nvPr/>
+        </p:nvSpPr>
+        <p:spPr>
+          <a:xfrm>
+            <a:off x="106363" y="2935481"/>
+            <a:ext cx="11909425" cy="1484120"/>
+          </a:xfrm>
+          <a:prstGeom prst="rect">
+            <a:avLst/>
+          </a:prstGeom>
+        </p:spPr>
+        <p:txBody>
+          <a:bodyPr vert="horz" lIns="91440" tIns="45720" rIns="91440" bIns="45720" rtlCol="0">
+            <a:normAutofit/>
+          </a:bodyPr>
+          <a:lstStyle>
+            <a:lvl1pPr marL="0" indent="0" algn="l" defTabSz="914400" rtl="0" eaLnBrk="1" latinLnBrk="0" hangingPunct="1">
+              <a:spcBef>
+                <a:spcPct val="20000"/>
+              </a:spcBef>
+              <a:buFont typeface="Arial" panose="020B0604020202020204" pitchFamily="34" charset="0"/>
+              <a:buNone/>
+              <a:defRPr sz="2400" kern="1200">
+                <a:solidFill>
+                  <a:schemeClr val="tx1"/>
+                </a:solidFill>
+                <a:latin typeface="Arial" panose="020B0604020202020204" pitchFamily="34" charset="0"/>
+                <a:ea typeface="+mn-ea"/>
+                <a:cs typeface="Arial" panose="020B0604020202020204" pitchFamily="34" charset="0"/>
+              </a:defRPr>
+            </a:lvl1pPr>
+            <a:lvl2pPr marL="742950" indent="-285750" algn="l" defTabSz="914400" rtl="0" eaLnBrk="1" latinLnBrk="0" hangingPunct="1">
+              <a:spcBef>
+                <a:spcPct val="20000"/>
+              </a:spcBef>
+              <a:buFont typeface="Arial" panose="020B0604020202020204" pitchFamily="34" charset="0"/>
+              <a:buChar char="–"/>
+              <a:defRPr sz="2800" kern="1200">
+                <a:solidFill>
+                  <a:schemeClr val="tx1"/>
+                </a:solidFill>
+                <a:latin typeface="+mn-lt"/>
+                <a:ea typeface="+mn-ea"/>
+                <a:cs typeface="+mn-cs"/>
+              </a:defRPr>
+            </a:lvl2pPr>
+            <a:lvl3pPr marL="1143000" indent="-228600" algn="l" defTabSz="914400" rtl="0" eaLnBrk="1" latinLnBrk="0" hangingPunct="1">
+              <a:spcBef>
+                <a:spcPct val="20000"/>
+              </a:spcBef>
+              <a:buFont typeface="Arial" panose="020B0604020202020204" pitchFamily="34" charset="0"/>
+              <a:buChar char="•"/>
+              <a:defRPr sz="2400" kern="1200">
+                <a:solidFill>
+                  <a:schemeClr val="tx1"/>
+                </a:solidFill>
+                <a:latin typeface="+mn-lt"/>
+                <a:ea typeface="+mn-ea"/>
+                <a:cs typeface="+mn-cs"/>
+              </a:defRPr>
+            </a:lvl3pPr>
+            <a:lvl4pPr marL="1600200" indent="-228600" algn="l" defTabSz="914400" rtl="0" eaLnBrk="1" latinLnBrk="0" hangingPunct="1">
+              <a:spcBef>
+                <a:spcPct val="20000"/>
+              </a:spcBef>
+              <a:buFont typeface="Arial" panose="020B0604020202020204" pitchFamily="34" charset="0"/>
+              <a:buChar char="–"/>
+              <a:defRPr sz="2000" kern="1200">
+                <a:solidFill>
+                  <a:schemeClr val="tx1"/>
+                </a:solidFill>
+                <a:latin typeface="+mn-lt"/>
+                <a:ea typeface="+mn-ea"/>
+                <a:cs typeface="+mn-cs"/>
+              </a:defRPr>
+            </a:lvl4pPr>
+            <a:lvl5pPr marL="2057400" indent="-228600" algn="l" defTabSz="914400" rtl="0" eaLnBrk="1" latinLnBrk="0" hangingPunct="1">
+              <a:spcBef>
+                <a:spcPct val="20000"/>
+              </a:spcBef>
+              <a:buFont typeface="Arial" panose="020B0604020202020204" pitchFamily="34" charset="0"/>
+              <a:buChar char="»"/>
+              <a:defRPr sz="2000" kern="1200">
+                <a:solidFill>
+                  <a:schemeClr val="tx1"/>
+                </a:solidFill>
+                <a:latin typeface="+mn-lt"/>
+                <a:ea typeface="+mn-ea"/>
+                <a:cs typeface="+mn-cs"/>
+              </a:defRPr>
+            </a:lvl5pPr>
+            <a:lvl6pPr marL="2514600" indent="-228600" algn="l" defTabSz="914400" rtl="0" eaLnBrk="1" latinLnBrk="0" hangingPunct="1">
+              <a:spcBef>
+                <a:spcPct val="20000"/>
+              </a:spcBef>
+              <a:buFont typeface="Arial" panose="020B0604020202020204" pitchFamily="34" charset="0"/>
+              <a:buChar char="•"/>
+              <a:defRPr sz="2000" kern="1200">
+                <a:solidFill>
+                  <a:schemeClr val="tx1"/>
+                </a:solidFill>
+                <a:latin typeface="+mn-lt"/>
+                <a:ea typeface="+mn-ea"/>
+                <a:cs typeface="+mn-cs"/>
+              </a:defRPr>
+            </a:lvl6pPr>
+            <a:lvl7pPr marL="2971800" indent="-228600" algn="l" defTabSz="914400" rtl="0" eaLnBrk="1" latinLnBrk="0" hangingPunct="1">
+              <a:spcBef>
+                <a:spcPct val="20000"/>
+              </a:spcBef>
+              <a:buFont typeface="Arial" panose="020B0604020202020204" pitchFamily="34" charset="0"/>
+              <a:buChar char="•"/>
+              <a:defRPr sz="2000" kern="1200">
+                <a:solidFill>
+                  <a:schemeClr val="tx1"/>
+                </a:solidFill>
+                <a:latin typeface="+mn-lt"/>
+                <a:ea typeface="+mn-ea"/>
+                <a:cs typeface="+mn-cs"/>
+              </a:defRPr>
+            </a:lvl7pPr>
+            <a:lvl8pPr marL="3429000" indent="-228600" algn="l" defTabSz="914400" rtl="0" eaLnBrk="1" latinLnBrk="0" hangingPunct="1">
+              <a:spcBef>
+                <a:spcPct val="20000"/>
+              </a:spcBef>
+              <a:buFont typeface="Arial" panose="020B0604020202020204" pitchFamily="34" charset="0"/>
+              <a:buChar char="•"/>
+              <a:defRPr sz="2000" kern="1200">
+                <a:solidFill>
+                  <a:schemeClr val="tx1"/>
+                </a:solidFill>
+                <a:latin typeface="+mn-lt"/>
+                <a:ea typeface="+mn-ea"/>
+                <a:cs typeface="+mn-cs"/>
+              </a:defRPr>
+            </a:lvl8pPr>
+            <a:lvl9pPr marL="3886200" indent="-228600" algn="l" defTabSz="914400" rtl="0" eaLnBrk="1" latinLnBrk="0" hangingPunct="1">
+              <a:spcBef>
+                <a:spcPct val="20000"/>
+              </a:spcBef>
+              <a:buFont typeface="Arial" panose="020B0604020202020204" pitchFamily="34" charset="0"/>
+              <a:buChar char="•"/>
+              <a:defRPr sz="2000" kern="1200">
+                <a:solidFill>
+                  <a:schemeClr val="tx1"/>
+                </a:solidFill>
+                <a:latin typeface="+mn-lt"/>
+                <a:ea typeface="+mn-ea"/>
+                <a:cs typeface="+mn-cs"/>
+              </a:defRPr>
+            </a:lvl9pPr>
+          </a:lstStyle>
+          <a:p>
+            <a:pPr marL="342900" indent="-342900">
+              <a:buFont typeface="Arial" panose="020B0604020202020204" pitchFamily="34" charset="0"/>
+              <a:buChar char="•"/>
+            </a:pPr>
+            <a:r>
+              <a:rPr lang="pt-BR" dirty="0" err="1" smtClean="0"/>
+              <a:t>Renderização</a:t>
+            </a:r>
+            <a:r>
+              <a:rPr lang="pt-BR" dirty="0" smtClean="0"/>
+              <a:t> da informação para o usuário</a:t>
+            </a:r>
+          </a:p>
+          <a:p>
+            <a:endParaRPr lang="pt-BR" dirty="0" smtClean="0"/>
+          </a:p>
+        </p:txBody>
+      </p:sp>
+    </p:spTree>
+    <p:extLst>
+      <p:ext uri="{BB962C8B-B14F-4D97-AF65-F5344CB8AC3E}">
+        <p14:creationId xmlns:p14="http://schemas.microsoft.com/office/powerpoint/2010/main" val="2105065080"/>
+      </p:ext>
+    </p:extLst>
+  </p:cSld>
+  <p:clrMapOvr>
+    <a:masterClrMapping/>
+  </p:clrMapOvr>
+  <p:timing>
+    <p:tnLst>
+      <p:par>
+        <p:cTn id="1" dur="indefinite" restart="never" nodeType="tmRoot"/>
+      </p:par>
+    </p:tnLst>
+  </p:timing>
+</p:sld>
+</file>
+
+<file path=ppt/slides/slide12.xml><?xml version="1.0" encoding="utf-8"?>
+<p:sld xmlns:a="http://schemas.openxmlformats.org/drawingml/2006/main" xmlns:r="http://schemas.openxmlformats.org/officeDocument/2006/relationships" xmlns:p="http://schemas.openxmlformats.org/presentationml/2006/main">
+  <p:cSld>
+    <p:spTree>
+      <p:nvGrpSpPr>
+        <p:cNvPr id="1" name=""/>
+        <p:cNvGrpSpPr/>
+        <p:nvPr/>
+      </p:nvGrpSpPr>
+      <p:grpSpPr>
+        <a:xfrm>
+          <a:off x="0" y="0"/>
+          <a:ext cx="0" cy="0"/>
+          <a:chOff x="0" y="0"/>
+          <a:chExt cx="0" cy="0"/>
+        </a:xfrm>
+      </p:grpSpPr>
+      <p:sp>
+        <p:nvSpPr>
+          <p:cNvPr id="2" name="Espaço Reservado para Texto 1"/>
+          <p:cNvSpPr>
+            <a:spLocks noGrp="1"/>
+          </p:cNvSpPr>
+          <p:nvPr>
+            <p:ph type="body" sz="quarter" idx="10"/>
+          </p:nvPr>
+        </p:nvSpPr>
+        <p:spPr/>
+        <p:txBody>
+          <a:bodyPr/>
+          <a:lstStyle/>
+          <a:p>
+            <a:r>
+              <a:rPr lang="pt-BR" dirty="0" smtClean="0"/>
+              <a:t>Vantagens do MVC</a:t>
+            </a:r>
+            <a:endParaRPr lang="pt-BR" dirty="0"/>
+          </a:p>
+        </p:txBody>
+      </p:sp>
+      <p:sp>
+        <p:nvSpPr>
+          <p:cNvPr id="4" name="Espaço Reservado para Texto 3"/>
+          <p:cNvSpPr>
+            <a:spLocks noGrp="1"/>
+          </p:cNvSpPr>
+          <p:nvPr>
+            <p:ph type="body" sz="quarter" idx="11"/>
+          </p:nvPr>
+        </p:nvSpPr>
+        <p:spPr/>
+        <p:txBody>
+          <a:bodyPr/>
+          <a:lstStyle/>
+          <a:p>
+            <a:pPr marL="342900" indent="-342900">
+              <a:buFont typeface="Arial" panose="020B0604020202020204" pitchFamily="34" charset="0"/>
+              <a:buChar char="•"/>
+            </a:pPr>
+            <a:r>
+              <a:rPr lang="pt-BR" dirty="0" smtClean="0"/>
+              <a:t>Separação de responsabilidades</a:t>
+            </a:r>
+          </a:p>
+          <a:p>
+            <a:pPr marL="342900" indent="-342900">
+              <a:buFont typeface="Arial" panose="020B0604020202020204" pitchFamily="34" charset="0"/>
+              <a:buChar char="•"/>
+            </a:pPr>
+            <a:r>
+              <a:rPr lang="pt-BR" dirty="0" smtClean="0"/>
+              <a:t>Baixo acoplamento</a:t>
+            </a:r>
+          </a:p>
+          <a:p>
+            <a:pPr marL="342900" indent="-342900">
+              <a:buFont typeface="Arial" panose="020B0604020202020204" pitchFamily="34" charset="0"/>
+              <a:buChar char="•"/>
+            </a:pPr>
+            <a:r>
+              <a:rPr lang="pt-BR" dirty="0" smtClean="0"/>
+              <a:t>Facilidade de modificação (alta </a:t>
+            </a:r>
+            <a:r>
+              <a:rPr lang="pt-BR" dirty="0" err="1" smtClean="0"/>
+              <a:t>manutenibilidade</a:t>
+            </a:r>
+            <a:r>
+              <a:rPr lang="pt-BR" dirty="0" smtClean="0"/>
+              <a:t>)</a:t>
+            </a:r>
+          </a:p>
+          <a:p>
+            <a:pPr marL="342900" indent="-342900">
+              <a:buFont typeface="Arial" panose="020B0604020202020204" pitchFamily="34" charset="0"/>
+              <a:buChar char="•"/>
+            </a:pPr>
+            <a:r>
+              <a:rPr lang="pt-BR" dirty="0" smtClean="0"/>
+              <a:t>Múltiplas </a:t>
+            </a:r>
+            <a:r>
+              <a:rPr lang="pt-BR" dirty="0" err="1" smtClean="0"/>
+              <a:t>views</a:t>
+            </a:r>
+            <a:r>
+              <a:rPr lang="pt-BR" dirty="0" smtClean="0"/>
+              <a:t> para um determinado modelo</a:t>
+            </a:r>
+          </a:p>
+          <a:p>
+            <a:pPr marL="342900" indent="-342900">
+              <a:buFont typeface="Arial" panose="020B0604020202020204" pitchFamily="34" charset="0"/>
+              <a:buChar char="•"/>
+            </a:pPr>
+            <a:r>
+              <a:rPr lang="pt-BR" dirty="0" smtClean="0"/>
+              <a:t>Desenvolvimento simultâneo</a:t>
+            </a:r>
+          </a:p>
+          <a:p>
+            <a:pPr marL="342900" indent="-342900">
+              <a:buFont typeface="Arial" panose="020B0604020202020204" pitchFamily="34" charset="0"/>
+              <a:buChar char="•"/>
+            </a:pPr>
+            <a:r>
+              <a:rPr lang="pt-BR" dirty="0" err="1" smtClean="0"/>
+              <a:t>Reusabilidade</a:t>
+            </a:r>
+            <a:endParaRPr lang="pt-BR" dirty="0" smtClean="0"/>
+          </a:p>
+          <a:p>
+            <a:pPr marL="342900" indent="-342900">
+              <a:buFont typeface="Arial" panose="020B0604020202020204" pitchFamily="34" charset="0"/>
+              <a:buChar char="•"/>
+            </a:pPr>
+            <a:endParaRPr lang="pt-BR" dirty="0"/>
+          </a:p>
+        </p:txBody>
+      </p:sp>
+    </p:spTree>
+    <p:extLst>
+      <p:ext uri="{BB962C8B-B14F-4D97-AF65-F5344CB8AC3E}">
+        <p14:creationId xmlns:p14="http://schemas.microsoft.com/office/powerpoint/2010/main" val="3358681711"/>
+      </p:ext>
+    </p:extLst>
+  </p:cSld>
+  <p:clrMapOvr>
+    <a:masterClrMapping/>
+  </p:clrMapOvr>
+  <p:timing>
+    <p:tnLst>
+      <p:par>
+        <p:cTn id="1" dur="indefinite" restart="never" nodeType="tmRoot"/>
+      </p:par>
+    </p:tnLst>
+  </p:timing>
+</p:sld>
+</file>
+
+<file path=ppt/slides/slide13.xml><?xml version="1.0" encoding="utf-8"?>
+<p:sld xmlns:a="http://schemas.openxmlformats.org/drawingml/2006/main" xmlns:r="http://schemas.openxmlformats.org/officeDocument/2006/relationships" xmlns:p="http://schemas.openxmlformats.org/presentationml/2006/main">
+  <p:cSld>
+    <p:spTree>
+      <p:nvGrpSpPr>
+        <p:cNvPr id="1" name=""/>
+        <p:cNvGrpSpPr/>
+        <p:nvPr/>
+      </p:nvGrpSpPr>
+      <p:grpSpPr>
+        <a:xfrm>
+          <a:off x="0" y="0"/>
+          <a:ext cx="0" cy="0"/>
+          <a:chOff x="0" y="0"/>
+          <a:chExt cx="0" cy="0"/>
+        </a:xfrm>
+      </p:grpSpPr>
+      <p:sp>
+        <p:nvSpPr>
+          <p:cNvPr id="2" name="Espaço Reservado para Texto 1"/>
+          <p:cNvSpPr>
+            <a:spLocks noGrp="1"/>
+          </p:cNvSpPr>
+          <p:nvPr>
+            <p:ph type="body" sz="quarter" idx="10"/>
+          </p:nvPr>
+        </p:nvSpPr>
+        <p:spPr/>
+        <p:txBody>
+          <a:bodyPr/>
+          <a:lstStyle/>
+          <a:p>
+            <a:r>
+              <a:rPr lang="pt-BR" dirty="0" smtClean="0"/>
+              <a:t>Responsabilidades</a:t>
+            </a:r>
+            <a:endParaRPr lang="pt-BR" dirty="0"/>
+          </a:p>
+        </p:txBody>
+      </p:sp>
+      <p:sp>
+        <p:nvSpPr>
+          <p:cNvPr id="3" name="Espaço Reservado para Texto 2"/>
+          <p:cNvSpPr>
+            <a:spLocks noGrp="1"/>
+          </p:cNvSpPr>
+          <p:nvPr>
+            <p:ph type="body" sz="quarter" idx="11"/>
+          </p:nvPr>
+        </p:nvSpPr>
+        <p:spPr>
+          <a:xfrm>
+            <a:off x="106363" y="995363"/>
+            <a:ext cx="11909425" cy="4897437"/>
+          </a:xfrm>
+        </p:spPr>
+        <p:txBody>
+          <a:bodyPr/>
+          <a:lstStyle/>
+          <a:p>
+            <a:pPr marL="342900" indent="-342900">
+              <a:buFont typeface="Arial" panose="020B0604020202020204" pitchFamily="34" charset="0"/>
+              <a:buChar char="•"/>
+            </a:pPr>
+            <a:r>
+              <a:rPr lang="pt-BR" dirty="0" err="1" smtClean="0"/>
+              <a:t>Controllers</a:t>
+            </a:r>
+            <a:endParaRPr lang="pt-BR" dirty="0" smtClean="0"/>
+          </a:p>
+          <a:p>
+            <a:pPr marL="1085850" lvl="1" indent="-342900">
+              <a:buFont typeface="Arial" panose="020B0604020202020204" pitchFamily="34" charset="0"/>
+              <a:buChar char="•"/>
+            </a:pPr>
+            <a:r>
+              <a:rPr lang="pt-BR" sz="2000" dirty="0" smtClean="0">
+                <a:latin typeface="Arial" panose="020B0604020202020204" pitchFamily="34" charset="0"/>
+                <a:cs typeface="Arial" panose="020B0604020202020204" pitchFamily="34" charset="0"/>
+              </a:rPr>
+              <a:t>Ações necessárias para satisfazer à requisição</a:t>
+            </a:r>
+          </a:p>
+          <a:p>
+            <a:pPr marL="1085850" lvl="1" indent="-342900">
+              <a:buFont typeface="Arial" panose="020B0604020202020204" pitchFamily="34" charset="0"/>
+              <a:buChar char="•"/>
+            </a:pPr>
+            <a:r>
+              <a:rPr lang="pt-BR" sz="2000" dirty="0" smtClean="0">
+                <a:latin typeface="Arial" panose="020B0604020202020204" pitchFamily="34" charset="0"/>
+                <a:cs typeface="Arial" panose="020B0604020202020204" pitchFamily="34" charset="0"/>
+              </a:rPr>
+              <a:t>Lógicas para transformar o modelo de negócio nos </a:t>
+            </a:r>
+            <a:r>
+              <a:rPr lang="pt-BR" sz="2000" dirty="0" err="1" smtClean="0">
+                <a:latin typeface="Arial" panose="020B0604020202020204" pitchFamily="34" charset="0"/>
+                <a:cs typeface="Arial" panose="020B0604020202020204" pitchFamily="34" charset="0"/>
+              </a:rPr>
+              <a:t>ViewModels</a:t>
+            </a:r>
+            <a:endParaRPr lang="pt-BR" sz="2000" dirty="0" smtClean="0">
+              <a:latin typeface="Arial" panose="020B0604020202020204" pitchFamily="34" charset="0"/>
+              <a:cs typeface="Arial" panose="020B0604020202020204" pitchFamily="34" charset="0"/>
+            </a:endParaRPr>
+          </a:p>
+          <a:p>
+            <a:pPr marL="1085850" lvl="1" indent="-342900">
+              <a:buFont typeface="Arial" panose="020B0604020202020204" pitchFamily="34" charset="0"/>
+              <a:buChar char="•"/>
+            </a:pPr>
+            <a:r>
+              <a:rPr lang="pt-BR" sz="2000" dirty="0" smtClean="0">
+                <a:latin typeface="Arial" panose="020B0604020202020204" pitchFamily="34" charset="0"/>
+                <a:cs typeface="Arial" panose="020B0604020202020204" pitchFamily="34" charset="0"/>
+              </a:rPr>
+              <a:t>Operações lógicas mais complexas</a:t>
+            </a:r>
+          </a:p>
+          <a:p>
+            <a:pPr marL="342900" indent="-342900">
+              <a:buFont typeface="Arial" panose="020B0604020202020204" pitchFamily="34" charset="0"/>
+              <a:buChar char="•"/>
+            </a:pPr>
+            <a:r>
+              <a:rPr lang="pt-BR" dirty="0" err="1" smtClean="0"/>
+              <a:t>Views</a:t>
+            </a:r>
+            <a:endParaRPr lang="pt-BR" dirty="0" smtClean="0"/>
+          </a:p>
+          <a:p>
+            <a:pPr marL="1085850" lvl="1" indent="-342900">
+              <a:buFont typeface="Arial" panose="020B0604020202020204" pitchFamily="34" charset="0"/>
+              <a:buChar char="•"/>
+            </a:pPr>
+            <a:r>
+              <a:rPr lang="pt-BR" sz="2000" dirty="0" smtClean="0">
+                <a:latin typeface="Arial" panose="020B0604020202020204" pitchFamily="34" charset="0"/>
+                <a:cs typeface="Arial" panose="020B0604020202020204" pitchFamily="34" charset="0"/>
+              </a:rPr>
+              <a:t>Lógica para exibição da informação</a:t>
+            </a:r>
+          </a:p>
+          <a:p>
+            <a:pPr marL="1085850" lvl="1" indent="-342900">
+              <a:buFont typeface="Arial" panose="020B0604020202020204" pitchFamily="34" charset="0"/>
+              <a:buChar char="•"/>
+            </a:pPr>
+            <a:r>
+              <a:rPr lang="pt-BR" sz="2000" dirty="0" smtClean="0">
+                <a:latin typeface="Arial" panose="020B0604020202020204" pitchFamily="34" charset="0"/>
+                <a:cs typeface="Arial" panose="020B0604020202020204" pitchFamily="34" charset="0"/>
+              </a:rPr>
+              <a:t>Linguagem para </a:t>
+            </a:r>
+            <a:r>
+              <a:rPr lang="pt-BR" sz="2000" dirty="0" err="1" smtClean="0">
+                <a:latin typeface="Arial" panose="020B0604020202020204" pitchFamily="34" charset="0"/>
+                <a:cs typeface="Arial" panose="020B0604020202020204" pitchFamily="34" charset="0"/>
+              </a:rPr>
+              <a:t>renderização</a:t>
+            </a:r>
+            <a:r>
+              <a:rPr lang="pt-BR" sz="2000" dirty="0" smtClean="0">
+                <a:latin typeface="Arial" panose="020B0604020202020204" pitchFamily="34" charset="0"/>
+                <a:cs typeface="Arial" panose="020B0604020202020204" pitchFamily="34" charset="0"/>
+              </a:rPr>
+              <a:t> da informação</a:t>
+            </a:r>
+          </a:p>
+          <a:p>
+            <a:pPr marL="342900" indent="-342900">
+              <a:buFont typeface="Arial" panose="020B0604020202020204" pitchFamily="34" charset="0"/>
+              <a:buChar char="•"/>
+            </a:pPr>
+            <a:r>
+              <a:rPr lang="pt-BR" dirty="0" err="1" smtClean="0"/>
+              <a:t>Models</a:t>
+            </a:r>
+            <a:endParaRPr lang="pt-BR" dirty="0" smtClean="0"/>
+          </a:p>
+          <a:p>
+            <a:pPr marL="1085850" lvl="1" indent="-342900">
+              <a:buFont typeface="Arial" panose="020B0604020202020204" pitchFamily="34" charset="0"/>
+              <a:buChar char="•"/>
+            </a:pPr>
+            <a:r>
+              <a:rPr lang="pt-BR" sz="2000" dirty="0" smtClean="0">
+                <a:latin typeface="Arial" panose="020B0604020202020204" pitchFamily="34" charset="0"/>
+                <a:cs typeface="Arial" panose="020B0604020202020204" pitchFamily="34" charset="0"/>
+              </a:rPr>
+              <a:t>Modelos de domínio</a:t>
+            </a:r>
+          </a:p>
+          <a:p>
+            <a:pPr marL="1085850" lvl="1" indent="-342900">
+              <a:buFont typeface="Arial" panose="020B0604020202020204" pitchFamily="34" charset="0"/>
+              <a:buChar char="•"/>
+            </a:pPr>
+            <a:r>
+              <a:rPr lang="pt-BR" sz="2000" dirty="0" smtClean="0">
+                <a:latin typeface="Arial" panose="020B0604020202020204" pitchFamily="34" charset="0"/>
+                <a:cs typeface="Arial" panose="020B0604020202020204" pitchFamily="34" charset="0"/>
+              </a:rPr>
+              <a:t>Lógica para manipular os modelos de domínio</a:t>
+            </a:r>
+          </a:p>
+          <a:p>
+            <a:pPr marL="1085850" lvl="1" indent="-342900">
+              <a:buFont typeface="Arial" panose="020B0604020202020204" pitchFamily="34" charset="0"/>
+              <a:buChar char="•"/>
+            </a:pPr>
+            <a:r>
+              <a:rPr lang="pt-BR" sz="2000" dirty="0" smtClean="0">
+                <a:latin typeface="Arial" panose="020B0604020202020204" pitchFamily="34" charset="0"/>
+                <a:cs typeface="Arial" panose="020B0604020202020204" pitchFamily="34" charset="0"/>
+              </a:rPr>
+              <a:t>Prover uma API que expõe o modelo e as operações que podem ser realizadas</a:t>
+            </a:r>
+          </a:p>
+          <a:p>
+            <a:pPr marL="1085850" lvl="1" indent="-342900">
+              <a:buFont typeface="Arial" panose="020B0604020202020204" pitchFamily="34" charset="0"/>
+              <a:buChar char="•"/>
+            </a:pPr>
+            <a:endParaRPr lang="pt-BR" sz="2000" dirty="0" smtClean="0">
+              <a:latin typeface="Arial" panose="020B0604020202020204" pitchFamily="34" charset="0"/>
+              <a:cs typeface="Arial" panose="020B0604020202020204" pitchFamily="34" charset="0"/>
+            </a:endParaRPr>
+          </a:p>
+          <a:p>
+            <a:pPr marL="342900" indent="-342900">
+              <a:buFont typeface="Arial" panose="020B0604020202020204" pitchFamily="34" charset="0"/>
+              <a:buChar char="•"/>
+            </a:pPr>
+            <a:endParaRPr lang="pt-BR" dirty="0"/>
+          </a:p>
+        </p:txBody>
+      </p:sp>
+    </p:spTree>
+    <p:extLst>
+      <p:ext uri="{BB962C8B-B14F-4D97-AF65-F5344CB8AC3E}">
+        <p14:creationId xmlns:p14="http://schemas.microsoft.com/office/powerpoint/2010/main" val="1826262732"/>
+      </p:ext>
+    </p:extLst>
+  </p:cSld>
+  <p:clrMapOvr>
+    <a:masterClrMapping/>
+  </p:clrMapOvr>
+  <p:timing>
+    <p:tnLst>
+      <p:par>
+        <p:cTn id="1" dur="indefinite" restart="never" nodeType="tmRoot"/>
+      </p:par>
+    </p:tnLst>
+  </p:timing>
+</p:sld>
+</file>
+
+<file path=ppt/slides/slide14.xml><?xml version="1.0" encoding="utf-8"?>
+<p:sld xmlns:a="http://schemas.openxmlformats.org/drawingml/2006/main" xmlns:r="http://schemas.openxmlformats.org/officeDocument/2006/relationships" xmlns:p="http://schemas.openxmlformats.org/presentationml/2006/main">
+  <p:cSld>
+    <p:spTree>
+      <p:nvGrpSpPr>
+        <p:cNvPr id="1" name=""/>
+        <p:cNvGrpSpPr/>
+        <p:nvPr/>
+      </p:nvGrpSpPr>
+      <p:grpSpPr>
+        <a:xfrm>
+          <a:off x="0" y="0"/>
+          <a:ext cx="0" cy="0"/>
+          <a:chOff x="0" y="0"/>
+          <a:chExt cx="0" cy="0"/>
+        </a:xfrm>
+      </p:grpSpPr>
+      <p:sp>
+        <p:nvSpPr>
+          <p:cNvPr id="2" name="Espaço Reservado para Texto 1"/>
+          <p:cNvSpPr>
+            <a:spLocks noGrp="1"/>
+          </p:cNvSpPr>
+          <p:nvPr>
+            <p:ph type="body" sz="quarter" idx="10"/>
+          </p:nvPr>
+        </p:nvSpPr>
+        <p:spPr/>
+        <p:txBody>
+          <a:bodyPr/>
+          <a:lstStyle/>
+          <a:p>
+            <a:r>
+              <a:rPr lang="pt-BR" dirty="0" smtClean="0"/>
+              <a:t>Como tudo funciona?</a:t>
+            </a:r>
+            <a:endParaRPr lang="pt-BR" dirty="0"/>
+          </a:p>
+        </p:txBody>
+      </p:sp>
+      <p:pic>
+        <p:nvPicPr>
+          <p:cNvPr id="9" name="Imagem 8"/>
+          <p:cNvPicPr>
+            <a:picLocks noChangeAspect="1"/>
+          </p:cNvPicPr>
+          <p:nvPr/>
+        </p:nvPicPr>
+        <p:blipFill>
+          <a:blip r:embed="rId2"/>
+          <a:stretch>
+            <a:fillRect/>
+          </a:stretch>
+        </p:blipFill>
+        <p:spPr>
+          <a:xfrm>
+            <a:off x="1122590" y="1768926"/>
+            <a:ext cx="991961" cy="991961"/>
+          </a:xfrm>
+          <a:prstGeom prst="rect">
+            <a:avLst/>
+          </a:prstGeom>
+        </p:spPr>
+      </p:pic>
+      <p:cxnSp>
+        <p:nvCxnSpPr>
+          <p:cNvPr id="11" name="Conector de seta reta 10"/>
+          <p:cNvCxnSpPr/>
+          <p:nvPr/>
+        </p:nvCxnSpPr>
+        <p:spPr>
+          <a:xfrm flipV="1">
+            <a:off x="2343150" y="2253343"/>
+            <a:ext cx="1845808" cy="16328"/>
+          </a:xfrm>
+          <a:prstGeom prst="straightConnector1">
+            <a:avLst/>
+          </a:prstGeom>
+          <a:ln w="57150">
+            <a:solidFill>
+              <a:schemeClr val="bg1">
+                <a:lumMod val="50000"/>
+              </a:schemeClr>
+            </a:solidFill>
+            <a:tailEnd type="triangle"/>
+          </a:ln>
+        </p:spPr>
+        <p:style>
+          <a:lnRef idx="3">
+            <a:schemeClr val="dk1"/>
+          </a:lnRef>
+          <a:fillRef idx="0">
+            <a:schemeClr val="dk1"/>
+          </a:fillRef>
+          <a:effectRef idx="2">
+            <a:schemeClr val="dk1"/>
+          </a:effectRef>
+          <a:fontRef idx="minor">
+            <a:schemeClr val="tx1"/>
+          </a:fontRef>
+        </p:style>
+      </p:cxnSp>
+      <p:sp>
+        <p:nvSpPr>
+          <p:cNvPr id="15" name="CaixaDeTexto 14"/>
+          <p:cNvSpPr txBox="1"/>
+          <p:nvPr/>
+        </p:nvSpPr>
+        <p:spPr>
+          <a:xfrm>
+            <a:off x="2482623" y="1768926"/>
+            <a:ext cx="1641021" cy="338554"/>
+          </a:xfrm>
+          <a:prstGeom prst="rect">
+            <a:avLst/>
+          </a:prstGeom>
+          <a:noFill/>
+        </p:spPr>
+        <p:txBody>
+          <a:bodyPr wrap="square" rtlCol="0">
+            <a:spAutoFit/>
+          </a:bodyPr>
+          <a:lstStyle/>
+          <a:p>
+            <a:r>
+              <a:rPr lang="pt-BR" sz="1600" dirty="0" smtClean="0"/>
+              <a:t>Requisição HTTP</a:t>
+            </a:r>
+            <a:endParaRPr lang="pt-BR" sz="1600" dirty="0"/>
+          </a:p>
+        </p:txBody>
+      </p:sp>
+      <p:sp>
+        <p:nvSpPr>
+          <p:cNvPr id="17" name="Retângulo de cantos arredondados 16"/>
+          <p:cNvSpPr/>
+          <p:nvPr/>
+        </p:nvSpPr>
+        <p:spPr>
+          <a:xfrm>
+            <a:off x="4637315" y="1768926"/>
+            <a:ext cx="1624693" cy="859974"/>
+          </a:xfrm>
+          <a:prstGeom prst="roundRect">
+            <a:avLst/>
+          </a:prstGeom>
+        </p:spPr>
+        <p:style>
+          <a:lnRef idx="1">
+            <a:schemeClr val="accent6"/>
+          </a:lnRef>
+          <a:fillRef idx="2">
+            <a:schemeClr val="accent6"/>
+          </a:fillRef>
+          <a:effectRef idx="1">
+            <a:schemeClr val="accent6"/>
+          </a:effectRef>
+          <a:fontRef idx="minor">
+            <a:schemeClr val="dk1"/>
+          </a:fontRef>
+        </p:style>
+        <p:txBody>
+          <a:bodyPr rtlCol="0" anchor="ctr"/>
+          <a:lstStyle/>
+          <a:p>
+            <a:pPr algn="ctr"/>
+            <a:r>
+              <a:rPr lang="pt-BR" sz="2400" dirty="0" err="1" smtClean="0"/>
+              <a:t>Controller</a:t>
+            </a:r>
+            <a:endParaRPr lang="pt-BR" sz="2400" dirty="0"/>
+          </a:p>
+        </p:txBody>
+      </p:sp>
+      <p:sp>
+        <p:nvSpPr>
+          <p:cNvPr id="18" name="Retângulo de cantos arredondados 17"/>
+          <p:cNvSpPr/>
+          <p:nvPr/>
+        </p:nvSpPr>
+        <p:spPr>
+          <a:xfrm>
+            <a:off x="8726943" y="1733545"/>
+            <a:ext cx="1624693" cy="859974"/>
+          </a:xfrm>
+          <a:prstGeom prst="roundRect">
+            <a:avLst/>
+          </a:prstGeom>
+        </p:spPr>
+        <p:style>
+          <a:lnRef idx="1">
+            <a:schemeClr val="accent6"/>
+          </a:lnRef>
+          <a:fillRef idx="2">
+            <a:schemeClr val="accent6"/>
+          </a:fillRef>
+          <a:effectRef idx="1">
+            <a:schemeClr val="accent6"/>
+          </a:effectRef>
+          <a:fontRef idx="minor">
+            <a:schemeClr val="dk1"/>
+          </a:fontRef>
+        </p:style>
+        <p:txBody>
+          <a:bodyPr rtlCol="0" anchor="ctr"/>
+          <a:lstStyle/>
+          <a:p>
+            <a:pPr algn="ctr"/>
+            <a:r>
+              <a:rPr lang="pt-BR" sz="2400" dirty="0" err="1" smtClean="0"/>
+              <a:t>Model</a:t>
+            </a:r>
+            <a:endParaRPr lang="pt-BR" sz="2400" dirty="0"/>
+          </a:p>
+        </p:txBody>
+      </p:sp>
+      <p:sp>
+        <p:nvSpPr>
+          <p:cNvPr id="19" name="Retângulo de cantos arredondados 18"/>
+          <p:cNvSpPr/>
+          <p:nvPr/>
+        </p:nvSpPr>
+        <p:spPr>
+          <a:xfrm>
+            <a:off x="4637314" y="3864412"/>
+            <a:ext cx="1624693" cy="859974"/>
+          </a:xfrm>
+          <a:prstGeom prst="roundRect">
+            <a:avLst/>
+          </a:prstGeom>
+        </p:spPr>
+        <p:style>
+          <a:lnRef idx="1">
+            <a:schemeClr val="accent6"/>
+          </a:lnRef>
+          <a:fillRef idx="2">
+            <a:schemeClr val="accent6"/>
+          </a:fillRef>
+          <a:effectRef idx="1">
+            <a:schemeClr val="accent6"/>
+          </a:effectRef>
+          <a:fontRef idx="minor">
+            <a:schemeClr val="dk1"/>
+          </a:fontRef>
+        </p:style>
+        <p:txBody>
+          <a:bodyPr rtlCol="0" anchor="ctr"/>
+          <a:lstStyle/>
+          <a:p>
+            <a:pPr algn="ctr"/>
+            <a:r>
+              <a:rPr lang="pt-BR" sz="2400" dirty="0" err="1" smtClean="0"/>
+              <a:t>View</a:t>
+            </a:r>
+            <a:endParaRPr lang="pt-BR" sz="2400" dirty="0"/>
+          </a:p>
+        </p:txBody>
+      </p:sp>
+      <p:sp>
+        <p:nvSpPr>
+          <p:cNvPr id="20" name="Cilindro 19"/>
+          <p:cNvSpPr/>
+          <p:nvPr/>
+        </p:nvSpPr>
+        <p:spPr>
+          <a:xfrm>
+            <a:off x="9690329" y="3548731"/>
+            <a:ext cx="784450" cy="745668"/>
+          </a:xfrm>
+          <a:prstGeom prst="can">
+            <a:avLst/>
+          </a:prstGeom>
+          <a:solidFill>
+            <a:schemeClr val="bg1">
+              <a:lumMod val="75000"/>
+            </a:schemeClr>
+          </a:solidFill>
+          <a:ln>
+            <a:solidFill>
+              <a:schemeClr val="bg1">
+                <a:lumMod val="65000"/>
+              </a:schemeClr>
+            </a:solidFill>
+          </a:ln>
+        </p:spPr>
+        <p:style>
+          <a:lnRef idx="2">
+            <a:schemeClr val="accent5">
+              <a:shade val="50000"/>
+            </a:schemeClr>
+          </a:lnRef>
+          <a:fillRef idx="1">
+            <a:schemeClr val="accent5"/>
+          </a:fillRef>
+          <a:effectRef idx="0">
+            <a:schemeClr val="accent5"/>
+          </a:effectRef>
+          <a:fontRef idx="minor">
+            <a:schemeClr val="lt1"/>
+          </a:fontRef>
+        </p:style>
+        <p:txBody>
+          <a:bodyPr rtlCol="0" anchor="ctr"/>
+          <a:lstStyle/>
+          <a:p>
+            <a:pPr algn="ctr"/>
+            <a:r>
+              <a:rPr lang="pt-BR" dirty="0" smtClean="0">
+                <a:solidFill>
+                  <a:schemeClr val="tx1"/>
+                </a:solidFill>
+              </a:rPr>
+              <a:t>Dados</a:t>
+            </a:r>
+            <a:endParaRPr lang="pt-BR" dirty="0">
+              <a:solidFill>
+                <a:schemeClr val="tx1"/>
+              </a:solidFill>
+            </a:endParaRPr>
+          </a:p>
+        </p:txBody>
+      </p:sp>
+      <p:cxnSp>
+        <p:nvCxnSpPr>
+          <p:cNvPr id="21" name="Conector de seta reta 20"/>
+          <p:cNvCxnSpPr/>
+          <p:nvPr/>
+        </p:nvCxnSpPr>
+        <p:spPr>
+          <a:xfrm flipV="1">
+            <a:off x="6710365" y="2003112"/>
+            <a:ext cx="1568221" cy="11087"/>
+          </a:xfrm>
+          <a:prstGeom prst="straightConnector1">
+            <a:avLst/>
+          </a:prstGeom>
+          <a:ln w="57150">
+            <a:solidFill>
+              <a:schemeClr val="bg1">
+                <a:lumMod val="50000"/>
+              </a:schemeClr>
+            </a:solidFill>
+            <a:prstDash val="sysDot"/>
+            <a:tailEnd type="triangle"/>
+          </a:ln>
+        </p:spPr>
+        <p:style>
+          <a:lnRef idx="3">
+            <a:schemeClr val="dk1"/>
+          </a:lnRef>
+          <a:fillRef idx="0">
+            <a:schemeClr val="dk1"/>
+          </a:fillRef>
+          <a:effectRef idx="2">
+            <a:schemeClr val="dk1"/>
+          </a:effectRef>
+          <a:fontRef idx="minor">
+            <a:schemeClr val="tx1"/>
+          </a:fontRef>
+        </p:style>
+      </p:cxnSp>
+      <p:cxnSp>
+        <p:nvCxnSpPr>
+          <p:cNvPr id="28" name="Conector de seta reta 27"/>
+          <p:cNvCxnSpPr/>
+          <p:nvPr/>
+        </p:nvCxnSpPr>
+        <p:spPr>
+          <a:xfrm rot="10800000" flipV="1">
+            <a:off x="6693697" y="2392276"/>
+            <a:ext cx="1568221" cy="11087"/>
+          </a:xfrm>
+          <a:prstGeom prst="straightConnector1">
+            <a:avLst/>
+          </a:prstGeom>
+          <a:ln w="57150">
+            <a:solidFill>
+              <a:schemeClr val="bg1">
+                <a:lumMod val="50000"/>
+              </a:schemeClr>
+            </a:solidFill>
+            <a:prstDash val="sysDot"/>
+            <a:tailEnd type="triangle"/>
+          </a:ln>
+        </p:spPr>
+        <p:style>
+          <a:lnRef idx="3">
+            <a:schemeClr val="dk1"/>
+          </a:lnRef>
+          <a:fillRef idx="0">
+            <a:schemeClr val="dk1"/>
+          </a:fillRef>
+          <a:effectRef idx="2">
+            <a:schemeClr val="dk1"/>
+          </a:effectRef>
+          <a:fontRef idx="minor">
+            <a:schemeClr val="tx1"/>
+          </a:fontRef>
+        </p:style>
+      </p:cxnSp>
+      <p:cxnSp>
+        <p:nvCxnSpPr>
+          <p:cNvPr id="29" name="Conector de seta reta 28"/>
+          <p:cNvCxnSpPr/>
+          <p:nvPr/>
+        </p:nvCxnSpPr>
+        <p:spPr>
+          <a:xfrm>
+            <a:off x="10163858" y="2760887"/>
+            <a:ext cx="0" cy="713011"/>
+          </a:xfrm>
+          <a:prstGeom prst="straightConnector1">
+            <a:avLst/>
+          </a:prstGeom>
+          <a:ln w="57150">
+            <a:solidFill>
+              <a:schemeClr val="bg1">
+                <a:lumMod val="50000"/>
+              </a:schemeClr>
+            </a:solidFill>
+            <a:prstDash val="sysDot"/>
+            <a:tailEnd type="triangle"/>
+          </a:ln>
+        </p:spPr>
+        <p:style>
+          <a:lnRef idx="3">
+            <a:schemeClr val="dk1"/>
+          </a:lnRef>
+          <a:fillRef idx="0">
+            <a:schemeClr val="dk1"/>
+          </a:fillRef>
+          <a:effectRef idx="2">
+            <a:schemeClr val="dk1"/>
+          </a:effectRef>
+          <a:fontRef idx="minor">
+            <a:schemeClr val="tx1"/>
+          </a:fontRef>
+        </p:style>
+      </p:cxnSp>
+      <p:cxnSp>
+        <p:nvCxnSpPr>
+          <p:cNvPr id="32" name="Conector de seta reta 31"/>
+          <p:cNvCxnSpPr/>
+          <p:nvPr/>
+        </p:nvCxnSpPr>
+        <p:spPr>
+          <a:xfrm rot="10800000">
+            <a:off x="9834565" y="2760886"/>
+            <a:ext cx="0" cy="713011"/>
+          </a:xfrm>
+          <a:prstGeom prst="straightConnector1">
+            <a:avLst/>
+          </a:prstGeom>
+          <a:ln w="57150">
+            <a:solidFill>
+              <a:schemeClr val="bg1">
+                <a:lumMod val="50000"/>
+              </a:schemeClr>
+            </a:solidFill>
+            <a:prstDash val="sysDot"/>
+            <a:tailEnd type="triangle"/>
+          </a:ln>
+        </p:spPr>
+        <p:style>
+          <a:lnRef idx="3">
+            <a:schemeClr val="dk1"/>
+          </a:lnRef>
+          <a:fillRef idx="0">
+            <a:schemeClr val="dk1"/>
+          </a:fillRef>
+          <a:effectRef idx="2">
+            <a:schemeClr val="dk1"/>
+          </a:effectRef>
+          <a:fontRef idx="minor">
+            <a:schemeClr val="tx1"/>
+          </a:fontRef>
+        </p:style>
+      </p:cxnSp>
+      <p:cxnSp>
+        <p:nvCxnSpPr>
+          <p:cNvPr id="33" name="Conector de seta reta 32"/>
+          <p:cNvCxnSpPr/>
+          <p:nvPr/>
+        </p:nvCxnSpPr>
+        <p:spPr>
+          <a:xfrm flipH="1">
+            <a:off x="5446486" y="2732775"/>
+            <a:ext cx="3174" cy="1027761"/>
+          </a:xfrm>
+          <a:prstGeom prst="straightConnector1">
+            <a:avLst/>
+          </a:prstGeom>
+          <a:ln w="57150">
+            <a:solidFill>
+              <a:schemeClr val="bg1">
+                <a:lumMod val="50000"/>
+              </a:schemeClr>
+            </a:solidFill>
+            <a:tailEnd type="triangle"/>
+          </a:ln>
+        </p:spPr>
+        <p:style>
+          <a:lnRef idx="3">
+            <a:schemeClr val="dk1"/>
+          </a:lnRef>
+          <a:fillRef idx="0">
+            <a:schemeClr val="dk1"/>
+          </a:fillRef>
+          <a:effectRef idx="2">
+            <a:schemeClr val="dk1"/>
+          </a:effectRef>
+          <a:fontRef idx="minor">
+            <a:schemeClr val="tx1"/>
+          </a:fontRef>
+        </p:style>
+      </p:cxnSp>
+      <p:cxnSp>
+        <p:nvCxnSpPr>
+          <p:cNvPr id="35" name="Conector de seta reta 34"/>
+          <p:cNvCxnSpPr/>
+          <p:nvPr/>
+        </p:nvCxnSpPr>
+        <p:spPr>
+          <a:xfrm flipH="1" flipV="1">
+            <a:off x="2278775" y="2824843"/>
+            <a:ext cx="2048863" cy="1469557"/>
+          </a:xfrm>
+          <a:prstGeom prst="straightConnector1">
+            <a:avLst/>
+          </a:prstGeom>
+          <a:ln w="57150">
+            <a:solidFill>
+              <a:schemeClr val="bg1">
+                <a:lumMod val="50000"/>
+              </a:schemeClr>
+            </a:solidFill>
+            <a:tailEnd type="triangle"/>
+          </a:ln>
+        </p:spPr>
+        <p:style>
+          <a:lnRef idx="3">
+            <a:schemeClr val="dk1"/>
+          </a:lnRef>
+          <a:fillRef idx="0">
+            <a:schemeClr val="dk1"/>
+          </a:fillRef>
+          <a:effectRef idx="2">
+            <a:schemeClr val="dk1"/>
+          </a:effectRef>
+          <a:fontRef idx="minor">
+            <a:schemeClr val="tx1"/>
+          </a:fontRef>
+        </p:style>
+      </p:cxnSp>
+      <p:sp>
+        <p:nvSpPr>
+          <p:cNvPr id="39" name="CaixaDeTexto 38"/>
+          <p:cNvSpPr txBox="1"/>
+          <p:nvPr/>
+        </p:nvSpPr>
+        <p:spPr>
+          <a:xfrm rot="2109049">
+            <a:off x="2421610" y="3249829"/>
+            <a:ext cx="2152650" cy="338554"/>
+          </a:xfrm>
+          <a:prstGeom prst="rect">
+            <a:avLst/>
+          </a:prstGeom>
+          <a:noFill/>
+        </p:spPr>
+        <p:txBody>
+          <a:bodyPr wrap="square" rtlCol="0">
+            <a:spAutoFit/>
+          </a:bodyPr>
+          <a:lstStyle/>
+          <a:p>
+            <a:r>
+              <a:rPr lang="pt-BR" sz="1600" dirty="0" smtClean="0"/>
+              <a:t>Resposta </a:t>
+            </a:r>
+            <a:r>
+              <a:rPr lang="pt-BR" sz="1600" dirty="0" err="1" smtClean="0"/>
+              <a:t>Renderizada</a:t>
+            </a:r>
+            <a:endParaRPr lang="pt-BR" sz="1600" dirty="0"/>
+          </a:p>
+        </p:txBody>
+      </p:sp>
+      <p:sp>
+        <p:nvSpPr>
+          <p:cNvPr id="41" name="CaixaDeTexto 40"/>
+          <p:cNvSpPr txBox="1"/>
+          <p:nvPr/>
+        </p:nvSpPr>
+        <p:spPr>
+          <a:xfrm>
+            <a:off x="6891338" y="1500389"/>
+            <a:ext cx="1158649" cy="338554"/>
+          </a:xfrm>
+          <a:prstGeom prst="rect">
+            <a:avLst/>
+          </a:prstGeom>
+          <a:noFill/>
+        </p:spPr>
+        <p:txBody>
+          <a:bodyPr wrap="square" rtlCol="0">
+            <a:spAutoFit/>
+          </a:bodyPr>
+          <a:lstStyle/>
+          <a:p>
+            <a:r>
+              <a:rPr lang="pt-BR" sz="1600" dirty="0" smtClean="0"/>
+              <a:t>Solicitação</a:t>
+            </a:r>
+            <a:endParaRPr lang="pt-BR" sz="1600" dirty="0"/>
+          </a:p>
+        </p:txBody>
+      </p:sp>
+      <p:sp>
+        <p:nvSpPr>
+          <p:cNvPr id="42" name="CaixaDeTexto 41"/>
+          <p:cNvSpPr txBox="1"/>
+          <p:nvPr/>
+        </p:nvSpPr>
+        <p:spPr>
+          <a:xfrm>
+            <a:off x="5528674" y="3054740"/>
+            <a:ext cx="1288506" cy="338554"/>
+          </a:xfrm>
+          <a:prstGeom prst="rect">
+            <a:avLst/>
+          </a:prstGeom>
+          <a:noFill/>
+        </p:spPr>
+        <p:txBody>
+          <a:bodyPr wrap="square" rtlCol="0">
+            <a:spAutoFit/>
+          </a:bodyPr>
+          <a:lstStyle/>
+          <a:p>
+            <a:r>
+              <a:rPr lang="pt-BR" sz="1600" dirty="0" smtClean="0"/>
+              <a:t>[</a:t>
+            </a:r>
+            <a:r>
+              <a:rPr lang="pt-BR" sz="1600" dirty="0" err="1" smtClean="0"/>
+              <a:t>ViewModel</a:t>
+            </a:r>
+            <a:r>
+              <a:rPr lang="pt-BR" sz="1600" dirty="0" smtClean="0"/>
+              <a:t>]</a:t>
+            </a:r>
+            <a:endParaRPr lang="pt-BR" sz="1600" dirty="0"/>
+          </a:p>
+        </p:txBody>
+      </p:sp>
+    </p:spTree>
+    <p:extLst>
+      <p:ext uri="{BB962C8B-B14F-4D97-AF65-F5344CB8AC3E}">
+        <p14:creationId xmlns:p14="http://schemas.microsoft.com/office/powerpoint/2010/main" val="3204137560"/>
+      </p:ext>
+    </p:extLst>
+  </p:cSld>
+  <p:clrMapOvr>
+    <a:masterClrMapping/>
+  </p:clrMapOvr>
+  <p:timing>
+    <p:tnLst>
+      <p:par>
+        <p:cTn id="1" dur="indefinite" restart="never" nodeType="tmRoot">
+          <p:childTnLst>
+            <p:seq concurrent="1" nextAc="seek">
+              <p:cTn id="2" dur="indefinite" nodeType="mainSeq">
+                <p:childTnLst>
+                  <p:par>
+                    <p:cTn id="3" fill="hold">
+                      <p:stCondLst>
+                        <p:cond delay="indefinite"/>
+                      </p:stCondLst>
+                      <p:childTnLst>
+                        <p:par>
+                          <p:cTn id="4" fill="hold">
+                            <p:stCondLst>
+                              <p:cond delay="0"/>
+                            </p:stCondLst>
+                            <p:childTnLst>
+                              <p:par>
+                                <p:cTn id="5" presetID="10" presetClass="entr" presetSubtype="0" fill="hold" nodeType="clickEffect">
+                                  <p:stCondLst>
+                                    <p:cond delay="0"/>
+                                  </p:stCondLst>
+                                  <p:childTnLst>
+                                    <p:set>
+                                      <p:cBhvr>
+                                        <p:cTn id="6" dur="1" fill="hold">
+                                          <p:stCondLst>
+                                            <p:cond delay="0"/>
+                                          </p:stCondLst>
+                                        </p:cTn>
+                                        <p:tgtEl>
+                                          <p:spTgt spid="9"/>
+                                        </p:tgtEl>
+                                        <p:attrNameLst>
+                                          <p:attrName>style.visibility</p:attrName>
+                                        </p:attrNameLst>
+                                      </p:cBhvr>
+                                      <p:to>
+                                        <p:strVal val="visible"/>
+                                      </p:to>
+                                    </p:set>
+                                    <p:animEffect transition="in" filter="fade">
+                                      <p:cBhvr>
+                                        <p:cTn id="7" dur="500"/>
+                                        <p:tgtEl>
+                                          <p:spTgt spid="9"/>
+                                        </p:tgtEl>
+                                      </p:cBhvr>
+                                    </p:animEffect>
+                                  </p:childTnLst>
+                                </p:cTn>
+                              </p:par>
+                            </p:childTnLst>
+                          </p:cTn>
+                        </p:par>
+                      </p:childTnLst>
+                    </p:cTn>
+                  </p:par>
+                  <p:par>
+                    <p:cTn id="8" fill="hold">
+                      <p:stCondLst>
+                        <p:cond delay="indefinite"/>
+                      </p:stCondLst>
+                      <p:childTnLst>
+                        <p:par>
+                          <p:cTn id="9" fill="hold">
+                            <p:stCondLst>
+                              <p:cond delay="0"/>
+                            </p:stCondLst>
+                            <p:childTnLst>
+                              <p:par>
+                                <p:cTn id="10" presetID="10" presetClass="entr" presetSubtype="0" fill="hold" grpId="0" nodeType="clickEffect">
+                                  <p:stCondLst>
+                                    <p:cond delay="0"/>
+                                  </p:stCondLst>
+                                  <p:childTnLst>
+                                    <p:set>
+                                      <p:cBhvr>
+                                        <p:cTn id="11" dur="1" fill="hold">
+                                          <p:stCondLst>
+                                            <p:cond delay="0"/>
+                                          </p:stCondLst>
+                                        </p:cTn>
+                                        <p:tgtEl>
+                                          <p:spTgt spid="15"/>
+                                        </p:tgtEl>
+                                        <p:attrNameLst>
+                                          <p:attrName>style.visibility</p:attrName>
+                                        </p:attrNameLst>
+                                      </p:cBhvr>
+                                      <p:to>
+                                        <p:strVal val="visible"/>
+                                      </p:to>
+                                    </p:set>
+                                    <p:animEffect transition="in" filter="fade">
+                                      <p:cBhvr>
+                                        <p:cTn id="12" dur="500"/>
+                                        <p:tgtEl>
+                                          <p:spTgt spid="15"/>
+                                        </p:tgtEl>
+                                      </p:cBhvr>
+                                    </p:animEffect>
+                                  </p:childTnLst>
+                                </p:cTn>
+                              </p:par>
+                              <p:par>
+                                <p:cTn id="13" presetID="10" presetClass="entr" presetSubtype="0" fill="hold" nodeType="withEffect">
+                                  <p:stCondLst>
+                                    <p:cond delay="0"/>
+                                  </p:stCondLst>
+                                  <p:childTnLst>
+                                    <p:set>
+                                      <p:cBhvr>
+                                        <p:cTn id="14" dur="1" fill="hold">
+                                          <p:stCondLst>
+                                            <p:cond delay="0"/>
+                                          </p:stCondLst>
+                                        </p:cTn>
+                                        <p:tgtEl>
+                                          <p:spTgt spid="11"/>
+                                        </p:tgtEl>
+                                        <p:attrNameLst>
+                                          <p:attrName>style.visibility</p:attrName>
+                                        </p:attrNameLst>
+                                      </p:cBhvr>
+                                      <p:to>
+                                        <p:strVal val="visible"/>
+                                      </p:to>
+                                    </p:set>
+                                    <p:animEffect transition="in" filter="fade">
+                                      <p:cBhvr>
+                                        <p:cTn id="15" dur="500"/>
+                                        <p:tgtEl>
+                                          <p:spTgt spid="11"/>
+                                        </p:tgtEl>
+                                      </p:cBhvr>
+                                    </p:animEffect>
+                                  </p:childTnLst>
+                                </p:cTn>
+                              </p:par>
+                            </p:childTnLst>
+                          </p:cTn>
+                        </p:par>
+                      </p:childTnLst>
+                    </p:cTn>
+                  </p:par>
+                  <p:par>
+                    <p:cTn id="16" fill="hold">
+                      <p:stCondLst>
+                        <p:cond delay="indefinite"/>
+                      </p:stCondLst>
+                      <p:childTnLst>
+                        <p:par>
+                          <p:cTn id="17" fill="hold">
+                            <p:stCondLst>
+                              <p:cond delay="0"/>
+                            </p:stCondLst>
+                            <p:childTnLst>
+                              <p:par>
+                                <p:cTn id="18" presetID="10" presetClass="entr" presetSubtype="0" fill="hold" grpId="0" nodeType="clickEffect">
+                                  <p:stCondLst>
+                                    <p:cond delay="0"/>
+                                  </p:stCondLst>
+                                  <p:childTnLst>
+                                    <p:set>
+                                      <p:cBhvr>
+                                        <p:cTn id="19" dur="1" fill="hold">
+                                          <p:stCondLst>
+                                            <p:cond delay="0"/>
+                                          </p:stCondLst>
+                                        </p:cTn>
+                                        <p:tgtEl>
+                                          <p:spTgt spid="17"/>
+                                        </p:tgtEl>
+                                        <p:attrNameLst>
+                                          <p:attrName>style.visibility</p:attrName>
+                                        </p:attrNameLst>
+                                      </p:cBhvr>
+                                      <p:to>
+                                        <p:strVal val="visible"/>
+                                      </p:to>
+                                    </p:set>
+                                    <p:animEffect transition="in" filter="fade">
+                                      <p:cBhvr>
+                                        <p:cTn id="20" dur="500"/>
+                                        <p:tgtEl>
+                                          <p:spTgt spid="17"/>
+                                        </p:tgtEl>
+                                      </p:cBhvr>
+                                    </p:animEffect>
+                                  </p:childTnLst>
+                                </p:cTn>
+                              </p:par>
+                            </p:childTnLst>
+                          </p:cTn>
+                        </p:par>
+                      </p:childTnLst>
+                    </p:cTn>
+                  </p:par>
+                  <p:par>
+                    <p:cTn id="21" fill="hold">
+                      <p:stCondLst>
+                        <p:cond delay="indefinite"/>
+                      </p:stCondLst>
+                      <p:childTnLst>
+                        <p:par>
+                          <p:cTn id="22" fill="hold">
+                            <p:stCondLst>
+                              <p:cond delay="0"/>
+                            </p:stCondLst>
+                            <p:childTnLst>
+                              <p:par>
+                                <p:cTn id="23" presetID="10" presetClass="entr" presetSubtype="0" fill="hold" nodeType="clickEffect">
+                                  <p:stCondLst>
+                                    <p:cond delay="0"/>
+                                  </p:stCondLst>
+                                  <p:childTnLst>
+                                    <p:set>
+                                      <p:cBhvr>
+                                        <p:cTn id="24" dur="1" fill="hold">
+                                          <p:stCondLst>
+                                            <p:cond delay="0"/>
+                                          </p:stCondLst>
+                                        </p:cTn>
+                                        <p:tgtEl>
+                                          <p:spTgt spid="21"/>
+                                        </p:tgtEl>
+                                        <p:attrNameLst>
+                                          <p:attrName>style.visibility</p:attrName>
+                                        </p:attrNameLst>
+                                      </p:cBhvr>
+                                      <p:to>
+                                        <p:strVal val="visible"/>
+                                      </p:to>
+                                    </p:set>
+                                    <p:animEffect transition="in" filter="fade">
+                                      <p:cBhvr>
+                                        <p:cTn id="25" dur="500"/>
+                                        <p:tgtEl>
+                                          <p:spTgt spid="21"/>
+                                        </p:tgtEl>
+                                      </p:cBhvr>
+                                    </p:animEffect>
+                                  </p:childTnLst>
+                                </p:cTn>
+                              </p:par>
+                              <p:par>
+                                <p:cTn id="26" presetID="10" presetClass="entr" presetSubtype="0" fill="hold" grpId="0" nodeType="withEffect">
+                                  <p:stCondLst>
+                                    <p:cond delay="0"/>
+                                  </p:stCondLst>
+                                  <p:childTnLst>
+                                    <p:set>
+                                      <p:cBhvr>
+                                        <p:cTn id="27" dur="1" fill="hold">
+                                          <p:stCondLst>
+                                            <p:cond delay="0"/>
+                                          </p:stCondLst>
+                                        </p:cTn>
+                                        <p:tgtEl>
+                                          <p:spTgt spid="41"/>
+                                        </p:tgtEl>
+                                        <p:attrNameLst>
+                                          <p:attrName>style.visibility</p:attrName>
+                                        </p:attrNameLst>
+                                      </p:cBhvr>
+                                      <p:to>
+                                        <p:strVal val="visible"/>
+                                      </p:to>
+                                    </p:set>
+                                    <p:animEffect transition="in" filter="fade">
+                                      <p:cBhvr>
+                                        <p:cTn id="28" dur="500"/>
+                                        <p:tgtEl>
+                                          <p:spTgt spid="41"/>
+                                        </p:tgtEl>
+                                      </p:cBhvr>
+                                    </p:animEffect>
+                                  </p:childTnLst>
+                                </p:cTn>
+                              </p:par>
+                            </p:childTnLst>
+                          </p:cTn>
+                        </p:par>
+                      </p:childTnLst>
+                    </p:cTn>
+                  </p:par>
+                  <p:par>
+                    <p:cTn id="29" fill="hold">
+                      <p:stCondLst>
+                        <p:cond delay="indefinite"/>
+                      </p:stCondLst>
+                      <p:childTnLst>
+                        <p:par>
+                          <p:cTn id="30" fill="hold">
+                            <p:stCondLst>
+                              <p:cond delay="0"/>
+                            </p:stCondLst>
+                            <p:childTnLst>
+                              <p:par>
+                                <p:cTn id="31" presetID="10" presetClass="entr" presetSubtype="0" fill="hold" grpId="0" nodeType="clickEffect">
+                                  <p:stCondLst>
+                                    <p:cond delay="0"/>
+                                  </p:stCondLst>
+                                  <p:childTnLst>
+                                    <p:set>
+                                      <p:cBhvr>
+                                        <p:cTn id="32" dur="1" fill="hold">
+                                          <p:stCondLst>
+                                            <p:cond delay="0"/>
+                                          </p:stCondLst>
+                                        </p:cTn>
+                                        <p:tgtEl>
+                                          <p:spTgt spid="18"/>
+                                        </p:tgtEl>
+                                        <p:attrNameLst>
+                                          <p:attrName>style.visibility</p:attrName>
+                                        </p:attrNameLst>
+                                      </p:cBhvr>
+                                      <p:to>
+                                        <p:strVal val="visible"/>
+                                      </p:to>
+                                    </p:set>
+                                    <p:animEffect transition="in" filter="fade">
+                                      <p:cBhvr>
+                                        <p:cTn id="33" dur="500"/>
+                                        <p:tgtEl>
+                                          <p:spTgt spid="18"/>
+                                        </p:tgtEl>
+                                      </p:cBhvr>
+                                    </p:animEffect>
+                                  </p:childTnLst>
+                                </p:cTn>
+                              </p:par>
+                            </p:childTnLst>
+                          </p:cTn>
+                        </p:par>
+                      </p:childTnLst>
+                    </p:cTn>
+                  </p:par>
+                  <p:par>
+                    <p:cTn id="34" fill="hold">
+                      <p:stCondLst>
+                        <p:cond delay="indefinite"/>
+                      </p:stCondLst>
+                      <p:childTnLst>
+                        <p:par>
+                          <p:cTn id="35" fill="hold">
+                            <p:stCondLst>
+                              <p:cond delay="0"/>
+                            </p:stCondLst>
+                            <p:childTnLst>
+                              <p:par>
+                                <p:cTn id="36" presetID="10" presetClass="entr" presetSubtype="0" fill="hold" nodeType="clickEffect">
+                                  <p:stCondLst>
+                                    <p:cond delay="0"/>
+                                  </p:stCondLst>
+                                  <p:childTnLst>
+                                    <p:set>
+                                      <p:cBhvr>
+                                        <p:cTn id="37" dur="1" fill="hold">
+                                          <p:stCondLst>
+                                            <p:cond delay="0"/>
+                                          </p:stCondLst>
+                                        </p:cTn>
+                                        <p:tgtEl>
+                                          <p:spTgt spid="29"/>
+                                        </p:tgtEl>
+                                        <p:attrNameLst>
+                                          <p:attrName>style.visibility</p:attrName>
+                                        </p:attrNameLst>
+                                      </p:cBhvr>
+                                      <p:to>
+                                        <p:strVal val="visible"/>
+                                      </p:to>
+                                    </p:set>
+                                    <p:animEffect transition="in" filter="fade">
+                                      <p:cBhvr>
+                                        <p:cTn id="38" dur="500"/>
+                                        <p:tgtEl>
+                                          <p:spTgt spid="29"/>
+                                        </p:tgtEl>
+                                      </p:cBhvr>
+                                    </p:animEffect>
+                                  </p:childTnLst>
+                                </p:cTn>
+                              </p:par>
+                              <p:par>
+                                <p:cTn id="39" presetID="10" presetClass="entr" presetSubtype="0" fill="hold" grpId="0" nodeType="withEffect">
+                                  <p:stCondLst>
+                                    <p:cond delay="0"/>
+                                  </p:stCondLst>
+                                  <p:childTnLst>
+                                    <p:set>
+                                      <p:cBhvr>
+                                        <p:cTn id="40" dur="1" fill="hold">
+                                          <p:stCondLst>
+                                            <p:cond delay="0"/>
+                                          </p:stCondLst>
+                                        </p:cTn>
+                                        <p:tgtEl>
+                                          <p:spTgt spid="20"/>
+                                        </p:tgtEl>
+                                        <p:attrNameLst>
+                                          <p:attrName>style.visibility</p:attrName>
+                                        </p:attrNameLst>
+                                      </p:cBhvr>
+                                      <p:to>
+                                        <p:strVal val="visible"/>
+                                      </p:to>
+                                    </p:set>
+                                    <p:animEffect transition="in" filter="fade">
+                                      <p:cBhvr>
+                                        <p:cTn id="41" dur="500"/>
+                                        <p:tgtEl>
+                                          <p:spTgt spid="20"/>
+                                        </p:tgtEl>
+                                      </p:cBhvr>
+                                    </p:animEffect>
+                                  </p:childTnLst>
+                                </p:cTn>
+                              </p:par>
+                              <p:par>
+                                <p:cTn id="42" presetID="10" presetClass="entr" presetSubtype="0" fill="hold" nodeType="withEffect">
+                                  <p:stCondLst>
+                                    <p:cond delay="0"/>
+                                  </p:stCondLst>
+                                  <p:childTnLst>
+                                    <p:set>
+                                      <p:cBhvr>
+                                        <p:cTn id="43" dur="1" fill="hold">
+                                          <p:stCondLst>
+                                            <p:cond delay="0"/>
+                                          </p:stCondLst>
+                                        </p:cTn>
+                                        <p:tgtEl>
+                                          <p:spTgt spid="32"/>
+                                        </p:tgtEl>
+                                        <p:attrNameLst>
+                                          <p:attrName>style.visibility</p:attrName>
+                                        </p:attrNameLst>
+                                      </p:cBhvr>
+                                      <p:to>
+                                        <p:strVal val="visible"/>
+                                      </p:to>
+                                    </p:set>
+                                    <p:animEffect transition="in" filter="fade">
+                                      <p:cBhvr>
+                                        <p:cTn id="44" dur="500"/>
+                                        <p:tgtEl>
+                                          <p:spTgt spid="32"/>
+                                        </p:tgtEl>
+                                      </p:cBhvr>
+                                    </p:animEffect>
+                                  </p:childTnLst>
+                                </p:cTn>
+                              </p:par>
+                            </p:childTnLst>
+                          </p:cTn>
+                        </p:par>
+                      </p:childTnLst>
+                    </p:cTn>
+                  </p:par>
+                  <p:par>
+                    <p:cTn id="45" fill="hold">
+                      <p:stCondLst>
+                        <p:cond delay="indefinite"/>
+                      </p:stCondLst>
+                      <p:childTnLst>
+                        <p:par>
+                          <p:cTn id="46" fill="hold">
+                            <p:stCondLst>
+                              <p:cond delay="0"/>
+                            </p:stCondLst>
+                            <p:childTnLst>
+                              <p:par>
+                                <p:cTn id="47" presetID="10" presetClass="entr" presetSubtype="0" fill="hold" nodeType="clickEffect">
+                                  <p:stCondLst>
+                                    <p:cond delay="0"/>
+                                  </p:stCondLst>
+                                  <p:childTnLst>
+                                    <p:set>
+                                      <p:cBhvr>
+                                        <p:cTn id="48" dur="1" fill="hold">
+                                          <p:stCondLst>
+                                            <p:cond delay="0"/>
+                                          </p:stCondLst>
+                                        </p:cTn>
+                                        <p:tgtEl>
+                                          <p:spTgt spid="28"/>
+                                        </p:tgtEl>
+                                        <p:attrNameLst>
+                                          <p:attrName>style.visibility</p:attrName>
+                                        </p:attrNameLst>
+                                      </p:cBhvr>
+                                      <p:to>
+                                        <p:strVal val="visible"/>
+                                      </p:to>
+                                    </p:set>
+                                    <p:animEffect transition="in" filter="fade">
+                                      <p:cBhvr>
+                                        <p:cTn id="49" dur="500"/>
+                                        <p:tgtEl>
+                                          <p:spTgt spid="28"/>
+                                        </p:tgtEl>
+                                      </p:cBhvr>
+                                    </p:animEffect>
+                                  </p:childTnLst>
+                                </p:cTn>
+                              </p:par>
+                            </p:childTnLst>
+                          </p:cTn>
+                        </p:par>
+                      </p:childTnLst>
+                    </p:cTn>
+                  </p:par>
+                  <p:par>
+                    <p:cTn id="50" fill="hold">
+                      <p:stCondLst>
+                        <p:cond delay="indefinite"/>
+                      </p:stCondLst>
+                      <p:childTnLst>
+                        <p:par>
+                          <p:cTn id="51" fill="hold">
+                            <p:stCondLst>
+                              <p:cond delay="0"/>
+                            </p:stCondLst>
+                            <p:childTnLst>
+                              <p:par>
+                                <p:cTn id="52" presetID="10" presetClass="entr" presetSubtype="0" fill="hold" grpId="0" nodeType="clickEffect">
+                                  <p:stCondLst>
+                                    <p:cond delay="0"/>
+                                  </p:stCondLst>
+                                  <p:childTnLst>
+                                    <p:set>
+                                      <p:cBhvr>
+                                        <p:cTn id="53" dur="1" fill="hold">
+                                          <p:stCondLst>
+                                            <p:cond delay="0"/>
+                                          </p:stCondLst>
+                                        </p:cTn>
+                                        <p:tgtEl>
+                                          <p:spTgt spid="42"/>
+                                        </p:tgtEl>
+                                        <p:attrNameLst>
+                                          <p:attrName>style.visibility</p:attrName>
+                                        </p:attrNameLst>
+                                      </p:cBhvr>
+                                      <p:to>
+                                        <p:strVal val="visible"/>
+                                      </p:to>
+                                    </p:set>
+                                    <p:animEffect transition="in" filter="fade">
+                                      <p:cBhvr>
+                                        <p:cTn id="54" dur="500"/>
+                                        <p:tgtEl>
+                                          <p:spTgt spid="42"/>
+                                        </p:tgtEl>
+                                      </p:cBhvr>
+                                    </p:animEffect>
+                                  </p:childTnLst>
+                                </p:cTn>
+                              </p:par>
+                              <p:par>
+                                <p:cTn id="55" presetID="10" presetClass="entr" presetSubtype="0" fill="hold" nodeType="withEffect">
+                                  <p:stCondLst>
+                                    <p:cond delay="0"/>
+                                  </p:stCondLst>
+                                  <p:childTnLst>
+                                    <p:set>
+                                      <p:cBhvr>
+                                        <p:cTn id="56" dur="1" fill="hold">
+                                          <p:stCondLst>
+                                            <p:cond delay="0"/>
+                                          </p:stCondLst>
+                                        </p:cTn>
+                                        <p:tgtEl>
+                                          <p:spTgt spid="33"/>
+                                        </p:tgtEl>
+                                        <p:attrNameLst>
+                                          <p:attrName>style.visibility</p:attrName>
+                                        </p:attrNameLst>
+                                      </p:cBhvr>
+                                      <p:to>
+                                        <p:strVal val="visible"/>
+                                      </p:to>
+                                    </p:set>
+                                    <p:animEffect transition="in" filter="fade">
+                                      <p:cBhvr>
+                                        <p:cTn id="57" dur="500"/>
+                                        <p:tgtEl>
+                                          <p:spTgt spid="33"/>
+                                        </p:tgtEl>
+                                      </p:cBhvr>
+                                    </p:animEffect>
+                                  </p:childTnLst>
+                                </p:cTn>
+                              </p:par>
+                              <p:par>
+                                <p:cTn id="58" presetID="10" presetClass="entr" presetSubtype="0" fill="hold" grpId="0" nodeType="withEffect">
+                                  <p:stCondLst>
+                                    <p:cond delay="0"/>
+                                  </p:stCondLst>
+                                  <p:childTnLst>
+                                    <p:set>
+                                      <p:cBhvr>
+                                        <p:cTn id="59" dur="1" fill="hold">
+                                          <p:stCondLst>
+                                            <p:cond delay="0"/>
+                                          </p:stCondLst>
+                                        </p:cTn>
+                                        <p:tgtEl>
+                                          <p:spTgt spid="19"/>
+                                        </p:tgtEl>
+                                        <p:attrNameLst>
+                                          <p:attrName>style.visibility</p:attrName>
+                                        </p:attrNameLst>
+                                      </p:cBhvr>
+                                      <p:to>
+                                        <p:strVal val="visible"/>
+                                      </p:to>
+                                    </p:set>
+                                    <p:animEffect transition="in" filter="fade">
+                                      <p:cBhvr>
+                                        <p:cTn id="60" dur="500"/>
+                                        <p:tgtEl>
+                                          <p:spTgt spid="19"/>
+                                        </p:tgtEl>
+                                      </p:cBhvr>
+                                    </p:animEffect>
+                                  </p:childTnLst>
+                                </p:cTn>
+                              </p:par>
+                            </p:childTnLst>
+                          </p:cTn>
+                        </p:par>
+                      </p:childTnLst>
+                    </p:cTn>
+                  </p:par>
+                  <p:par>
+                    <p:cTn id="61" fill="hold">
+                      <p:stCondLst>
+                        <p:cond delay="indefinite"/>
+                      </p:stCondLst>
+                      <p:childTnLst>
+                        <p:par>
+                          <p:cTn id="62" fill="hold">
+                            <p:stCondLst>
+                              <p:cond delay="0"/>
+                            </p:stCondLst>
+                            <p:childTnLst>
+                              <p:par>
+                                <p:cTn id="63" presetID="10" presetClass="entr" presetSubtype="0" fill="hold" grpId="0" nodeType="clickEffect">
+                                  <p:stCondLst>
+                                    <p:cond delay="0"/>
+                                  </p:stCondLst>
+                                  <p:childTnLst>
+                                    <p:set>
+                                      <p:cBhvr>
+                                        <p:cTn id="64" dur="1" fill="hold">
+                                          <p:stCondLst>
+                                            <p:cond delay="0"/>
+                                          </p:stCondLst>
+                                        </p:cTn>
+                                        <p:tgtEl>
+                                          <p:spTgt spid="39"/>
+                                        </p:tgtEl>
+                                        <p:attrNameLst>
+                                          <p:attrName>style.visibility</p:attrName>
+                                        </p:attrNameLst>
+                                      </p:cBhvr>
+                                      <p:to>
+                                        <p:strVal val="visible"/>
+                                      </p:to>
+                                    </p:set>
+                                    <p:animEffect transition="in" filter="fade">
+                                      <p:cBhvr>
+                                        <p:cTn id="65" dur="500"/>
+                                        <p:tgtEl>
+                                          <p:spTgt spid="39"/>
+                                        </p:tgtEl>
+                                      </p:cBhvr>
+                                    </p:animEffect>
+                                  </p:childTnLst>
+                                </p:cTn>
+                              </p:par>
+                              <p:par>
+                                <p:cTn id="66" presetID="10" presetClass="entr" presetSubtype="0" fill="hold" nodeType="withEffect">
+                                  <p:stCondLst>
+                                    <p:cond delay="0"/>
+                                  </p:stCondLst>
+                                  <p:childTnLst>
+                                    <p:set>
+                                      <p:cBhvr>
+                                        <p:cTn id="67" dur="1" fill="hold">
+                                          <p:stCondLst>
+                                            <p:cond delay="0"/>
+                                          </p:stCondLst>
+                                        </p:cTn>
+                                        <p:tgtEl>
+                                          <p:spTgt spid="35"/>
+                                        </p:tgtEl>
+                                        <p:attrNameLst>
+                                          <p:attrName>style.visibility</p:attrName>
+                                        </p:attrNameLst>
+                                      </p:cBhvr>
+                                      <p:to>
+                                        <p:strVal val="visible"/>
+                                      </p:to>
+                                    </p:set>
+                                    <p:animEffect transition="in" filter="fade">
+                                      <p:cBhvr>
+                                        <p:cTn id="68" dur="500"/>
+                                        <p:tgtEl>
+                                          <p:spTgt spid="35"/>
+                                        </p:tgtEl>
+                                      </p:cBhvr>
+                                    </p:animEffect>
+                                  </p:childTnLst>
+                                </p:cTn>
+                              </p:par>
+                            </p:childTnLst>
+                          </p:cTn>
+                        </p:par>
+                      </p:childTnLst>
+                    </p:cTn>
+                  </p:par>
+                </p:childTnLst>
+              </p:cTn>
+              <p:prevCondLst>
+                <p:cond evt="onPrev" delay="0">
+                  <p:tgtEl>
+                    <p:sldTgt/>
+                  </p:tgtEl>
+                </p:cond>
+              </p:prevCondLst>
+              <p:nextCondLst>
+                <p:cond evt="onNext" delay="0">
+                  <p:tgtEl>
+                    <p:sldTgt/>
+                  </p:tgtEl>
+                </p:cond>
+              </p:nextCondLst>
+            </p:seq>
+          </p:childTnLst>
+        </p:cTn>
+      </p:par>
+    </p:tnLst>
+    <p:bldLst>
+      <p:bldP spid="15" grpId="0"/>
+      <p:bldP spid="17" grpId="0" animBg="1"/>
+      <p:bldP spid="18" grpId="0" animBg="1"/>
+      <p:bldP spid="19" grpId="0" animBg="1"/>
+      <p:bldP spid="20" grpId="0" animBg="1"/>
+      <p:bldP spid="39" grpId="0"/>
+      <p:bldP spid="41" grpId="0"/>
+      <p:bldP spid="42" grpId="0"/>
+    </p:bldLst>
+  </p:timing>
 </p:sld>
 </file>
 
@@ -2263,6 +4796,13 @@
   <p:clrMapOvr>
     <a:masterClrMapping/>
   </p:clrMapOvr>
+  <p:timing>
+    <p:tnLst>
+      <p:par>
+        <p:cTn id="1" dur="indefinite" restart="never" nodeType="tmRoot"/>
+      </p:par>
+    </p:tnLst>
+  </p:timing>
 </p:sld>
 </file>
 
@@ -2347,17 +4887,11 @@
             </a:pPr>
             <a:r>
               <a:rPr lang="pt-BR" dirty="0" smtClean="0"/>
-              <a:t>ASP .NET Core 2.0</a:t>
-            </a:r>
-          </a:p>
-          <a:p>
-            <a:pPr marL="342900" indent="-342900">
-              <a:buFont typeface="Arial" panose="020B0604020202020204" pitchFamily="34" charset="0"/>
-              <a:buChar char="•"/>
-            </a:pPr>
-            <a:r>
-              <a:rPr lang="pt-BR" dirty="0" smtClean="0"/>
-              <a:t>O que é o padrão de projeto MVC?</a:t>
+              <a:t>O </a:t>
+            </a:r>
+            <a:r>
+              <a:rPr lang="pt-BR" dirty="0" smtClean="0"/>
+              <a:t>que é o padrão de projeto MVC?</a:t>
             </a:r>
           </a:p>
           <a:p>
@@ -2450,6 +4984,13 @@
   <p:clrMapOvr>
     <a:masterClrMapping/>
   </p:clrMapOvr>
+  <p:timing>
+    <p:tnLst>
+      <p:par>
+        <p:cTn id="1" dur="indefinite" restart="never" nodeType="tmRoot"/>
+      </p:par>
+    </p:tnLst>
+  </p:timing>
 </p:sld>
 </file>
 
@@ -2487,13 +5028,11 @@
           <a:p>
             <a:r>
               <a:rPr lang="pt-BR" dirty="0" smtClean="0"/>
-              <a:t>ASP .NET Core e </a:t>
-            </a:r>
-          </a:p>
-          <a:p>
-            <a:r>
-              <a:rPr lang="pt-BR" dirty="0" smtClean="0"/>
-              <a:t>ASP .NET Core MVC</a:t>
+              <a:t>ASP .NET </a:t>
+            </a:r>
+            <a:r>
+              <a:rPr lang="pt-BR" dirty="0" smtClean="0"/>
+              <a:t>Core</a:t>
             </a:r>
             <a:endParaRPr lang="pt-BR" dirty="0"/>
           </a:p>
@@ -2567,6 +5106,13 @@
   <p:clrMapOvr>
     <a:masterClrMapping/>
   </p:clrMapOvr>
+  <p:timing>
+    <p:tnLst>
+      <p:par>
+        <p:cTn id="1" dur="indefinite" restart="never" nodeType="tmRoot"/>
+      </p:par>
+    </p:tnLst>
+  </p:timing>
 </p:sld>
 </file>
 
@@ -2722,6 +5268,13 @@
   <p:clrMapOvr>
     <a:masterClrMapping/>
   </p:clrMapOvr>
+  <p:timing>
+    <p:tnLst>
+      <p:par>
+        <p:cTn id="1" dur="indefinite" restart="never" nodeType="tmRoot"/>
+      </p:par>
+    </p:tnLst>
+  </p:timing>
 </p:sld>
 </file>
 
@@ -2757,9 +5310,10 @@
           <a:bodyPr/>
           <a:lstStyle/>
           <a:p>
-            <a:r>
-              <a:rPr lang="pt-BR" dirty="0" smtClean="0"/>
-              <a:t>ASP .NET Core MVC</a:t>
+            <a:pPr algn="r"/>
+            <a:r>
+              <a:rPr lang="pt-BR" dirty="0" smtClean="0"/>
+              <a:t>ASP .NET Core</a:t>
             </a:r>
             <a:endParaRPr lang="pt-BR" dirty="0"/>
           </a:p>
@@ -2780,57 +5334,260 @@
           <a:bodyPr/>
           <a:lstStyle/>
           <a:p>
-            <a:pPr marL="342900" indent="-342900">
-              <a:buFont typeface="Arial" panose="020B0604020202020204" pitchFamily="34" charset="0"/>
-              <a:buChar char="•"/>
-            </a:pPr>
-            <a:r>
-              <a:rPr lang="pt-BR" dirty="0" smtClean="0"/>
-              <a:t>Framework para desenvolvimento de aplicações web.</a:t>
-            </a:r>
-          </a:p>
-          <a:p>
-            <a:pPr marL="342900" indent="-342900">
-              <a:buFont typeface="Arial" panose="020B0604020202020204" pitchFamily="34" charset="0"/>
-              <a:buChar char="•"/>
-            </a:pPr>
-            <a:r>
-              <a:rPr lang="pt-BR" dirty="0" smtClean="0"/>
-              <a:t>Segue o padrão de projeto MVC (será explicado mais a frente)</a:t>
-            </a:r>
-          </a:p>
-          <a:p>
-            <a:pPr marL="342900" indent="-342900">
-              <a:buFont typeface="Arial" panose="020B0604020202020204" pitchFamily="34" charset="0"/>
-              <a:buChar char="•"/>
-            </a:pPr>
-            <a:r>
-              <a:rPr lang="pt-BR" dirty="0" smtClean="0"/>
-              <a:t>O MVC guia o formato da aplicação e as interações entre as camadas</a:t>
-            </a:r>
-          </a:p>
-          <a:p>
-            <a:pPr marL="342900" indent="-342900">
-              <a:buFont typeface="Arial" panose="020B0604020202020204" pitchFamily="34" charset="0"/>
-              <a:buChar char="•"/>
-            </a:pPr>
-            <a:r>
-              <a:rPr lang="pt-BR" dirty="0" smtClean="0"/>
-              <a:t>Separação de responsabilidades</a:t>
-            </a:r>
+            <a:pPr marL="342900" indent="-342900" algn="r">
+              <a:buFont typeface="Arial" panose="020B0604020202020204" pitchFamily="34" charset="0"/>
+              <a:buChar char="•"/>
+            </a:pPr>
+            <a:r>
+              <a:rPr lang="pt-BR" dirty="0" err="1" smtClean="0"/>
+              <a:t>Multiplataforma</a:t>
+            </a:r>
+            <a:endParaRPr lang="pt-BR" dirty="0" smtClean="0"/>
+          </a:p>
+          <a:p>
+            <a:pPr marL="342900" indent="-342900" algn="r">
+              <a:buFont typeface="Arial" panose="020B0604020202020204" pitchFamily="34" charset="0"/>
+              <a:buChar char="•"/>
+            </a:pPr>
+            <a:r>
+              <a:rPr lang="pt-BR" dirty="0" smtClean="0"/>
+              <a:t>Open </a:t>
+            </a:r>
+            <a:r>
+              <a:rPr lang="pt-BR" dirty="0" err="1" smtClean="0"/>
+              <a:t>Source</a:t>
+            </a:r>
+            <a:endParaRPr lang="pt-BR" dirty="0" smtClean="0"/>
+          </a:p>
+          <a:p>
+            <a:pPr marL="342900" indent="-342900" algn="r">
+              <a:buFont typeface="Arial" panose="020B0604020202020204" pitchFamily="34" charset="0"/>
+              <a:buChar char="•"/>
+            </a:pPr>
+            <a:r>
+              <a:rPr lang="pt-BR" dirty="0" err="1" smtClean="0"/>
+              <a:t>Deploy</a:t>
+            </a:r>
+            <a:r>
+              <a:rPr lang="pt-BR" dirty="0" smtClean="0"/>
+              <a:t> em várias plataformas</a:t>
+            </a:r>
+          </a:p>
+          <a:p>
+            <a:pPr marL="342900" indent="-342900" algn="r">
+              <a:buFont typeface="Arial" panose="020B0604020202020204" pitchFamily="34" charset="0"/>
+              <a:buChar char="•"/>
+            </a:pPr>
+            <a:r>
+              <a:rPr lang="pt-BR" dirty="0" smtClean="0"/>
+              <a:t>Sem Suporte a Web </a:t>
+            </a:r>
+            <a:r>
+              <a:rPr lang="pt-BR" dirty="0" err="1" smtClean="0"/>
+              <a:t>Forms</a:t>
+            </a:r>
+            <a:endParaRPr lang="pt-BR" dirty="0" smtClean="0"/>
+          </a:p>
+          <a:p>
+            <a:pPr marL="342900" indent="-342900" algn="r">
+              <a:buFont typeface="Arial" panose="020B0604020202020204" pitchFamily="34" charset="0"/>
+              <a:buChar char="•"/>
+            </a:pPr>
+            <a:r>
+              <a:rPr lang="pt-BR" dirty="0" smtClean="0"/>
+              <a:t>Favorece Performance</a:t>
+            </a:r>
+          </a:p>
+          <a:p>
+            <a:pPr marL="342900" indent="-342900" algn="r">
+              <a:buFont typeface="Arial" panose="020B0604020202020204" pitchFamily="34" charset="0"/>
+              <a:buChar char="•"/>
+            </a:pPr>
+            <a:r>
+              <a:rPr lang="pt-BR" dirty="0"/>
+              <a:t>Utilizado em micro serviços</a:t>
+            </a:r>
+          </a:p>
+          <a:p>
+            <a:pPr marL="342900" indent="-342900" algn="r">
+              <a:buFont typeface="Arial" panose="020B0604020202020204" pitchFamily="34" charset="0"/>
+              <a:buChar char="•"/>
+            </a:pPr>
+            <a:r>
+              <a:rPr lang="pt-BR" dirty="0" smtClean="0"/>
+              <a:t>Em constante evolução</a:t>
+            </a:r>
+            <a:endParaRPr lang="pt-BR" dirty="0"/>
           </a:p>
         </p:txBody>
       </p:sp>
+      <p:sp>
+        <p:nvSpPr>
+          <p:cNvPr id="4" name="Espaço Reservado para Texto 3"/>
+          <p:cNvSpPr>
+            <a:spLocks noGrp="1"/>
+          </p:cNvSpPr>
+          <p:nvPr>
+            <p:ph type="body" sz="quarter" idx="12"/>
+          </p:nvPr>
+        </p:nvSpPr>
+        <p:spPr/>
+        <p:txBody>
+          <a:bodyPr/>
+          <a:lstStyle/>
+          <a:p>
+            <a:pPr algn="l"/>
+            <a:r>
+              <a:rPr lang="pt-BR" dirty="0" smtClean="0"/>
+              <a:t>ASP .NET Framework</a:t>
+            </a:r>
+            <a:endParaRPr lang="pt-BR" dirty="0"/>
+          </a:p>
+        </p:txBody>
+      </p:sp>
+      <p:sp>
+        <p:nvSpPr>
+          <p:cNvPr id="5" name="Espaço Reservado para Texto 4"/>
+          <p:cNvSpPr>
+            <a:spLocks noGrp="1"/>
+          </p:cNvSpPr>
+          <p:nvPr>
+            <p:ph type="body" sz="quarter" idx="13"/>
+          </p:nvPr>
+        </p:nvSpPr>
+        <p:spPr/>
+        <p:txBody>
+          <a:bodyPr/>
+          <a:lstStyle/>
+          <a:p>
+            <a:pPr marL="342900" indent="-342900">
+              <a:buFont typeface="Arial" panose="020B0604020202020204" pitchFamily="34" charset="0"/>
+              <a:buChar char="•"/>
+            </a:pPr>
+            <a:r>
+              <a:rPr lang="pt-BR" dirty="0" smtClean="0"/>
+              <a:t>Windows</a:t>
+            </a:r>
+          </a:p>
+          <a:p>
+            <a:pPr marL="342900" indent="-342900">
+              <a:buFont typeface="Arial" panose="020B0604020202020204" pitchFamily="34" charset="0"/>
+              <a:buChar char="•"/>
+            </a:pPr>
+            <a:r>
+              <a:rPr lang="pt-BR" dirty="0" smtClean="0"/>
+              <a:t>Código proprietário*</a:t>
+            </a:r>
+          </a:p>
+          <a:p>
+            <a:pPr marL="342900" indent="-342900">
+              <a:buFont typeface="Arial" panose="020B0604020202020204" pitchFamily="34" charset="0"/>
+              <a:buChar char="•"/>
+            </a:pPr>
+            <a:r>
+              <a:rPr lang="pt-BR" dirty="0" err="1" smtClean="0"/>
+              <a:t>Deploy</a:t>
+            </a:r>
+            <a:r>
+              <a:rPr lang="pt-BR" dirty="0" smtClean="0"/>
+              <a:t> apenas no IIS</a:t>
+            </a:r>
+          </a:p>
+          <a:p>
+            <a:pPr marL="342900" indent="-342900">
+              <a:buFont typeface="Arial" panose="020B0604020202020204" pitchFamily="34" charset="0"/>
+              <a:buChar char="•"/>
+            </a:pPr>
+            <a:r>
+              <a:rPr lang="pt-BR" dirty="0" smtClean="0"/>
+              <a:t>Web </a:t>
+            </a:r>
+            <a:r>
+              <a:rPr lang="pt-BR" dirty="0" err="1" smtClean="0"/>
+              <a:t>Forms</a:t>
+            </a:r>
+            <a:endParaRPr lang="pt-BR" dirty="0" smtClean="0"/>
+          </a:p>
+          <a:p>
+            <a:pPr marL="342900" indent="-342900">
+              <a:buFont typeface="Arial" panose="020B0604020202020204" pitchFamily="34" charset="0"/>
+              <a:buChar char="•"/>
+            </a:pPr>
+            <a:r>
+              <a:rPr lang="pt-BR" dirty="0" smtClean="0"/>
+              <a:t>Performance é um problema</a:t>
+            </a:r>
+          </a:p>
+          <a:p>
+            <a:pPr marL="342900" indent="-342900">
+              <a:buFont typeface="Arial" panose="020B0604020202020204" pitchFamily="34" charset="0"/>
+              <a:buChar char="•"/>
+            </a:pPr>
+            <a:r>
+              <a:rPr lang="pt-BR" dirty="0" smtClean="0"/>
+              <a:t>Utilizado em micro serviços</a:t>
+            </a:r>
+          </a:p>
+          <a:p>
+            <a:pPr marL="342900" indent="-342900">
+              <a:buFont typeface="Arial" panose="020B0604020202020204" pitchFamily="34" charset="0"/>
+              <a:buChar char="•"/>
+            </a:pPr>
+            <a:r>
+              <a:rPr lang="pt-BR" dirty="0" smtClean="0"/>
+              <a:t>Estável</a:t>
+            </a:r>
+            <a:endParaRPr lang="pt-BR" dirty="0"/>
+          </a:p>
+        </p:txBody>
+      </p:sp>
+      <p:cxnSp>
+        <p:nvCxnSpPr>
+          <p:cNvPr id="9" name="Conector reto 8"/>
+          <p:cNvCxnSpPr/>
+          <p:nvPr/>
+        </p:nvCxnSpPr>
+        <p:spPr>
+          <a:xfrm>
+            <a:off x="5577017" y="113709"/>
+            <a:ext cx="24713" cy="6608367"/>
+          </a:xfrm>
+          <a:prstGeom prst="line">
+            <a:avLst/>
+          </a:prstGeom>
+        </p:spPr>
+        <p:style>
+          <a:lnRef idx="1">
+            <a:schemeClr val="accent1"/>
+          </a:lnRef>
+          <a:fillRef idx="0">
+            <a:schemeClr val="accent1"/>
+          </a:fillRef>
+          <a:effectRef idx="0">
+            <a:schemeClr val="accent1"/>
+          </a:effectRef>
+          <a:fontRef idx="minor">
+            <a:schemeClr val="tx1"/>
+          </a:fontRef>
+        </p:style>
+      </p:cxnSp>
     </p:spTree>
     <p:extLst>
       <p:ext uri="{BB962C8B-B14F-4D97-AF65-F5344CB8AC3E}">
-        <p14:creationId xmlns:p14="http://schemas.microsoft.com/office/powerpoint/2010/main" val="1725375219"/>
+        <p14:creationId xmlns:p14="http://schemas.microsoft.com/office/powerpoint/2010/main" val="2252472872"/>
       </p:ext>
     </p:extLst>
   </p:cSld>
   <p:clrMapOvr>
     <a:masterClrMapping/>
   </p:clrMapOvr>
+  <p:timing>
+    <p:tnLst>
+      <p:par>
+        <p:cTn id="1" dur="indefinite" restart="never" nodeType="tmRoot"/>
+      </p:par>
+    </p:tnLst>
+  </p:timing>
 </p:sld>
 </file>
 
@@ -2868,13 +5625,17 @@
           <a:p>
             <a:r>
               <a:rPr lang="pt-BR" dirty="0" smtClean="0"/>
-              <a:t>E o ASP .</a:t>
-            </a:r>
-            <a:r>
-              <a:rPr lang="pt-BR" smtClean="0"/>
-              <a:t>NET Framework?</a:t>
-            </a:r>
-            <a:endParaRPr lang="pt-BR"/>
+              <a:t>O que havia de errado com o Web </a:t>
+            </a:r>
+            <a:r>
+              <a:rPr lang="pt-BR" dirty="0" err="1" smtClean="0"/>
+              <a:t>Forms</a:t>
+            </a:r>
+            <a:r>
+              <a:rPr lang="pt-BR" dirty="0" smtClean="0"/>
+              <a:t>?</a:t>
+            </a:r>
+            <a:endParaRPr lang="pt-BR" dirty="0"/>
           </a:p>
         </p:txBody>
       </p:sp>
@@ -2893,7 +5654,79 @@
           <a:bodyPr/>
           <a:lstStyle/>
           <a:p>
-            <a:endParaRPr lang="pt-BR"/>
+            <a:pPr marL="342900" indent="-342900">
+              <a:buFont typeface="Arial" panose="020B0604020202020204" pitchFamily="34" charset="0"/>
+              <a:buChar char="•"/>
+            </a:pPr>
+            <a:r>
+              <a:rPr lang="pt-BR" dirty="0" smtClean="0"/>
+              <a:t>Peso do </a:t>
+            </a:r>
+            <a:r>
+              <a:rPr lang="pt-BR" dirty="0" err="1" smtClean="0"/>
+              <a:t>ViewState</a:t>
+            </a:r>
+            <a:endParaRPr lang="pt-BR" dirty="0" smtClean="0"/>
+          </a:p>
+          <a:p>
+            <a:pPr marL="342900" indent="-342900">
+              <a:buFont typeface="Arial" panose="020B0604020202020204" pitchFamily="34" charset="0"/>
+              <a:buChar char="•"/>
+            </a:pPr>
+            <a:r>
+              <a:rPr lang="pt-BR" dirty="0" smtClean="0"/>
+              <a:t>Falso senso de separação de responsabilidades no formato </a:t>
+            </a:r>
+            <a:r>
+              <a:rPr lang="pt-BR" dirty="0" err="1" smtClean="0"/>
+              <a:t>view</a:t>
+            </a:r>
+            <a:r>
+              <a:rPr lang="pt-BR" dirty="0" smtClean="0"/>
+              <a:t> e </a:t>
+            </a:r>
+            <a:r>
+              <a:rPr lang="pt-BR" dirty="0" err="1" smtClean="0"/>
+              <a:t>code</a:t>
+            </a:r>
+            <a:r>
+              <a:rPr lang="pt-BR" dirty="0" smtClean="0"/>
+              <a:t> </a:t>
+            </a:r>
+            <a:r>
+              <a:rPr lang="pt-BR" dirty="0" err="1" smtClean="0"/>
+              <a:t>behind</a:t>
+            </a:r>
+            <a:endParaRPr lang="pt-BR" dirty="0" smtClean="0"/>
+          </a:p>
+          <a:p>
+            <a:pPr marL="342900" indent="-342900">
+              <a:buFont typeface="Arial" panose="020B0604020202020204" pitchFamily="34" charset="0"/>
+              <a:buChar char="•"/>
+            </a:pPr>
+            <a:r>
+              <a:rPr lang="pt-BR" dirty="0" smtClean="0"/>
+              <a:t>Controle limitado do código HTML</a:t>
+            </a:r>
+          </a:p>
+          <a:p>
+            <a:pPr marL="342900" indent="-342900">
+              <a:buFont typeface="Arial" panose="020B0604020202020204" pitchFamily="34" charset="0"/>
+              <a:buChar char="•"/>
+            </a:pPr>
+            <a:r>
+              <a:rPr lang="pt-BR" dirty="0" smtClean="0"/>
+              <a:t>Baixa </a:t>
+            </a:r>
+            <a:r>
+              <a:rPr lang="pt-BR" dirty="0" err="1" smtClean="0"/>
+              <a:t>testabilidade</a:t>
+            </a:r>
+            <a:r>
+              <a:rPr lang="pt-BR" dirty="0" smtClean="0"/>
+              <a:t> num código fortemente acoplado</a:t>
+            </a:r>
+            <a:endParaRPr lang="pt-BR" dirty="0"/>
           </a:p>
         </p:txBody>
       </p:sp>
@@ -2907,6 +5740,220 @@
   <p:clrMapOvr>
     <a:masterClrMapping/>
   </p:clrMapOvr>
+  <p:timing>
+    <p:tnLst>
+      <p:par>
+        <p:cTn id="1" dur="indefinite" restart="never" nodeType="tmRoot"/>
+      </p:par>
+    </p:tnLst>
+  </p:timing>
+</p:sld>
+</file>
+
+<file path=ppt/slides/slide8.xml><?xml version="1.0" encoding="utf-8"?>
+<p:sld xmlns:a="http://schemas.openxmlformats.org/drawingml/2006/main" xmlns:r="http://schemas.openxmlformats.org/officeDocument/2006/relationships" xmlns:p="http://schemas.openxmlformats.org/presentationml/2006/main">
+  <p:cSld>
+    <p:spTree>
+      <p:nvGrpSpPr>
+        <p:cNvPr id="1" name=""/>
+        <p:cNvGrpSpPr/>
+        <p:nvPr/>
+      </p:nvGrpSpPr>
+      <p:grpSpPr>
+        <a:xfrm>
+          <a:off x="0" y="0"/>
+          <a:ext cx="0" cy="0"/>
+          <a:chOff x="0" y="0"/>
+          <a:chExt cx="0" cy="0"/>
+        </a:xfrm>
+      </p:grpSpPr>
+      <p:sp>
+        <p:nvSpPr>
+          <p:cNvPr id="4" name="Espaço Reservado para Texto 3"/>
+          <p:cNvSpPr>
+            <a:spLocks noGrp="1"/>
+          </p:cNvSpPr>
+          <p:nvPr>
+            <p:ph type="body" sz="quarter" idx="11"/>
+          </p:nvPr>
+        </p:nvSpPr>
+        <p:spPr/>
+        <p:txBody>
+          <a:bodyPr/>
+          <a:lstStyle/>
+          <a:p>
+            <a:r>
+              <a:rPr lang="pt-BR" dirty="0" smtClean="0"/>
+              <a:t>Padrão de Projeto MVC</a:t>
+            </a:r>
+            <a:endParaRPr lang="pt-BR" dirty="0"/>
+          </a:p>
+        </p:txBody>
+      </p:sp>
+    </p:spTree>
+    <p:extLst>
+      <p:ext uri="{BB962C8B-B14F-4D97-AF65-F5344CB8AC3E}">
+        <p14:creationId xmlns:p14="http://schemas.microsoft.com/office/powerpoint/2010/main" val="4284654996"/>
+      </p:ext>
+    </p:extLst>
+  </p:cSld>
+  <p:clrMapOvr>
+    <a:masterClrMapping/>
+  </p:clrMapOvr>
+  <p:timing>
+    <p:tnLst>
+      <p:par>
+        <p:cTn id="1" dur="indefinite" restart="never" nodeType="tmRoot"/>
+      </p:par>
+    </p:tnLst>
+  </p:timing>
+</p:sld>
+</file>
+
+<file path=ppt/slides/slide9.xml><?xml version="1.0" encoding="utf-8"?>
+<p:sld xmlns:a="http://schemas.openxmlformats.org/drawingml/2006/main" xmlns:r="http://schemas.openxmlformats.org/officeDocument/2006/relationships" xmlns:p="http://schemas.openxmlformats.org/presentationml/2006/main">
+  <p:cSld>
+    <p:spTree>
+      <p:nvGrpSpPr>
+        <p:cNvPr id="1" name=""/>
+        <p:cNvGrpSpPr/>
+        <p:nvPr/>
+      </p:nvGrpSpPr>
+      <p:grpSpPr>
+        <a:xfrm>
+          <a:off x="0" y="0"/>
+          <a:ext cx="0" cy="0"/>
+          <a:chOff x="0" y="0"/>
+          <a:chExt cx="0" cy="0"/>
+        </a:xfrm>
+      </p:grpSpPr>
+      <p:sp>
+        <p:nvSpPr>
+          <p:cNvPr id="3" name="Espaço Reservado para Texto 2"/>
+          <p:cNvSpPr>
+            <a:spLocks noGrp="1"/>
+          </p:cNvSpPr>
+          <p:nvPr>
+            <p:ph type="body" sz="quarter" idx="10"/>
+          </p:nvPr>
+        </p:nvSpPr>
+        <p:spPr/>
+        <p:txBody>
+          <a:bodyPr/>
+          <a:lstStyle/>
+          <a:p>
+            <a:r>
+              <a:rPr lang="pt-BR" dirty="0" smtClean="0"/>
+              <a:t>O que é o MVC?</a:t>
+            </a:r>
+            <a:endParaRPr lang="pt-BR" dirty="0"/>
+          </a:p>
+        </p:txBody>
+      </p:sp>
+      <p:sp>
+        <p:nvSpPr>
+          <p:cNvPr id="4" name="Espaço Reservado para Texto 3"/>
+          <p:cNvSpPr>
+            <a:spLocks noGrp="1"/>
+          </p:cNvSpPr>
+          <p:nvPr>
+            <p:ph type="body" sz="quarter" idx="11"/>
+          </p:nvPr>
+        </p:nvSpPr>
+        <p:spPr/>
+        <p:txBody>
+          <a:bodyPr>
+            <a:normAutofit/>
+          </a:bodyPr>
+          <a:lstStyle/>
+          <a:p>
+            <a:pPr marL="342900" indent="-342900">
+              <a:buFont typeface="Arial" panose="020B0604020202020204" pitchFamily="34" charset="0"/>
+              <a:buChar char="•"/>
+            </a:pPr>
+            <a:r>
+              <a:rPr lang="pt-BR" sz="4000" dirty="0" err="1" smtClean="0"/>
+              <a:t>M</a:t>
+            </a:r>
+            <a:r>
+              <a:rPr lang="pt-BR" dirty="0" err="1" smtClean="0"/>
+              <a:t>odels</a:t>
+            </a:r>
+            <a:r>
+              <a:rPr lang="pt-BR" dirty="0"/>
+              <a:t> </a:t>
+            </a:r>
+            <a:r>
+              <a:rPr lang="pt-BR" dirty="0" smtClean="0"/>
+              <a:t>(contém a informação com que os usuários trabalham, representa o domínio da aplicação)</a:t>
+            </a:r>
+            <a:endParaRPr lang="pt-BR" sz="3600" dirty="0" smtClean="0"/>
+          </a:p>
+          <a:p>
+            <a:pPr marL="342900" indent="-342900">
+              <a:buFont typeface="Arial" panose="020B0604020202020204" pitchFamily="34" charset="0"/>
+              <a:buChar char="•"/>
+            </a:pPr>
+            <a:r>
+              <a:rPr lang="pt-BR" sz="4000" dirty="0" err="1" smtClean="0"/>
+              <a:t>V</a:t>
+            </a:r>
+            <a:r>
+              <a:rPr lang="pt-BR" dirty="0" err="1" smtClean="0"/>
+              <a:t>iews</a:t>
+            </a:r>
+            <a:r>
+              <a:rPr lang="pt-BR" dirty="0" smtClean="0"/>
+              <a:t> (representação das informações, interface com o usuário)</a:t>
+            </a:r>
+            <a:endParaRPr lang="pt-BR" sz="3600" dirty="0" smtClean="0"/>
+          </a:p>
+          <a:p>
+            <a:pPr marL="342900" indent="-342900">
+              <a:buFont typeface="Arial" panose="020B0604020202020204" pitchFamily="34" charset="0"/>
+              <a:buChar char="•"/>
+            </a:pPr>
+            <a:r>
+              <a:rPr lang="pt-BR" sz="4000" dirty="0" err="1" smtClean="0"/>
+              <a:t>C</a:t>
+            </a:r>
+            <a:r>
+              <a:rPr lang="pt-BR" dirty="0" err="1" smtClean="0"/>
+              <a:t>ontrollers</a:t>
+            </a:r>
+            <a:r>
+              <a:rPr lang="pt-BR" dirty="0" smtClean="0"/>
+              <a:t> (processa as requisições, executa operações no modelo e as envia para uma </a:t>
+            </a:r>
+            <a:r>
+              <a:rPr lang="pt-BR" dirty="0" err="1" smtClean="0"/>
+              <a:t>view</a:t>
+            </a:r>
+            <a:r>
+              <a:rPr lang="pt-BR" dirty="0" smtClean="0"/>
+              <a:t>)</a:t>
+            </a:r>
+            <a:endParaRPr lang="pt-BR" sz="3600" dirty="0"/>
+          </a:p>
+        </p:txBody>
+      </p:sp>
+    </p:spTree>
+    <p:extLst>
+      <p:ext uri="{BB962C8B-B14F-4D97-AF65-F5344CB8AC3E}">
+        <p14:creationId xmlns:p14="http://schemas.microsoft.com/office/powerpoint/2010/main" val="894188675"/>
+      </p:ext>
+    </p:extLst>
+  </p:cSld>
+  <p:clrMapOvr>
+    <a:masterClrMapping/>
+  </p:clrMapOvr>
+  <p:timing>
+    <p:tnLst>
+      <p:par>
+        <p:cTn id="1" dur="indefinite" restart="never" nodeType="tmRoot"/>
+      </p:par>
+    </p:tnLst>
+  </p:timing>
 </p:sld>
 </file>
 

</xml_diff>

<commit_message>
Criação do projeto para o workshop (empty project)
</commit_message>
<xml_diff>
--- a/workshop-aspnet-core-mvc.pptx
+++ b/workshop-aspnet-core-mvc.pptx
@@ -19,6 +19,17 @@
     <p:sldId id="269" r:id="rId13"/>
     <p:sldId id="270" r:id="rId14"/>
     <p:sldId id="271" r:id="rId15"/>
+    <p:sldId id="272" r:id="rId16"/>
+    <p:sldId id="273" r:id="rId17"/>
+    <p:sldId id="274" r:id="rId18"/>
+    <p:sldId id="275" r:id="rId19"/>
+    <p:sldId id="276" r:id="rId20"/>
+    <p:sldId id="278" r:id="rId21"/>
+    <p:sldId id="279" r:id="rId22"/>
+    <p:sldId id="280" r:id="rId23"/>
+    <p:sldId id="281" r:id="rId24"/>
+    <p:sldId id="282" r:id="rId25"/>
+    <p:sldId id="283" r:id="rId26"/>
   </p:sldIdLst>
   <p:sldSz cx="12192000" cy="6858000"/>
   <p:notesSz cx="6858000" cy="9144000"/>
@@ -1640,7 +1651,7 @@
             <a:fld id="{B24C654B-750A-47A0-AE34-444BB51CE4F3}" type="datetimeFigureOut">
               <a:rPr lang="pt-BR" smtClean="0"/>
               <a:pPr/>
-              <a:t>20/09/2017</a:t>
+              <a:t>21/09/2017</a:t>
             </a:fld>
             <a:endParaRPr lang="pt-BR"/>
           </a:p>
@@ -4700,6 +4711,1282 @@
 </p:sld>
 </file>
 
+<file path=ppt/slides/slide15.xml><?xml version="1.0" encoding="utf-8"?>
+<p:sld xmlns:a="http://schemas.openxmlformats.org/drawingml/2006/main" xmlns:r="http://schemas.openxmlformats.org/officeDocument/2006/relationships" xmlns:p="http://schemas.openxmlformats.org/presentationml/2006/main">
+  <p:cSld>
+    <p:spTree>
+      <p:nvGrpSpPr>
+        <p:cNvPr id="1" name=""/>
+        <p:cNvGrpSpPr/>
+        <p:nvPr/>
+      </p:nvGrpSpPr>
+      <p:grpSpPr>
+        <a:xfrm>
+          <a:off x="0" y="0"/>
+          <a:ext cx="0" cy="0"/>
+          <a:chOff x="0" y="0"/>
+          <a:chExt cx="0" cy="0"/>
+        </a:xfrm>
+      </p:grpSpPr>
+      <p:sp>
+        <p:nvSpPr>
+          <p:cNvPr id="4" name="Espaço Reservado para Texto 3"/>
+          <p:cNvSpPr>
+            <a:spLocks noGrp="1"/>
+          </p:cNvSpPr>
+          <p:nvPr>
+            <p:ph type="body" sz="quarter" idx="11"/>
+          </p:nvPr>
+        </p:nvSpPr>
+        <p:spPr/>
+        <p:txBody>
+          <a:bodyPr/>
+          <a:lstStyle/>
+          <a:p>
+            <a:r>
+              <a:rPr lang="pt-BR" dirty="0" smtClean="0"/>
+              <a:t>Aplicação ASP .NET Core MVC</a:t>
+            </a:r>
+          </a:p>
+        </p:txBody>
+      </p:sp>
+    </p:spTree>
+    <p:extLst>
+      <p:ext uri="{BB962C8B-B14F-4D97-AF65-F5344CB8AC3E}">
+        <p14:creationId xmlns:p14="http://schemas.microsoft.com/office/powerpoint/2010/main" val="72721711"/>
+      </p:ext>
+    </p:extLst>
+  </p:cSld>
+  <p:clrMapOvr>
+    <a:masterClrMapping/>
+  </p:clrMapOvr>
+  <p:timing>
+    <p:tnLst>
+      <p:par>
+        <p:cTn id="1" dur="indefinite" restart="never" nodeType="tmRoot"/>
+      </p:par>
+    </p:tnLst>
+  </p:timing>
+</p:sld>
+</file>
+
+<file path=ppt/slides/slide16.xml><?xml version="1.0" encoding="utf-8"?>
+<p:sld xmlns:a="http://schemas.openxmlformats.org/drawingml/2006/main" xmlns:r="http://schemas.openxmlformats.org/officeDocument/2006/relationships" xmlns:p="http://schemas.openxmlformats.org/presentationml/2006/main">
+  <p:cSld>
+    <p:spTree>
+      <p:nvGrpSpPr>
+        <p:cNvPr id="1" name=""/>
+        <p:cNvGrpSpPr/>
+        <p:nvPr/>
+      </p:nvGrpSpPr>
+      <p:grpSpPr>
+        <a:xfrm>
+          <a:off x="0" y="0"/>
+          <a:ext cx="0" cy="0"/>
+          <a:chOff x="0" y="0"/>
+          <a:chExt cx="0" cy="0"/>
+        </a:xfrm>
+      </p:grpSpPr>
+      <p:sp>
+        <p:nvSpPr>
+          <p:cNvPr id="3" name="Espaço Reservado para Texto 2"/>
+          <p:cNvSpPr>
+            <a:spLocks noGrp="1"/>
+          </p:cNvSpPr>
+          <p:nvPr>
+            <p:ph type="body" sz="quarter" idx="10"/>
+          </p:nvPr>
+        </p:nvSpPr>
+        <p:spPr/>
+        <p:txBody>
+          <a:bodyPr/>
+          <a:lstStyle/>
+          <a:p>
+            <a:r>
+              <a:rPr lang="pt-BR" dirty="0" smtClean="0"/>
+              <a:t>Criação pelo Visual Studio 2017</a:t>
+            </a:r>
+            <a:endParaRPr lang="pt-BR" dirty="0"/>
+          </a:p>
+        </p:txBody>
+      </p:sp>
+      <p:pic>
+        <p:nvPicPr>
+          <p:cNvPr id="6" name="Imagem 5"/>
+          <p:cNvPicPr>
+            <a:picLocks noChangeAspect="1"/>
+          </p:cNvPicPr>
+          <p:nvPr/>
+        </p:nvPicPr>
+        <p:blipFill>
+          <a:blip r:embed="rId2"/>
+          <a:stretch>
+            <a:fillRect/>
+          </a:stretch>
+        </p:blipFill>
+        <p:spPr>
+          <a:xfrm>
+            <a:off x="2521194" y="914401"/>
+            <a:ext cx="7079761" cy="4925707"/>
+          </a:xfrm>
+          <a:prstGeom prst="rect">
+            <a:avLst/>
+          </a:prstGeom>
+        </p:spPr>
+      </p:pic>
+    </p:spTree>
+    <p:extLst>
+      <p:ext uri="{BB962C8B-B14F-4D97-AF65-F5344CB8AC3E}">
+        <p14:creationId xmlns:p14="http://schemas.microsoft.com/office/powerpoint/2010/main" val="762664621"/>
+      </p:ext>
+    </p:extLst>
+  </p:cSld>
+  <p:clrMapOvr>
+    <a:masterClrMapping/>
+  </p:clrMapOvr>
+  <p:timing>
+    <p:tnLst>
+      <p:par>
+        <p:cTn id="1" dur="indefinite" restart="never" nodeType="tmRoot"/>
+      </p:par>
+    </p:tnLst>
+  </p:timing>
+</p:sld>
+</file>
+
+<file path=ppt/slides/slide17.xml><?xml version="1.0" encoding="utf-8"?>
+<p:sld xmlns:a="http://schemas.openxmlformats.org/drawingml/2006/main" xmlns:r="http://schemas.openxmlformats.org/officeDocument/2006/relationships" xmlns:p="http://schemas.openxmlformats.org/presentationml/2006/main">
+  <p:cSld>
+    <p:spTree>
+      <p:nvGrpSpPr>
+        <p:cNvPr id="1" name=""/>
+        <p:cNvGrpSpPr/>
+        <p:nvPr/>
+      </p:nvGrpSpPr>
+      <p:grpSpPr>
+        <a:xfrm>
+          <a:off x="0" y="0"/>
+          <a:ext cx="0" cy="0"/>
+          <a:chOff x="0" y="0"/>
+          <a:chExt cx="0" cy="0"/>
+        </a:xfrm>
+      </p:grpSpPr>
+      <p:sp>
+        <p:nvSpPr>
+          <p:cNvPr id="2" name="Espaço Reservado para Texto 1"/>
+          <p:cNvSpPr>
+            <a:spLocks noGrp="1"/>
+          </p:cNvSpPr>
+          <p:nvPr>
+            <p:ph type="body" sz="quarter" idx="10"/>
+          </p:nvPr>
+        </p:nvSpPr>
+        <p:spPr/>
+        <p:txBody>
+          <a:bodyPr/>
+          <a:lstStyle/>
+          <a:p>
+            <a:r>
+              <a:rPr lang="pt-BR" dirty="0"/>
+              <a:t>Criação pelo Visual Studio 2017</a:t>
+            </a:r>
+            <a:endParaRPr lang="pt-BR" dirty="0"/>
+          </a:p>
+        </p:txBody>
+      </p:sp>
+      <p:pic>
+        <p:nvPicPr>
+          <p:cNvPr id="4" name="Imagem 3"/>
+          <p:cNvPicPr>
+            <a:picLocks noChangeAspect="1"/>
+          </p:cNvPicPr>
+          <p:nvPr/>
+        </p:nvPicPr>
+        <p:blipFill>
+          <a:blip r:embed="rId2"/>
+          <a:stretch>
+            <a:fillRect/>
+          </a:stretch>
+        </p:blipFill>
+        <p:spPr>
+          <a:xfrm>
+            <a:off x="464580" y="914401"/>
+            <a:ext cx="7184668" cy="4689230"/>
+          </a:xfrm>
+          <a:prstGeom prst="rect">
+            <a:avLst/>
+          </a:prstGeom>
+        </p:spPr>
+      </p:pic>
+      <p:pic>
+        <p:nvPicPr>
+          <p:cNvPr id="5" name="Imagem 4"/>
+          <p:cNvPicPr>
+            <a:picLocks noChangeAspect="1"/>
+          </p:cNvPicPr>
+          <p:nvPr/>
+        </p:nvPicPr>
+        <p:blipFill>
+          <a:blip r:embed="rId3"/>
+          <a:stretch>
+            <a:fillRect/>
+          </a:stretch>
+        </p:blipFill>
+        <p:spPr>
+          <a:xfrm>
+            <a:off x="8192233" y="914401"/>
+            <a:ext cx="2724150" cy="4743450"/>
+          </a:xfrm>
+          <a:prstGeom prst="rect">
+            <a:avLst/>
+          </a:prstGeom>
+        </p:spPr>
+      </p:pic>
+    </p:spTree>
+    <p:extLst>
+      <p:ext uri="{BB962C8B-B14F-4D97-AF65-F5344CB8AC3E}">
+        <p14:creationId xmlns:p14="http://schemas.microsoft.com/office/powerpoint/2010/main" val="1020269156"/>
+      </p:ext>
+    </p:extLst>
+  </p:cSld>
+  <p:clrMapOvr>
+    <a:masterClrMapping/>
+  </p:clrMapOvr>
+  <p:timing>
+    <p:tnLst>
+      <p:par>
+        <p:cTn id="1" dur="indefinite" restart="never" nodeType="tmRoot">
+          <p:childTnLst>
+            <p:seq concurrent="1" nextAc="seek">
+              <p:cTn id="2" dur="indefinite" nodeType="mainSeq">
+                <p:childTnLst>
+                  <p:par>
+                    <p:cTn id="3" fill="hold">
+                      <p:stCondLst>
+                        <p:cond delay="indefinite"/>
+                      </p:stCondLst>
+                      <p:childTnLst>
+                        <p:par>
+                          <p:cTn id="4" fill="hold">
+                            <p:stCondLst>
+                              <p:cond delay="0"/>
+                            </p:stCondLst>
+                            <p:childTnLst>
+                              <p:par>
+                                <p:cTn id="5" presetID="10" presetClass="entr" presetSubtype="0" fill="hold" nodeType="clickEffect">
+                                  <p:stCondLst>
+                                    <p:cond delay="0"/>
+                                  </p:stCondLst>
+                                  <p:childTnLst>
+                                    <p:set>
+                                      <p:cBhvr>
+                                        <p:cTn id="6" dur="1" fill="hold">
+                                          <p:stCondLst>
+                                            <p:cond delay="0"/>
+                                          </p:stCondLst>
+                                        </p:cTn>
+                                        <p:tgtEl>
+                                          <p:spTgt spid="5"/>
+                                        </p:tgtEl>
+                                        <p:attrNameLst>
+                                          <p:attrName>style.visibility</p:attrName>
+                                        </p:attrNameLst>
+                                      </p:cBhvr>
+                                      <p:to>
+                                        <p:strVal val="visible"/>
+                                      </p:to>
+                                    </p:set>
+                                    <p:animEffect transition="in" filter="fade">
+                                      <p:cBhvr>
+                                        <p:cTn id="7" dur="500"/>
+                                        <p:tgtEl>
+                                          <p:spTgt spid="5"/>
+                                        </p:tgtEl>
+                                      </p:cBhvr>
+                                    </p:animEffect>
+                                  </p:childTnLst>
+                                </p:cTn>
+                              </p:par>
+                            </p:childTnLst>
+                          </p:cTn>
+                        </p:par>
+                      </p:childTnLst>
+                    </p:cTn>
+                  </p:par>
+                </p:childTnLst>
+              </p:cTn>
+              <p:prevCondLst>
+                <p:cond evt="onPrev" delay="0">
+                  <p:tgtEl>
+                    <p:sldTgt/>
+                  </p:tgtEl>
+                </p:cond>
+              </p:prevCondLst>
+              <p:nextCondLst>
+                <p:cond evt="onNext" delay="0">
+                  <p:tgtEl>
+                    <p:sldTgt/>
+                  </p:tgtEl>
+                </p:cond>
+              </p:nextCondLst>
+            </p:seq>
+          </p:childTnLst>
+        </p:cTn>
+      </p:par>
+    </p:tnLst>
+  </p:timing>
+</p:sld>
+</file>
+
+<file path=ppt/slides/slide18.xml><?xml version="1.0" encoding="utf-8"?>
+<p:sld xmlns:a="http://schemas.openxmlformats.org/drawingml/2006/main" xmlns:r="http://schemas.openxmlformats.org/officeDocument/2006/relationships" xmlns:p="http://schemas.openxmlformats.org/presentationml/2006/main">
+  <p:cSld>
+    <p:spTree>
+      <p:nvGrpSpPr>
+        <p:cNvPr id="1" name=""/>
+        <p:cNvGrpSpPr/>
+        <p:nvPr/>
+      </p:nvGrpSpPr>
+      <p:grpSpPr>
+        <a:xfrm>
+          <a:off x="0" y="0"/>
+          <a:ext cx="0" cy="0"/>
+          <a:chOff x="0" y="0"/>
+          <a:chExt cx="0" cy="0"/>
+        </a:xfrm>
+      </p:grpSpPr>
+      <p:sp>
+        <p:nvSpPr>
+          <p:cNvPr id="2" name="Espaço Reservado para Texto 1"/>
+          <p:cNvSpPr>
+            <a:spLocks noGrp="1"/>
+          </p:cNvSpPr>
+          <p:nvPr>
+            <p:ph type="body" sz="quarter" idx="10"/>
+          </p:nvPr>
+        </p:nvSpPr>
+        <p:spPr/>
+        <p:txBody>
+          <a:bodyPr/>
+          <a:lstStyle/>
+          <a:p>
+            <a:r>
+              <a:rPr lang="pt-BR" dirty="0" smtClean="0"/>
+              <a:t>A aplicação Web ASP .NET Core MVC</a:t>
+            </a:r>
+            <a:endParaRPr lang="pt-BR" dirty="0"/>
+          </a:p>
+        </p:txBody>
+      </p:sp>
+      <p:pic>
+        <p:nvPicPr>
+          <p:cNvPr id="4" name="Imagem 3"/>
+          <p:cNvPicPr>
+            <a:picLocks noChangeAspect="1"/>
+          </p:cNvPicPr>
+          <p:nvPr/>
+        </p:nvPicPr>
+        <p:blipFill>
+          <a:blip r:embed="rId2"/>
+          <a:stretch>
+            <a:fillRect/>
+          </a:stretch>
+        </p:blipFill>
+        <p:spPr>
+          <a:xfrm>
+            <a:off x="353157" y="1048483"/>
+            <a:ext cx="3741561" cy="2820132"/>
+          </a:xfrm>
+          <a:prstGeom prst="rect">
+            <a:avLst/>
+          </a:prstGeom>
+        </p:spPr>
+      </p:pic>
+      <p:sp>
+        <p:nvSpPr>
+          <p:cNvPr id="5" name="CaixaDeTexto 4"/>
+          <p:cNvSpPr txBox="1"/>
+          <p:nvPr/>
+        </p:nvSpPr>
+        <p:spPr>
+          <a:xfrm>
+            <a:off x="4301067" y="1048483"/>
+            <a:ext cx="7196666" cy="3416320"/>
+          </a:xfrm>
+          <a:prstGeom prst="rect">
+            <a:avLst/>
+          </a:prstGeom>
+          <a:noFill/>
+        </p:spPr>
+        <p:txBody>
+          <a:bodyPr wrap="square" rtlCol="0">
+            <a:spAutoFit/>
+          </a:bodyPr>
+          <a:lstStyle/>
+          <a:p>
+            <a:pPr marL="342900" indent="-342900">
+              <a:buFont typeface="Arial" panose="020B0604020202020204" pitchFamily="34" charset="0"/>
+              <a:buChar char="•"/>
+            </a:pPr>
+            <a:r>
+              <a:rPr lang="pt-BR" sz="2400" dirty="0" smtClean="0"/>
+              <a:t>Home: </a:t>
+            </a:r>
+            <a:r>
+              <a:rPr lang="pt-BR" sz="2400" dirty="0" err="1" smtClean="0"/>
+              <a:t>views</a:t>
+            </a:r>
+            <a:r>
+              <a:rPr lang="pt-BR" sz="2400" dirty="0" smtClean="0"/>
+              <a:t> padrão criadas pelo </a:t>
+            </a:r>
+            <a:r>
+              <a:rPr lang="pt-BR" sz="2400" dirty="0" err="1" smtClean="0"/>
+              <a:t>template</a:t>
+            </a:r>
+            <a:endParaRPr lang="pt-BR" sz="2400" dirty="0" smtClean="0"/>
+          </a:p>
+          <a:p>
+            <a:pPr marL="342900" indent="-342900">
+              <a:buFont typeface="Arial" panose="020B0604020202020204" pitchFamily="34" charset="0"/>
+              <a:buChar char="•"/>
+            </a:pPr>
+            <a:r>
+              <a:rPr lang="pt-BR" sz="2400" dirty="0" err="1" smtClean="0"/>
+              <a:t>Shared</a:t>
+            </a:r>
+            <a:r>
+              <a:rPr lang="pt-BR" sz="2400" dirty="0" smtClean="0"/>
+              <a:t>: </a:t>
+            </a:r>
+            <a:r>
+              <a:rPr lang="pt-BR" sz="2400" dirty="0" err="1" smtClean="0"/>
+              <a:t>views</a:t>
+            </a:r>
+            <a:r>
+              <a:rPr lang="pt-BR" sz="2400" dirty="0" smtClean="0"/>
+              <a:t> que são compartilhadas</a:t>
+            </a:r>
+          </a:p>
+          <a:p>
+            <a:pPr marL="800100" lvl="1" indent="-342900">
+              <a:buFont typeface="Arial" panose="020B0604020202020204" pitchFamily="34" charset="0"/>
+              <a:buChar char="•"/>
+            </a:pPr>
+            <a:r>
+              <a:rPr lang="pt-BR" sz="2400" dirty="0" smtClean="0"/>
+              <a:t>_</a:t>
+            </a:r>
+            <a:r>
+              <a:rPr lang="pt-BR" sz="2400" dirty="0" err="1" smtClean="0"/>
+              <a:t>Layout.cshtml</a:t>
+            </a:r>
+            <a:r>
+              <a:rPr lang="pt-BR" sz="2400" dirty="0" smtClean="0"/>
+              <a:t> : </a:t>
+            </a:r>
+            <a:r>
+              <a:rPr lang="pt-BR" sz="2400" dirty="0" err="1" smtClean="0"/>
+              <a:t>view</a:t>
+            </a:r>
+            <a:r>
+              <a:rPr lang="pt-BR" sz="2400" dirty="0" smtClean="0"/>
+              <a:t> padrão que é utilizada como página pai (</a:t>
+            </a:r>
+            <a:r>
+              <a:rPr lang="pt-BR" sz="2400" dirty="0" err="1" smtClean="0"/>
+              <a:t>master</a:t>
+            </a:r>
+            <a:r>
+              <a:rPr lang="pt-BR" sz="2400" dirty="0" smtClean="0"/>
+              <a:t> </a:t>
+            </a:r>
+            <a:r>
+              <a:rPr lang="pt-BR" sz="2400" dirty="0" err="1" smtClean="0"/>
+              <a:t>page</a:t>
+            </a:r>
+            <a:r>
+              <a:rPr lang="pt-BR" sz="2400" dirty="0" smtClean="0"/>
+              <a:t> no conceito antigo) por todas as demais</a:t>
+            </a:r>
+          </a:p>
+          <a:p>
+            <a:pPr marL="342900" indent="-342900">
+              <a:buFont typeface="Arial" panose="020B0604020202020204" pitchFamily="34" charset="0"/>
+              <a:buChar char="•"/>
+            </a:pPr>
+            <a:r>
+              <a:rPr lang="pt-BR" sz="2400" dirty="0" smtClean="0"/>
+              <a:t>_</a:t>
+            </a:r>
+            <a:r>
+              <a:rPr lang="pt-BR" sz="2400" dirty="0" err="1" smtClean="0"/>
+              <a:t>ViewImports</a:t>
+            </a:r>
+            <a:r>
+              <a:rPr lang="pt-BR" sz="2400" dirty="0" smtClean="0"/>
+              <a:t> : contém os </a:t>
+            </a:r>
+            <a:r>
+              <a:rPr lang="pt-BR" sz="2400" dirty="0" err="1" smtClean="0"/>
+              <a:t>namespaces</a:t>
+            </a:r>
+            <a:r>
+              <a:rPr lang="pt-BR" sz="2400" dirty="0" smtClean="0"/>
+              <a:t> que serão utilizados nas </a:t>
+            </a:r>
+            <a:r>
+              <a:rPr lang="pt-BR" sz="2400" dirty="0" err="1" smtClean="0"/>
+              <a:t>views</a:t>
+            </a:r>
+            <a:endParaRPr lang="pt-BR" sz="2400" dirty="0" smtClean="0"/>
+          </a:p>
+          <a:p>
+            <a:pPr marL="342900" indent="-342900">
+              <a:buFont typeface="Arial" panose="020B0604020202020204" pitchFamily="34" charset="0"/>
+              <a:buChar char="•"/>
+            </a:pPr>
+            <a:r>
+              <a:rPr lang="pt-BR" sz="2400" dirty="0" smtClean="0"/>
+              <a:t>_</a:t>
+            </a:r>
+            <a:r>
+              <a:rPr lang="pt-BR" sz="2400" dirty="0" err="1" smtClean="0"/>
+              <a:t>ViewStart</a:t>
+            </a:r>
+            <a:r>
+              <a:rPr lang="pt-BR" sz="2400" dirty="0" smtClean="0"/>
+              <a:t>: configurações padrão para todas as demais </a:t>
+            </a:r>
+            <a:r>
+              <a:rPr lang="pt-BR" sz="2400" dirty="0" err="1" smtClean="0"/>
+              <a:t>views</a:t>
+            </a:r>
+            <a:endParaRPr lang="pt-BR" sz="2400" dirty="0"/>
+          </a:p>
+        </p:txBody>
+      </p:sp>
+    </p:spTree>
+    <p:extLst>
+      <p:ext uri="{BB962C8B-B14F-4D97-AF65-F5344CB8AC3E}">
+        <p14:creationId xmlns:p14="http://schemas.microsoft.com/office/powerpoint/2010/main" val="2630231825"/>
+      </p:ext>
+    </p:extLst>
+  </p:cSld>
+  <p:clrMapOvr>
+    <a:masterClrMapping/>
+  </p:clrMapOvr>
+  <p:timing>
+    <p:tnLst>
+      <p:par>
+        <p:cTn id="1" dur="indefinite" restart="never" nodeType="tmRoot"/>
+      </p:par>
+    </p:tnLst>
+  </p:timing>
+</p:sld>
+</file>
+
+<file path=ppt/slides/slide19.xml><?xml version="1.0" encoding="utf-8"?>
+<p:sld xmlns:a="http://schemas.openxmlformats.org/drawingml/2006/main" xmlns:r="http://schemas.openxmlformats.org/officeDocument/2006/relationships" xmlns:p="http://schemas.openxmlformats.org/presentationml/2006/main">
+  <p:cSld>
+    <p:spTree>
+      <p:nvGrpSpPr>
+        <p:cNvPr id="1" name=""/>
+        <p:cNvGrpSpPr/>
+        <p:nvPr/>
+      </p:nvGrpSpPr>
+      <p:grpSpPr>
+        <a:xfrm>
+          <a:off x="0" y="0"/>
+          <a:ext cx="0" cy="0"/>
+          <a:chOff x="0" y="0"/>
+          <a:chExt cx="0" cy="0"/>
+        </a:xfrm>
+      </p:grpSpPr>
+      <p:sp>
+        <p:nvSpPr>
+          <p:cNvPr id="2" name="Espaço Reservado para Texto 1"/>
+          <p:cNvSpPr>
+            <a:spLocks noGrp="1"/>
+          </p:cNvSpPr>
+          <p:nvPr>
+            <p:ph type="body" sz="quarter" idx="10"/>
+          </p:nvPr>
+        </p:nvSpPr>
+        <p:spPr/>
+        <p:txBody>
+          <a:bodyPr/>
+          <a:lstStyle/>
+          <a:p>
+            <a:r>
+              <a:rPr lang="pt-BR" dirty="0"/>
+              <a:t>A aplicação Web ASP .NET Core </a:t>
+            </a:r>
+            <a:r>
+              <a:rPr lang="pt-BR" dirty="0" smtClean="0"/>
+              <a:t>MVC</a:t>
+            </a:r>
+            <a:endParaRPr lang="pt-BR" dirty="0"/>
+          </a:p>
+        </p:txBody>
+      </p:sp>
+      <p:pic>
+        <p:nvPicPr>
+          <p:cNvPr id="4" name="Imagem 3"/>
+          <p:cNvPicPr>
+            <a:picLocks noChangeAspect="1"/>
+          </p:cNvPicPr>
+          <p:nvPr/>
+        </p:nvPicPr>
+        <p:blipFill>
+          <a:blip r:embed="rId2"/>
+          <a:stretch>
+            <a:fillRect/>
+          </a:stretch>
+        </p:blipFill>
+        <p:spPr>
+          <a:xfrm>
+            <a:off x="301198" y="914401"/>
+            <a:ext cx="7696200" cy="5648325"/>
+          </a:xfrm>
+          <a:prstGeom prst="rect">
+            <a:avLst/>
+          </a:prstGeom>
+        </p:spPr>
+      </p:pic>
+      <p:pic>
+        <p:nvPicPr>
+          <p:cNvPr id="5" name="Imagem 4"/>
+          <p:cNvPicPr>
+            <a:picLocks noChangeAspect="1"/>
+          </p:cNvPicPr>
+          <p:nvPr/>
+        </p:nvPicPr>
+        <p:blipFill>
+          <a:blip r:embed="rId3"/>
+          <a:stretch>
+            <a:fillRect/>
+          </a:stretch>
+        </p:blipFill>
+        <p:spPr>
+          <a:xfrm>
+            <a:off x="8192233" y="914401"/>
+            <a:ext cx="2724150" cy="4743450"/>
+          </a:xfrm>
+          <a:prstGeom prst="rect">
+            <a:avLst/>
+          </a:prstGeom>
+        </p:spPr>
+      </p:pic>
+      <p:sp>
+        <p:nvSpPr>
+          <p:cNvPr id="8" name="Retângulo 7"/>
+          <p:cNvSpPr/>
+          <p:nvPr/>
+        </p:nvSpPr>
+        <p:spPr>
+          <a:xfrm>
+            <a:off x="1559379" y="1885950"/>
+            <a:ext cx="293914" cy="253093"/>
+          </a:xfrm>
+          <a:prstGeom prst="rect">
+            <a:avLst/>
+          </a:prstGeom>
+          <a:solidFill>
+            <a:schemeClr val="accent1">
+              <a:alpha val="34000"/>
+            </a:schemeClr>
+          </a:solidFill>
+        </p:spPr>
+        <p:style>
+          <a:lnRef idx="2">
+            <a:schemeClr val="accent1">
+              <a:shade val="50000"/>
+            </a:schemeClr>
+          </a:lnRef>
+          <a:fillRef idx="1">
+            <a:schemeClr val="accent1"/>
+          </a:fillRef>
+          <a:effectRef idx="0">
+            <a:schemeClr val="accent1"/>
+          </a:effectRef>
+          <a:fontRef idx="minor">
+            <a:schemeClr val="lt1"/>
+          </a:fontRef>
+        </p:style>
+        <p:txBody>
+          <a:bodyPr rtlCol="0" anchor="ctr"/>
+          <a:lstStyle/>
+          <a:p>
+            <a:pPr algn="ctr"/>
+            <a:endParaRPr lang="pt-BR"/>
+          </a:p>
+        </p:txBody>
+      </p:sp>
+      <p:cxnSp>
+        <p:nvCxnSpPr>
+          <p:cNvPr id="10" name="Conector de seta reta 9"/>
+          <p:cNvCxnSpPr/>
+          <p:nvPr/>
+        </p:nvCxnSpPr>
+        <p:spPr>
+          <a:xfrm>
+            <a:off x="1926771" y="2139043"/>
+            <a:ext cx="6588579" cy="955221"/>
+          </a:xfrm>
+          <a:prstGeom prst="straightConnector1">
+            <a:avLst/>
+          </a:prstGeom>
+          <a:ln w="12700">
+            <a:tailEnd type="triangle"/>
+          </a:ln>
+        </p:spPr>
+        <p:style>
+          <a:lnRef idx="1">
+            <a:schemeClr val="accent1"/>
+          </a:lnRef>
+          <a:fillRef idx="0">
+            <a:schemeClr val="accent1"/>
+          </a:fillRef>
+          <a:effectRef idx="0">
+            <a:schemeClr val="accent1"/>
+          </a:effectRef>
+          <a:fontRef idx="minor">
+            <a:schemeClr val="tx1"/>
+          </a:fontRef>
+        </p:style>
+      </p:cxnSp>
+      <p:cxnSp>
+        <p:nvCxnSpPr>
+          <p:cNvPr id="11" name="Conector de seta reta 10"/>
+          <p:cNvCxnSpPr/>
+          <p:nvPr/>
+        </p:nvCxnSpPr>
+        <p:spPr>
+          <a:xfrm>
+            <a:off x="2228850" y="2767693"/>
+            <a:ext cx="6637564" cy="849086"/>
+          </a:xfrm>
+          <a:prstGeom prst="straightConnector1">
+            <a:avLst/>
+          </a:prstGeom>
+          <a:ln w="12700">
+            <a:tailEnd type="triangle"/>
+          </a:ln>
+        </p:spPr>
+        <p:style>
+          <a:lnRef idx="1">
+            <a:schemeClr val="accent1"/>
+          </a:lnRef>
+          <a:fillRef idx="0">
+            <a:schemeClr val="accent1"/>
+          </a:fillRef>
+          <a:effectRef idx="0">
+            <a:schemeClr val="accent1"/>
+          </a:effectRef>
+          <a:fontRef idx="minor">
+            <a:schemeClr val="tx1"/>
+          </a:fontRef>
+        </p:style>
+      </p:cxnSp>
+      <p:cxnSp>
+        <p:nvCxnSpPr>
+          <p:cNvPr id="14" name="Conector de seta reta 13"/>
+          <p:cNvCxnSpPr/>
+          <p:nvPr/>
+        </p:nvCxnSpPr>
+        <p:spPr>
+          <a:xfrm flipV="1">
+            <a:off x="2228850" y="3286126"/>
+            <a:ext cx="6637564" cy="665612"/>
+          </a:xfrm>
+          <a:prstGeom prst="straightConnector1">
+            <a:avLst/>
+          </a:prstGeom>
+          <a:ln w="12700">
+            <a:tailEnd type="triangle"/>
+          </a:ln>
+        </p:spPr>
+        <p:style>
+          <a:lnRef idx="1">
+            <a:schemeClr val="accent1"/>
+          </a:lnRef>
+          <a:fillRef idx="0">
+            <a:schemeClr val="accent1"/>
+          </a:fillRef>
+          <a:effectRef idx="0">
+            <a:schemeClr val="accent1"/>
+          </a:effectRef>
+          <a:fontRef idx="minor">
+            <a:schemeClr val="tx1"/>
+          </a:fontRef>
+        </p:style>
+      </p:cxnSp>
+      <p:cxnSp>
+        <p:nvCxnSpPr>
+          <p:cNvPr id="16" name="Conector de seta reta 15"/>
+          <p:cNvCxnSpPr/>
+          <p:nvPr/>
+        </p:nvCxnSpPr>
+        <p:spPr>
+          <a:xfrm flipV="1">
+            <a:off x="2228850" y="3451453"/>
+            <a:ext cx="6637564" cy="1710071"/>
+          </a:xfrm>
+          <a:prstGeom prst="straightConnector1">
+            <a:avLst/>
+          </a:prstGeom>
+          <a:ln w="12700">
+            <a:tailEnd type="triangle"/>
+          </a:ln>
+        </p:spPr>
+        <p:style>
+          <a:lnRef idx="1">
+            <a:schemeClr val="accent1"/>
+          </a:lnRef>
+          <a:fillRef idx="0">
+            <a:schemeClr val="accent1"/>
+          </a:fillRef>
+          <a:effectRef idx="0">
+            <a:schemeClr val="accent1"/>
+          </a:effectRef>
+          <a:fontRef idx="minor">
+            <a:schemeClr val="tx1"/>
+          </a:fontRef>
+        </p:style>
+      </p:cxnSp>
+      <p:cxnSp>
+        <p:nvCxnSpPr>
+          <p:cNvPr id="18" name="Conector de seta reta 17"/>
+          <p:cNvCxnSpPr/>
+          <p:nvPr/>
+        </p:nvCxnSpPr>
+        <p:spPr>
+          <a:xfrm flipV="1">
+            <a:off x="2128157" y="4306488"/>
+            <a:ext cx="6738257" cy="1614539"/>
+          </a:xfrm>
+          <a:prstGeom prst="straightConnector1">
+            <a:avLst/>
+          </a:prstGeom>
+          <a:ln w="12700">
+            <a:tailEnd type="triangle"/>
+          </a:ln>
+        </p:spPr>
+        <p:style>
+          <a:lnRef idx="1">
+            <a:schemeClr val="accent1"/>
+          </a:lnRef>
+          <a:fillRef idx="0">
+            <a:schemeClr val="accent1"/>
+          </a:fillRef>
+          <a:effectRef idx="0">
+            <a:schemeClr val="accent1"/>
+          </a:effectRef>
+          <a:fontRef idx="minor">
+            <a:schemeClr val="tx1"/>
+          </a:fontRef>
+        </p:style>
+      </p:cxnSp>
+    </p:spTree>
+    <p:extLst>
+      <p:ext uri="{BB962C8B-B14F-4D97-AF65-F5344CB8AC3E}">
+        <p14:creationId xmlns:p14="http://schemas.microsoft.com/office/powerpoint/2010/main" val="4044729547"/>
+      </p:ext>
+    </p:extLst>
+  </p:cSld>
+  <p:clrMapOvr>
+    <a:masterClrMapping/>
+  </p:clrMapOvr>
+  <p:timing>
+    <p:tnLst>
+      <p:par>
+        <p:cTn id="1" dur="indefinite" restart="never" nodeType="tmRoot">
+          <p:childTnLst>
+            <p:seq concurrent="1" nextAc="seek">
+              <p:cTn id="2" dur="indefinite" nodeType="mainSeq">
+                <p:childTnLst>
+                  <p:par>
+                    <p:cTn id="3" fill="hold">
+                      <p:stCondLst>
+                        <p:cond delay="indefinite"/>
+                      </p:stCondLst>
+                      <p:childTnLst>
+                        <p:par>
+                          <p:cTn id="4" fill="hold">
+                            <p:stCondLst>
+                              <p:cond delay="0"/>
+                            </p:stCondLst>
+                            <p:childTnLst>
+                              <p:par>
+                                <p:cTn id="5" presetID="10" presetClass="entr" presetSubtype="0" fill="hold" nodeType="clickEffect">
+                                  <p:stCondLst>
+                                    <p:cond delay="0"/>
+                                  </p:stCondLst>
+                                  <p:childTnLst>
+                                    <p:set>
+                                      <p:cBhvr>
+                                        <p:cTn id="6" dur="1" fill="hold">
+                                          <p:stCondLst>
+                                            <p:cond delay="0"/>
+                                          </p:stCondLst>
+                                        </p:cTn>
+                                        <p:tgtEl>
+                                          <p:spTgt spid="5"/>
+                                        </p:tgtEl>
+                                        <p:attrNameLst>
+                                          <p:attrName>style.visibility</p:attrName>
+                                        </p:attrNameLst>
+                                      </p:cBhvr>
+                                      <p:to>
+                                        <p:strVal val="visible"/>
+                                      </p:to>
+                                    </p:set>
+                                    <p:animEffect transition="in" filter="fade">
+                                      <p:cBhvr>
+                                        <p:cTn id="7" dur="500"/>
+                                        <p:tgtEl>
+                                          <p:spTgt spid="5"/>
+                                        </p:tgtEl>
+                                      </p:cBhvr>
+                                    </p:animEffect>
+                                  </p:childTnLst>
+                                </p:cTn>
+                              </p:par>
+                            </p:childTnLst>
+                          </p:cTn>
+                        </p:par>
+                      </p:childTnLst>
+                    </p:cTn>
+                  </p:par>
+                  <p:par>
+                    <p:cTn id="8" fill="hold">
+                      <p:stCondLst>
+                        <p:cond delay="indefinite"/>
+                      </p:stCondLst>
+                      <p:childTnLst>
+                        <p:par>
+                          <p:cTn id="9" fill="hold">
+                            <p:stCondLst>
+                              <p:cond delay="0"/>
+                            </p:stCondLst>
+                            <p:childTnLst>
+                              <p:par>
+                                <p:cTn id="10" presetID="10" presetClass="entr" presetSubtype="0" fill="hold" grpId="0" nodeType="clickEffect">
+                                  <p:stCondLst>
+                                    <p:cond delay="0"/>
+                                  </p:stCondLst>
+                                  <p:childTnLst>
+                                    <p:set>
+                                      <p:cBhvr>
+                                        <p:cTn id="11" dur="1" fill="hold">
+                                          <p:stCondLst>
+                                            <p:cond delay="0"/>
+                                          </p:stCondLst>
+                                        </p:cTn>
+                                        <p:tgtEl>
+                                          <p:spTgt spid="8"/>
+                                        </p:tgtEl>
+                                        <p:attrNameLst>
+                                          <p:attrName>style.visibility</p:attrName>
+                                        </p:attrNameLst>
+                                      </p:cBhvr>
+                                      <p:to>
+                                        <p:strVal val="visible"/>
+                                      </p:to>
+                                    </p:set>
+                                    <p:animEffect transition="in" filter="fade">
+                                      <p:cBhvr>
+                                        <p:cTn id="12" dur="500"/>
+                                        <p:tgtEl>
+                                          <p:spTgt spid="8"/>
+                                        </p:tgtEl>
+                                      </p:cBhvr>
+                                    </p:animEffect>
+                                  </p:childTnLst>
+                                </p:cTn>
+                              </p:par>
+                              <p:par>
+                                <p:cTn id="13" presetID="10" presetClass="entr" presetSubtype="0" fill="hold" nodeType="withEffect">
+                                  <p:stCondLst>
+                                    <p:cond delay="0"/>
+                                  </p:stCondLst>
+                                  <p:childTnLst>
+                                    <p:set>
+                                      <p:cBhvr>
+                                        <p:cTn id="14" dur="1" fill="hold">
+                                          <p:stCondLst>
+                                            <p:cond delay="0"/>
+                                          </p:stCondLst>
+                                        </p:cTn>
+                                        <p:tgtEl>
+                                          <p:spTgt spid="10"/>
+                                        </p:tgtEl>
+                                        <p:attrNameLst>
+                                          <p:attrName>style.visibility</p:attrName>
+                                        </p:attrNameLst>
+                                      </p:cBhvr>
+                                      <p:to>
+                                        <p:strVal val="visible"/>
+                                      </p:to>
+                                    </p:set>
+                                    <p:animEffect transition="in" filter="fade">
+                                      <p:cBhvr>
+                                        <p:cTn id="15" dur="500"/>
+                                        <p:tgtEl>
+                                          <p:spTgt spid="10"/>
+                                        </p:tgtEl>
+                                      </p:cBhvr>
+                                    </p:animEffect>
+                                  </p:childTnLst>
+                                </p:cTn>
+                              </p:par>
+                            </p:childTnLst>
+                          </p:cTn>
+                        </p:par>
+                      </p:childTnLst>
+                    </p:cTn>
+                  </p:par>
+                  <p:par>
+                    <p:cTn id="16" fill="hold">
+                      <p:stCondLst>
+                        <p:cond delay="indefinite"/>
+                      </p:stCondLst>
+                      <p:childTnLst>
+                        <p:par>
+                          <p:cTn id="17" fill="hold">
+                            <p:stCondLst>
+                              <p:cond delay="0"/>
+                            </p:stCondLst>
+                            <p:childTnLst>
+                              <p:par>
+                                <p:cTn id="18" presetID="10" presetClass="entr" presetSubtype="0" fill="hold" nodeType="clickEffect">
+                                  <p:stCondLst>
+                                    <p:cond delay="0"/>
+                                  </p:stCondLst>
+                                  <p:childTnLst>
+                                    <p:set>
+                                      <p:cBhvr>
+                                        <p:cTn id="19" dur="1" fill="hold">
+                                          <p:stCondLst>
+                                            <p:cond delay="0"/>
+                                          </p:stCondLst>
+                                        </p:cTn>
+                                        <p:tgtEl>
+                                          <p:spTgt spid="11"/>
+                                        </p:tgtEl>
+                                        <p:attrNameLst>
+                                          <p:attrName>style.visibility</p:attrName>
+                                        </p:attrNameLst>
+                                      </p:cBhvr>
+                                      <p:to>
+                                        <p:strVal val="visible"/>
+                                      </p:to>
+                                    </p:set>
+                                    <p:animEffect transition="in" filter="fade">
+                                      <p:cBhvr>
+                                        <p:cTn id="20" dur="500"/>
+                                        <p:tgtEl>
+                                          <p:spTgt spid="11"/>
+                                        </p:tgtEl>
+                                      </p:cBhvr>
+                                    </p:animEffect>
+                                  </p:childTnLst>
+                                </p:cTn>
+                              </p:par>
+                            </p:childTnLst>
+                          </p:cTn>
+                        </p:par>
+                      </p:childTnLst>
+                    </p:cTn>
+                  </p:par>
+                  <p:par>
+                    <p:cTn id="21" fill="hold">
+                      <p:stCondLst>
+                        <p:cond delay="indefinite"/>
+                      </p:stCondLst>
+                      <p:childTnLst>
+                        <p:par>
+                          <p:cTn id="22" fill="hold">
+                            <p:stCondLst>
+                              <p:cond delay="0"/>
+                            </p:stCondLst>
+                            <p:childTnLst>
+                              <p:par>
+                                <p:cTn id="23" presetID="10" presetClass="entr" presetSubtype="0" fill="hold" nodeType="clickEffect">
+                                  <p:stCondLst>
+                                    <p:cond delay="0"/>
+                                  </p:stCondLst>
+                                  <p:childTnLst>
+                                    <p:set>
+                                      <p:cBhvr>
+                                        <p:cTn id="24" dur="1" fill="hold">
+                                          <p:stCondLst>
+                                            <p:cond delay="0"/>
+                                          </p:stCondLst>
+                                        </p:cTn>
+                                        <p:tgtEl>
+                                          <p:spTgt spid="14"/>
+                                        </p:tgtEl>
+                                        <p:attrNameLst>
+                                          <p:attrName>style.visibility</p:attrName>
+                                        </p:attrNameLst>
+                                      </p:cBhvr>
+                                      <p:to>
+                                        <p:strVal val="visible"/>
+                                      </p:to>
+                                    </p:set>
+                                    <p:animEffect transition="in" filter="fade">
+                                      <p:cBhvr>
+                                        <p:cTn id="25" dur="500"/>
+                                        <p:tgtEl>
+                                          <p:spTgt spid="14"/>
+                                        </p:tgtEl>
+                                      </p:cBhvr>
+                                    </p:animEffect>
+                                  </p:childTnLst>
+                                </p:cTn>
+                              </p:par>
+                            </p:childTnLst>
+                          </p:cTn>
+                        </p:par>
+                      </p:childTnLst>
+                    </p:cTn>
+                  </p:par>
+                  <p:par>
+                    <p:cTn id="26" fill="hold">
+                      <p:stCondLst>
+                        <p:cond delay="indefinite"/>
+                      </p:stCondLst>
+                      <p:childTnLst>
+                        <p:par>
+                          <p:cTn id="27" fill="hold">
+                            <p:stCondLst>
+                              <p:cond delay="0"/>
+                            </p:stCondLst>
+                            <p:childTnLst>
+                              <p:par>
+                                <p:cTn id="28" presetID="10" presetClass="entr" presetSubtype="0" fill="hold" nodeType="clickEffect">
+                                  <p:stCondLst>
+                                    <p:cond delay="0"/>
+                                  </p:stCondLst>
+                                  <p:childTnLst>
+                                    <p:set>
+                                      <p:cBhvr>
+                                        <p:cTn id="29" dur="1" fill="hold">
+                                          <p:stCondLst>
+                                            <p:cond delay="0"/>
+                                          </p:stCondLst>
+                                        </p:cTn>
+                                        <p:tgtEl>
+                                          <p:spTgt spid="16"/>
+                                        </p:tgtEl>
+                                        <p:attrNameLst>
+                                          <p:attrName>style.visibility</p:attrName>
+                                        </p:attrNameLst>
+                                      </p:cBhvr>
+                                      <p:to>
+                                        <p:strVal val="visible"/>
+                                      </p:to>
+                                    </p:set>
+                                    <p:animEffect transition="in" filter="fade">
+                                      <p:cBhvr>
+                                        <p:cTn id="30" dur="500"/>
+                                        <p:tgtEl>
+                                          <p:spTgt spid="16"/>
+                                        </p:tgtEl>
+                                      </p:cBhvr>
+                                    </p:animEffect>
+                                  </p:childTnLst>
+                                </p:cTn>
+                              </p:par>
+                            </p:childTnLst>
+                          </p:cTn>
+                        </p:par>
+                      </p:childTnLst>
+                    </p:cTn>
+                  </p:par>
+                  <p:par>
+                    <p:cTn id="31" fill="hold">
+                      <p:stCondLst>
+                        <p:cond delay="indefinite"/>
+                      </p:stCondLst>
+                      <p:childTnLst>
+                        <p:par>
+                          <p:cTn id="32" fill="hold">
+                            <p:stCondLst>
+                              <p:cond delay="0"/>
+                            </p:stCondLst>
+                            <p:childTnLst>
+                              <p:par>
+                                <p:cTn id="33" presetID="10" presetClass="entr" presetSubtype="0" fill="hold" nodeType="clickEffect">
+                                  <p:stCondLst>
+                                    <p:cond delay="0"/>
+                                  </p:stCondLst>
+                                  <p:childTnLst>
+                                    <p:set>
+                                      <p:cBhvr>
+                                        <p:cTn id="34" dur="1" fill="hold">
+                                          <p:stCondLst>
+                                            <p:cond delay="0"/>
+                                          </p:stCondLst>
+                                        </p:cTn>
+                                        <p:tgtEl>
+                                          <p:spTgt spid="18"/>
+                                        </p:tgtEl>
+                                        <p:attrNameLst>
+                                          <p:attrName>style.visibility</p:attrName>
+                                        </p:attrNameLst>
+                                      </p:cBhvr>
+                                      <p:to>
+                                        <p:strVal val="visible"/>
+                                      </p:to>
+                                    </p:set>
+                                    <p:animEffect transition="in" filter="fade">
+                                      <p:cBhvr>
+                                        <p:cTn id="35" dur="500"/>
+                                        <p:tgtEl>
+                                          <p:spTgt spid="18"/>
+                                        </p:tgtEl>
+                                      </p:cBhvr>
+                                    </p:animEffect>
+                                  </p:childTnLst>
+                                </p:cTn>
+                              </p:par>
+                            </p:childTnLst>
+                          </p:cTn>
+                        </p:par>
+                      </p:childTnLst>
+                    </p:cTn>
+                  </p:par>
+                </p:childTnLst>
+              </p:cTn>
+              <p:prevCondLst>
+                <p:cond evt="onPrev" delay="0">
+                  <p:tgtEl>
+                    <p:sldTgt/>
+                  </p:tgtEl>
+                </p:cond>
+              </p:prevCondLst>
+              <p:nextCondLst>
+                <p:cond evt="onNext" delay="0">
+                  <p:tgtEl>
+                    <p:sldTgt/>
+                  </p:tgtEl>
+                </p:cond>
+              </p:nextCondLst>
+            </p:seq>
+          </p:childTnLst>
+        </p:cTn>
+      </p:par>
+    </p:tnLst>
+    <p:bldLst>
+      <p:bldP spid="8" grpId="0" animBg="1"/>
+    </p:bldLst>
+  </p:timing>
+</p:sld>
+</file>
+
 <file path=ppt/slides/slide2.xml><?xml version="1.0" encoding="utf-8"?>
 <p:sld xmlns:a="http://schemas.openxmlformats.org/drawingml/2006/main" xmlns:r="http://schemas.openxmlformats.org/officeDocument/2006/relationships" xmlns:p="http://schemas.openxmlformats.org/presentationml/2006/main">
   <p:cSld>
@@ -4790,6 +6077,908 @@
     <p:extLst>
       <p:ext uri="{BB962C8B-B14F-4D97-AF65-F5344CB8AC3E}">
         <p14:creationId xmlns:p14="http://schemas.microsoft.com/office/powerpoint/2010/main" val="2328723032"/>
+      </p:ext>
+    </p:extLst>
+  </p:cSld>
+  <p:clrMapOvr>
+    <a:masterClrMapping/>
+  </p:clrMapOvr>
+  <p:timing>
+    <p:tnLst>
+      <p:par>
+        <p:cTn id="1" dur="indefinite" restart="never" nodeType="tmRoot"/>
+      </p:par>
+    </p:tnLst>
+  </p:timing>
+</p:sld>
+</file>
+
+<file path=ppt/slides/slide20.xml><?xml version="1.0" encoding="utf-8"?>
+<p:sld xmlns:a="http://schemas.openxmlformats.org/drawingml/2006/main" xmlns:r="http://schemas.openxmlformats.org/officeDocument/2006/relationships" xmlns:p="http://schemas.openxmlformats.org/presentationml/2006/main">
+  <p:cSld>
+    <p:spTree>
+      <p:nvGrpSpPr>
+        <p:cNvPr id="1" name=""/>
+        <p:cNvGrpSpPr/>
+        <p:nvPr/>
+      </p:nvGrpSpPr>
+      <p:grpSpPr>
+        <a:xfrm>
+          <a:off x="0" y="0"/>
+          <a:ext cx="0" cy="0"/>
+          <a:chOff x="0" y="0"/>
+          <a:chExt cx="0" cy="0"/>
+        </a:xfrm>
+      </p:grpSpPr>
+      <p:sp>
+        <p:nvSpPr>
+          <p:cNvPr id="2" name="Espaço Reservado para Texto 1"/>
+          <p:cNvSpPr>
+            <a:spLocks noGrp="1"/>
+          </p:cNvSpPr>
+          <p:nvPr>
+            <p:ph type="body" sz="quarter" idx="10"/>
+          </p:nvPr>
+        </p:nvSpPr>
+        <p:spPr/>
+        <p:txBody>
+          <a:bodyPr/>
+          <a:lstStyle/>
+          <a:p>
+            <a:r>
+              <a:rPr lang="pt-BR" dirty="0"/>
+              <a:t>A aplicação Web ASP .NET Core MVC</a:t>
+            </a:r>
+            <a:endParaRPr lang="pt-BR" dirty="0"/>
+          </a:p>
+        </p:txBody>
+      </p:sp>
+      <p:pic>
+        <p:nvPicPr>
+          <p:cNvPr id="4" name="Imagem 3"/>
+          <p:cNvPicPr>
+            <a:picLocks noChangeAspect="1"/>
+          </p:cNvPicPr>
+          <p:nvPr/>
+        </p:nvPicPr>
+        <p:blipFill>
+          <a:blip r:embed="rId2"/>
+          <a:stretch>
+            <a:fillRect/>
+          </a:stretch>
+        </p:blipFill>
+        <p:spPr>
+          <a:xfrm>
+            <a:off x="218687" y="833231"/>
+            <a:ext cx="6014172" cy="5688867"/>
+          </a:xfrm>
+          <a:prstGeom prst="rect">
+            <a:avLst/>
+          </a:prstGeom>
+        </p:spPr>
+      </p:pic>
+      <p:pic>
+        <p:nvPicPr>
+          <p:cNvPr id="5" name="Imagem 4"/>
+          <p:cNvPicPr>
+            <a:picLocks noChangeAspect="1"/>
+          </p:cNvPicPr>
+          <p:nvPr/>
+        </p:nvPicPr>
+        <p:blipFill>
+          <a:blip r:embed="rId3"/>
+          <a:stretch>
+            <a:fillRect/>
+          </a:stretch>
+        </p:blipFill>
+        <p:spPr>
+          <a:xfrm>
+            <a:off x="7292941" y="991855"/>
+            <a:ext cx="1524487" cy="1185712"/>
+          </a:xfrm>
+          <a:prstGeom prst="rect">
+            <a:avLst/>
+          </a:prstGeom>
+        </p:spPr>
+      </p:pic>
+      <p:sp>
+        <p:nvSpPr>
+          <p:cNvPr id="6" name="CaixaDeTexto 5"/>
+          <p:cNvSpPr txBox="1"/>
+          <p:nvPr/>
+        </p:nvSpPr>
+        <p:spPr>
+          <a:xfrm>
+            <a:off x="7292941" y="2640563"/>
+            <a:ext cx="4485401" cy="369332"/>
+          </a:xfrm>
+          <a:prstGeom prst="rect">
+            <a:avLst/>
+          </a:prstGeom>
+          <a:noFill/>
+        </p:spPr>
+        <p:txBody>
+          <a:bodyPr wrap="square" rtlCol="0">
+            <a:spAutoFit/>
+          </a:bodyPr>
+          <a:lstStyle/>
+          <a:p>
+            <a:pPr marL="285750" indent="-285750">
+              <a:buFont typeface="Arial" panose="020B0604020202020204" pitchFamily="34" charset="0"/>
+              <a:buChar char="•"/>
+            </a:pPr>
+            <a:r>
+              <a:rPr lang="pt-BR" dirty="0" smtClean="0"/>
+              <a:t>Diretório padrão para arquivos estáticos</a:t>
+            </a:r>
+            <a:endParaRPr lang="pt-BR" dirty="0"/>
+          </a:p>
+        </p:txBody>
+      </p:sp>
+      <p:cxnSp>
+        <p:nvCxnSpPr>
+          <p:cNvPr id="8" name="Conector de seta reta 7"/>
+          <p:cNvCxnSpPr/>
+          <p:nvPr/>
+        </p:nvCxnSpPr>
+        <p:spPr>
+          <a:xfrm flipV="1">
+            <a:off x="2080727" y="1147666"/>
+            <a:ext cx="5122506" cy="4030824"/>
+          </a:xfrm>
+          <a:prstGeom prst="straightConnector1">
+            <a:avLst/>
+          </a:prstGeom>
+          <a:ln w="12700">
+            <a:tailEnd type="triangle"/>
+          </a:ln>
+        </p:spPr>
+        <p:style>
+          <a:lnRef idx="1">
+            <a:schemeClr val="accent1"/>
+          </a:lnRef>
+          <a:fillRef idx="0">
+            <a:schemeClr val="accent1"/>
+          </a:fillRef>
+          <a:effectRef idx="0">
+            <a:schemeClr val="accent1"/>
+          </a:effectRef>
+          <a:fontRef idx="minor">
+            <a:schemeClr val="tx1"/>
+          </a:fontRef>
+        </p:style>
+      </p:cxnSp>
+    </p:spTree>
+    <p:extLst>
+      <p:ext uri="{BB962C8B-B14F-4D97-AF65-F5344CB8AC3E}">
+        <p14:creationId xmlns:p14="http://schemas.microsoft.com/office/powerpoint/2010/main" val="1306809616"/>
+      </p:ext>
+    </p:extLst>
+  </p:cSld>
+  <p:clrMapOvr>
+    <a:masterClrMapping/>
+  </p:clrMapOvr>
+  <p:timing>
+    <p:tnLst>
+      <p:par>
+        <p:cTn id="1" dur="indefinite" restart="never" nodeType="tmRoot">
+          <p:childTnLst>
+            <p:seq concurrent="1" nextAc="seek">
+              <p:cTn id="2" dur="indefinite" nodeType="mainSeq">
+                <p:childTnLst>
+                  <p:par>
+                    <p:cTn id="3" fill="hold">
+                      <p:stCondLst>
+                        <p:cond delay="indefinite"/>
+                      </p:stCondLst>
+                      <p:childTnLst>
+                        <p:par>
+                          <p:cTn id="4" fill="hold">
+                            <p:stCondLst>
+                              <p:cond delay="0"/>
+                            </p:stCondLst>
+                            <p:childTnLst>
+                              <p:par>
+                                <p:cTn id="5" presetID="10" presetClass="entr" presetSubtype="0" fill="hold" nodeType="clickEffect">
+                                  <p:stCondLst>
+                                    <p:cond delay="0"/>
+                                  </p:stCondLst>
+                                  <p:childTnLst>
+                                    <p:set>
+                                      <p:cBhvr>
+                                        <p:cTn id="6" dur="1" fill="hold">
+                                          <p:stCondLst>
+                                            <p:cond delay="0"/>
+                                          </p:stCondLst>
+                                        </p:cTn>
+                                        <p:tgtEl>
+                                          <p:spTgt spid="8"/>
+                                        </p:tgtEl>
+                                        <p:attrNameLst>
+                                          <p:attrName>style.visibility</p:attrName>
+                                        </p:attrNameLst>
+                                      </p:cBhvr>
+                                      <p:to>
+                                        <p:strVal val="visible"/>
+                                      </p:to>
+                                    </p:set>
+                                    <p:animEffect transition="in" filter="fade">
+                                      <p:cBhvr>
+                                        <p:cTn id="7" dur="500"/>
+                                        <p:tgtEl>
+                                          <p:spTgt spid="8"/>
+                                        </p:tgtEl>
+                                      </p:cBhvr>
+                                    </p:animEffect>
+                                  </p:childTnLst>
+                                </p:cTn>
+                              </p:par>
+                              <p:par>
+                                <p:cTn id="8" presetID="10" presetClass="entr" presetSubtype="0" fill="hold" nodeType="withEffect">
+                                  <p:stCondLst>
+                                    <p:cond delay="0"/>
+                                  </p:stCondLst>
+                                  <p:childTnLst>
+                                    <p:set>
+                                      <p:cBhvr>
+                                        <p:cTn id="9" dur="1" fill="hold">
+                                          <p:stCondLst>
+                                            <p:cond delay="0"/>
+                                          </p:stCondLst>
+                                        </p:cTn>
+                                        <p:tgtEl>
+                                          <p:spTgt spid="5"/>
+                                        </p:tgtEl>
+                                        <p:attrNameLst>
+                                          <p:attrName>style.visibility</p:attrName>
+                                        </p:attrNameLst>
+                                      </p:cBhvr>
+                                      <p:to>
+                                        <p:strVal val="visible"/>
+                                      </p:to>
+                                    </p:set>
+                                    <p:animEffect transition="in" filter="fade">
+                                      <p:cBhvr>
+                                        <p:cTn id="10" dur="500"/>
+                                        <p:tgtEl>
+                                          <p:spTgt spid="5"/>
+                                        </p:tgtEl>
+                                      </p:cBhvr>
+                                    </p:animEffect>
+                                  </p:childTnLst>
+                                </p:cTn>
+                              </p:par>
+                              <p:par>
+                                <p:cTn id="11" presetID="10" presetClass="entr" presetSubtype="0" fill="hold" grpId="0" nodeType="withEffect">
+                                  <p:stCondLst>
+                                    <p:cond delay="0"/>
+                                  </p:stCondLst>
+                                  <p:childTnLst>
+                                    <p:set>
+                                      <p:cBhvr>
+                                        <p:cTn id="12" dur="1" fill="hold">
+                                          <p:stCondLst>
+                                            <p:cond delay="0"/>
+                                          </p:stCondLst>
+                                        </p:cTn>
+                                        <p:tgtEl>
+                                          <p:spTgt spid="6"/>
+                                        </p:tgtEl>
+                                        <p:attrNameLst>
+                                          <p:attrName>style.visibility</p:attrName>
+                                        </p:attrNameLst>
+                                      </p:cBhvr>
+                                      <p:to>
+                                        <p:strVal val="visible"/>
+                                      </p:to>
+                                    </p:set>
+                                    <p:animEffect transition="in" filter="fade">
+                                      <p:cBhvr>
+                                        <p:cTn id="13" dur="500"/>
+                                        <p:tgtEl>
+                                          <p:spTgt spid="6"/>
+                                        </p:tgtEl>
+                                      </p:cBhvr>
+                                    </p:animEffect>
+                                  </p:childTnLst>
+                                </p:cTn>
+                              </p:par>
+                            </p:childTnLst>
+                          </p:cTn>
+                        </p:par>
+                      </p:childTnLst>
+                    </p:cTn>
+                  </p:par>
+                </p:childTnLst>
+              </p:cTn>
+              <p:prevCondLst>
+                <p:cond evt="onPrev" delay="0">
+                  <p:tgtEl>
+                    <p:sldTgt/>
+                  </p:tgtEl>
+                </p:cond>
+              </p:prevCondLst>
+              <p:nextCondLst>
+                <p:cond evt="onNext" delay="0">
+                  <p:tgtEl>
+                    <p:sldTgt/>
+                  </p:tgtEl>
+                </p:cond>
+              </p:nextCondLst>
+            </p:seq>
+          </p:childTnLst>
+        </p:cTn>
+      </p:par>
+    </p:tnLst>
+    <p:bldLst>
+      <p:bldP spid="6" grpId="0"/>
+    </p:bldLst>
+  </p:timing>
+</p:sld>
+</file>
+
+<file path=ppt/slides/slide21.xml><?xml version="1.0" encoding="utf-8"?>
+<p:sld xmlns:a="http://schemas.openxmlformats.org/drawingml/2006/main" xmlns:r="http://schemas.openxmlformats.org/officeDocument/2006/relationships" xmlns:p="http://schemas.openxmlformats.org/presentationml/2006/main">
+  <p:cSld>
+    <p:spTree>
+      <p:nvGrpSpPr>
+        <p:cNvPr id="1" name=""/>
+        <p:cNvGrpSpPr/>
+        <p:nvPr/>
+      </p:nvGrpSpPr>
+      <p:grpSpPr>
+        <a:xfrm>
+          <a:off x="0" y="0"/>
+          <a:ext cx="0" cy="0"/>
+          <a:chOff x="0" y="0"/>
+          <a:chExt cx="0" cy="0"/>
+        </a:xfrm>
+      </p:grpSpPr>
+      <p:sp>
+        <p:nvSpPr>
+          <p:cNvPr id="2" name="Espaço Reservado para Texto 1"/>
+          <p:cNvSpPr>
+            <a:spLocks noGrp="1"/>
+          </p:cNvSpPr>
+          <p:nvPr>
+            <p:ph type="body" sz="quarter" idx="10"/>
+          </p:nvPr>
+        </p:nvSpPr>
+        <p:spPr/>
+        <p:txBody>
+          <a:bodyPr/>
+          <a:lstStyle/>
+          <a:p>
+            <a:r>
+              <a:rPr lang="pt-BR" dirty="0"/>
+              <a:t>A aplicação Web ASP .NET Core MVC</a:t>
+            </a:r>
+            <a:endParaRPr lang="pt-BR" dirty="0"/>
+          </a:p>
+        </p:txBody>
+      </p:sp>
+      <p:pic>
+        <p:nvPicPr>
+          <p:cNvPr id="4" name="Imagem 3"/>
+          <p:cNvPicPr>
+            <a:picLocks noChangeAspect="1"/>
+          </p:cNvPicPr>
+          <p:nvPr/>
+        </p:nvPicPr>
+        <p:blipFill>
+          <a:blip r:embed="rId2"/>
+          <a:stretch>
+            <a:fillRect/>
+          </a:stretch>
+        </p:blipFill>
+        <p:spPr>
+          <a:xfrm>
+            <a:off x="3672336" y="1843670"/>
+            <a:ext cx="4777478" cy="3502770"/>
+          </a:xfrm>
+          <a:prstGeom prst="rect">
+            <a:avLst/>
+          </a:prstGeom>
+        </p:spPr>
+      </p:pic>
+    </p:spTree>
+    <p:extLst>
+      <p:ext uri="{BB962C8B-B14F-4D97-AF65-F5344CB8AC3E}">
+        <p14:creationId xmlns:p14="http://schemas.microsoft.com/office/powerpoint/2010/main" val="614523609"/>
+      </p:ext>
+    </p:extLst>
+  </p:cSld>
+  <p:clrMapOvr>
+    <a:masterClrMapping/>
+  </p:clrMapOvr>
+  <p:timing>
+    <p:tnLst>
+      <p:par>
+        <p:cTn id="1" dur="indefinite" restart="never" nodeType="tmRoot"/>
+      </p:par>
+    </p:tnLst>
+  </p:timing>
+</p:sld>
+</file>
+
+<file path=ppt/slides/slide22.xml><?xml version="1.0" encoding="utf-8"?>
+<p:sld xmlns:a="http://schemas.openxmlformats.org/drawingml/2006/main" xmlns:r="http://schemas.openxmlformats.org/officeDocument/2006/relationships" xmlns:p="http://schemas.openxmlformats.org/presentationml/2006/main">
+  <p:cSld>
+    <p:spTree>
+      <p:nvGrpSpPr>
+        <p:cNvPr id="1" name=""/>
+        <p:cNvGrpSpPr/>
+        <p:nvPr/>
+      </p:nvGrpSpPr>
+      <p:grpSpPr>
+        <a:xfrm>
+          <a:off x="0" y="0"/>
+          <a:ext cx="0" cy="0"/>
+          <a:chOff x="0" y="0"/>
+          <a:chExt cx="0" cy="0"/>
+        </a:xfrm>
+      </p:grpSpPr>
+      <p:sp>
+        <p:nvSpPr>
+          <p:cNvPr id="2" name="Espaço Reservado para Texto 1"/>
+          <p:cNvSpPr>
+            <a:spLocks noGrp="1"/>
+          </p:cNvSpPr>
+          <p:nvPr>
+            <p:ph type="body" sz="quarter" idx="11"/>
+          </p:nvPr>
+        </p:nvSpPr>
+        <p:spPr>
+          <a:xfrm>
+            <a:off x="3668452" y="2081892"/>
+            <a:ext cx="5996022" cy="2228849"/>
+          </a:xfrm>
+        </p:spPr>
+        <p:txBody>
+          <a:bodyPr/>
+          <a:lstStyle/>
+          <a:p>
+            <a:r>
+              <a:rPr lang="pt-BR" dirty="0"/>
+              <a:t>Desenvolvendo uma aplicação Web ASP .NET Core </a:t>
+            </a:r>
+            <a:r>
+              <a:rPr lang="pt-BR" dirty="0" smtClean="0"/>
+              <a:t>MVC</a:t>
+            </a:r>
+            <a:endParaRPr lang="pt-BR" dirty="0"/>
+          </a:p>
+        </p:txBody>
+      </p:sp>
+      <p:pic>
+        <p:nvPicPr>
+          <p:cNvPr id="3" name="Imagem 2"/>
+          <p:cNvPicPr>
+            <a:picLocks noChangeAspect="1"/>
+          </p:cNvPicPr>
+          <p:nvPr/>
+        </p:nvPicPr>
+        <p:blipFill>
+          <a:blip r:embed="rId2"/>
+          <a:stretch>
+            <a:fillRect/>
+          </a:stretch>
+        </p:blipFill>
+        <p:spPr>
+          <a:xfrm>
+            <a:off x="688522" y="531809"/>
+            <a:ext cx="3259849" cy="2174068"/>
+          </a:xfrm>
+          <a:prstGeom prst="rect">
+            <a:avLst/>
+          </a:prstGeom>
+        </p:spPr>
+      </p:pic>
+    </p:spTree>
+    <p:extLst>
+      <p:ext uri="{BB962C8B-B14F-4D97-AF65-F5344CB8AC3E}">
+        <p14:creationId xmlns:p14="http://schemas.microsoft.com/office/powerpoint/2010/main" val="2611667637"/>
+      </p:ext>
+    </p:extLst>
+  </p:cSld>
+  <p:clrMapOvr>
+    <a:masterClrMapping/>
+  </p:clrMapOvr>
+  <p:timing>
+    <p:tnLst>
+      <p:par>
+        <p:cTn id="1" dur="indefinite" restart="never" nodeType="tmRoot"/>
+      </p:par>
+    </p:tnLst>
+  </p:timing>
+</p:sld>
+</file>
+
+<file path=ppt/slides/slide23.xml><?xml version="1.0" encoding="utf-8"?>
+<p:sld xmlns:a="http://schemas.openxmlformats.org/drawingml/2006/main" xmlns:r="http://schemas.openxmlformats.org/officeDocument/2006/relationships" xmlns:p="http://schemas.openxmlformats.org/presentationml/2006/main">
+  <p:cSld>
+    <p:spTree>
+      <p:nvGrpSpPr>
+        <p:cNvPr id="1" name=""/>
+        <p:cNvGrpSpPr/>
+        <p:nvPr/>
+      </p:nvGrpSpPr>
+      <p:grpSpPr>
+        <a:xfrm>
+          <a:off x="0" y="0"/>
+          <a:ext cx="0" cy="0"/>
+          <a:chOff x="0" y="0"/>
+          <a:chExt cx="0" cy="0"/>
+        </a:xfrm>
+      </p:grpSpPr>
+      <p:sp>
+        <p:nvSpPr>
+          <p:cNvPr id="3" name="Espaço Reservado para Texto 2"/>
+          <p:cNvSpPr>
+            <a:spLocks noGrp="1"/>
+          </p:cNvSpPr>
+          <p:nvPr>
+            <p:ph type="body" sz="quarter" idx="10"/>
+          </p:nvPr>
+        </p:nvSpPr>
+        <p:spPr/>
+        <p:txBody>
+          <a:bodyPr/>
+          <a:lstStyle/>
+          <a:p>
+            <a:r>
+              <a:rPr lang="pt-BR" dirty="0" smtClean="0"/>
+              <a:t>Escopo da aplicação</a:t>
+            </a:r>
+            <a:endParaRPr lang="pt-BR" dirty="0"/>
+          </a:p>
+        </p:txBody>
+      </p:sp>
+      <p:sp>
+        <p:nvSpPr>
+          <p:cNvPr id="4" name="Espaço Reservado para Texto 3"/>
+          <p:cNvSpPr>
+            <a:spLocks noGrp="1"/>
+          </p:cNvSpPr>
+          <p:nvPr>
+            <p:ph type="body" sz="quarter" idx="11"/>
+          </p:nvPr>
+        </p:nvSpPr>
+        <p:spPr/>
+        <p:txBody>
+          <a:bodyPr/>
+          <a:lstStyle/>
+          <a:p>
+            <a:pPr marL="342900" indent="-342900">
+              <a:buFont typeface="Arial" panose="020B0604020202020204" pitchFamily="34" charset="0"/>
+              <a:buChar char="•"/>
+            </a:pPr>
+            <a:r>
+              <a:rPr lang="pt-BR" dirty="0" smtClean="0"/>
+              <a:t>Nome da aplicação: </a:t>
+            </a:r>
+            <a:r>
+              <a:rPr lang="pt-BR" dirty="0" err="1" smtClean="0"/>
+              <a:t>ConfirmacaoPresenca</a:t>
+            </a:r>
+            <a:endParaRPr lang="pt-BR" dirty="0" smtClean="0"/>
+          </a:p>
+          <a:p>
+            <a:pPr marL="342900" indent="-342900">
+              <a:buFont typeface="Arial" panose="020B0604020202020204" pitchFamily="34" charset="0"/>
+              <a:buChar char="•"/>
+            </a:pPr>
+            <a:r>
+              <a:rPr lang="pt-BR" dirty="0" smtClean="0"/>
+              <a:t>Funcionalidades</a:t>
+            </a:r>
+          </a:p>
+          <a:p>
+            <a:pPr marL="1085850" lvl="1" indent="-342900">
+              <a:buFont typeface="Arial" panose="020B0604020202020204" pitchFamily="34" charset="0"/>
+              <a:buChar char="•"/>
+            </a:pPr>
+            <a:r>
+              <a:rPr lang="pt-BR" sz="2000" dirty="0" smtClean="0"/>
+              <a:t>Página inicial com fotos e detalhes da festa</a:t>
+            </a:r>
+          </a:p>
+          <a:p>
+            <a:pPr marL="1085850" lvl="1" indent="-342900">
+              <a:buFont typeface="Arial" panose="020B0604020202020204" pitchFamily="34" charset="0"/>
+              <a:buChar char="•"/>
+            </a:pPr>
+            <a:r>
+              <a:rPr lang="pt-BR" sz="2000" dirty="0" smtClean="0"/>
+              <a:t>Barra de navegação superior com links para a pagina inicial, formulário de confirmação de presença, lista de confirmações e sobre</a:t>
+            </a:r>
+          </a:p>
+          <a:p>
+            <a:pPr marL="1085850" lvl="1" indent="-342900">
+              <a:buFont typeface="Arial" panose="020B0604020202020204" pitchFamily="34" charset="0"/>
+              <a:buChar char="•"/>
+            </a:pPr>
+            <a:r>
+              <a:rPr lang="pt-BR" sz="2000" dirty="0" smtClean="0"/>
+              <a:t>Formulário com nome, telefone, </a:t>
+            </a:r>
+            <a:r>
+              <a:rPr lang="pt-BR" sz="2000" dirty="0" err="1" smtClean="0"/>
+              <a:t>email</a:t>
+            </a:r>
+            <a:r>
+              <a:rPr lang="pt-BR" sz="2000" dirty="0" smtClean="0"/>
+              <a:t> e uma confirmação de presença</a:t>
+            </a:r>
+            <a:r>
+              <a:rPr lang="pt-BR" sz="2000" dirty="0"/>
+              <a:t> </a:t>
+            </a:r>
+            <a:r>
+              <a:rPr lang="pt-BR" sz="2000" dirty="0" smtClean="0"/>
+              <a:t>(validar campos conforme regras específicas)</a:t>
+            </a:r>
+          </a:p>
+          <a:p>
+            <a:pPr marL="1085850" lvl="1" indent="-342900">
+              <a:buFont typeface="Arial" panose="020B0604020202020204" pitchFamily="34" charset="0"/>
+              <a:buChar char="•"/>
+            </a:pPr>
+            <a:r>
+              <a:rPr lang="pt-BR" sz="2000" dirty="0" smtClean="0"/>
+              <a:t>Página informando a lista de pessoas que confirmaram presença</a:t>
+            </a:r>
+          </a:p>
+          <a:p>
+            <a:pPr marL="1085850" lvl="1" indent="-342900">
+              <a:buFont typeface="Arial" panose="020B0604020202020204" pitchFamily="34" charset="0"/>
+              <a:buChar char="•"/>
+            </a:pPr>
+            <a:r>
+              <a:rPr lang="pt-BR" sz="2000" dirty="0" smtClean="0"/>
+              <a:t>Página de agradecimento após confirmação da presença</a:t>
+            </a:r>
+          </a:p>
+        </p:txBody>
+      </p:sp>
+    </p:spTree>
+    <p:extLst>
+      <p:ext uri="{BB962C8B-B14F-4D97-AF65-F5344CB8AC3E}">
+        <p14:creationId xmlns:p14="http://schemas.microsoft.com/office/powerpoint/2010/main" val="451395726"/>
+      </p:ext>
+    </p:extLst>
+  </p:cSld>
+  <p:clrMapOvr>
+    <a:masterClrMapping/>
+  </p:clrMapOvr>
+  <p:timing>
+    <p:tnLst>
+      <p:par>
+        <p:cTn id="1" dur="indefinite" restart="never" nodeType="tmRoot"/>
+      </p:par>
+    </p:tnLst>
+  </p:timing>
+</p:sld>
+</file>
+
+<file path=ppt/slides/slide24.xml><?xml version="1.0" encoding="utf-8"?>
+<p:sld xmlns:a="http://schemas.openxmlformats.org/drawingml/2006/main" xmlns:r="http://schemas.openxmlformats.org/officeDocument/2006/relationships" xmlns:p="http://schemas.openxmlformats.org/presentationml/2006/main">
+  <p:cSld>
+    <p:spTree>
+      <p:nvGrpSpPr>
+        <p:cNvPr id="1" name=""/>
+        <p:cNvGrpSpPr/>
+        <p:nvPr/>
+      </p:nvGrpSpPr>
+      <p:grpSpPr>
+        <a:xfrm>
+          <a:off x="0" y="0"/>
+          <a:ext cx="0" cy="0"/>
+          <a:chOff x="0" y="0"/>
+          <a:chExt cx="0" cy="0"/>
+        </a:xfrm>
+      </p:grpSpPr>
+      <p:sp>
+        <p:nvSpPr>
+          <p:cNvPr id="2" name="Espaço Reservado para Texto 1"/>
+          <p:cNvSpPr>
+            <a:spLocks noGrp="1"/>
+          </p:cNvSpPr>
+          <p:nvPr>
+            <p:ph type="body" sz="quarter" idx="10"/>
+          </p:nvPr>
+        </p:nvSpPr>
+        <p:spPr/>
+        <p:txBody>
+          <a:bodyPr/>
+          <a:lstStyle/>
+          <a:p>
+            <a:r>
+              <a:rPr lang="pt-BR" dirty="0" smtClean="0"/>
+              <a:t>Tecnologias a serem utilizadas</a:t>
+            </a:r>
+            <a:endParaRPr lang="pt-BR" dirty="0"/>
+          </a:p>
+        </p:txBody>
+      </p:sp>
+      <p:sp>
+        <p:nvSpPr>
+          <p:cNvPr id="3" name="Espaço Reservado para Texto 2"/>
+          <p:cNvSpPr>
+            <a:spLocks noGrp="1"/>
+          </p:cNvSpPr>
+          <p:nvPr>
+            <p:ph type="body" sz="quarter" idx="11"/>
+          </p:nvPr>
+        </p:nvSpPr>
+        <p:spPr/>
+        <p:txBody>
+          <a:bodyPr/>
+          <a:lstStyle/>
+          <a:p>
+            <a:pPr marL="342900" indent="-342900">
+              <a:buFont typeface="Arial" panose="020B0604020202020204" pitchFamily="34" charset="0"/>
+              <a:buChar char="•"/>
+            </a:pPr>
+            <a:r>
+              <a:rPr lang="pt-BR" dirty="0" smtClean="0"/>
+              <a:t>HTML, CSS, </a:t>
+            </a:r>
+            <a:r>
+              <a:rPr lang="pt-BR" dirty="0" err="1" smtClean="0"/>
+              <a:t>JavaScript</a:t>
+            </a:r>
+            <a:endParaRPr lang="pt-BR" dirty="0" smtClean="0"/>
+          </a:p>
+          <a:p>
+            <a:pPr marL="342900" indent="-342900">
+              <a:buFont typeface="Arial" panose="020B0604020202020204" pitchFamily="34" charset="0"/>
+              <a:buChar char="•"/>
+            </a:pPr>
+            <a:r>
+              <a:rPr lang="pt-BR" dirty="0" err="1" smtClean="0"/>
+              <a:t>Bootstrap</a:t>
+            </a:r>
+            <a:endParaRPr lang="pt-BR" dirty="0" smtClean="0"/>
+          </a:p>
+          <a:p>
+            <a:pPr marL="342900" indent="-342900">
+              <a:buFont typeface="Arial" panose="020B0604020202020204" pitchFamily="34" charset="0"/>
+              <a:buChar char="•"/>
+            </a:pPr>
+            <a:r>
+              <a:rPr lang="pt-BR" dirty="0" err="1" smtClean="0"/>
+              <a:t>JQuery</a:t>
+            </a:r>
+            <a:endParaRPr lang="pt-BR" dirty="0" smtClean="0"/>
+          </a:p>
+          <a:p>
+            <a:pPr marL="342900" indent="-342900">
+              <a:buFont typeface="Arial" panose="020B0604020202020204" pitchFamily="34" charset="0"/>
+              <a:buChar char="•"/>
+            </a:pPr>
+            <a:r>
+              <a:rPr lang="pt-BR" dirty="0" err="1" smtClean="0"/>
+              <a:t>Razor</a:t>
+            </a:r>
+            <a:endParaRPr lang="pt-BR" dirty="0" smtClean="0"/>
+          </a:p>
+          <a:p>
+            <a:pPr marL="342900" indent="-342900">
+              <a:buFont typeface="Arial" panose="020B0604020202020204" pitchFamily="34" charset="0"/>
+              <a:buChar char="•"/>
+            </a:pPr>
+            <a:r>
+              <a:rPr lang="pt-BR" dirty="0" err="1" smtClean="0"/>
+              <a:t>Entity</a:t>
+            </a:r>
+            <a:r>
+              <a:rPr lang="pt-BR" dirty="0" smtClean="0"/>
+              <a:t> Framework Core</a:t>
+            </a:r>
+          </a:p>
+          <a:p>
+            <a:pPr marL="342900" indent="-342900">
+              <a:buFont typeface="Arial" panose="020B0604020202020204" pitchFamily="34" charset="0"/>
+              <a:buChar char="•"/>
+            </a:pPr>
+            <a:r>
+              <a:rPr lang="pt-BR" dirty="0" smtClean="0"/>
+              <a:t>SQL Server</a:t>
+            </a:r>
+          </a:p>
+          <a:p>
+            <a:pPr marL="342900" indent="-342900">
+              <a:buFont typeface="Arial" panose="020B0604020202020204" pitchFamily="34" charset="0"/>
+              <a:buChar char="•"/>
+            </a:pPr>
+            <a:endParaRPr lang="pt-BR" dirty="0"/>
+          </a:p>
+        </p:txBody>
+      </p:sp>
+    </p:spTree>
+    <p:extLst>
+      <p:ext uri="{BB962C8B-B14F-4D97-AF65-F5344CB8AC3E}">
+        <p14:creationId xmlns:p14="http://schemas.microsoft.com/office/powerpoint/2010/main" val="1191562441"/>
+      </p:ext>
+    </p:extLst>
+  </p:cSld>
+  <p:clrMapOvr>
+    <a:masterClrMapping/>
+  </p:clrMapOvr>
+  <p:timing>
+    <p:tnLst>
+      <p:par>
+        <p:cTn id="1" dur="indefinite" restart="never" nodeType="tmRoot"/>
+      </p:par>
+    </p:tnLst>
+  </p:timing>
+</p:sld>
+</file>
+
+<file path=ppt/slides/slide25.xml><?xml version="1.0" encoding="utf-8"?>
+<p:sld xmlns:a="http://schemas.openxmlformats.org/drawingml/2006/main" xmlns:r="http://schemas.openxmlformats.org/officeDocument/2006/relationships" xmlns:p="http://schemas.openxmlformats.org/presentationml/2006/main">
+  <p:cSld>
+    <p:spTree>
+      <p:nvGrpSpPr>
+        <p:cNvPr id="1" name=""/>
+        <p:cNvGrpSpPr/>
+        <p:nvPr/>
+      </p:nvGrpSpPr>
+      <p:grpSpPr>
+        <a:xfrm>
+          <a:off x="0" y="0"/>
+          <a:ext cx="0" cy="0"/>
+          <a:chOff x="0" y="0"/>
+          <a:chExt cx="0" cy="0"/>
+        </a:xfrm>
+      </p:grpSpPr>
+      <p:sp>
+        <p:nvSpPr>
+          <p:cNvPr id="2" name="Espaço Reservado para Texto 1"/>
+          <p:cNvSpPr>
+            <a:spLocks noGrp="1"/>
+          </p:cNvSpPr>
+          <p:nvPr>
+            <p:ph type="body" sz="quarter" idx="10"/>
+          </p:nvPr>
+        </p:nvSpPr>
+        <p:spPr/>
+        <p:txBody>
+          <a:bodyPr/>
+          <a:lstStyle/>
+          <a:p>
+            <a:r>
+              <a:rPr lang="pt-BR" dirty="0" smtClean="0"/>
+              <a:t>Criando a aplicação</a:t>
+            </a:r>
+            <a:endParaRPr lang="pt-BR" dirty="0"/>
+          </a:p>
+        </p:txBody>
+      </p:sp>
+      <p:sp>
+        <p:nvSpPr>
+          <p:cNvPr id="3" name="Espaço Reservado para Texto 2"/>
+          <p:cNvSpPr>
+            <a:spLocks noGrp="1"/>
+          </p:cNvSpPr>
+          <p:nvPr>
+            <p:ph type="body" sz="quarter" idx="11"/>
+          </p:nvPr>
+        </p:nvSpPr>
+        <p:spPr/>
+        <p:txBody>
+          <a:bodyPr/>
+          <a:lstStyle/>
+          <a:p>
+            <a:endParaRPr lang="pt-BR"/>
+          </a:p>
+        </p:txBody>
+      </p:sp>
+    </p:spTree>
+    <p:extLst>
+      <p:ext uri="{BB962C8B-B14F-4D97-AF65-F5344CB8AC3E}">
+        <p14:creationId xmlns:p14="http://schemas.microsoft.com/office/powerpoint/2010/main" val="4207913846"/>
       </p:ext>
     </p:extLst>
   </p:cSld>
@@ -4887,11 +7076,7 @@
             </a:pPr>
             <a:r>
               <a:rPr lang="pt-BR" dirty="0" smtClean="0"/>
-              <a:t>O </a:t>
-            </a:r>
-            <a:r>
-              <a:rPr lang="pt-BR" dirty="0" smtClean="0"/>
-              <a:t>que é o padrão de projeto MVC?</a:t>
+              <a:t>O que é o padrão de projeto MVC?</a:t>
             </a:r>
           </a:p>
           <a:p>
@@ -5028,11 +7213,7 @@
           <a:p>
             <a:r>
               <a:rPr lang="pt-BR" dirty="0" smtClean="0"/>
-              <a:t>ASP .NET </a:t>
-            </a:r>
-            <a:r>
-              <a:rPr lang="pt-BR" dirty="0" smtClean="0"/>
-              <a:t>Core</a:t>
+              <a:t>ASP .NET Core</a:t>
             </a:r>
             <a:endParaRPr lang="pt-BR" dirty="0"/>
           </a:p>

</xml_diff>

<commit_message>
Criação do esqueleto básico da aplicação.
</commit_message>
<xml_diff>
--- a/workshop-aspnet-core-mvc.pptx
+++ b/workshop-aspnet-core-mvc.pptx
@@ -30,6 +30,7 @@
     <p:sldId id="281" r:id="rId24"/>
     <p:sldId id="282" r:id="rId25"/>
     <p:sldId id="283" r:id="rId26"/>
+    <p:sldId id="284" r:id="rId27"/>
   </p:sldIdLst>
   <p:sldSz cx="12192000" cy="6858000"/>
   <p:notesSz cx="6858000" cy="9144000"/>
@@ -4890,7 +4891,6 @@
               <a:rPr lang="pt-BR" dirty="0"/>
               <a:t>Criação pelo Visual Studio 2017</a:t>
             </a:r>
-            <a:endParaRPr lang="pt-BR" dirty="0"/>
           </a:p>
         </p:txBody>
       </p:sp>
@@ -6129,7 +6129,6 @@
               <a:rPr lang="pt-BR" dirty="0"/>
               <a:t>A aplicação Web ASP .NET Core MVC</a:t>
             </a:r>
-            <a:endParaRPr lang="pt-BR" dirty="0"/>
           </a:p>
         </p:txBody>
       </p:sp>
@@ -6453,7 +6452,6 @@
               <a:rPr lang="pt-BR" dirty="0"/>
               <a:t>A aplicação Web ASP .NET Core MVC</a:t>
             </a:r>
-            <a:endParaRPr lang="pt-BR" dirty="0"/>
           </a:p>
         </p:txBody>
       </p:sp>
@@ -6956,6 +6954,186 @@
           </a:p>
         </p:txBody>
       </p:sp>
+      <p:pic>
+        <p:nvPicPr>
+          <p:cNvPr id="4" name="Imagem 3"/>
+          <p:cNvPicPr>
+            <a:picLocks noChangeAspect="1"/>
+          </p:cNvPicPr>
+          <p:nvPr/>
+        </p:nvPicPr>
+        <p:blipFill>
+          <a:blip r:embed="rId2"/>
+          <a:stretch>
+            <a:fillRect/>
+          </a:stretch>
+        </p:blipFill>
+        <p:spPr>
+          <a:xfrm>
+            <a:off x="921883" y="1109663"/>
+            <a:ext cx="7038295" cy="4377586"/>
+          </a:xfrm>
+          <a:prstGeom prst="rect">
+            <a:avLst/>
+          </a:prstGeom>
+        </p:spPr>
+      </p:pic>
+      <p:pic>
+        <p:nvPicPr>
+          <p:cNvPr id="5" name="Imagem 4"/>
+          <p:cNvPicPr>
+            <a:picLocks noChangeAspect="1"/>
+          </p:cNvPicPr>
+          <p:nvPr/>
+        </p:nvPicPr>
+        <p:blipFill>
+          <a:blip r:embed="rId3"/>
+          <a:stretch>
+            <a:fillRect/>
+          </a:stretch>
+        </p:blipFill>
+        <p:spPr>
+          <a:xfrm>
+            <a:off x="8547326" y="1109663"/>
+            <a:ext cx="2657475" cy="1495425"/>
+          </a:xfrm>
+          <a:prstGeom prst="rect">
+            <a:avLst/>
+          </a:prstGeom>
+        </p:spPr>
+      </p:pic>
+    </p:spTree>
+    <p:extLst>
+      <p:ext uri="{BB962C8B-B14F-4D97-AF65-F5344CB8AC3E}">
+        <p14:creationId xmlns:p14="http://schemas.microsoft.com/office/powerpoint/2010/main" val="4207913846"/>
+      </p:ext>
+    </p:extLst>
+  </p:cSld>
+  <p:clrMapOvr>
+    <a:masterClrMapping/>
+  </p:clrMapOvr>
+  <p:timing>
+    <p:tnLst>
+      <p:par>
+        <p:cTn id="1" dur="indefinite" restart="never" nodeType="tmRoot">
+          <p:childTnLst>
+            <p:seq concurrent="1" nextAc="seek">
+              <p:cTn id="2" dur="indefinite" nodeType="mainSeq">
+                <p:childTnLst>
+                  <p:par>
+                    <p:cTn id="3" fill="hold">
+                      <p:stCondLst>
+                        <p:cond delay="indefinite"/>
+                      </p:stCondLst>
+                      <p:childTnLst>
+                        <p:par>
+                          <p:cTn id="4" fill="hold">
+                            <p:stCondLst>
+                              <p:cond delay="0"/>
+                            </p:stCondLst>
+                            <p:childTnLst>
+                              <p:par>
+                                <p:cTn id="5" presetID="10" presetClass="entr" presetSubtype="0" fill="hold" nodeType="clickEffect">
+                                  <p:stCondLst>
+                                    <p:cond delay="0"/>
+                                  </p:stCondLst>
+                                  <p:childTnLst>
+                                    <p:set>
+                                      <p:cBhvr>
+                                        <p:cTn id="6" dur="1" fill="hold">
+                                          <p:stCondLst>
+                                            <p:cond delay="0"/>
+                                          </p:stCondLst>
+                                        </p:cTn>
+                                        <p:tgtEl>
+                                          <p:spTgt spid="5"/>
+                                        </p:tgtEl>
+                                        <p:attrNameLst>
+                                          <p:attrName>style.visibility</p:attrName>
+                                        </p:attrNameLst>
+                                      </p:cBhvr>
+                                      <p:to>
+                                        <p:strVal val="visible"/>
+                                      </p:to>
+                                    </p:set>
+                                    <p:animEffect transition="in" filter="fade">
+                                      <p:cBhvr>
+                                        <p:cTn id="7" dur="500"/>
+                                        <p:tgtEl>
+                                          <p:spTgt spid="5"/>
+                                        </p:tgtEl>
+                                      </p:cBhvr>
+                                    </p:animEffect>
+                                  </p:childTnLst>
+                                </p:cTn>
+                              </p:par>
+                            </p:childTnLst>
+                          </p:cTn>
+                        </p:par>
+                      </p:childTnLst>
+                    </p:cTn>
+                  </p:par>
+                </p:childTnLst>
+              </p:cTn>
+              <p:prevCondLst>
+                <p:cond evt="onPrev" delay="0">
+                  <p:tgtEl>
+                    <p:sldTgt/>
+                  </p:tgtEl>
+                </p:cond>
+              </p:prevCondLst>
+              <p:nextCondLst>
+                <p:cond evt="onNext" delay="0">
+                  <p:tgtEl>
+                    <p:sldTgt/>
+                  </p:tgtEl>
+                </p:cond>
+              </p:nextCondLst>
+            </p:seq>
+          </p:childTnLst>
+        </p:cTn>
+      </p:par>
+    </p:tnLst>
+  </p:timing>
+</p:sld>
+</file>
+
+<file path=ppt/slides/slide26.xml><?xml version="1.0" encoding="utf-8"?>
+<p:sld xmlns:a="http://schemas.openxmlformats.org/drawingml/2006/main" xmlns:r="http://schemas.openxmlformats.org/officeDocument/2006/relationships" xmlns:p="http://schemas.openxmlformats.org/presentationml/2006/main">
+  <p:cSld>
+    <p:spTree>
+      <p:nvGrpSpPr>
+        <p:cNvPr id="1" name=""/>
+        <p:cNvGrpSpPr/>
+        <p:nvPr/>
+      </p:nvGrpSpPr>
+      <p:grpSpPr>
+        <a:xfrm>
+          <a:off x="0" y="0"/>
+          <a:ext cx="0" cy="0"/>
+          <a:chOff x="0" y="0"/>
+          <a:chExt cx="0" cy="0"/>
+        </a:xfrm>
+      </p:grpSpPr>
+      <p:sp>
+        <p:nvSpPr>
+          <p:cNvPr id="2" name="Espaço Reservado para Texto 1"/>
+          <p:cNvSpPr>
+            <a:spLocks noGrp="1"/>
+          </p:cNvSpPr>
+          <p:nvPr>
+            <p:ph type="body" sz="quarter" idx="10"/>
+          </p:nvPr>
+        </p:nvSpPr>
+        <p:spPr/>
+        <p:txBody>
+          <a:bodyPr/>
+          <a:lstStyle/>
+          <a:p>
+            <a:endParaRPr lang="pt-BR"/>
+          </a:p>
+        </p:txBody>
+      </p:sp>
       <p:sp>
         <p:nvSpPr>
           <p:cNvPr id="3" name="Espaço Reservado para Texto 2"/>
@@ -6978,7 +7156,7 @@
     </p:spTree>
     <p:extLst>
       <p:ext uri="{BB962C8B-B14F-4D97-AF65-F5344CB8AC3E}">
-        <p14:creationId xmlns:p14="http://schemas.microsoft.com/office/powerpoint/2010/main" val="4207913846"/>
+        <p14:creationId xmlns:p14="http://schemas.microsoft.com/office/powerpoint/2010/main" val="3829435932"/>
       </p:ext>
     </p:extLst>
   </p:cSld>

</xml_diff>

<commit_message>
Adicionada validação no formulário de confirmação
</commit_message>
<xml_diff>
--- a/workshop-aspnet-core-mvc.pptx
+++ b/workshop-aspnet-core-mvc.pptx
@@ -31,6 +31,8 @@
     <p:sldId id="282" r:id="rId25"/>
     <p:sldId id="283" r:id="rId26"/>
     <p:sldId id="284" r:id="rId27"/>
+    <p:sldId id="285" r:id="rId28"/>
+    <p:sldId id="286" r:id="rId29"/>
   </p:sldIdLst>
   <p:sldSz cx="12192000" cy="6858000"/>
   <p:notesSz cx="6858000" cy="9144000"/>
@@ -7130,7 +7132,111 @@
           <a:bodyPr/>
           <a:lstStyle/>
           <a:p>
-            <a:endParaRPr lang="pt-BR"/>
+            <a:r>
+              <a:rPr lang="pt-BR" dirty="0" smtClean="0"/>
+              <a:t>Esqueleto da aplicação</a:t>
+            </a:r>
+            <a:endParaRPr lang="pt-BR" dirty="0"/>
+          </a:p>
+        </p:txBody>
+      </p:sp>
+      <p:pic>
+        <p:nvPicPr>
+          <p:cNvPr id="4" name="Imagem 3"/>
+          <p:cNvPicPr>
+            <a:picLocks noChangeAspect="1"/>
+          </p:cNvPicPr>
+          <p:nvPr/>
+        </p:nvPicPr>
+        <p:blipFill>
+          <a:blip r:embed="rId2"/>
+          <a:stretch>
+            <a:fillRect/>
+          </a:stretch>
+        </p:blipFill>
+        <p:spPr>
+          <a:xfrm>
+            <a:off x="4686299" y="1058637"/>
+            <a:ext cx="3061607" cy="4137307"/>
+          </a:xfrm>
+          <a:prstGeom prst="rect">
+            <a:avLst/>
+          </a:prstGeom>
+        </p:spPr>
+      </p:pic>
+    </p:spTree>
+    <p:extLst>
+      <p:ext uri="{BB962C8B-B14F-4D97-AF65-F5344CB8AC3E}">
+        <p14:creationId xmlns:p14="http://schemas.microsoft.com/office/powerpoint/2010/main" val="3829435932"/>
+      </p:ext>
+    </p:extLst>
+  </p:cSld>
+  <p:clrMapOvr>
+    <a:masterClrMapping/>
+  </p:clrMapOvr>
+  <p:timing>
+    <p:tnLst>
+      <p:par>
+        <p:cTn id="1" dur="indefinite" restart="never" nodeType="tmRoot"/>
+      </p:par>
+    </p:tnLst>
+  </p:timing>
+</p:sld>
+</file>
+
+<file path=ppt/slides/slide27.xml><?xml version="1.0" encoding="utf-8"?>
+<p:sld xmlns:a="http://schemas.openxmlformats.org/drawingml/2006/main" xmlns:r="http://schemas.openxmlformats.org/officeDocument/2006/relationships" xmlns:p="http://schemas.openxmlformats.org/presentationml/2006/main">
+  <p:cSld>
+    <p:spTree>
+      <p:nvGrpSpPr>
+        <p:cNvPr id="1" name=""/>
+        <p:cNvGrpSpPr/>
+        <p:nvPr/>
+      </p:nvGrpSpPr>
+      <p:grpSpPr>
+        <a:xfrm>
+          <a:off x="0" y="0"/>
+          <a:ext cx="0" cy="0"/>
+          <a:chOff x="0" y="0"/>
+          <a:chExt cx="0" cy="0"/>
+        </a:xfrm>
+      </p:grpSpPr>
+      <p:sp>
+        <p:nvSpPr>
+          <p:cNvPr id="2" name="Espaço Reservado para Texto 1"/>
+          <p:cNvSpPr>
+            <a:spLocks noGrp="1"/>
+          </p:cNvSpPr>
+          <p:nvPr>
+            <p:ph type="body" sz="quarter" idx="10"/>
+          </p:nvPr>
+        </p:nvSpPr>
+        <p:spPr/>
+        <p:txBody>
+          <a:bodyPr/>
+          <a:lstStyle/>
+          <a:p>
+            <a:r>
+              <a:rPr lang="pt-BR" dirty="0" err="1" smtClean="0"/>
+              <a:t>Razor</a:t>
+            </a:r>
+            <a:r>
+              <a:rPr lang="pt-BR" dirty="0" smtClean="0"/>
+              <a:t> </a:t>
+            </a:r>
+            <a:r>
+              <a:rPr lang="pt-BR" dirty="0" err="1" smtClean="0"/>
+              <a:t>View</a:t>
+            </a:r>
+            <a:r>
+              <a:rPr lang="pt-BR" dirty="0" smtClean="0"/>
+              <a:t> </a:t>
+            </a:r>
+            <a:r>
+              <a:rPr lang="pt-BR" dirty="0" err="1" smtClean="0"/>
+              <a:t>Engine</a:t>
+            </a:r>
+            <a:endParaRPr lang="pt-BR" dirty="0"/>
           </a:p>
         </p:txBody>
       </p:sp>
@@ -7149,14 +7255,191 @@
           <a:bodyPr/>
           <a:lstStyle/>
           <a:p>
-            <a:endParaRPr lang="pt-BR"/>
+            <a:pPr marL="342900" indent="-342900">
+              <a:buFont typeface="Arial" panose="020B0604020202020204" pitchFamily="34" charset="0"/>
+              <a:buChar char="•"/>
+            </a:pPr>
+            <a:r>
+              <a:rPr lang="pt-BR" dirty="0" smtClean="0"/>
+              <a:t>Responsável por incorporar informações em documentos HTML</a:t>
+            </a:r>
+          </a:p>
+          <a:p>
+            <a:pPr marL="342900" indent="-342900">
+              <a:buFont typeface="Arial" panose="020B0604020202020204" pitchFamily="34" charset="0"/>
+              <a:buChar char="•"/>
+            </a:pPr>
+            <a:r>
+              <a:rPr lang="pt-BR" dirty="0" smtClean="0"/>
+              <a:t>Usado para gerar conteúdo dinamicamente</a:t>
+            </a:r>
+          </a:p>
+          <a:p>
+            <a:pPr marL="342900" indent="-342900">
+              <a:buFont typeface="Arial" panose="020B0604020202020204" pitchFamily="34" charset="0"/>
+              <a:buChar char="•"/>
+            </a:pPr>
+            <a:r>
+              <a:rPr lang="pt-BR" dirty="0" smtClean="0"/>
+              <a:t>Contém boa parte das expressões da linguagem C# (</a:t>
+            </a:r>
+            <a:r>
+              <a:rPr lang="pt-BR" dirty="0" err="1" smtClean="0"/>
+              <a:t>if</a:t>
+            </a:r>
+            <a:r>
+              <a:rPr lang="pt-BR" dirty="0" smtClean="0"/>
+              <a:t>, </a:t>
+            </a:r>
+            <a:r>
+              <a:rPr lang="pt-BR" dirty="0" err="1" smtClean="0"/>
+              <a:t>foreach</a:t>
+            </a:r>
+            <a:r>
+              <a:rPr lang="pt-BR" dirty="0" smtClean="0"/>
+              <a:t>, switch, etc..)</a:t>
+            </a:r>
+          </a:p>
+          <a:p>
+            <a:pPr marL="342900" indent="-342900">
+              <a:buFont typeface="Arial" panose="020B0604020202020204" pitchFamily="34" charset="0"/>
+              <a:buChar char="•"/>
+            </a:pPr>
+            <a:r>
+              <a:rPr lang="pt-BR" dirty="0" smtClean="0"/>
+              <a:t>Deve ser usado pensando na separação de responsabilidades</a:t>
+            </a:r>
+          </a:p>
+          <a:p>
+            <a:pPr marL="342900" indent="-342900">
+              <a:buFont typeface="Arial" panose="020B0604020202020204" pitchFamily="34" charset="0"/>
+              <a:buChar char="•"/>
+            </a:pPr>
+            <a:r>
+              <a:rPr lang="pt-BR" dirty="0"/>
+              <a:t>Início do bloco de código é sinalizado com </a:t>
+            </a:r>
+            <a:r>
+              <a:rPr lang="pt-BR" dirty="0" smtClean="0"/>
+              <a:t>@</a:t>
+            </a:r>
+          </a:p>
+          <a:p>
+            <a:pPr marL="342900" indent="-342900">
+              <a:buFont typeface="Arial" panose="020B0604020202020204" pitchFamily="34" charset="0"/>
+              <a:buChar char="•"/>
+            </a:pPr>
+            <a:endParaRPr lang="pt-BR" dirty="0" smtClean="0"/>
+          </a:p>
+          <a:p>
+            <a:endParaRPr lang="pt-BR" dirty="0"/>
           </a:p>
         </p:txBody>
       </p:sp>
     </p:spTree>
     <p:extLst>
       <p:ext uri="{BB962C8B-B14F-4D97-AF65-F5344CB8AC3E}">
-        <p14:creationId xmlns:p14="http://schemas.microsoft.com/office/powerpoint/2010/main" val="3829435932"/>
+        <p14:creationId xmlns:p14="http://schemas.microsoft.com/office/powerpoint/2010/main" val="1349049509"/>
+      </p:ext>
+    </p:extLst>
+  </p:cSld>
+  <p:clrMapOvr>
+    <a:masterClrMapping/>
+  </p:clrMapOvr>
+  <p:timing>
+    <p:tnLst>
+      <p:par>
+        <p:cTn id="1" dur="indefinite" restart="never" nodeType="tmRoot"/>
+      </p:par>
+    </p:tnLst>
+  </p:timing>
+</p:sld>
+</file>
+
+<file path=ppt/slides/slide28.xml><?xml version="1.0" encoding="utf-8"?>
+<p:sld xmlns:a="http://schemas.openxmlformats.org/drawingml/2006/main" xmlns:r="http://schemas.openxmlformats.org/officeDocument/2006/relationships" xmlns:p="http://schemas.openxmlformats.org/presentationml/2006/main">
+  <p:cSld>
+    <p:spTree>
+      <p:nvGrpSpPr>
+        <p:cNvPr id="1" name=""/>
+        <p:cNvGrpSpPr/>
+        <p:nvPr/>
+      </p:nvGrpSpPr>
+      <p:grpSpPr>
+        <a:xfrm>
+          <a:off x="0" y="0"/>
+          <a:ext cx="0" cy="0"/>
+          <a:chOff x="0" y="0"/>
+          <a:chExt cx="0" cy="0"/>
+        </a:xfrm>
+      </p:grpSpPr>
+      <p:sp>
+        <p:nvSpPr>
+          <p:cNvPr id="2" name="Espaço Reservado para Texto 1"/>
+          <p:cNvSpPr>
+            <a:spLocks noGrp="1"/>
+          </p:cNvSpPr>
+          <p:nvPr>
+            <p:ph type="body" sz="quarter" idx="10"/>
+          </p:nvPr>
+        </p:nvSpPr>
+        <p:spPr/>
+        <p:txBody>
+          <a:bodyPr/>
+          <a:lstStyle/>
+          <a:p>
+            <a:r>
+              <a:rPr lang="pt-BR" dirty="0" err="1" smtClean="0"/>
+              <a:t>Razor</a:t>
+            </a:r>
+            <a:r>
+              <a:rPr lang="pt-BR" dirty="0" smtClean="0"/>
+              <a:t> </a:t>
+            </a:r>
+            <a:r>
+              <a:rPr lang="pt-BR" dirty="0" err="1" smtClean="0"/>
+              <a:t>View</a:t>
+            </a:r>
+            <a:r>
+              <a:rPr lang="pt-BR" dirty="0" smtClean="0"/>
+              <a:t> </a:t>
+            </a:r>
+            <a:r>
+              <a:rPr lang="pt-BR" dirty="0" err="1" smtClean="0"/>
+              <a:t>Engine</a:t>
+            </a:r>
+            <a:endParaRPr lang="pt-BR" dirty="0"/>
+          </a:p>
+        </p:txBody>
+      </p:sp>
+      <p:pic>
+        <p:nvPicPr>
+          <p:cNvPr id="4" name="Imagem 3"/>
+          <p:cNvPicPr>
+            <a:picLocks noChangeAspect="1"/>
+          </p:cNvPicPr>
+          <p:nvPr/>
+        </p:nvPicPr>
+        <p:blipFill>
+          <a:blip r:embed="rId2"/>
+          <a:stretch>
+            <a:fillRect/>
+          </a:stretch>
+        </p:blipFill>
+        <p:spPr>
+          <a:xfrm>
+            <a:off x="2868928" y="1929342"/>
+            <a:ext cx="6384293" cy="2507192"/>
+          </a:xfrm>
+          <a:prstGeom prst="rect">
+            <a:avLst/>
+          </a:prstGeom>
+        </p:spPr>
+      </p:pic>
+    </p:spTree>
+    <p:extLst>
+      <p:ext uri="{BB962C8B-B14F-4D97-AF65-F5344CB8AC3E}">
+        <p14:creationId xmlns:p14="http://schemas.microsoft.com/office/powerpoint/2010/main" val="2557115031"/>
       </p:ext>
     </p:extLst>
   </p:cSld>

</xml_diff>

<commit_message>
Bootstrap adicionado no projeto
</commit_message>
<xml_diff>
--- a/workshop-aspnet-core-mvc.pptx
+++ b/workshop-aspnet-core-mvc.pptx
@@ -33,6 +33,12 @@
     <p:sldId id="284" r:id="rId27"/>
     <p:sldId id="285" r:id="rId28"/>
     <p:sldId id="286" r:id="rId29"/>
+    <p:sldId id="287" r:id="rId30"/>
+    <p:sldId id="288" r:id="rId31"/>
+    <p:sldId id="289" r:id="rId32"/>
+    <p:sldId id="290" r:id="rId33"/>
+    <p:sldId id="291" r:id="rId34"/>
+    <p:sldId id="292" r:id="rId35"/>
   </p:sldIdLst>
   <p:sldSz cx="12192000" cy="6858000"/>
   <p:notesSz cx="6858000" cy="9144000"/>
@@ -7414,6 +7420,90 @@
       </p:sp>
       <p:pic>
         <p:nvPicPr>
+          <p:cNvPr id="6" name="Imagem 5"/>
+          <p:cNvPicPr>
+            <a:picLocks noChangeAspect="1"/>
+          </p:cNvPicPr>
+          <p:nvPr/>
+        </p:nvPicPr>
+        <p:blipFill>
+          <a:blip r:embed="rId2"/>
+          <a:stretch>
+            <a:fillRect/>
+          </a:stretch>
+        </p:blipFill>
+        <p:spPr>
+          <a:xfrm>
+            <a:off x="2413984" y="1985434"/>
+            <a:ext cx="7294182" cy="2959100"/>
+          </a:xfrm>
+          <a:prstGeom prst="rect">
+            <a:avLst/>
+          </a:prstGeom>
+        </p:spPr>
+      </p:pic>
+    </p:spTree>
+    <p:extLst>
+      <p:ext uri="{BB962C8B-B14F-4D97-AF65-F5344CB8AC3E}">
+        <p14:creationId xmlns:p14="http://schemas.microsoft.com/office/powerpoint/2010/main" val="2557115031"/>
+      </p:ext>
+    </p:extLst>
+  </p:cSld>
+  <p:clrMapOvr>
+    <a:masterClrMapping/>
+  </p:clrMapOvr>
+  <p:timing>
+    <p:tnLst>
+      <p:par>
+        <p:cTn id="1" dur="indefinite" restart="never" nodeType="tmRoot"/>
+      </p:par>
+    </p:tnLst>
+  </p:timing>
+</p:sld>
+</file>
+
+<file path=ppt/slides/slide29.xml><?xml version="1.0" encoding="utf-8"?>
+<p:sld xmlns:a="http://schemas.openxmlformats.org/drawingml/2006/main" xmlns:r="http://schemas.openxmlformats.org/officeDocument/2006/relationships" xmlns:p="http://schemas.openxmlformats.org/presentationml/2006/main">
+  <p:cSld>
+    <p:spTree>
+      <p:nvGrpSpPr>
+        <p:cNvPr id="1" name=""/>
+        <p:cNvGrpSpPr/>
+        <p:nvPr/>
+      </p:nvGrpSpPr>
+      <p:grpSpPr>
+        <a:xfrm>
+          <a:off x="0" y="0"/>
+          <a:ext cx="0" cy="0"/>
+          <a:chOff x="0" y="0"/>
+          <a:chExt cx="0" cy="0"/>
+        </a:xfrm>
+      </p:grpSpPr>
+      <p:sp>
+        <p:nvSpPr>
+          <p:cNvPr id="2" name="Espaço Reservado para Texto 1"/>
+          <p:cNvSpPr>
+            <a:spLocks noGrp="1"/>
+          </p:cNvSpPr>
+          <p:nvPr>
+            <p:ph type="body" sz="quarter" idx="10"/>
+          </p:nvPr>
+        </p:nvSpPr>
+        <p:spPr/>
+        <p:txBody>
+          <a:bodyPr/>
+          <a:lstStyle/>
+          <a:p>
+            <a:r>
+              <a:rPr lang="pt-BR" dirty="0" smtClean="0"/>
+              <a:t>Validação do formulário</a:t>
+            </a:r>
+            <a:endParaRPr lang="pt-BR" dirty="0"/>
+          </a:p>
+        </p:txBody>
+      </p:sp>
+      <p:pic>
+        <p:nvPicPr>
           <p:cNvPr id="4" name="Imagem 3"/>
           <p:cNvPicPr>
             <a:picLocks noChangeAspect="1"/>
@@ -7428,8 +7518,8 @@
         </p:blipFill>
         <p:spPr>
           <a:xfrm>
-            <a:off x="2868928" y="1929342"/>
-            <a:ext cx="6384293" cy="2507192"/>
+            <a:off x="2604689" y="1208615"/>
+            <a:ext cx="6912772" cy="4243917"/>
           </a:xfrm>
           <a:prstGeom prst="rect">
             <a:avLst/>
@@ -7439,7 +7529,7 @@
     </p:spTree>
     <p:extLst>
       <p:ext uri="{BB962C8B-B14F-4D97-AF65-F5344CB8AC3E}">
-        <p14:creationId xmlns:p14="http://schemas.microsoft.com/office/powerpoint/2010/main" val="2557115031"/>
+        <p14:creationId xmlns:p14="http://schemas.microsoft.com/office/powerpoint/2010/main" val="960006403"/>
       </p:ext>
     </p:extLst>
   </p:cSld>
@@ -7624,6 +7714,1318 @@
     <p:extLst>
       <p:ext uri="{BB962C8B-B14F-4D97-AF65-F5344CB8AC3E}">
         <p14:creationId xmlns:p14="http://schemas.microsoft.com/office/powerpoint/2010/main" val="1793893156"/>
+      </p:ext>
+    </p:extLst>
+  </p:cSld>
+  <p:clrMapOvr>
+    <a:masterClrMapping/>
+  </p:clrMapOvr>
+  <p:timing>
+    <p:tnLst>
+      <p:par>
+        <p:cTn id="1" dur="indefinite" restart="never" nodeType="tmRoot"/>
+      </p:par>
+    </p:tnLst>
+  </p:timing>
+</p:sld>
+</file>
+
+<file path=ppt/slides/slide30.xml><?xml version="1.0" encoding="utf-8"?>
+<p:sld xmlns:a="http://schemas.openxmlformats.org/drawingml/2006/main" xmlns:r="http://schemas.openxmlformats.org/officeDocument/2006/relationships" xmlns:p="http://schemas.openxmlformats.org/presentationml/2006/main">
+  <p:cSld>
+    <p:spTree>
+      <p:nvGrpSpPr>
+        <p:cNvPr id="1" name=""/>
+        <p:cNvGrpSpPr/>
+        <p:nvPr/>
+      </p:nvGrpSpPr>
+      <p:grpSpPr>
+        <a:xfrm>
+          <a:off x="0" y="0"/>
+          <a:ext cx="0" cy="0"/>
+          <a:chOff x="0" y="0"/>
+          <a:chExt cx="0" cy="0"/>
+        </a:xfrm>
+      </p:grpSpPr>
+      <p:sp>
+        <p:nvSpPr>
+          <p:cNvPr id="2" name="Espaço Reservado para Texto 1"/>
+          <p:cNvSpPr>
+            <a:spLocks noGrp="1"/>
+          </p:cNvSpPr>
+          <p:nvPr>
+            <p:ph type="body" sz="quarter" idx="10"/>
+          </p:nvPr>
+        </p:nvSpPr>
+        <p:spPr/>
+        <p:txBody>
+          <a:bodyPr/>
+          <a:lstStyle/>
+          <a:p>
+            <a:r>
+              <a:rPr lang="pt-BR" dirty="0" smtClean="0"/>
+              <a:t>Gerenciador de pacotes </a:t>
+            </a:r>
+            <a:r>
+              <a:rPr lang="pt-BR" dirty="0" err="1" smtClean="0"/>
+              <a:t>Bower</a:t>
+            </a:r>
+            <a:endParaRPr lang="pt-BR" dirty="0"/>
+          </a:p>
+        </p:txBody>
+      </p:sp>
+      <p:pic>
+        <p:nvPicPr>
+          <p:cNvPr id="4" name="Imagem 3"/>
+          <p:cNvPicPr>
+            <a:picLocks noChangeAspect="1"/>
+          </p:cNvPicPr>
+          <p:nvPr/>
+        </p:nvPicPr>
+        <p:blipFill>
+          <a:blip r:embed="rId2"/>
+          <a:stretch>
+            <a:fillRect/>
+          </a:stretch>
+        </p:blipFill>
+        <p:spPr>
+          <a:xfrm>
+            <a:off x="2100792" y="914401"/>
+            <a:ext cx="7314142" cy="5039149"/>
+          </a:xfrm>
+          <a:prstGeom prst="rect">
+            <a:avLst/>
+          </a:prstGeom>
+        </p:spPr>
+      </p:pic>
+    </p:spTree>
+    <p:extLst>
+      <p:ext uri="{BB962C8B-B14F-4D97-AF65-F5344CB8AC3E}">
+        <p14:creationId xmlns:p14="http://schemas.microsoft.com/office/powerpoint/2010/main" val="903362893"/>
+      </p:ext>
+    </p:extLst>
+  </p:cSld>
+  <p:clrMapOvr>
+    <a:masterClrMapping/>
+  </p:clrMapOvr>
+  <p:timing>
+    <p:tnLst>
+      <p:par>
+        <p:cTn id="1" dur="indefinite" restart="never" nodeType="tmRoot"/>
+      </p:par>
+    </p:tnLst>
+  </p:timing>
+</p:sld>
+</file>
+
+<file path=ppt/slides/slide31.xml><?xml version="1.0" encoding="utf-8"?>
+<p:sld xmlns:a="http://schemas.openxmlformats.org/drawingml/2006/main" xmlns:r="http://schemas.openxmlformats.org/officeDocument/2006/relationships" xmlns:p="http://schemas.openxmlformats.org/presentationml/2006/main">
+  <p:cSld>
+    <p:spTree>
+      <p:nvGrpSpPr>
+        <p:cNvPr id="1" name=""/>
+        <p:cNvGrpSpPr/>
+        <p:nvPr/>
+      </p:nvGrpSpPr>
+      <p:grpSpPr>
+        <a:xfrm>
+          <a:off x="0" y="0"/>
+          <a:ext cx="0" cy="0"/>
+          <a:chOff x="0" y="0"/>
+          <a:chExt cx="0" cy="0"/>
+        </a:xfrm>
+      </p:grpSpPr>
+      <p:sp>
+        <p:nvSpPr>
+          <p:cNvPr id="2" name="Espaço Reservado para Texto 1"/>
+          <p:cNvSpPr>
+            <a:spLocks noGrp="1"/>
+          </p:cNvSpPr>
+          <p:nvPr>
+            <p:ph type="body" sz="quarter" idx="10"/>
+          </p:nvPr>
+        </p:nvSpPr>
+        <p:spPr/>
+        <p:txBody>
+          <a:bodyPr/>
+          <a:lstStyle/>
+          <a:p>
+            <a:r>
+              <a:rPr lang="pt-BR" dirty="0" err="1"/>
+              <a:t>b</a:t>
+            </a:r>
+            <a:r>
+              <a:rPr lang="pt-BR" dirty="0" err="1" smtClean="0"/>
+              <a:t>ower.json</a:t>
+            </a:r>
+            <a:endParaRPr lang="pt-BR" dirty="0"/>
+          </a:p>
+        </p:txBody>
+      </p:sp>
+      <p:pic>
+        <p:nvPicPr>
+          <p:cNvPr id="13" name="Imagem 12"/>
+          <p:cNvPicPr>
+            <a:picLocks noChangeAspect="1"/>
+          </p:cNvPicPr>
+          <p:nvPr/>
+        </p:nvPicPr>
+        <p:blipFill>
+          <a:blip r:embed="rId2"/>
+          <a:stretch>
+            <a:fillRect/>
+          </a:stretch>
+        </p:blipFill>
+        <p:spPr>
+          <a:xfrm>
+            <a:off x="1169531" y="1017038"/>
+            <a:ext cx="4409772" cy="1483566"/>
+          </a:xfrm>
+          <a:prstGeom prst="rect">
+            <a:avLst/>
+          </a:prstGeom>
+        </p:spPr>
+      </p:pic>
+      <p:pic>
+        <p:nvPicPr>
+          <p:cNvPr id="14" name="Imagem 13"/>
+          <p:cNvPicPr>
+            <a:picLocks noChangeAspect="1"/>
+          </p:cNvPicPr>
+          <p:nvPr/>
+        </p:nvPicPr>
+        <p:blipFill>
+          <a:blip r:embed="rId3"/>
+          <a:stretch>
+            <a:fillRect/>
+          </a:stretch>
+        </p:blipFill>
+        <p:spPr>
+          <a:xfrm>
+            <a:off x="5924016" y="1017038"/>
+            <a:ext cx="4824183" cy="1483566"/>
+          </a:xfrm>
+          <a:prstGeom prst="rect">
+            <a:avLst/>
+          </a:prstGeom>
+        </p:spPr>
+      </p:pic>
+      <p:pic>
+        <p:nvPicPr>
+          <p:cNvPr id="15" name="Imagem 14"/>
+          <p:cNvPicPr>
+            <a:picLocks noChangeAspect="1"/>
+          </p:cNvPicPr>
+          <p:nvPr/>
+        </p:nvPicPr>
+        <p:blipFill>
+          <a:blip r:embed="rId4"/>
+          <a:stretch>
+            <a:fillRect/>
+          </a:stretch>
+        </p:blipFill>
+        <p:spPr>
+          <a:xfrm>
+            <a:off x="1169531" y="2808126"/>
+            <a:ext cx="4409772" cy="1400528"/>
+          </a:xfrm>
+          <a:prstGeom prst="rect">
+            <a:avLst/>
+          </a:prstGeom>
+        </p:spPr>
+      </p:pic>
+      <p:pic>
+        <p:nvPicPr>
+          <p:cNvPr id="17" name="Imagem 16"/>
+          <p:cNvPicPr>
+            <a:picLocks noChangeAspect="1"/>
+          </p:cNvPicPr>
+          <p:nvPr/>
+        </p:nvPicPr>
+        <p:blipFill>
+          <a:blip r:embed="rId5"/>
+          <a:stretch>
+            <a:fillRect/>
+          </a:stretch>
+        </p:blipFill>
+        <p:spPr>
+          <a:xfrm>
+            <a:off x="5924016" y="2826593"/>
+            <a:ext cx="2136136" cy="1250691"/>
+          </a:xfrm>
+          <a:prstGeom prst="rect">
+            <a:avLst/>
+          </a:prstGeom>
+        </p:spPr>
+      </p:pic>
+      <p:cxnSp>
+        <p:nvCxnSpPr>
+          <p:cNvPr id="19" name="Conector de seta reta 18"/>
+          <p:cNvCxnSpPr/>
+          <p:nvPr/>
+        </p:nvCxnSpPr>
+        <p:spPr>
+          <a:xfrm>
+            <a:off x="8336107" y="3433471"/>
+            <a:ext cx="975842" cy="0"/>
+          </a:xfrm>
+          <a:prstGeom prst="straightConnector1">
+            <a:avLst/>
+          </a:prstGeom>
+          <a:ln w="28575">
+            <a:tailEnd type="triangle"/>
+          </a:ln>
+        </p:spPr>
+        <p:style>
+          <a:lnRef idx="1">
+            <a:schemeClr val="accent1"/>
+          </a:lnRef>
+          <a:fillRef idx="0">
+            <a:schemeClr val="accent1"/>
+          </a:fillRef>
+          <a:effectRef idx="0">
+            <a:schemeClr val="accent1"/>
+          </a:effectRef>
+          <a:fontRef idx="minor">
+            <a:schemeClr val="tx1"/>
+          </a:fontRef>
+        </p:style>
+      </p:cxnSp>
+      <p:pic>
+        <p:nvPicPr>
+          <p:cNvPr id="20" name="Imagem 19"/>
+          <p:cNvPicPr>
+            <a:picLocks noChangeAspect="1"/>
+          </p:cNvPicPr>
+          <p:nvPr/>
+        </p:nvPicPr>
+        <p:blipFill>
+          <a:blip r:embed="rId6"/>
+          <a:stretch>
+            <a:fillRect/>
+          </a:stretch>
+        </p:blipFill>
+        <p:spPr>
+          <a:xfrm>
+            <a:off x="9479025" y="2808126"/>
+            <a:ext cx="1876328" cy="1896613"/>
+          </a:xfrm>
+          <a:prstGeom prst="rect">
+            <a:avLst/>
+          </a:prstGeom>
+        </p:spPr>
+      </p:pic>
+    </p:spTree>
+    <p:extLst>
+      <p:ext uri="{BB962C8B-B14F-4D97-AF65-F5344CB8AC3E}">
+        <p14:creationId xmlns:p14="http://schemas.microsoft.com/office/powerpoint/2010/main" val="1497176720"/>
+      </p:ext>
+    </p:extLst>
+  </p:cSld>
+  <p:clrMapOvr>
+    <a:masterClrMapping/>
+  </p:clrMapOvr>
+  <p:timing>
+    <p:tnLst>
+      <p:par>
+        <p:cTn id="1" dur="indefinite" restart="never" nodeType="tmRoot">
+          <p:childTnLst>
+            <p:seq concurrent="1" nextAc="seek">
+              <p:cTn id="2" dur="indefinite" nodeType="mainSeq">
+                <p:childTnLst>
+                  <p:par>
+                    <p:cTn id="3" fill="hold">
+                      <p:stCondLst>
+                        <p:cond delay="indefinite"/>
+                      </p:stCondLst>
+                      <p:childTnLst>
+                        <p:par>
+                          <p:cTn id="4" fill="hold">
+                            <p:stCondLst>
+                              <p:cond delay="0"/>
+                            </p:stCondLst>
+                            <p:childTnLst>
+                              <p:par>
+                                <p:cTn id="5" presetID="10" presetClass="entr" presetSubtype="0" fill="hold" nodeType="clickEffect">
+                                  <p:stCondLst>
+                                    <p:cond delay="0"/>
+                                  </p:stCondLst>
+                                  <p:childTnLst>
+                                    <p:set>
+                                      <p:cBhvr>
+                                        <p:cTn id="6" dur="1" fill="hold">
+                                          <p:stCondLst>
+                                            <p:cond delay="0"/>
+                                          </p:stCondLst>
+                                        </p:cTn>
+                                        <p:tgtEl>
+                                          <p:spTgt spid="13"/>
+                                        </p:tgtEl>
+                                        <p:attrNameLst>
+                                          <p:attrName>style.visibility</p:attrName>
+                                        </p:attrNameLst>
+                                      </p:cBhvr>
+                                      <p:to>
+                                        <p:strVal val="visible"/>
+                                      </p:to>
+                                    </p:set>
+                                    <p:animEffect transition="in" filter="fade">
+                                      <p:cBhvr>
+                                        <p:cTn id="7" dur="500"/>
+                                        <p:tgtEl>
+                                          <p:spTgt spid="13"/>
+                                        </p:tgtEl>
+                                      </p:cBhvr>
+                                    </p:animEffect>
+                                  </p:childTnLst>
+                                </p:cTn>
+                              </p:par>
+                            </p:childTnLst>
+                          </p:cTn>
+                        </p:par>
+                      </p:childTnLst>
+                    </p:cTn>
+                  </p:par>
+                  <p:par>
+                    <p:cTn id="8" fill="hold">
+                      <p:stCondLst>
+                        <p:cond delay="indefinite"/>
+                      </p:stCondLst>
+                      <p:childTnLst>
+                        <p:par>
+                          <p:cTn id="9" fill="hold">
+                            <p:stCondLst>
+                              <p:cond delay="0"/>
+                            </p:stCondLst>
+                            <p:childTnLst>
+                              <p:par>
+                                <p:cTn id="10" presetID="10" presetClass="entr" presetSubtype="0" fill="hold" nodeType="clickEffect">
+                                  <p:stCondLst>
+                                    <p:cond delay="0"/>
+                                  </p:stCondLst>
+                                  <p:childTnLst>
+                                    <p:set>
+                                      <p:cBhvr>
+                                        <p:cTn id="11" dur="1" fill="hold">
+                                          <p:stCondLst>
+                                            <p:cond delay="0"/>
+                                          </p:stCondLst>
+                                        </p:cTn>
+                                        <p:tgtEl>
+                                          <p:spTgt spid="14"/>
+                                        </p:tgtEl>
+                                        <p:attrNameLst>
+                                          <p:attrName>style.visibility</p:attrName>
+                                        </p:attrNameLst>
+                                      </p:cBhvr>
+                                      <p:to>
+                                        <p:strVal val="visible"/>
+                                      </p:to>
+                                    </p:set>
+                                    <p:animEffect transition="in" filter="fade">
+                                      <p:cBhvr>
+                                        <p:cTn id="12" dur="500"/>
+                                        <p:tgtEl>
+                                          <p:spTgt spid="14"/>
+                                        </p:tgtEl>
+                                      </p:cBhvr>
+                                    </p:animEffect>
+                                  </p:childTnLst>
+                                </p:cTn>
+                              </p:par>
+                            </p:childTnLst>
+                          </p:cTn>
+                        </p:par>
+                      </p:childTnLst>
+                    </p:cTn>
+                  </p:par>
+                  <p:par>
+                    <p:cTn id="13" fill="hold">
+                      <p:stCondLst>
+                        <p:cond delay="indefinite"/>
+                      </p:stCondLst>
+                      <p:childTnLst>
+                        <p:par>
+                          <p:cTn id="14" fill="hold">
+                            <p:stCondLst>
+                              <p:cond delay="0"/>
+                            </p:stCondLst>
+                            <p:childTnLst>
+                              <p:par>
+                                <p:cTn id="15" presetID="10" presetClass="entr" presetSubtype="0" fill="hold" nodeType="clickEffect">
+                                  <p:stCondLst>
+                                    <p:cond delay="0"/>
+                                  </p:stCondLst>
+                                  <p:childTnLst>
+                                    <p:set>
+                                      <p:cBhvr>
+                                        <p:cTn id="16" dur="1" fill="hold">
+                                          <p:stCondLst>
+                                            <p:cond delay="0"/>
+                                          </p:stCondLst>
+                                        </p:cTn>
+                                        <p:tgtEl>
+                                          <p:spTgt spid="15"/>
+                                        </p:tgtEl>
+                                        <p:attrNameLst>
+                                          <p:attrName>style.visibility</p:attrName>
+                                        </p:attrNameLst>
+                                      </p:cBhvr>
+                                      <p:to>
+                                        <p:strVal val="visible"/>
+                                      </p:to>
+                                    </p:set>
+                                    <p:animEffect transition="in" filter="fade">
+                                      <p:cBhvr>
+                                        <p:cTn id="17" dur="500"/>
+                                        <p:tgtEl>
+                                          <p:spTgt spid="15"/>
+                                        </p:tgtEl>
+                                      </p:cBhvr>
+                                    </p:animEffect>
+                                  </p:childTnLst>
+                                </p:cTn>
+                              </p:par>
+                            </p:childTnLst>
+                          </p:cTn>
+                        </p:par>
+                      </p:childTnLst>
+                    </p:cTn>
+                  </p:par>
+                  <p:par>
+                    <p:cTn id="18" fill="hold">
+                      <p:stCondLst>
+                        <p:cond delay="indefinite"/>
+                      </p:stCondLst>
+                      <p:childTnLst>
+                        <p:par>
+                          <p:cTn id="19" fill="hold">
+                            <p:stCondLst>
+                              <p:cond delay="0"/>
+                            </p:stCondLst>
+                            <p:childTnLst>
+                              <p:par>
+                                <p:cTn id="20" presetID="10" presetClass="entr" presetSubtype="0" fill="hold" nodeType="clickEffect">
+                                  <p:stCondLst>
+                                    <p:cond delay="0"/>
+                                  </p:stCondLst>
+                                  <p:childTnLst>
+                                    <p:set>
+                                      <p:cBhvr>
+                                        <p:cTn id="21" dur="1" fill="hold">
+                                          <p:stCondLst>
+                                            <p:cond delay="0"/>
+                                          </p:stCondLst>
+                                        </p:cTn>
+                                        <p:tgtEl>
+                                          <p:spTgt spid="17"/>
+                                        </p:tgtEl>
+                                        <p:attrNameLst>
+                                          <p:attrName>style.visibility</p:attrName>
+                                        </p:attrNameLst>
+                                      </p:cBhvr>
+                                      <p:to>
+                                        <p:strVal val="visible"/>
+                                      </p:to>
+                                    </p:set>
+                                    <p:animEffect transition="in" filter="fade">
+                                      <p:cBhvr>
+                                        <p:cTn id="22" dur="500"/>
+                                        <p:tgtEl>
+                                          <p:spTgt spid="17"/>
+                                        </p:tgtEl>
+                                      </p:cBhvr>
+                                    </p:animEffect>
+                                  </p:childTnLst>
+                                </p:cTn>
+                              </p:par>
+                            </p:childTnLst>
+                          </p:cTn>
+                        </p:par>
+                      </p:childTnLst>
+                    </p:cTn>
+                  </p:par>
+                  <p:par>
+                    <p:cTn id="23" fill="hold">
+                      <p:stCondLst>
+                        <p:cond delay="indefinite"/>
+                      </p:stCondLst>
+                      <p:childTnLst>
+                        <p:par>
+                          <p:cTn id="24" fill="hold">
+                            <p:stCondLst>
+                              <p:cond delay="0"/>
+                            </p:stCondLst>
+                            <p:childTnLst>
+                              <p:par>
+                                <p:cTn id="25" presetID="10" presetClass="entr" presetSubtype="0" fill="hold" nodeType="clickEffect">
+                                  <p:stCondLst>
+                                    <p:cond delay="0"/>
+                                  </p:stCondLst>
+                                  <p:childTnLst>
+                                    <p:set>
+                                      <p:cBhvr>
+                                        <p:cTn id="26" dur="1" fill="hold">
+                                          <p:stCondLst>
+                                            <p:cond delay="0"/>
+                                          </p:stCondLst>
+                                        </p:cTn>
+                                        <p:tgtEl>
+                                          <p:spTgt spid="19"/>
+                                        </p:tgtEl>
+                                        <p:attrNameLst>
+                                          <p:attrName>style.visibility</p:attrName>
+                                        </p:attrNameLst>
+                                      </p:cBhvr>
+                                      <p:to>
+                                        <p:strVal val="visible"/>
+                                      </p:to>
+                                    </p:set>
+                                    <p:animEffect transition="in" filter="fade">
+                                      <p:cBhvr>
+                                        <p:cTn id="27" dur="500"/>
+                                        <p:tgtEl>
+                                          <p:spTgt spid="19"/>
+                                        </p:tgtEl>
+                                      </p:cBhvr>
+                                    </p:animEffect>
+                                  </p:childTnLst>
+                                </p:cTn>
+                              </p:par>
+                              <p:par>
+                                <p:cTn id="28" presetID="10" presetClass="entr" presetSubtype="0" fill="hold" nodeType="withEffect">
+                                  <p:stCondLst>
+                                    <p:cond delay="0"/>
+                                  </p:stCondLst>
+                                  <p:childTnLst>
+                                    <p:set>
+                                      <p:cBhvr>
+                                        <p:cTn id="29" dur="1" fill="hold">
+                                          <p:stCondLst>
+                                            <p:cond delay="0"/>
+                                          </p:stCondLst>
+                                        </p:cTn>
+                                        <p:tgtEl>
+                                          <p:spTgt spid="20"/>
+                                        </p:tgtEl>
+                                        <p:attrNameLst>
+                                          <p:attrName>style.visibility</p:attrName>
+                                        </p:attrNameLst>
+                                      </p:cBhvr>
+                                      <p:to>
+                                        <p:strVal val="visible"/>
+                                      </p:to>
+                                    </p:set>
+                                    <p:animEffect transition="in" filter="fade">
+                                      <p:cBhvr>
+                                        <p:cTn id="30" dur="500"/>
+                                        <p:tgtEl>
+                                          <p:spTgt spid="20"/>
+                                        </p:tgtEl>
+                                      </p:cBhvr>
+                                    </p:animEffect>
+                                  </p:childTnLst>
+                                </p:cTn>
+                              </p:par>
+                            </p:childTnLst>
+                          </p:cTn>
+                        </p:par>
+                      </p:childTnLst>
+                    </p:cTn>
+                  </p:par>
+                </p:childTnLst>
+              </p:cTn>
+              <p:prevCondLst>
+                <p:cond evt="onPrev" delay="0">
+                  <p:tgtEl>
+                    <p:sldTgt/>
+                  </p:tgtEl>
+                </p:cond>
+              </p:prevCondLst>
+              <p:nextCondLst>
+                <p:cond evt="onNext" delay="0">
+                  <p:tgtEl>
+                    <p:sldTgt/>
+                  </p:tgtEl>
+                </p:cond>
+              </p:nextCondLst>
+            </p:seq>
+          </p:childTnLst>
+        </p:cTn>
+      </p:par>
+    </p:tnLst>
+  </p:timing>
+</p:sld>
+</file>
+
+<file path=ppt/slides/slide32.xml><?xml version="1.0" encoding="utf-8"?>
+<p:sld xmlns:a="http://schemas.openxmlformats.org/drawingml/2006/main" xmlns:r="http://schemas.openxmlformats.org/officeDocument/2006/relationships" xmlns:p="http://schemas.openxmlformats.org/presentationml/2006/main">
+  <p:cSld>
+    <p:spTree>
+      <p:nvGrpSpPr>
+        <p:cNvPr id="1" name=""/>
+        <p:cNvGrpSpPr/>
+        <p:nvPr/>
+      </p:nvGrpSpPr>
+      <p:grpSpPr>
+        <a:xfrm>
+          <a:off x="0" y="0"/>
+          <a:ext cx="0" cy="0"/>
+          <a:chOff x="0" y="0"/>
+          <a:chExt cx="0" cy="0"/>
+        </a:xfrm>
+      </p:grpSpPr>
+      <p:sp>
+        <p:nvSpPr>
+          <p:cNvPr id="2" name="Espaço Reservado para Texto 1"/>
+          <p:cNvSpPr>
+            <a:spLocks noGrp="1"/>
+          </p:cNvSpPr>
+          <p:nvPr>
+            <p:ph type="body" sz="quarter" idx="10"/>
+          </p:nvPr>
+        </p:nvSpPr>
+        <p:spPr/>
+        <p:txBody>
+          <a:bodyPr/>
+          <a:lstStyle/>
+          <a:p>
+            <a:r>
+              <a:rPr lang="pt-BR" dirty="0" err="1" smtClean="0"/>
+              <a:t>Bootstrap</a:t>
+            </a:r>
+            <a:endParaRPr lang="pt-BR" dirty="0"/>
+          </a:p>
+        </p:txBody>
+      </p:sp>
+      <p:sp>
+        <p:nvSpPr>
+          <p:cNvPr id="3" name="Espaço Reservado para Texto 2"/>
+          <p:cNvSpPr>
+            <a:spLocks noGrp="1"/>
+          </p:cNvSpPr>
+          <p:nvPr>
+            <p:ph type="body" sz="quarter" idx="11"/>
+          </p:nvPr>
+        </p:nvSpPr>
+        <p:spPr/>
+        <p:txBody>
+          <a:bodyPr/>
+          <a:lstStyle/>
+          <a:p>
+            <a:pPr marL="342900" indent="-342900">
+              <a:buFont typeface="Arial" panose="020B0604020202020204" pitchFamily="34" charset="0"/>
+              <a:buChar char="•"/>
+            </a:pPr>
+            <a:r>
+              <a:rPr lang="pt-BR" dirty="0" smtClean="0"/>
+              <a:t>Front-</a:t>
+            </a:r>
+            <a:r>
+              <a:rPr lang="pt-BR" dirty="0" err="1" smtClean="0"/>
+              <a:t>end</a:t>
+            </a:r>
+            <a:r>
+              <a:rPr lang="pt-BR" dirty="0" smtClean="0"/>
+              <a:t> web framework</a:t>
+            </a:r>
+          </a:p>
+          <a:p>
+            <a:pPr marL="342900" indent="-342900">
+              <a:buFont typeface="Arial" panose="020B0604020202020204" pitchFamily="34" charset="0"/>
+              <a:buChar char="•"/>
+            </a:pPr>
+            <a:r>
+              <a:rPr lang="pt-BR" dirty="0" smtClean="0"/>
+              <a:t>Biblioteca de CSS e JS</a:t>
+            </a:r>
+          </a:p>
+          <a:p>
+            <a:pPr marL="342900" indent="-342900">
+              <a:buFont typeface="Arial" panose="020B0604020202020204" pitchFamily="34" charset="0"/>
+              <a:buChar char="•"/>
+            </a:pPr>
+            <a:r>
+              <a:rPr lang="pt-BR" dirty="0" smtClean="0"/>
+              <a:t>Biblioteca para desenvolvimento de aplicações web responsivas</a:t>
+            </a:r>
+          </a:p>
+          <a:p>
+            <a:pPr marL="342900" indent="-342900">
+              <a:buFont typeface="Arial" panose="020B0604020202020204" pitchFamily="34" charset="0"/>
+              <a:buChar char="•"/>
+            </a:pPr>
+            <a:r>
+              <a:rPr lang="pt-BR" dirty="0">
+                <a:hlinkClick r:id="rId2"/>
+              </a:rPr>
+              <a:t>http://getbootstrap.com</a:t>
+            </a:r>
+            <a:r>
+              <a:rPr lang="pt-BR" dirty="0" smtClean="0">
+                <a:hlinkClick r:id="rId2"/>
+              </a:rPr>
+              <a:t>/</a:t>
+            </a:r>
+            <a:endParaRPr lang="pt-BR" dirty="0" smtClean="0"/>
+          </a:p>
+          <a:p>
+            <a:pPr marL="342900" indent="-342900">
+              <a:buFont typeface="Arial" panose="020B0604020202020204" pitchFamily="34" charset="0"/>
+              <a:buChar char="•"/>
+            </a:pPr>
+            <a:r>
+              <a:rPr lang="pt-BR" dirty="0" smtClean="0"/>
+              <a:t>Atualmente está na versão 3, mas a versão 4 está em fase beta.</a:t>
+            </a:r>
+            <a:endParaRPr lang="pt-BR" dirty="0"/>
+          </a:p>
+        </p:txBody>
+      </p:sp>
+    </p:spTree>
+    <p:extLst>
+      <p:ext uri="{BB962C8B-B14F-4D97-AF65-F5344CB8AC3E}">
+        <p14:creationId xmlns:p14="http://schemas.microsoft.com/office/powerpoint/2010/main" val="652949971"/>
+      </p:ext>
+    </p:extLst>
+  </p:cSld>
+  <p:clrMapOvr>
+    <a:masterClrMapping/>
+  </p:clrMapOvr>
+  <p:timing>
+    <p:tnLst>
+      <p:par>
+        <p:cTn id="1" dur="indefinite" restart="never" nodeType="tmRoot"/>
+      </p:par>
+    </p:tnLst>
+  </p:timing>
+</p:sld>
+</file>
+
+<file path=ppt/slides/slide33.xml><?xml version="1.0" encoding="utf-8"?>
+<p:sld xmlns:a="http://schemas.openxmlformats.org/drawingml/2006/main" xmlns:r="http://schemas.openxmlformats.org/officeDocument/2006/relationships" xmlns:p="http://schemas.openxmlformats.org/presentationml/2006/main">
+  <p:cSld>
+    <p:spTree>
+      <p:nvGrpSpPr>
+        <p:cNvPr id="1" name=""/>
+        <p:cNvGrpSpPr/>
+        <p:nvPr/>
+      </p:nvGrpSpPr>
+      <p:grpSpPr>
+        <a:xfrm>
+          <a:off x="0" y="0"/>
+          <a:ext cx="0" cy="0"/>
+          <a:chOff x="0" y="0"/>
+          <a:chExt cx="0" cy="0"/>
+        </a:xfrm>
+      </p:grpSpPr>
+      <p:sp>
+        <p:nvSpPr>
+          <p:cNvPr id="2" name="Espaço Reservado para Texto 1"/>
+          <p:cNvSpPr>
+            <a:spLocks noGrp="1"/>
+          </p:cNvSpPr>
+          <p:nvPr>
+            <p:ph type="body" sz="quarter" idx="10"/>
+          </p:nvPr>
+        </p:nvSpPr>
+        <p:spPr/>
+        <p:txBody>
+          <a:bodyPr/>
+          <a:lstStyle/>
+          <a:p>
+            <a:r>
+              <a:rPr lang="pt-BR" dirty="0" err="1" smtClean="0"/>
+              <a:t>Bootstrap</a:t>
+            </a:r>
+            <a:r>
+              <a:rPr lang="pt-BR" dirty="0" smtClean="0"/>
+              <a:t> Grid System</a:t>
+            </a:r>
+            <a:endParaRPr lang="pt-BR" dirty="0"/>
+          </a:p>
+        </p:txBody>
+      </p:sp>
+      <p:pic>
+        <p:nvPicPr>
+          <p:cNvPr id="5" name="Imagem 4"/>
+          <p:cNvPicPr>
+            <a:picLocks noChangeAspect="1"/>
+          </p:cNvPicPr>
+          <p:nvPr/>
+        </p:nvPicPr>
+        <p:blipFill>
+          <a:blip r:embed="rId2"/>
+          <a:stretch>
+            <a:fillRect/>
+          </a:stretch>
+        </p:blipFill>
+        <p:spPr>
+          <a:xfrm>
+            <a:off x="2651125" y="1750752"/>
+            <a:ext cx="6819900" cy="3076575"/>
+          </a:xfrm>
+          <a:prstGeom prst="rect">
+            <a:avLst/>
+          </a:prstGeom>
+        </p:spPr>
+      </p:pic>
+      <p:pic>
+        <p:nvPicPr>
+          <p:cNvPr id="6" name="Imagem 5"/>
+          <p:cNvPicPr>
+            <a:picLocks noChangeAspect="1"/>
+          </p:cNvPicPr>
+          <p:nvPr/>
+        </p:nvPicPr>
+        <p:blipFill>
+          <a:blip r:embed="rId3"/>
+          <a:stretch>
+            <a:fillRect/>
+          </a:stretch>
+        </p:blipFill>
+        <p:spPr>
+          <a:xfrm>
+            <a:off x="2651125" y="1750752"/>
+            <a:ext cx="6791325" cy="3076575"/>
+          </a:xfrm>
+          <a:prstGeom prst="rect">
+            <a:avLst/>
+          </a:prstGeom>
+        </p:spPr>
+      </p:pic>
+      <p:pic>
+        <p:nvPicPr>
+          <p:cNvPr id="7" name="Imagem 6"/>
+          <p:cNvPicPr>
+            <a:picLocks noChangeAspect="1"/>
+          </p:cNvPicPr>
+          <p:nvPr/>
+        </p:nvPicPr>
+        <p:blipFill>
+          <a:blip r:embed="rId4"/>
+          <a:stretch>
+            <a:fillRect/>
+          </a:stretch>
+        </p:blipFill>
+        <p:spPr>
+          <a:xfrm>
+            <a:off x="2632074" y="1750752"/>
+            <a:ext cx="6829425" cy="3086100"/>
+          </a:xfrm>
+          <a:prstGeom prst="rect">
+            <a:avLst/>
+          </a:prstGeom>
+        </p:spPr>
+      </p:pic>
+      <p:pic>
+        <p:nvPicPr>
+          <p:cNvPr id="8" name="Imagem 7"/>
+          <p:cNvPicPr>
+            <a:picLocks noChangeAspect="1"/>
+          </p:cNvPicPr>
+          <p:nvPr/>
+        </p:nvPicPr>
+        <p:blipFill>
+          <a:blip r:embed="rId5"/>
+          <a:stretch>
+            <a:fillRect/>
+          </a:stretch>
+        </p:blipFill>
+        <p:spPr>
+          <a:xfrm>
+            <a:off x="2632074" y="1750752"/>
+            <a:ext cx="7981950" cy="3086100"/>
+          </a:xfrm>
+          <a:prstGeom prst="rect">
+            <a:avLst/>
+          </a:prstGeom>
+        </p:spPr>
+      </p:pic>
+      <p:pic>
+        <p:nvPicPr>
+          <p:cNvPr id="9" name="Imagem 8"/>
+          <p:cNvPicPr>
+            <a:picLocks noChangeAspect="1"/>
+          </p:cNvPicPr>
+          <p:nvPr/>
+        </p:nvPicPr>
+        <p:blipFill>
+          <a:blip r:embed="rId6"/>
+          <a:stretch>
+            <a:fillRect/>
+          </a:stretch>
+        </p:blipFill>
+        <p:spPr>
+          <a:xfrm>
+            <a:off x="2617786" y="1755415"/>
+            <a:ext cx="8010525" cy="3086100"/>
+          </a:xfrm>
+          <a:prstGeom prst="rect">
+            <a:avLst/>
+          </a:prstGeom>
+        </p:spPr>
+      </p:pic>
+    </p:spTree>
+    <p:extLst>
+      <p:ext uri="{BB962C8B-B14F-4D97-AF65-F5344CB8AC3E}">
+        <p14:creationId xmlns:p14="http://schemas.microsoft.com/office/powerpoint/2010/main" val="2684623141"/>
+      </p:ext>
+    </p:extLst>
+  </p:cSld>
+  <p:clrMapOvr>
+    <a:masterClrMapping/>
+  </p:clrMapOvr>
+  <p:timing>
+    <p:tnLst>
+      <p:par>
+        <p:cTn id="1" dur="indefinite" restart="never" nodeType="tmRoot">
+          <p:childTnLst>
+            <p:seq concurrent="1" nextAc="seek">
+              <p:cTn id="2" dur="indefinite" nodeType="mainSeq">
+                <p:childTnLst>
+                  <p:par>
+                    <p:cTn id="3" fill="hold">
+                      <p:stCondLst>
+                        <p:cond delay="indefinite"/>
+                      </p:stCondLst>
+                      <p:childTnLst>
+                        <p:par>
+                          <p:cTn id="4" fill="hold">
+                            <p:stCondLst>
+                              <p:cond delay="0"/>
+                            </p:stCondLst>
+                            <p:childTnLst>
+                              <p:par>
+                                <p:cTn id="5" presetID="1" presetClass="entr" presetSubtype="0" fill="hold" nodeType="clickEffect">
+                                  <p:stCondLst>
+                                    <p:cond delay="0"/>
+                                  </p:stCondLst>
+                                  <p:childTnLst>
+                                    <p:set>
+                                      <p:cBhvr>
+                                        <p:cTn id="6" dur="1" fill="hold">
+                                          <p:stCondLst>
+                                            <p:cond delay="0"/>
+                                          </p:stCondLst>
+                                        </p:cTn>
+                                        <p:tgtEl>
+                                          <p:spTgt spid="6"/>
+                                        </p:tgtEl>
+                                        <p:attrNameLst>
+                                          <p:attrName>style.visibility</p:attrName>
+                                        </p:attrNameLst>
+                                      </p:cBhvr>
+                                      <p:to>
+                                        <p:strVal val="visible"/>
+                                      </p:to>
+                                    </p:set>
+                                  </p:childTnLst>
+                                </p:cTn>
+                              </p:par>
+                            </p:childTnLst>
+                          </p:cTn>
+                        </p:par>
+                      </p:childTnLst>
+                    </p:cTn>
+                  </p:par>
+                  <p:par>
+                    <p:cTn id="7" fill="hold">
+                      <p:stCondLst>
+                        <p:cond delay="indefinite"/>
+                      </p:stCondLst>
+                      <p:childTnLst>
+                        <p:par>
+                          <p:cTn id="8" fill="hold">
+                            <p:stCondLst>
+                              <p:cond delay="0"/>
+                            </p:stCondLst>
+                            <p:childTnLst>
+                              <p:par>
+                                <p:cTn id="9" presetID="1" presetClass="entr" presetSubtype="0" fill="hold" nodeType="clickEffect">
+                                  <p:stCondLst>
+                                    <p:cond delay="0"/>
+                                  </p:stCondLst>
+                                  <p:childTnLst>
+                                    <p:set>
+                                      <p:cBhvr>
+                                        <p:cTn id="10" dur="1" fill="hold">
+                                          <p:stCondLst>
+                                            <p:cond delay="0"/>
+                                          </p:stCondLst>
+                                        </p:cTn>
+                                        <p:tgtEl>
+                                          <p:spTgt spid="7"/>
+                                        </p:tgtEl>
+                                        <p:attrNameLst>
+                                          <p:attrName>style.visibility</p:attrName>
+                                        </p:attrNameLst>
+                                      </p:cBhvr>
+                                      <p:to>
+                                        <p:strVal val="visible"/>
+                                      </p:to>
+                                    </p:set>
+                                  </p:childTnLst>
+                                </p:cTn>
+                              </p:par>
+                            </p:childTnLst>
+                          </p:cTn>
+                        </p:par>
+                      </p:childTnLst>
+                    </p:cTn>
+                  </p:par>
+                  <p:par>
+                    <p:cTn id="11" fill="hold">
+                      <p:stCondLst>
+                        <p:cond delay="indefinite"/>
+                      </p:stCondLst>
+                      <p:childTnLst>
+                        <p:par>
+                          <p:cTn id="12" fill="hold">
+                            <p:stCondLst>
+                              <p:cond delay="0"/>
+                            </p:stCondLst>
+                            <p:childTnLst>
+                              <p:par>
+                                <p:cTn id="13" presetID="1" presetClass="entr" presetSubtype="0" fill="hold" nodeType="clickEffect">
+                                  <p:stCondLst>
+                                    <p:cond delay="0"/>
+                                  </p:stCondLst>
+                                  <p:childTnLst>
+                                    <p:set>
+                                      <p:cBhvr>
+                                        <p:cTn id="14" dur="1" fill="hold">
+                                          <p:stCondLst>
+                                            <p:cond delay="0"/>
+                                          </p:stCondLst>
+                                        </p:cTn>
+                                        <p:tgtEl>
+                                          <p:spTgt spid="8"/>
+                                        </p:tgtEl>
+                                        <p:attrNameLst>
+                                          <p:attrName>style.visibility</p:attrName>
+                                        </p:attrNameLst>
+                                      </p:cBhvr>
+                                      <p:to>
+                                        <p:strVal val="visible"/>
+                                      </p:to>
+                                    </p:set>
+                                  </p:childTnLst>
+                                </p:cTn>
+                              </p:par>
+                            </p:childTnLst>
+                          </p:cTn>
+                        </p:par>
+                      </p:childTnLst>
+                    </p:cTn>
+                  </p:par>
+                  <p:par>
+                    <p:cTn id="15" fill="hold">
+                      <p:stCondLst>
+                        <p:cond delay="indefinite"/>
+                      </p:stCondLst>
+                      <p:childTnLst>
+                        <p:par>
+                          <p:cTn id="16" fill="hold">
+                            <p:stCondLst>
+                              <p:cond delay="0"/>
+                            </p:stCondLst>
+                            <p:childTnLst>
+                              <p:par>
+                                <p:cTn id="17" presetID="1" presetClass="entr" presetSubtype="0" fill="hold" nodeType="clickEffect">
+                                  <p:stCondLst>
+                                    <p:cond delay="0"/>
+                                  </p:stCondLst>
+                                  <p:childTnLst>
+                                    <p:set>
+                                      <p:cBhvr>
+                                        <p:cTn id="18" dur="1" fill="hold">
+                                          <p:stCondLst>
+                                            <p:cond delay="0"/>
+                                          </p:stCondLst>
+                                        </p:cTn>
+                                        <p:tgtEl>
+                                          <p:spTgt spid="9"/>
+                                        </p:tgtEl>
+                                        <p:attrNameLst>
+                                          <p:attrName>style.visibility</p:attrName>
+                                        </p:attrNameLst>
+                                      </p:cBhvr>
+                                      <p:to>
+                                        <p:strVal val="visible"/>
+                                      </p:to>
+                                    </p:set>
+                                  </p:childTnLst>
+                                </p:cTn>
+                              </p:par>
+                            </p:childTnLst>
+                          </p:cTn>
+                        </p:par>
+                      </p:childTnLst>
+                    </p:cTn>
+                  </p:par>
+                </p:childTnLst>
+              </p:cTn>
+              <p:prevCondLst>
+                <p:cond evt="onPrev" delay="0">
+                  <p:tgtEl>
+                    <p:sldTgt/>
+                  </p:tgtEl>
+                </p:cond>
+              </p:prevCondLst>
+              <p:nextCondLst>
+                <p:cond evt="onNext" delay="0">
+                  <p:tgtEl>
+                    <p:sldTgt/>
+                  </p:tgtEl>
+                </p:cond>
+              </p:nextCondLst>
+            </p:seq>
+          </p:childTnLst>
+        </p:cTn>
+      </p:par>
+    </p:tnLst>
+  </p:timing>
+</p:sld>
+</file>
+
+<file path=ppt/slides/slide34.xml><?xml version="1.0" encoding="utf-8"?>
+<p:sld xmlns:a="http://schemas.openxmlformats.org/drawingml/2006/main" xmlns:r="http://schemas.openxmlformats.org/officeDocument/2006/relationships" xmlns:p="http://schemas.openxmlformats.org/presentationml/2006/main">
+  <p:cSld>
+    <p:spTree>
+      <p:nvGrpSpPr>
+        <p:cNvPr id="1" name=""/>
+        <p:cNvGrpSpPr/>
+        <p:nvPr/>
+      </p:nvGrpSpPr>
+      <p:grpSpPr>
+        <a:xfrm>
+          <a:off x="0" y="0"/>
+          <a:ext cx="0" cy="0"/>
+          <a:chOff x="0" y="0"/>
+          <a:chExt cx="0" cy="0"/>
+        </a:xfrm>
+      </p:grpSpPr>
+      <p:sp>
+        <p:nvSpPr>
+          <p:cNvPr id="2" name="Espaço Reservado para Texto 1"/>
+          <p:cNvSpPr>
+            <a:spLocks noGrp="1"/>
+          </p:cNvSpPr>
+          <p:nvPr>
+            <p:ph type="body" sz="quarter" idx="10"/>
+          </p:nvPr>
+        </p:nvSpPr>
+        <p:spPr/>
+        <p:txBody>
+          <a:bodyPr/>
+          <a:lstStyle/>
+          <a:p>
+            <a:r>
+              <a:rPr lang="pt-BR" dirty="0" smtClean="0"/>
+              <a:t>Grid Classes</a:t>
+            </a:r>
+            <a:endParaRPr lang="pt-BR" dirty="0"/>
+          </a:p>
+        </p:txBody>
+      </p:sp>
+      <p:sp>
+        <p:nvSpPr>
+          <p:cNvPr id="3" name="Espaço Reservado para Texto 2"/>
+          <p:cNvSpPr>
+            <a:spLocks noGrp="1"/>
+          </p:cNvSpPr>
+          <p:nvPr>
+            <p:ph type="body" sz="quarter" idx="11"/>
+          </p:nvPr>
+        </p:nvSpPr>
+        <p:spPr/>
+        <p:txBody>
+          <a:bodyPr/>
+          <a:lstStyle/>
+          <a:p>
+            <a:pPr marL="342900" indent="-342900">
+              <a:buFont typeface="Arial" panose="020B0604020202020204" pitchFamily="34" charset="0"/>
+              <a:buChar char="•"/>
+            </a:pPr>
+            <a:r>
+              <a:rPr lang="pt-BR" dirty="0" err="1" smtClean="0"/>
+              <a:t>xs</a:t>
+            </a:r>
+            <a:r>
+              <a:rPr lang="pt-BR" dirty="0" smtClean="0"/>
+              <a:t> </a:t>
+            </a:r>
+            <a:r>
+              <a:rPr lang="pt-BR" dirty="0"/>
+              <a:t>:</a:t>
+            </a:r>
+            <a:r>
+              <a:rPr lang="pt-BR" dirty="0" smtClean="0"/>
+              <a:t> &lt; 768px (smartphones)</a:t>
+            </a:r>
+          </a:p>
+          <a:p>
+            <a:pPr marL="342900" indent="-342900">
+              <a:buFont typeface="Arial" panose="020B0604020202020204" pitchFamily="34" charset="0"/>
+              <a:buChar char="•"/>
+            </a:pPr>
+            <a:r>
+              <a:rPr lang="pt-BR" dirty="0" err="1" smtClean="0"/>
+              <a:t>sm</a:t>
+            </a:r>
+            <a:r>
+              <a:rPr lang="pt-BR" dirty="0" smtClean="0"/>
+              <a:t> : &gt;= 768px (</a:t>
+            </a:r>
+            <a:r>
+              <a:rPr lang="pt-BR" dirty="0" err="1" smtClean="0"/>
+              <a:t>tablets</a:t>
+            </a:r>
+            <a:r>
+              <a:rPr lang="pt-BR" dirty="0" smtClean="0"/>
+              <a:t>)</a:t>
+            </a:r>
+          </a:p>
+          <a:p>
+            <a:pPr marL="342900" indent="-342900">
+              <a:buFont typeface="Arial" panose="020B0604020202020204" pitchFamily="34" charset="0"/>
+              <a:buChar char="•"/>
+            </a:pPr>
+            <a:r>
+              <a:rPr lang="pt-BR" dirty="0" err="1"/>
+              <a:t>m</a:t>
+            </a:r>
+            <a:r>
+              <a:rPr lang="pt-BR" dirty="0" err="1" smtClean="0"/>
+              <a:t>d</a:t>
+            </a:r>
+            <a:r>
+              <a:rPr lang="pt-BR" dirty="0" smtClean="0"/>
+              <a:t> : &gt;= 992px (monitores)</a:t>
+            </a:r>
+          </a:p>
+          <a:p>
+            <a:pPr marL="342900" indent="-342900">
+              <a:buFont typeface="Arial" panose="020B0604020202020204" pitchFamily="34" charset="0"/>
+              <a:buChar char="•"/>
+            </a:pPr>
+            <a:r>
+              <a:rPr lang="pt-BR" dirty="0" err="1" smtClean="0"/>
+              <a:t>lg</a:t>
+            </a:r>
+            <a:r>
+              <a:rPr lang="pt-BR" dirty="0" smtClean="0"/>
+              <a:t> : &gt;= 1200px (monitores com resoluções maiores)</a:t>
+            </a:r>
+            <a:endParaRPr lang="pt-BR" dirty="0"/>
+          </a:p>
+        </p:txBody>
+      </p:sp>
+    </p:spTree>
+    <p:extLst>
+      <p:ext uri="{BB962C8B-B14F-4D97-AF65-F5344CB8AC3E}">
+        <p14:creationId xmlns:p14="http://schemas.microsoft.com/office/powerpoint/2010/main" val="1497074926"/>
       </p:ext>
     </p:extLst>
   </p:cSld>

</xml_diff>

<commit_message>
Pequenas correções na apresentação
</commit_message>
<xml_diff>
--- a/workshop-aspnet-core-mvc.pptx
+++ b/workshop-aspnet-core-mvc.pptx
@@ -39,6 +39,10 @@
     <p:sldId id="290" r:id="rId33"/>
     <p:sldId id="291" r:id="rId34"/>
     <p:sldId id="292" r:id="rId35"/>
+    <p:sldId id="293" r:id="rId36"/>
+    <p:sldId id="294" r:id="rId37"/>
+    <p:sldId id="295" r:id="rId38"/>
+    <p:sldId id="296" r:id="rId39"/>
   </p:sldIdLst>
   <p:sldSz cx="12192000" cy="6858000"/>
   <p:notesSz cx="6858000" cy="9144000"/>
@@ -6048,7 +6052,7 @@
               <a:rPr lang="pt-BR" dirty="0" smtClean="0">
                 <a:hlinkClick r:id="rId3"/>
               </a:rPr>
-              <a:t>caio.souza@prodest.es.gov.br</a:t>
+              <a:t>caio.rocha@prodest.es.gov.br</a:t>
             </a:r>
             <a:endParaRPr lang="pt-BR" dirty="0" smtClean="0"/>
           </a:p>
@@ -6067,7 +6071,12 @@
             <p:ph type="body" sz="quarter" idx="10"/>
           </p:nvPr>
         </p:nvSpPr>
-        <p:spPr/>
+        <p:spPr>
+          <a:xfrm>
+            <a:off x="2597707" y="4375686"/>
+            <a:ext cx="7442032" cy="506207"/>
+          </a:xfrm>
+        </p:spPr>
         <p:txBody>
           <a:bodyPr>
             <a:normAutofit/>
@@ -6076,7 +6085,15 @@
           <a:p>
             <a:r>
               <a:rPr lang="pt-BR" dirty="0" smtClean="0"/>
-              <a:t>Breno Wruck Schneider | Caio Miled R. Souza</a:t>
+              <a:t>Breno Wruck Schneider | Caio Miled </a:t>
+            </a:r>
+            <a:r>
+              <a:rPr lang="pt-BR" dirty="0" smtClean="0"/>
+              <a:t>Rocha </a:t>
+            </a:r>
+            <a:r>
+              <a:rPr lang="pt-BR" dirty="0" smtClean="0"/>
+              <a:t>Souza</a:t>
             </a:r>
           </a:p>
         </p:txBody>
@@ -6801,7 +6818,15 @@
           <a:p>
             <a:r>
               <a:rPr lang="pt-BR" dirty="0" smtClean="0"/>
-              <a:t>Tecnologias a serem utilizadas</a:t>
+              <a:t>Tecnologias e conceitos </a:t>
+            </a:r>
+            <a:r>
+              <a:rPr lang="pt-BR" dirty="0" smtClean="0"/>
+              <a:t>a serem </a:t>
+            </a:r>
+            <a:r>
+              <a:rPr lang="pt-BR" dirty="0" smtClean="0"/>
+              <a:t>utilizados</a:t>
             </a:r>
             <a:endParaRPr lang="pt-BR" dirty="0"/>
           </a:p>
@@ -6890,8 +6915,34 @@
             </a:pPr>
             <a:r>
               <a:rPr lang="pt-BR" dirty="0" smtClean="0"/>
-              <a:t>SQL Server</a:t>
-            </a:r>
+              <a:t>SQL </a:t>
+            </a:r>
+            <a:r>
+              <a:rPr lang="pt-BR" dirty="0" smtClean="0"/>
+              <a:t>Server</a:t>
+            </a:r>
+          </a:p>
+          <a:p>
+            <a:pPr marL="342900" indent="-342900">
+              <a:buFont typeface="Arial" panose="020B0604020202020204" pitchFamily="34" charset="0"/>
+              <a:buChar char="•"/>
+            </a:pPr>
+            <a:r>
+              <a:rPr lang="pt-BR" dirty="0" err="1" smtClean="0"/>
+              <a:t>AutoMapper</a:t>
+            </a:r>
+            <a:endParaRPr lang="pt-BR" dirty="0" smtClean="0"/>
+          </a:p>
+          <a:p>
+            <a:pPr marL="342900" indent="-342900">
+              <a:buFont typeface="Arial" panose="020B0604020202020204" pitchFamily="34" charset="0"/>
+              <a:buChar char="•"/>
+            </a:pPr>
+            <a:r>
+              <a:rPr lang="pt-BR" dirty="0" smtClean="0"/>
+              <a:t>Injeção de dependências</a:t>
+            </a:r>
+            <a:endParaRPr lang="pt-BR" dirty="0" smtClean="0"/>
           </a:p>
           <a:p>
             <a:pPr marL="342900" indent="-342900">
@@ -7656,50 +7707,86 @@
               <a:buChar char="§"/>
             </a:pPr>
             <a:r>
-              <a:rPr lang="pt-BR" dirty="0" err="1" smtClean="0"/>
+              <a:rPr lang="pt-BR" sz="2400" dirty="0" err="1" smtClean="0">
+                <a:latin typeface="Arial" panose="020B0604020202020204" pitchFamily="34" charset="0"/>
+                <a:cs typeface="Arial" panose="020B0604020202020204" pitchFamily="34" charset="0"/>
+              </a:rPr>
               <a:t>Bootstrap</a:t>
             </a:r>
             <a:r>
-              <a:rPr lang="pt-BR" dirty="0" smtClean="0"/>
+              <a:rPr lang="pt-BR" sz="2400" dirty="0" smtClean="0">
+                <a:latin typeface="Arial" panose="020B0604020202020204" pitchFamily="34" charset="0"/>
+                <a:cs typeface="Arial" panose="020B0604020202020204" pitchFamily="34" charset="0"/>
+              </a:rPr>
               <a:t>, </a:t>
             </a:r>
             <a:r>
-              <a:rPr lang="pt-BR" dirty="0" err="1" smtClean="0"/>
+              <a:rPr lang="pt-BR" sz="2400" dirty="0" err="1" smtClean="0">
+                <a:latin typeface="Arial" panose="020B0604020202020204" pitchFamily="34" charset="0"/>
+                <a:cs typeface="Arial" panose="020B0604020202020204" pitchFamily="34" charset="0"/>
+              </a:rPr>
               <a:t>Razor</a:t>
             </a:r>
             <a:r>
-              <a:rPr lang="pt-BR" dirty="0" smtClean="0"/>
+              <a:rPr lang="pt-BR" sz="2400" dirty="0" smtClean="0">
+                <a:latin typeface="Arial" panose="020B0604020202020204" pitchFamily="34" charset="0"/>
+                <a:cs typeface="Arial" panose="020B0604020202020204" pitchFamily="34" charset="0"/>
+              </a:rPr>
               <a:t>, </a:t>
             </a:r>
             <a:r>
-              <a:rPr lang="pt-BR" dirty="0" err="1" smtClean="0"/>
+              <a:rPr lang="pt-BR" sz="2400" dirty="0" err="1" smtClean="0">
+                <a:latin typeface="Arial" panose="020B0604020202020204" pitchFamily="34" charset="0"/>
+                <a:cs typeface="Arial" panose="020B0604020202020204" pitchFamily="34" charset="0"/>
+              </a:rPr>
               <a:t>Nuget</a:t>
             </a:r>
             <a:r>
-              <a:rPr lang="pt-BR" dirty="0" smtClean="0"/>
+              <a:rPr lang="pt-BR" sz="2400" dirty="0" smtClean="0">
+                <a:latin typeface="Arial" panose="020B0604020202020204" pitchFamily="34" charset="0"/>
+                <a:cs typeface="Arial" panose="020B0604020202020204" pitchFamily="34" charset="0"/>
+              </a:rPr>
               <a:t>/</a:t>
             </a:r>
             <a:r>
-              <a:rPr lang="pt-BR" dirty="0" err="1" smtClean="0"/>
+              <a:rPr lang="pt-BR" sz="2400" dirty="0" err="1" smtClean="0">
+                <a:latin typeface="Arial" panose="020B0604020202020204" pitchFamily="34" charset="0"/>
+                <a:cs typeface="Arial" panose="020B0604020202020204" pitchFamily="34" charset="0"/>
+              </a:rPr>
               <a:t>Bower</a:t>
             </a:r>
             <a:r>
-              <a:rPr lang="pt-BR" dirty="0" smtClean="0"/>
+              <a:rPr lang="pt-BR" sz="2400" dirty="0" smtClean="0">
+                <a:latin typeface="Arial" panose="020B0604020202020204" pitchFamily="34" charset="0"/>
+                <a:cs typeface="Arial" panose="020B0604020202020204" pitchFamily="34" charset="0"/>
+              </a:rPr>
               <a:t>, </a:t>
             </a:r>
             <a:r>
-              <a:rPr lang="pt-BR" dirty="0" err="1" smtClean="0"/>
+              <a:rPr lang="pt-BR" sz="2400" dirty="0" err="1" smtClean="0">
+                <a:latin typeface="Arial" panose="020B0604020202020204" pitchFamily="34" charset="0"/>
+                <a:cs typeface="Arial" panose="020B0604020202020204" pitchFamily="34" charset="0"/>
+              </a:rPr>
               <a:t>Entity</a:t>
             </a:r>
             <a:r>
-              <a:rPr lang="pt-BR" dirty="0" smtClean="0"/>
+              <a:rPr lang="pt-BR" sz="2400" dirty="0" smtClean="0">
+                <a:latin typeface="Arial" panose="020B0604020202020204" pitchFamily="34" charset="0"/>
+                <a:cs typeface="Arial" panose="020B0604020202020204" pitchFamily="34" charset="0"/>
+              </a:rPr>
               <a:t> Framework Core, SQL Server, Injeção de dependências, </a:t>
             </a:r>
             <a:r>
-              <a:rPr lang="pt-BR" dirty="0" err="1" smtClean="0"/>
+              <a:rPr lang="pt-BR" sz="2400" dirty="0" err="1" smtClean="0">
+                <a:latin typeface="Arial" panose="020B0604020202020204" pitchFamily="34" charset="0"/>
+                <a:cs typeface="Arial" panose="020B0604020202020204" pitchFamily="34" charset="0"/>
+              </a:rPr>
               <a:t>Git</a:t>
             </a:r>
-            <a:endParaRPr lang="pt-BR" dirty="0" smtClean="0"/>
+            <a:endParaRPr lang="pt-BR" sz="2400" dirty="0" smtClean="0">
+              <a:latin typeface="Arial" panose="020B0604020202020204" pitchFamily="34" charset="0"/>
+              <a:cs typeface="Arial" panose="020B0604020202020204" pitchFamily="34" charset="0"/>
+            </a:endParaRPr>
           </a:p>
           <a:p>
             <a:pPr marL="342900" indent="-342900">
@@ -9042,6 +9129,337 @@
 </p:sld>
 </file>
 
+<file path=ppt/slides/slide35.xml><?xml version="1.0" encoding="utf-8"?>
+<p:sld xmlns:a="http://schemas.openxmlformats.org/drawingml/2006/main" xmlns:r="http://schemas.openxmlformats.org/officeDocument/2006/relationships" xmlns:p="http://schemas.openxmlformats.org/presentationml/2006/main">
+  <p:cSld>
+    <p:spTree>
+      <p:nvGrpSpPr>
+        <p:cNvPr id="1" name=""/>
+        <p:cNvGrpSpPr/>
+        <p:nvPr/>
+      </p:nvGrpSpPr>
+      <p:grpSpPr>
+        <a:xfrm>
+          <a:off x="0" y="0"/>
+          <a:ext cx="0" cy="0"/>
+          <a:chOff x="0" y="0"/>
+          <a:chExt cx="0" cy="0"/>
+        </a:xfrm>
+      </p:grpSpPr>
+      <p:sp>
+        <p:nvSpPr>
+          <p:cNvPr id="2" name="Espaço Reservado para Texto 1"/>
+          <p:cNvSpPr>
+            <a:spLocks noGrp="1"/>
+          </p:cNvSpPr>
+          <p:nvPr>
+            <p:ph type="body" sz="quarter" idx="10"/>
+          </p:nvPr>
+        </p:nvSpPr>
+        <p:spPr/>
+        <p:txBody>
+          <a:bodyPr/>
+          <a:lstStyle/>
+          <a:p>
+            <a:r>
+              <a:rPr lang="pt-BR" dirty="0" smtClean="0"/>
+              <a:t>_Layout Page</a:t>
+            </a:r>
+            <a:endParaRPr lang="pt-BR" dirty="0"/>
+          </a:p>
+        </p:txBody>
+      </p:sp>
+      <p:pic>
+        <p:nvPicPr>
+          <p:cNvPr id="4" name="Imagem 3"/>
+          <p:cNvPicPr>
+            <a:picLocks noChangeAspect="1"/>
+          </p:cNvPicPr>
+          <p:nvPr/>
+        </p:nvPicPr>
+        <p:blipFill>
+          <a:blip r:embed="rId2"/>
+          <a:stretch>
+            <a:fillRect/>
+          </a:stretch>
+        </p:blipFill>
+        <p:spPr>
+          <a:xfrm>
+            <a:off x="2439386" y="914401"/>
+            <a:ext cx="7243378" cy="5290456"/>
+          </a:xfrm>
+          <a:prstGeom prst="rect">
+            <a:avLst/>
+          </a:prstGeom>
+        </p:spPr>
+      </p:pic>
+    </p:spTree>
+    <p:extLst>
+      <p:ext uri="{BB962C8B-B14F-4D97-AF65-F5344CB8AC3E}">
+        <p14:creationId xmlns:p14="http://schemas.microsoft.com/office/powerpoint/2010/main" val="1988328442"/>
+      </p:ext>
+    </p:extLst>
+  </p:cSld>
+  <p:clrMapOvr>
+    <a:masterClrMapping/>
+  </p:clrMapOvr>
+  <p:timing>
+    <p:tnLst>
+      <p:par>
+        <p:cTn id="1" dur="indefinite" restart="never" nodeType="tmRoot"/>
+      </p:par>
+    </p:tnLst>
+  </p:timing>
+</p:sld>
+</file>
+
+<file path=ppt/slides/slide36.xml><?xml version="1.0" encoding="utf-8"?>
+<p:sld xmlns:a="http://schemas.openxmlformats.org/drawingml/2006/main" xmlns:r="http://schemas.openxmlformats.org/officeDocument/2006/relationships" xmlns:p="http://schemas.openxmlformats.org/presentationml/2006/main">
+  <p:cSld>
+    <p:spTree>
+      <p:nvGrpSpPr>
+        <p:cNvPr id="1" name=""/>
+        <p:cNvGrpSpPr/>
+        <p:nvPr/>
+      </p:nvGrpSpPr>
+      <p:grpSpPr>
+        <a:xfrm>
+          <a:off x="0" y="0"/>
+          <a:ext cx="0" cy="0"/>
+          <a:chOff x="0" y="0"/>
+          <a:chExt cx="0" cy="0"/>
+        </a:xfrm>
+      </p:grpSpPr>
+      <p:sp>
+        <p:nvSpPr>
+          <p:cNvPr id="2" name="Espaço Reservado para Texto 1"/>
+          <p:cNvSpPr>
+            <a:spLocks noGrp="1"/>
+          </p:cNvSpPr>
+          <p:nvPr>
+            <p:ph type="body" sz="quarter" idx="10"/>
+          </p:nvPr>
+        </p:nvSpPr>
+        <p:spPr/>
+        <p:txBody>
+          <a:bodyPr/>
+          <a:lstStyle/>
+          <a:p>
+            <a:r>
+              <a:rPr lang="pt-BR" dirty="0" smtClean="0"/>
+              <a:t>Página inicial</a:t>
+            </a:r>
+            <a:endParaRPr lang="pt-BR" dirty="0"/>
+          </a:p>
+        </p:txBody>
+      </p:sp>
+      <p:pic>
+        <p:nvPicPr>
+          <p:cNvPr id="4" name="Imagem 3"/>
+          <p:cNvPicPr>
+            <a:picLocks noChangeAspect="1"/>
+          </p:cNvPicPr>
+          <p:nvPr/>
+        </p:nvPicPr>
+        <p:blipFill>
+          <a:blip r:embed="rId2"/>
+          <a:stretch>
+            <a:fillRect/>
+          </a:stretch>
+        </p:blipFill>
+        <p:spPr>
+          <a:xfrm>
+            <a:off x="1949116" y="1511462"/>
+            <a:ext cx="8223917" cy="1959526"/>
+          </a:xfrm>
+          <a:prstGeom prst="rect">
+            <a:avLst/>
+          </a:prstGeom>
+        </p:spPr>
+      </p:pic>
+    </p:spTree>
+    <p:extLst>
+      <p:ext uri="{BB962C8B-B14F-4D97-AF65-F5344CB8AC3E}">
+        <p14:creationId xmlns:p14="http://schemas.microsoft.com/office/powerpoint/2010/main" val="3569658024"/>
+      </p:ext>
+    </p:extLst>
+  </p:cSld>
+  <p:clrMapOvr>
+    <a:masterClrMapping/>
+  </p:clrMapOvr>
+  <p:timing>
+    <p:tnLst>
+      <p:par>
+        <p:cTn id="1" dur="indefinite" restart="never" nodeType="tmRoot"/>
+      </p:par>
+    </p:tnLst>
+  </p:timing>
+</p:sld>
+</file>
+
+<file path=ppt/slides/slide37.xml><?xml version="1.0" encoding="utf-8"?>
+<p:sld xmlns:a="http://schemas.openxmlformats.org/drawingml/2006/main" xmlns:r="http://schemas.openxmlformats.org/officeDocument/2006/relationships" xmlns:p="http://schemas.openxmlformats.org/presentationml/2006/main">
+  <p:cSld>
+    <p:spTree>
+      <p:nvGrpSpPr>
+        <p:cNvPr id="1" name=""/>
+        <p:cNvGrpSpPr/>
+        <p:nvPr/>
+      </p:nvGrpSpPr>
+      <p:grpSpPr>
+        <a:xfrm>
+          <a:off x="0" y="0"/>
+          <a:ext cx="0" cy="0"/>
+          <a:chOff x="0" y="0"/>
+          <a:chExt cx="0" cy="0"/>
+        </a:xfrm>
+      </p:grpSpPr>
+      <p:sp>
+        <p:nvSpPr>
+          <p:cNvPr id="2" name="Espaço Reservado para Texto 1"/>
+          <p:cNvSpPr>
+            <a:spLocks noGrp="1"/>
+          </p:cNvSpPr>
+          <p:nvPr>
+            <p:ph type="body" sz="quarter" idx="10"/>
+          </p:nvPr>
+        </p:nvSpPr>
+        <p:spPr/>
+        <p:txBody>
+          <a:bodyPr/>
+          <a:lstStyle/>
+          <a:p>
+            <a:r>
+              <a:rPr lang="pt-BR" dirty="0" smtClean="0"/>
+              <a:t>Formulário de confirmação</a:t>
+            </a:r>
+            <a:endParaRPr lang="pt-BR" dirty="0"/>
+          </a:p>
+        </p:txBody>
+      </p:sp>
+      <p:pic>
+        <p:nvPicPr>
+          <p:cNvPr id="4" name="Imagem 3"/>
+          <p:cNvPicPr>
+            <a:picLocks noChangeAspect="1"/>
+          </p:cNvPicPr>
+          <p:nvPr/>
+        </p:nvPicPr>
+        <p:blipFill>
+          <a:blip r:embed="rId2"/>
+          <a:stretch>
+            <a:fillRect/>
+          </a:stretch>
+        </p:blipFill>
+        <p:spPr>
+          <a:xfrm>
+            <a:off x="2408529" y="914401"/>
+            <a:ext cx="7305092" cy="5421234"/>
+          </a:xfrm>
+          <a:prstGeom prst="rect">
+            <a:avLst/>
+          </a:prstGeom>
+        </p:spPr>
+      </p:pic>
+    </p:spTree>
+    <p:extLst>
+      <p:ext uri="{BB962C8B-B14F-4D97-AF65-F5344CB8AC3E}">
+        <p14:creationId xmlns:p14="http://schemas.microsoft.com/office/powerpoint/2010/main" val="3913610773"/>
+      </p:ext>
+    </p:extLst>
+  </p:cSld>
+  <p:clrMapOvr>
+    <a:masterClrMapping/>
+  </p:clrMapOvr>
+  <p:timing>
+    <p:tnLst>
+      <p:par>
+        <p:cTn id="1" dur="indefinite" restart="never" nodeType="tmRoot"/>
+      </p:par>
+    </p:tnLst>
+  </p:timing>
+</p:sld>
+</file>
+
+<file path=ppt/slides/slide38.xml><?xml version="1.0" encoding="utf-8"?>
+<p:sld xmlns:a="http://schemas.openxmlformats.org/drawingml/2006/main" xmlns:r="http://schemas.openxmlformats.org/officeDocument/2006/relationships" xmlns:p="http://schemas.openxmlformats.org/presentationml/2006/main">
+  <p:cSld>
+    <p:spTree>
+      <p:nvGrpSpPr>
+        <p:cNvPr id="1" name=""/>
+        <p:cNvGrpSpPr/>
+        <p:nvPr/>
+      </p:nvGrpSpPr>
+      <p:grpSpPr>
+        <a:xfrm>
+          <a:off x="0" y="0"/>
+          <a:ext cx="0" cy="0"/>
+          <a:chOff x="0" y="0"/>
+          <a:chExt cx="0" cy="0"/>
+        </a:xfrm>
+      </p:grpSpPr>
+      <p:sp>
+        <p:nvSpPr>
+          <p:cNvPr id="2" name="Espaço Reservado para Texto 1"/>
+          <p:cNvSpPr>
+            <a:spLocks noGrp="1"/>
+          </p:cNvSpPr>
+          <p:nvPr>
+            <p:ph type="body" sz="quarter" idx="10"/>
+          </p:nvPr>
+        </p:nvSpPr>
+        <p:spPr/>
+        <p:txBody>
+          <a:bodyPr/>
+          <a:lstStyle/>
+          <a:p>
+            <a:r>
+              <a:rPr lang="pt-BR" dirty="0" smtClean="0"/>
+              <a:t>Página de agradecimento</a:t>
+            </a:r>
+            <a:endParaRPr lang="pt-BR" dirty="0"/>
+          </a:p>
+        </p:txBody>
+      </p:sp>
+      <p:sp>
+        <p:nvSpPr>
+          <p:cNvPr id="3" name="Espaço Reservado para Texto 2"/>
+          <p:cNvSpPr>
+            <a:spLocks noGrp="1"/>
+          </p:cNvSpPr>
+          <p:nvPr>
+            <p:ph type="body" sz="quarter" idx="11"/>
+          </p:nvPr>
+        </p:nvSpPr>
+        <p:spPr/>
+        <p:txBody>
+          <a:bodyPr/>
+          <a:lstStyle/>
+          <a:p>
+            <a:endParaRPr lang="pt-BR" dirty="0"/>
+          </a:p>
+        </p:txBody>
+      </p:sp>
+    </p:spTree>
+    <p:extLst>
+      <p:ext uri="{BB962C8B-B14F-4D97-AF65-F5344CB8AC3E}">
+        <p14:creationId xmlns:p14="http://schemas.microsoft.com/office/powerpoint/2010/main" val="2644516771"/>
+      </p:ext>
+    </p:extLst>
+  </p:cSld>
+  <p:clrMapOvr>
+    <a:masterClrMapping/>
+  </p:clrMapOvr>
+  <p:timing>
+    <p:tnLst>
+      <p:par>
+        <p:cTn id="1" dur="indefinite" restart="never" nodeType="tmRoot"/>
+      </p:par>
+    </p:tnLst>
+  </p:timing>
+</p:sld>
+</file>
+
 <file path=ppt/slides/slide4.xml><?xml version="1.0" encoding="utf-8"?>
 <p:sld xmlns:a="http://schemas.openxmlformats.org/drawingml/2006/main" xmlns:r="http://schemas.openxmlformats.org/officeDocument/2006/relationships" xmlns:p="http://schemas.openxmlformats.org/presentationml/2006/main">
   <p:cSld>

</xml_diff>

<commit_message>
Mudanças no repositório. Tela de lista de presentes.
</commit_message>
<xml_diff>
--- a/workshop-aspnet-core-mvc.pptx
+++ b/workshop-aspnet-core-mvc.pptx
@@ -33,16 +33,27 @@
     <p:sldId id="284" r:id="rId27"/>
     <p:sldId id="285" r:id="rId28"/>
     <p:sldId id="286" r:id="rId29"/>
-    <p:sldId id="287" r:id="rId30"/>
-    <p:sldId id="288" r:id="rId31"/>
-    <p:sldId id="289" r:id="rId32"/>
-    <p:sldId id="290" r:id="rId33"/>
-    <p:sldId id="291" r:id="rId34"/>
-    <p:sldId id="292" r:id="rId35"/>
-    <p:sldId id="293" r:id="rId36"/>
-    <p:sldId id="294" r:id="rId37"/>
-    <p:sldId id="295" r:id="rId38"/>
-    <p:sldId id="296" r:id="rId39"/>
+    <p:sldId id="300" r:id="rId30"/>
+    <p:sldId id="287" r:id="rId31"/>
+    <p:sldId id="298" r:id="rId32"/>
+    <p:sldId id="299" r:id="rId33"/>
+    <p:sldId id="288" r:id="rId34"/>
+    <p:sldId id="289" r:id="rId35"/>
+    <p:sldId id="290" r:id="rId36"/>
+    <p:sldId id="291" r:id="rId37"/>
+    <p:sldId id="292" r:id="rId38"/>
+    <p:sldId id="293" r:id="rId39"/>
+    <p:sldId id="294" r:id="rId40"/>
+    <p:sldId id="295" r:id="rId41"/>
+    <p:sldId id="296" r:id="rId42"/>
+    <p:sldId id="301" r:id="rId43"/>
+    <p:sldId id="302" r:id="rId44"/>
+    <p:sldId id="304" r:id="rId45"/>
+    <p:sldId id="303" r:id="rId46"/>
+    <p:sldId id="305" r:id="rId47"/>
+    <p:sldId id="297" r:id="rId48"/>
+    <p:sldId id="307" r:id="rId49"/>
+    <p:sldId id="306" r:id="rId50"/>
   </p:sldIdLst>
   <p:sldSz cx="12192000" cy="6858000"/>
   <p:notesSz cx="6858000" cy="9144000"/>
@@ -1664,7 +1675,7 @@
             <a:fld id="{B24C654B-750A-47A0-AE34-444BB51CE4F3}" type="datetimeFigureOut">
               <a:rPr lang="pt-BR" smtClean="0"/>
               <a:pPr/>
-              <a:t>21/09/2017</a:t>
+              <a:t>26/09/2017</a:t>
             </a:fld>
             <a:endParaRPr lang="pt-BR"/>
           </a:p>
@@ -6085,15 +6096,7 @@
           <a:p>
             <a:r>
               <a:rPr lang="pt-BR" dirty="0" smtClean="0"/>
-              <a:t>Breno Wruck Schneider | Caio Miled </a:t>
-            </a:r>
-            <a:r>
-              <a:rPr lang="pt-BR" dirty="0" smtClean="0"/>
-              <a:t>Rocha </a:t>
-            </a:r>
-            <a:r>
-              <a:rPr lang="pt-BR" dirty="0" smtClean="0"/>
-              <a:t>Souza</a:t>
+              <a:t>Breno Wruck Schneider | Caio Miled Rocha Souza</a:t>
             </a:r>
           </a:p>
         </p:txBody>
@@ -6703,7 +6706,7 @@
             </a:pPr>
             <a:r>
               <a:rPr lang="pt-BR" sz="2000" dirty="0" smtClean="0"/>
-              <a:t>Página inicial com fotos e detalhes da festa</a:t>
+              <a:t>Página inicial com detalhes da festa e botão para o formulário de confirmação de presença</a:t>
             </a:r>
           </a:p>
           <a:p>
@@ -6759,8 +6762,13 @@
             </a:pPr>
             <a:r>
               <a:rPr lang="pt-BR" sz="2000" dirty="0" smtClean="0"/>
-              <a:t>Página de agradecimento após confirmação da presença</a:t>
-            </a:r>
+              <a:t>Página de agradecimento após confirmação da presença com um botão para a página da lista </a:t>
+            </a:r>
+            <a:r>
+              <a:rPr lang="pt-BR" sz="2000" smtClean="0"/>
+              <a:t>de confirmados</a:t>
+            </a:r>
+            <a:endParaRPr lang="pt-BR" sz="2000" dirty="0" smtClean="0"/>
           </a:p>
         </p:txBody>
       </p:sp>
@@ -6818,15 +6826,7 @@
           <a:p>
             <a:r>
               <a:rPr lang="pt-BR" dirty="0" smtClean="0"/>
-              <a:t>Tecnologias e conceitos </a:t>
-            </a:r>
-            <a:r>
-              <a:rPr lang="pt-BR" dirty="0" smtClean="0"/>
-              <a:t>a serem </a:t>
-            </a:r>
-            <a:r>
-              <a:rPr lang="pt-BR" dirty="0" smtClean="0"/>
-              <a:t>utilizados</a:t>
+              <a:t>Tecnologias e conceitos a serem utilizados</a:t>
             </a:r>
             <a:endParaRPr lang="pt-BR" dirty="0"/>
           </a:p>
@@ -6915,11 +6915,7 @@
             </a:pPr>
             <a:r>
               <a:rPr lang="pt-BR" dirty="0" smtClean="0"/>
-              <a:t>SQL </a:t>
-            </a:r>
-            <a:r>
-              <a:rPr lang="pt-BR" dirty="0" smtClean="0"/>
-              <a:t>Server</a:t>
+              <a:t>SQL Server</a:t>
             </a:r>
           </a:p>
           <a:p>
@@ -6942,7 +6938,6 @@
               <a:rPr lang="pt-BR" dirty="0" smtClean="0"/>
               <a:t>Injeção de dependências</a:t>
             </a:r>
-            <a:endParaRPr lang="pt-BR" dirty="0" smtClean="0"/>
           </a:p>
           <a:p>
             <a:pPr marL="342900" indent="-342900">
@@ -7546,16 +7541,183 @@
           <a:lstStyle/>
           <a:p>
             <a:r>
-              <a:rPr lang="pt-BR" dirty="0" smtClean="0"/>
-              <a:t>Validação do formulário</a:t>
-            </a:r>
+              <a:rPr lang="pt-BR" dirty="0" err="1" smtClean="0"/>
+              <a:t>ViewBag</a:t>
+            </a:r>
+            <a:r>
+              <a:rPr lang="pt-BR" dirty="0" smtClean="0"/>
+              <a:t> e </a:t>
+            </a:r>
+            <a:r>
+              <a:rPr lang="pt-BR" dirty="0" err="1" smtClean="0"/>
+              <a:t>ViewData</a:t>
+            </a:r>
+            <a:endParaRPr lang="pt-BR" dirty="0"/>
+          </a:p>
+        </p:txBody>
+      </p:sp>
+      <p:sp>
+        <p:nvSpPr>
+          <p:cNvPr id="3" name="Espaço Reservado para Texto 2"/>
+          <p:cNvSpPr>
+            <a:spLocks noGrp="1"/>
+          </p:cNvSpPr>
+          <p:nvPr>
+            <p:ph type="body" sz="quarter" idx="11"/>
+          </p:nvPr>
+        </p:nvSpPr>
+        <p:spPr/>
+        <p:txBody>
+          <a:bodyPr/>
+          <a:lstStyle/>
+          <a:p>
+            <a:pPr marL="342900" indent="-342900">
+              <a:buFont typeface="Arial" panose="020B0604020202020204" pitchFamily="34" charset="0"/>
+              <a:buChar char="•"/>
+            </a:pPr>
+            <a:r>
+              <a:rPr lang="pt-BR" dirty="0" smtClean="0"/>
+              <a:t>Transfere informações do </a:t>
+            </a:r>
+            <a:r>
+              <a:rPr lang="pt-BR" dirty="0" err="1" smtClean="0"/>
+              <a:t>Controller</a:t>
+            </a:r>
+            <a:r>
+              <a:rPr lang="pt-BR" dirty="0" smtClean="0"/>
+              <a:t> para a </a:t>
+            </a:r>
+            <a:r>
+              <a:rPr lang="pt-BR" dirty="0" err="1" smtClean="0"/>
+              <a:t>View</a:t>
+            </a:r>
+            <a:endParaRPr lang="pt-BR" dirty="0" smtClean="0"/>
+          </a:p>
+          <a:p>
+            <a:pPr marL="342900" indent="-342900">
+              <a:buFont typeface="Arial" panose="020B0604020202020204" pitchFamily="34" charset="0"/>
+              <a:buChar char="•"/>
+            </a:pPr>
+            <a:r>
+              <a:rPr lang="pt-BR" dirty="0" err="1" smtClean="0"/>
+              <a:t>ViewBag</a:t>
+            </a:r>
+            <a:r>
+              <a:rPr lang="pt-BR" dirty="0" smtClean="0"/>
+              <a:t> é um objeto dinâmico</a:t>
+            </a:r>
+          </a:p>
+          <a:p>
+            <a:pPr marL="342900" indent="-342900">
+              <a:buFont typeface="Arial" panose="020B0604020202020204" pitchFamily="34" charset="0"/>
+              <a:buChar char="•"/>
+            </a:pPr>
+            <a:r>
+              <a:rPr lang="pt-BR" dirty="0" err="1" smtClean="0"/>
+              <a:t>ViewData</a:t>
+            </a:r>
+            <a:r>
+              <a:rPr lang="pt-BR" dirty="0" smtClean="0"/>
+              <a:t> é um dicionário (</a:t>
+            </a:r>
+            <a:r>
+              <a:rPr lang="pt-BR" dirty="0" err="1" smtClean="0"/>
+              <a:t>key</a:t>
+            </a:r>
+            <a:r>
+              <a:rPr lang="pt-BR" dirty="0" smtClean="0"/>
+              <a:t>, </a:t>
+            </a:r>
+            <a:r>
+              <a:rPr lang="pt-BR" dirty="0" err="1" smtClean="0"/>
+              <a:t>value</a:t>
+            </a:r>
+            <a:r>
+              <a:rPr lang="pt-BR" dirty="0" smtClean="0"/>
+              <a:t> </a:t>
+            </a:r>
+            <a:r>
+              <a:rPr lang="pt-BR" dirty="0" err="1" smtClean="0"/>
+              <a:t>pair</a:t>
+            </a:r>
+            <a:r>
+              <a:rPr lang="pt-BR" dirty="0" smtClean="0"/>
+              <a:t>)</a:t>
+            </a:r>
+          </a:p>
+          <a:p>
+            <a:pPr marL="342900" indent="-342900">
+              <a:buFont typeface="Arial" panose="020B0604020202020204" pitchFamily="34" charset="0"/>
+              <a:buChar char="•"/>
+            </a:pPr>
+            <a:r>
+              <a:rPr lang="pt-BR" dirty="0" smtClean="0"/>
+              <a:t>Para objetos complexos, é necessário utilizar </a:t>
+            </a:r>
+            <a:r>
+              <a:rPr lang="pt-BR" dirty="0" err="1" smtClean="0"/>
+              <a:t>type</a:t>
+            </a:r>
+            <a:r>
+              <a:rPr lang="pt-BR" dirty="0" smtClean="0"/>
+              <a:t> </a:t>
+            </a:r>
+            <a:r>
+              <a:rPr lang="pt-BR" dirty="0" err="1" smtClean="0"/>
+              <a:t>casting</a:t>
+            </a:r>
+            <a:r>
+              <a:rPr lang="pt-BR" dirty="0" smtClean="0"/>
+              <a:t> com </a:t>
+            </a:r>
+            <a:r>
+              <a:rPr lang="pt-BR" dirty="0" err="1" smtClean="0"/>
+              <a:t>ViewData</a:t>
+            </a:r>
+            <a:r>
+              <a:rPr lang="pt-BR" dirty="0" smtClean="0"/>
+              <a:t> </a:t>
+            </a:r>
+          </a:p>
+          <a:p>
+            <a:pPr marL="342900" indent="-342900">
+              <a:buFont typeface="Arial" panose="020B0604020202020204" pitchFamily="34" charset="0"/>
+              <a:buChar char="•"/>
+            </a:pPr>
+            <a:r>
+              <a:rPr lang="pt-BR" dirty="0" smtClean="0"/>
+              <a:t>Performance de </a:t>
+            </a:r>
+            <a:r>
+              <a:rPr lang="pt-BR" dirty="0" err="1" smtClean="0"/>
+              <a:t>ViewData</a:t>
+            </a:r>
+            <a:r>
+              <a:rPr lang="pt-BR" dirty="0" smtClean="0"/>
+              <a:t> é superior.</a:t>
+            </a:r>
+          </a:p>
+          <a:p>
+            <a:pPr marL="342900" indent="-342900">
+              <a:buFont typeface="Arial" panose="020B0604020202020204" pitchFamily="34" charset="0"/>
+              <a:buChar char="•"/>
+            </a:pPr>
+            <a:r>
+              <a:rPr lang="pt-BR" dirty="0" smtClean="0"/>
+              <a:t>Sintaxe: </a:t>
+            </a:r>
+          </a:p>
+          <a:p>
+            <a:endParaRPr lang="pt-BR" dirty="0" smtClean="0"/>
+          </a:p>
+          <a:p>
             <a:endParaRPr lang="pt-BR" dirty="0"/>
           </a:p>
         </p:txBody>
       </p:sp>
       <p:pic>
         <p:nvPicPr>
-          <p:cNvPr id="4" name="Imagem 3"/>
+          <p:cNvPr id="5" name="Imagem 4"/>
           <p:cNvPicPr>
             <a:picLocks noChangeAspect="1"/>
           </p:cNvPicPr>
@@ -7569,8 +7731,8 @@
         </p:blipFill>
         <p:spPr>
           <a:xfrm>
-            <a:off x="2604689" y="1208615"/>
-            <a:ext cx="6912772" cy="4243917"/>
+            <a:off x="1769608" y="3307215"/>
+            <a:ext cx="4066532" cy="619806"/>
           </a:xfrm>
           <a:prstGeom prst="rect">
             <a:avLst/>
@@ -7580,20 +7742,13 @@
     </p:spTree>
     <p:extLst>
       <p:ext uri="{BB962C8B-B14F-4D97-AF65-F5344CB8AC3E}">
-        <p14:creationId xmlns:p14="http://schemas.microsoft.com/office/powerpoint/2010/main" val="960006403"/>
+        <p14:creationId xmlns:p14="http://schemas.microsoft.com/office/powerpoint/2010/main" val="1173644386"/>
       </p:ext>
     </p:extLst>
   </p:cSld>
   <p:clrMapOvr>
     <a:masterClrMapping/>
   </p:clrMapOvr>
-  <p:timing>
-    <p:tnLst>
-      <p:par>
-        <p:cTn id="1" dur="indefinite" restart="never" nodeType="tmRoot"/>
-      </p:par>
-    </p:tnLst>
-  </p:timing>
 </p:sld>
 </file>
 
@@ -7851,6 +8006,358 @@
           <a:p>
             <a:r>
               <a:rPr lang="pt-BR" dirty="0" smtClean="0"/>
+              <a:t>Validação do formulário</a:t>
+            </a:r>
+            <a:endParaRPr lang="pt-BR" dirty="0"/>
+          </a:p>
+        </p:txBody>
+      </p:sp>
+      <p:pic>
+        <p:nvPicPr>
+          <p:cNvPr id="4" name="Imagem 3"/>
+          <p:cNvPicPr>
+            <a:picLocks noChangeAspect="1"/>
+          </p:cNvPicPr>
+          <p:nvPr/>
+        </p:nvPicPr>
+        <p:blipFill>
+          <a:blip r:embed="rId2"/>
+          <a:stretch>
+            <a:fillRect/>
+          </a:stretch>
+        </p:blipFill>
+        <p:spPr>
+          <a:xfrm>
+            <a:off x="335021" y="1020836"/>
+            <a:ext cx="6489192" cy="3983871"/>
+          </a:xfrm>
+          <a:prstGeom prst="rect">
+            <a:avLst/>
+          </a:prstGeom>
+        </p:spPr>
+      </p:pic>
+      <p:pic>
+        <p:nvPicPr>
+          <p:cNvPr id="3" name="Imagem 2"/>
+          <p:cNvPicPr>
+            <a:picLocks noChangeAspect="1"/>
+          </p:cNvPicPr>
+          <p:nvPr/>
+        </p:nvPicPr>
+        <p:blipFill>
+          <a:blip r:embed="rId3"/>
+          <a:stretch>
+            <a:fillRect/>
+          </a:stretch>
+        </p:blipFill>
+        <p:spPr>
+          <a:xfrm>
+            <a:off x="7200899" y="1020836"/>
+            <a:ext cx="3363687" cy="201347"/>
+          </a:xfrm>
+          <a:prstGeom prst="rect">
+            <a:avLst/>
+          </a:prstGeom>
+        </p:spPr>
+      </p:pic>
+      <p:pic>
+        <p:nvPicPr>
+          <p:cNvPr id="6" name="Imagem 5"/>
+          <p:cNvPicPr>
+            <a:picLocks noChangeAspect="1"/>
+          </p:cNvPicPr>
+          <p:nvPr/>
+        </p:nvPicPr>
+        <p:blipFill>
+          <a:blip r:embed="rId4"/>
+          <a:stretch>
+            <a:fillRect/>
+          </a:stretch>
+        </p:blipFill>
+        <p:spPr>
+          <a:xfrm>
+            <a:off x="7200899" y="1328619"/>
+            <a:ext cx="3363687" cy="599818"/>
+          </a:xfrm>
+          <a:prstGeom prst="rect">
+            <a:avLst/>
+          </a:prstGeom>
+        </p:spPr>
+      </p:pic>
+    </p:spTree>
+    <p:extLst>
+      <p:ext uri="{BB962C8B-B14F-4D97-AF65-F5344CB8AC3E}">
+        <p14:creationId xmlns:p14="http://schemas.microsoft.com/office/powerpoint/2010/main" val="960006403"/>
+      </p:ext>
+    </p:extLst>
+  </p:cSld>
+  <p:clrMapOvr>
+    <a:masterClrMapping/>
+  </p:clrMapOvr>
+  <p:timing>
+    <p:tnLst>
+      <p:par>
+        <p:cTn id="1" dur="indefinite" restart="never" nodeType="tmRoot"/>
+      </p:par>
+    </p:tnLst>
+  </p:timing>
+</p:sld>
+</file>
+
+<file path=ppt/slides/slide31.xml><?xml version="1.0" encoding="utf-8"?>
+<p:sld xmlns:a="http://schemas.openxmlformats.org/drawingml/2006/main" xmlns:r="http://schemas.openxmlformats.org/officeDocument/2006/relationships" xmlns:p="http://schemas.openxmlformats.org/presentationml/2006/main">
+  <p:cSld>
+    <p:spTree>
+      <p:nvGrpSpPr>
+        <p:cNvPr id="1" name=""/>
+        <p:cNvGrpSpPr/>
+        <p:nvPr/>
+      </p:nvGrpSpPr>
+      <p:grpSpPr>
+        <a:xfrm>
+          <a:off x="0" y="0"/>
+          <a:ext cx="0" cy="0"/>
+          <a:chOff x="0" y="0"/>
+          <a:chExt cx="0" cy="0"/>
+        </a:xfrm>
+      </p:grpSpPr>
+      <p:sp>
+        <p:nvSpPr>
+          <p:cNvPr id="2" name="Espaço Reservado para Texto 1"/>
+          <p:cNvSpPr>
+            <a:spLocks noGrp="1"/>
+          </p:cNvSpPr>
+          <p:nvPr>
+            <p:ph type="body" sz="quarter" idx="10"/>
+          </p:nvPr>
+        </p:nvSpPr>
+        <p:spPr/>
+        <p:txBody>
+          <a:bodyPr/>
+          <a:lstStyle/>
+          <a:p>
+            <a:r>
+              <a:rPr lang="pt-BR" dirty="0" err="1" smtClean="0"/>
+              <a:t>ModelState</a:t>
+            </a:r>
+            <a:endParaRPr lang="pt-BR" dirty="0"/>
+          </a:p>
+        </p:txBody>
+      </p:sp>
+      <p:sp>
+        <p:nvSpPr>
+          <p:cNvPr id="4" name="Espaço Reservado para Texto 3"/>
+          <p:cNvSpPr>
+            <a:spLocks noGrp="1"/>
+          </p:cNvSpPr>
+          <p:nvPr>
+            <p:ph type="body" sz="quarter" idx="11"/>
+          </p:nvPr>
+        </p:nvSpPr>
+        <p:spPr/>
+        <p:txBody>
+          <a:bodyPr/>
+          <a:lstStyle/>
+          <a:p>
+            <a:pPr marL="342900" indent="-342900">
+              <a:buFont typeface="Arial" panose="020B0604020202020204" pitchFamily="34" charset="0"/>
+              <a:buChar char="•"/>
+            </a:pPr>
+            <a:r>
+              <a:rPr lang="pt-BR" dirty="0" smtClean="0"/>
+              <a:t>Propriedade da classe </a:t>
+            </a:r>
+            <a:r>
+              <a:rPr lang="pt-BR" dirty="0" err="1" smtClean="0"/>
+              <a:t>Controller</a:t>
+            </a:r>
+            <a:endParaRPr lang="pt-BR" dirty="0"/>
+          </a:p>
+          <a:p>
+            <a:pPr marL="342900" indent="-342900">
+              <a:buFont typeface="Arial" panose="020B0604020202020204" pitchFamily="34" charset="0"/>
+              <a:buChar char="•"/>
+            </a:pPr>
+            <a:r>
+              <a:rPr lang="pt-BR" dirty="0" smtClean="0"/>
+              <a:t>Controla o estado do </a:t>
+            </a:r>
+            <a:r>
+              <a:rPr lang="pt-BR" dirty="0" err="1" smtClean="0"/>
+              <a:t>model</a:t>
+            </a:r>
+            <a:r>
+              <a:rPr lang="pt-BR" dirty="0" smtClean="0"/>
+              <a:t> </a:t>
+            </a:r>
+            <a:r>
+              <a:rPr lang="pt-BR" dirty="0" err="1" smtClean="0"/>
+              <a:t>binding</a:t>
+            </a:r>
+            <a:endParaRPr lang="pt-BR" dirty="0" smtClean="0"/>
+          </a:p>
+          <a:p>
+            <a:pPr marL="342900" indent="-342900">
+              <a:buFont typeface="Arial" panose="020B0604020202020204" pitchFamily="34" charset="0"/>
+              <a:buChar char="•"/>
+            </a:pPr>
+            <a:r>
+              <a:rPr lang="pt-BR" dirty="0" smtClean="0"/>
+              <a:t>Utilizado juntamente </a:t>
+            </a:r>
+            <a:r>
+              <a:rPr lang="pt-BR" dirty="0" err="1" smtClean="0"/>
+              <a:t>DataAnnotations</a:t>
+            </a:r>
+            <a:endParaRPr lang="pt-BR" dirty="0" smtClean="0"/>
+          </a:p>
+          <a:p>
+            <a:pPr marL="342900" indent="-342900">
+              <a:buFont typeface="Arial" panose="020B0604020202020204" pitchFamily="34" charset="0"/>
+              <a:buChar char="•"/>
+            </a:pPr>
+            <a:r>
+              <a:rPr lang="pt-BR" dirty="0" smtClean="0"/>
+              <a:t>Pode ser utilizado para validações específicas de negócio</a:t>
+            </a:r>
+          </a:p>
+          <a:p>
+            <a:pPr marL="342900" indent="-342900">
+              <a:buFont typeface="Arial" panose="020B0604020202020204" pitchFamily="34" charset="0"/>
+              <a:buChar char="•"/>
+            </a:pPr>
+            <a:endParaRPr lang="pt-BR" dirty="0"/>
+          </a:p>
+        </p:txBody>
+      </p:sp>
+    </p:spTree>
+    <p:extLst>
+      <p:ext uri="{BB962C8B-B14F-4D97-AF65-F5344CB8AC3E}">
+        <p14:creationId xmlns:p14="http://schemas.microsoft.com/office/powerpoint/2010/main" val="1109594319"/>
+      </p:ext>
+    </p:extLst>
+  </p:cSld>
+  <p:clrMapOvr>
+    <a:masterClrMapping/>
+  </p:clrMapOvr>
+</p:sld>
+</file>
+
+<file path=ppt/slides/slide32.xml><?xml version="1.0" encoding="utf-8"?>
+<p:sld xmlns:a="http://schemas.openxmlformats.org/drawingml/2006/main" xmlns:r="http://schemas.openxmlformats.org/officeDocument/2006/relationships" xmlns:p="http://schemas.openxmlformats.org/presentationml/2006/main">
+  <p:cSld>
+    <p:spTree>
+      <p:nvGrpSpPr>
+        <p:cNvPr id="1" name=""/>
+        <p:cNvGrpSpPr/>
+        <p:nvPr/>
+      </p:nvGrpSpPr>
+      <p:grpSpPr>
+        <a:xfrm>
+          <a:off x="0" y="0"/>
+          <a:ext cx="0" cy="0"/>
+          <a:chOff x="0" y="0"/>
+          <a:chExt cx="0" cy="0"/>
+        </a:xfrm>
+      </p:grpSpPr>
+      <p:sp>
+        <p:nvSpPr>
+          <p:cNvPr id="2" name="Espaço Reservado para Texto 1"/>
+          <p:cNvSpPr>
+            <a:spLocks noGrp="1"/>
+          </p:cNvSpPr>
+          <p:nvPr>
+            <p:ph type="body" sz="quarter" idx="10"/>
+          </p:nvPr>
+        </p:nvSpPr>
+        <p:spPr/>
+        <p:txBody>
+          <a:bodyPr/>
+          <a:lstStyle/>
+          <a:p>
+            <a:r>
+              <a:rPr lang="pt-BR" dirty="0" smtClean="0"/>
+              <a:t>Validação no </a:t>
+            </a:r>
+            <a:r>
+              <a:rPr lang="pt-BR" dirty="0" err="1" smtClean="0"/>
+              <a:t>Controller</a:t>
+            </a:r>
+            <a:endParaRPr lang="pt-BR" dirty="0"/>
+          </a:p>
+        </p:txBody>
+      </p:sp>
+      <p:pic>
+        <p:nvPicPr>
+          <p:cNvPr id="4" name="Imagem 3"/>
+          <p:cNvPicPr>
+            <a:picLocks noChangeAspect="1"/>
+          </p:cNvPicPr>
+          <p:nvPr/>
+        </p:nvPicPr>
+        <p:blipFill>
+          <a:blip r:embed="rId2"/>
+          <a:stretch>
+            <a:fillRect/>
+          </a:stretch>
+        </p:blipFill>
+        <p:spPr>
+          <a:xfrm>
+            <a:off x="3695019" y="2299606"/>
+            <a:ext cx="4888676" cy="2264229"/>
+          </a:xfrm>
+          <a:prstGeom prst="rect">
+            <a:avLst/>
+          </a:prstGeom>
+        </p:spPr>
+      </p:pic>
+    </p:spTree>
+    <p:extLst>
+      <p:ext uri="{BB962C8B-B14F-4D97-AF65-F5344CB8AC3E}">
+        <p14:creationId xmlns:p14="http://schemas.microsoft.com/office/powerpoint/2010/main" val="2388099965"/>
+      </p:ext>
+    </p:extLst>
+  </p:cSld>
+  <p:clrMapOvr>
+    <a:masterClrMapping/>
+  </p:clrMapOvr>
+</p:sld>
+</file>
+
+<file path=ppt/slides/slide33.xml><?xml version="1.0" encoding="utf-8"?>
+<p:sld xmlns:a="http://schemas.openxmlformats.org/drawingml/2006/main" xmlns:r="http://schemas.openxmlformats.org/officeDocument/2006/relationships" xmlns:p="http://schemas.openxmlformats.org/presentationml/2006/main">
+  <p:cSld>
+    <p:spTree>
+      <p:nvGrpSpPr>
+        <p:cNvPr id="1" name=""/>
+        <p:cNvGrpSpPr/>
+        <p:nvPr/>
+      </p:nvGrpSpPr>
+      <p:grpSpPr>
+        <a:xfrm>
+          <a:off x="0" y="0"/>
+          <a:ext cx="0" cy="0"/>
+          <a:chOff x="0" y="0"/>
+          <a:chExt cx="0" cy="0"/>
+        </a:xfrm>
+      </p:grpSpPr>
+      <p:sp>
+        <p:nvSpPr>
+          <p:cNvPr id="2" name="Espaço Reservado para Texto 1"/>
+          <p:cNvSpPr>
+            <a:spLocks noGrp="1"/>
+          </p:cNvSpPr>
+          <p:nvPr>
+            <p:ph type="body" sz="quarter" idx="10"/>
+          </p:nvPr>
+        </p:nvSpPr>
+        <p:spPr/>
+        <p:txBody>
+          <a:bodyPr/>
+          <a:lstStyle/>
+          <a:p>
+            <a:r>
+              <a:rPr lang="pt-BR" dirty="0" smtClean="0"/>
               <a:t>Gerenciador de pacotes </a:t>
             </a:r>
             <a:r>
@@ -7905,7 +8412,7 @@
 </p:sld>
 </file>
 
-<file path=ppt/slides/slide31.xml><?xml version="1.0" encoding="utf-8"?>
+<file path=ppt/slides/slide34.xml><?xml version="1.0" encoding="utf-8"?>
 <p:sld xmlns:a="http://schemas.openxmlformats.org/drawingml/2006/main" xmlns:r="http://schemas.openxmlformats.org/officeDocument/2006/relationships" xmlns:p="http://schemas.openxmlformats.org/presentationml/2006/main">
   <p:cSld>
     <p:spTree>
@@ -8445,7 +8952,7 @@
 </p:sld>
 </file>
 
-<file path=ppt/slides/slide32.xml><?xml version="1.0" encoding="utf-8"?>
+<file path=ppt/slides/slide35.xml><?xml version="1.0" encoding="utf-8"?>
 <p:sld xmlns:a="http://schemas.openxmlformats.org/drawingml/2006/main" xmlns:r="http://schemas.openxmlformats.org/officeDocument/2006/relationships" xmlns:p="http://schemas.openxmlformats.org/presentationml/2006/main">
   <p:cSld>
     <p:spTree>
@@ -8589,7 +9096,7 @@
 </p:sld>
 </file>
 
-<file path=ppt/slides/slide33.xml><?xml version="1.0" encoding="utf-8"?>
+<file path=ppt/slides/slide36.xml><?xml version="1.0" encoding="utf-8"?>
 <p:sld xmlns:a="http://schemas.openxmlformats.org/drawingml/2006/main" xmlns:r="http://schemas.openxmlformats.org/officeDocument/2006/relationships" xmlns:p="http://schemas.openxmlformats.org/presentationml/2006/main">
   <p:cSld>
     <p:spTree>
@@ -8976,327 +9483,6 @@
 </p:sld>
 </file>
 
-<file path=ppt/slides/slide34.xml><?xml version="1.0" encoding="utf-8"?>
-<p:sld xmlns:a="http://schemas.openxmlformats.org/drawingml/2006/main" xmlns:r="http://schemas.openxmlformats.org/officeDocument/2006/relationships" xmlns:p="http://schemas.openxmlformats.org/presentationml/2006/main">
-  <p:cSld>
-    <p:spTree>
-      <p:nvGrpSpPr>
-        <p:cNvPr id="1" name=""/>
-        <p:cNvGrpSpPr/>
-        <p:nvPr/>
-      </p:nvGrpSpPr>
-      <p:grpSpPr>
-        <a:xfrm>
-          <a:off x="0" y="0"/>
-          <a:ext cx="0" cy="0"/>
-          <a:chOff x="0" y="0"/>
-          <a:chExt cx="0" cy="0"/>
-        </a:xfrm>
-      </p:grpSpPr>
-      <p:sp>
-        <p:nvSpPr>
-          <p:cNvPr id="2" name="Espaço Reservado para Texto 1"/>
-          <p:cNvSpPr>
-            <a:spLocks noGrp="1"/>
-          </p:cNvSpPr>
-          <p:nvPr>
-            <p:ph type="body" sz="quarter" idx="10"/>
-          </p:nvPr>
-        </p:nvSpPr>
-        <p:spPr/>
-        <p:txBody>
-          <a:bodyPr/>
-          <a:lstStyle/>
-          <a:p>
-            <a:r>
-              <a:rPr lang="pt-BR" dirty="0" smtClean="0"/>
-              <a:t>Grid Classes</a:t>
-            </a:r>
-            <a:endParaRPr lang="pt-BR" dirty="0"/>
-          </a:p>
-        </p:txBody>
-      </p:sp>
-      <p:sp>
-        <p:nvSpPr>
-          <p:cNvPr id="3" name="Espaço Reservado para Texto 2"/>
-          <p:cNvSpPr>
-            <a:spLocks noGrp="1"/>
-          </p:cNvSpPr>
-          <p:nvPr>
-            <p:ph type="body" sz="quarter" idx="11"/>
-          </p:nvPr>
-        </p:nvSpPr>
-        <p:spPr/>
-        <p:txBody>
-          <a:bodyPr/>
-          <a:lstStyle/>
-          <a:p>
-            <a:pPr marL="342900" indent="-342900">
-              <a:buFont typeface="Arial" panose="020B0604020202020204" pitchFamily="34" charset="0"/>
-              <a:buChar char="•"/>
-            </a:pPr>
-            <a:r>
-              <a:rPr lang="pt-BR" dirty="0" err="1" smtClean="0"/>
-              <a:t>xs</a:t>
-            </a:r>
-            <a:r>
-              <a:rPr lang="pt-BR" dirty="0" smtClean="0"/>
-              <a:t> </a:t>
-            </a:r>
-            <a:r>
-              <a:rPr lang="pt-BR" dirty="0"/>
-              <a:t>:</a:t>
-            </a:r>
-            <a:r>
-              <a:rPr lang="pt-BR" dirty="0" smtClean="0"/>
-              <a:t> &lt; 768px (smartphones)</a:t>
-            </a:r>
-          </a:p>
-          <a:p>
-            <a:pPr marL="342900" indent="-342900">
-              <a:buFont typeface="Arial" panose="020B0604020202020204" pitchFamily="34" charset="0"/>
-              <a:buChar char="•"/>
-            </a:pPr>
-            <a:r>
-              <a:rPr lang="pt-BR" dirty="0" err="1" smtClean="0"/>
-              <a:t>sm</a:t>
-            </a:r>
-            <a:r>
-              <a:rPr lang="pt-BR" dirty="0" smtClean="0"/>
-              <a:t> : &gt;= 768px (</a:t>
-            </a:r>
-            <a:r>
-              <a:rPr lang="pt-BR" dirty="0" err="1" smtClean="0"/>
-              <a:t>tablets</a:t>
-            </a:r>
-            <a:r>
-              <a:rPr lang="pt-BR" dirty="0" smtClean="0"/>
-              <a:t>)</a:t>
-            </a:r>
-          </a:p>
-          <a:p>
-            <a:pPr marL="342900" indent="-342900">
-              <a:buFont typeface="Arial" panose="020B0604020202020204" pitchFamily="34" charset="0"/>
-              <a:buChar char="•"/>
-            </a:pPr>
-            <a:r>
-              <a:rPr lang="pt-BR" dirty="0" err="1"/>
-              <a:t>m</a:t>
-            </a:r>
-            <a:r>
-              <a:rPr lang="pt-BR" dirty="0" err="1" smtClean="0"/>
-              <a:t>d</a:t>
-            </a:r>
-            <a:r>
-              <a:rPr lang="pt-BR" dirty="0" smtClean="0"/>
-              <a:t> : &gt;= 992px (monitores)</a:t>
-            </a:r>
-          </a:p>
-          <a:p>
-            <a:pPr marL="342900" indent="-342900">
-              <a:buFont typeface="Arial" panose="020B0604020202020204" pitchFamily="34" charset="0"/>
-              <a:buChar char="•"/>
-            </a:pPr>
-            <a:r>
-              <a:rPr lang="pt-BR" dirty="0" err="1" smtClean="0"/>
-              <a:t>lg</a:t>
-            </a:r>
-            <a:r>
-              <a:rPr lang="pt-BR" dirty="0" smtClean="0"/>
-              <a:t> : &gt;= 1200px (monitores com resoluções maiores)</a:t>
-            </a:r>
-            <a:endParaRPr lang="pt-BR" dirty="0"/>
-          </a:p>
-        </p:txBody>
-      </p:sp>
-    </p:spTree>
-    <p:extLst>
-      <p:ext uri="{BB962C8B-B14F-4D97-AF65-F5344CB8AC3E}">
-        <p14:creationId xmlns:p14="http://schemas.microsoft.com/office/powerpoint/2010/main" val="1497074926"/>
-      </p:ext>
-    </p:extLst>
-  </p:cSld>
-  <p:clrMapOvr>
-    <a:masterClrMapping/>
-  </p:clrMapOvr>
-  <p:timing>
-    <p:tnLst>
-      <p:par>
-        <p:cTn id="1" dur="indefinite" restart="never" nodeType="tmRoot"/>
-      </p:par>
-    </p:tnLst>
-  </p:timing>
-</p:sld>
-</file>
-
-<file path=ppt/slides/slide35.xml><?xml version="1.0" encoding="utf-8"?>
-<p:sld xmlns:a="http://schemas.openxmlformats.org/drawingml/2006/main" xmlns:r="http://schemas.openxmlformats.org/officeDocument/2006/relationships" xmlns:p="http://schemas.openxmlformats.org/presentationml/2006/main">
-  <p:cSld>
-    <p:spTree>
-      <p:nvGrpSpPr>
-        <p:cNvPr id="1" name=""/>
-        <p:cNvGrpSpPr/>
-        <p:nvPr/>
-      </p:nvGrpSpPr>
-      <p:grpSpPr>
-        <a:xfrm>
-          <a:off x="0" y="0"/>
-          <a:ext cx="0" cy="0"/>
-          <a:chOff x="0" y="0"/>
-          <a:chExt cx="0" cy="0"/>
-        </a:xfrm>
-      </p:grpSpPr>
-      <p:sp>
-        <p:nvSpPr>
-          <p:cNvPr id="2" name="Espaço Reservado para Texto 1"/>
-          <p:cNvSpPr>
-            <a:spLocks noGrp="1"/>
-          </p:cNvSpPr>
-          <p:nvPr>
-            <p:ph type="body" sz="quarter" idx="10"/>
-          </p:nvPr>
-        </p:nvSpPr>
-        <p:spPr/>
-        <p:txBody>
-          <a:bodyPr/>
-          <a:lstStyle/>
-          <a:p>
-            <a:r>
-              <a:rPr lang="pt-BR" dirty="0" smtClean="0"/>
-              <a:t>_Layout Page</a:t>
-            </a:r>
-            <a:endParaRPr lang="pt-BR" dirty="0"/>
-          </a:p>
-        </p:txBody>
-      </p:sp>
-      <p:pic>
-        <p:nvPicPr>
-          <p:cNvPr id="4" name="Imagem 3"/>
-          <p:cNvPicPr>
-            <a:picLocks noChangeAspect="1"/>
-          </p:cNvPicPr>
-          <p:nvPr/>
-        </p:nvPicPr>
-        <p:blipFill>
-          <a:blip r:embed="rId2"/>
-          <a:stretch>
-            <a:fillRect/>
-          </a:stretch>
-        </p:blipFill>
-        <p:spPr>
-          <a:xfrm>
-            <a:off x="2439386" y="914401"/>
-            <a:ext cx="7243378" cy="5290456"/>
-          </a:xfrm>
-          <a:prstGeom prst="rect">
-            <a:avLst/>
-          </a:prstGeom>
-        </p:spPr>
-      </p:pic>
-    </p:spTree>
-    <p:extLst>
-      <p:ext uri="{BB962C8B-B14F-4D97-AF65-F5344CB8AC3E}">
-        <p14:creationId xmlns:p14="http://schemas.microsoft.com/office/powerpoint/2010/main" val="1988328442"/>
-      </p:ext>
-    </p:extLst>
-  </p:cSld>
-  <p:clrMapOvr>
-    <a:masterClrMapping/>
-  </p:clrMapOvr>
-  <p:timing>
-    <p:tnLst>
-      <p:par>
-        <p:cTn id="1" dur="indefinite" restart="never" nodeType="tmRoot"/>
-      </p:par>
-    </p:tnLst>
-  </p:timing>
-</p:sld>
-</file>
-
-<file path=ppt/slides/slide36.xml><?xml version="1.0" encoding="utf-8"?>
-<p:sld xmlns:a="http://schemas.openxmlformats.org/drawingml/2006/main" xmlns:r="http://schemas.openxmlformats.org/officeDocument/2006/relationships" xmlns:p="http://schemas.openxmlformats.org/presentationml/2006/main">
-  <p:cSld>
-    <p:spTree>
-      <p:nvGrpSpPr>
-        <p:cNvPr id="1" name=""/>
-        <p:cNvGrpSpPr/>
-        <p:nvPr/>
-      </p:nvGrpSpPr>
-      <p:grpSpPr>
-        <a:xfrm>
-          <a:off x="0" y="0"/>
-          <a:ext cx="0" cy="0"/>
-          <a:chOff x="0" y="0"/>
-          <a:chExt cx="0" cy="0"/>
-        </a:xfrm>
-      </p:grpSpPr>
-      <p:sp>
-        <p:nvSpPr>
-          <p:cNvPr id="2" name="Espaço Reservado para Texto 1"/>
-          <p:cNvSpPr>
-            <a:spLocks noGrp="1"/>
-          </p:cNvSpPr>
-          <p:nvPr>
-            <p:ph type="body" sz="quarter" idx="10"/>
-          </p:nvPr>
-        </p:nvSpPr>
-        <p:spPr/>
-        <p:txBody>
-          <a:bodyPr/>
-          <a:lstStyle/>
-          <a:p>
-            <a:r>
-              <a:rPr lang="pt-BR" dirty="0" smtClean="0"/>
-              <a:t>Página inicial</a:t>
-            </a:r>
-            <a:endParaRPr lang="pt-BR" dirty="0"/>
-          </a:p>
-        </p:txBody>
-      </p:sp>
-      <p:pic>
-        <p:nvPicPr>
-          <p:cNvPr id="4" name="Imagem 3"/>
-          <p:cNvPicPr>
-            <a:picLocks noChangeAspect="1"/>
-          </p:cNvPicPr>
-          <p:nvPr/>
-        </p:nvPicPr>
-        <p:blipFill>
-          <a:blip r:embed="rId2"/>
-          <a:stretch>
-            <a:fillRect/>
-          </a:stretch>
-        </p:blipFill>
-        <p:spPr>
-          <a:xfrm>
-            <a:off x="1949116" y="1511462"/>
-            <a:ext cx="8223917" cy="1959526"/>
-          </a:xfrm>
-          <a:prstGeom prst="rect">
-            <a:avLst/>
-          </a:prstGeom>
-        </p:spPr>
-      </p:pic>
-    </p:spTree>
-    <p:extLst>
-      <p:ext uri="{BB962C8B-B14F-4D97-AF65-F5344CB8AC3E}">
-        <p14:creationId xmlns:p14="http://schemas.microsoft.com/office/powerpoint/2010/main" val="3569658024"/>
-      </p:ext>
-    </p:extLst>
-  </p:cSld>
-  <p:clrMapOvr>
-    <a:masterClrMapping/>
-  </p:clrMapOvr>
-  <p:timing>
-    <p:tnLst>
-      <p:par>
-        <p:cTn id="1" dur="indefinite" restart="never" nodeType="tmRoot"/>
-      </p:par>
-    </p:tnLst>
-  </p:timing>
-</p:sld>
-</file>
-
 <file path=ppt/slides/slide37.xml><?xml version="1.0" encoding="utf-8"?>
 <p:sld xmlns:a="http://schemas.openxmlformats.org/drawingml/2006/main" xmlns:r="http://schemas.openxmlformats.org/officeDocument/2006/relationships" xmlns:p="http://schemas.openxmlformats.org/presentationml/2006/main">
   <p:cSld>
@@ -9331,40 +9517,109 @@
           <a:p>
             <a:r>
               <a:rPr lang="pt-BR" dirty="0" smtClean="0"/>
-              <a:t>Formulário de confirmação</a:t>
+              <a:t>Grid Classes</a:t>
             </a:r>
             <a:endParaRPr lang="pt-BR" dirty="0"/>
           </a:p>
         </p:txBody>
       </p:sp>
-      <p:pic>
-        <p:nvPicPr>
-          <p:cNvPr id="4" name="Imagem 3"/>
-          <p:cNvPicPr>
-            <a:picLocks noChangeAspect="1"/>
-          </p:cNvPicPr>
-          <p:nvPr/>
-        </p:nvPicPr>
-        <p:blipFill>
-          <a:blip r:embed="rId2"/>
-          <a:stretch>
-            <a:fillRect/>
-          </a:stretch>
-        </p:blipFill>
-        <p:spPr>
-          <a:xfrm>
-            <a:off x="2408529" y="914401"/>
-            <a:ext cx="7305092" cy="5421234"/>
-          </a:xfrm>
-          <a:prstGeom prst="rect">
-            <a:avLst/>
-          </a:prstGeom>
-        </p:spPr>
-      </p:pic>
+      <p:sp>
+        <p:nvSpPr>
+          <p:cNvPr id="3" name="Espaço Reservado para Texto 2"/>
+          <p:cNvSpPr>
+            <a:spLocks noGrp="1"/>
+          </p:cNvSpPr>
+          <p:nvPr>
+            <p:ph type="body" sz="quarter" idx="11"/>
+          </p:nvPr>
+        </p:nvSpPr>
+        <p:spPr/>
+        <p:txBody>
+          <a:bodyPr/>
+          <a:lstStyle/>
+          <a:p>
+            <a:pPr marL="342900" indent="-342900">
+              <a:buFont typeface="Arial" panose="020B0604020202020204" pitchFamily="34" charset="0"/>
+              <a:buChar char="•"/>
+            </a:pPr>
+            <a:r>
+              <a:rPr lang="pt-BR" dirty="0" err="1" smtClean="0"/>
+              <a:t>xs</a:t>
+            </a:r>
+            <a:r>
+              <a:rPr lang="pt-BR" dirty="0" smtClean="0"/>
+              <a:t> </a:t>
+            </a:r>
+            <a:r>
+              <a:rPr lang="pt-BR" dirty="0"/>
+              <a:t>:</a:t>
+            </a:r>
+            <a:r>
+              <a:rPr lang="pt-BR" dirty="0" smtClean="0"/>
+              <a:t> &lt; 768px (smartphones)</a:t>
+            </a:r>
+          </a:p>
+          <a:p>
+            <a:pPr marL="342900" indent="-342900">
+              <a:buFont typeface="Arial" panose="020B0604020202020204" pitchFamily="34" charset="0"/>
+              <a:buChar char="•"/>
+            </a:pPr>
+            <a:r>
+              <a:rPr lang="pt-BR" dirty="0" err="1" smtClean="0"/>
+              <a:t>sm</a:t>
+            </a:r>
+            <a:r>
+              <a:rPr lang="pt-BR" dirty="0" smtClean="0"/>
+              <a:t> : &gt;= 768px (</a:t>
+            </a:r>
+            <a:r>
+              <a:rPr lang="pt-BR" dirty="0" err="1" smtClean="0"/>
+              <a:t>tablets</a:t>
+            </a:r>
+            <a:r>
+              <a:rPr lang="pt-BR" dirty="0" smtClean="0"/>
+              <a:t>)</a:t>
+            </a:r>
+          </a:p>
+          <a:p>
+            <a:pPr marL="342900" indent="-342900">
+              <a:buFont typeface="Arial" panose="020B0604020202020204" pitchFamily="34" charset="0"/>
+              <a:buChar char="•"/>
+            </a:pPr>
+            <a:r>
+              <a:rPr lang="pt-BR" dirty="0" err="1"/>
+              <a:t>m</a:t>
+            </a:r>
+            <a:r>
+              <a:rPr lang="pt-BR" dirty="0" err="1" smtClean="0"/>
+              <a:t>d</a:t>
+            </a:r>
+            <a:r>
+              <a:rPr lang="pt-BR" dirty="0" smtClean="0"/>
+              <a:t> : &gt;= 992px (monitores)</a:t>
+            </a:r>
+          </a:p>
+          <a:p>
+            <a:pPr marL="342900" indent="-342900">
+              <a:buFont typeface="Arial" panose="020B0604020202020204" pitchFamily="34" charset="0"/>
+              <a:buChar char="•"/>
+            </a:pPr>
+            <a:r>
+              <a:rPr lang="pt-BR" dirty="0" err="1" smtClean="0"/>
+              <a:t>lg</a:t>
+            </a:r>
+            <a:r>
+              <a:rPr lang="pt-BR" dirty="0" smtClean="0"/>
+              <a:t> : &gt;= 1200px (monitores com resoluções maiores)</a:t>
+            </a:r>
+            <a:endParaRPr lang="pt-BR" dirty="0"/>
+          </a:p>
+        </p:txBody>
+      </p:sp>
     </p:spTree>
     <p:extLst>
       <p:ext uri="{BB962C8B-B14F-4D97-AF65-F5344CB8AC3E}">
-        <p14:creationId xmlns:p14="http://schemas.microsoft.com/office/powerpoint/2010/main" val="3913610773"/>
+        <p14:creationId xmlns:p14="http://schemas.microsoft.com/office/powerpoint/2010/main" val="1497074926"/>
       </p:ext>
     </p:extLst>
   </p:cSld>
@@ -9415,20 +9670,81 @@
           <a:p>
             <a:r>
               <a:rPr lang="pt-BR" dirty="0" smtClean="0"/>
-              <a:t>Página de agradecimento</a:t>
+              <a:t>_Layout Page</a:t>
             </a:r>
             <a:endParaRPr lang="pt-BR" dirty="0"/>
           </a:p>
         </p:txBody>
       </p:sp>
+      <p:pic>
+        <p:nvPicPr>
+          <p:cNvPr id="4" name="Imagem 3"/>
+          <p:cNvPicPr>
+            <a:picLocks noChangeAspect="1"/>
+          </p:cNvPicPr>
+          <p:nvPr/>
+        </p:nvPicPr>
+        <p:blipFill>
+          <a:blip r:embed="rId2"/>
+          <a:stretch>
+            <a:fillRect/>
+          </a:stretch>
+        </p:blipFill>
+        <p:spPr>
+          <a:xfrm>
+            <a:off x="2439386" y="914401"/>
+            <a:ext cx="7243378" cy="5290456"/>
+          </a:xfrm>
+          <a:prstGeom prst="rect">
+            <a:avLst/>
+          </a:prstGeom>
+        </p:spPr>
+      </p:pic>
+    </p:spTree>
+    <p:extLst>
+      <p:ext uri="{BB962C8B-B14F-4D97-AF65-F5344CB8AC3E}">
+        <p14:creationId xmlns:p14="http://schemas.microsoft.com/office/powerpoint/2010/main" val="1988328442"/>
+      </p:ext>
+    </p:extLst>
+  </p:cSld>
+  <p:clrMapOvr>
+    <a:masterClrMapping/>
+  </p:clrMapOvr>
+  <p:timing>
+    <p:tnLst>
+      <p:par>
+        <p:cTn id="1" dur="indefinite" restart="never" nodeType="tmRoot"/>
+      </p:par>
+    </p:tnLst>
+  </p:timing>
+</p:sld>
+</file>
+
+<file path=ppt/slides/slide39.xml><?xml version="1.0" encoding="utf-8"?>
+<p:sld xmlns:a="http://schemas.openxmlformats.org/drawingml/2006/main" xmlns:r="http://schemas.openxmlformats.org/officeDocument/2006/relationships" xmlns:p="http://schemas.openxmlformats.org/presentationml/2006/main">
+  <p:cSld>
+    <p:spTree>
+      <p:nvGrpSpPr>
+        <p:cNvPr id="1" name=""/>
+        <p:cNvGrpSpPr/>
+        <p:nvPr/>
+      </p:nvGrpSpPr>
+      <p:grpSpPr>
+        <a:xfrm>
+          <a:off x="0" y="0"/>
+          <a:ext cx="0" cy="0"/>
+          <a:chOff x="0" y="0"/>
+          <a:chExt cx="0" cy="0"/>
+        </a:xfrm>
+      </p:grpSpPr>
       <p:sp>
         <p:nvSpPr>
-          <p:cNvPr id="3" name="Espaço Reservado para Texto 2"/>
+          <p:cNvPr id="2" name="Espaço Reservado para Texto 1"/>
           <p:cNvSpPr>
             <a:spLocks noGrp="1"/>
           </p:cNvSpPr>
           <p:nvPr>
-            <p:ph type="body" sz="quarter" idx="11"/>
+            <p:ph type="body" sz="quarter" idx="10"/>
           </p:nvPr>
         </p:nvSpPr>
         <p:spPr/>
@@ -9436,14 +9752,42 @@
           <a:bodyPr/>
           <a:lstStyle/>
           <a:p>
+            <a:r>
+              <a:rPr lang="pt-BR" dirty="0" smtClean="0"/>
+              <a:t>Página inicial</a:t>
+            </a:r>
             <a:endParaRPr lang="pt-BR" dirty="0"/>
           </a:p>
         </p:txBody>
       </p:sp>
+      <p:pic>
+        <p:nvPicPr>
+          <p:cNvPr id="4" name="Imagem 3"/>
+          <p:cNvPicPr>
+            <a:picLocks noChangeAspect="1"/>
+          </p:cNvPicPr>
+          <p:nvPr/>
+        </p:nvPicPr>
+        <p:blipFill>
+          <a:blip r:embed="rId2"/>
+          <a:stretch>
+            <a:fillRect/>
+          </a:stretch>
+        </p:blipFill>
+        <p:spPr>
+          <a:xfrm>
+            <a:off x="1949116" y="1511462"/>
+            <a:ext cx="8223917" cy="1959526"/>
+          </a:xfrm>
+          <a:prstGeom prst="rect">
+            <a:avLst/>
+          </a:prstGeom>
+        </p:spPr>
+      </p:pic>
     </p:spTree>
     <p:extLst>
       <p:ext uri="{BB962C8B-B14F-4D97-AF65-F5344CB8AC3E}">
-        <p14:creationId xmlns:p14="http://schemas.microsoft.com/office/powerpoint/2010/main" val="2644516771"/>
+        <p14:creationId xmlns:p14="http://schemas.microsoft.com/office/powerpoint/2010/main" val="3569658024"/>
       </p:ext>
     </p:extLst>
   </p:cSld>
@@ -9575,6 +9919,978 @@
       </p:par>
     </p:tnLst>
   </p:timing>
+</p:sld>
+</file>
+
+<file path=ppt/slides/slide40.xml><?xml version="1.0" encoding="utf-8"?>
+<p:sld xmlns:a="http://schemas.openxmlformats.org/drawingml/2006/main" xmlns:r="http://schemas.openxmlformats.org/officeDocument/2006/relationships" xmlns:p="http://schemas.openxmlformats.org/presentationml/2006/main">
+  <p:cSld>
+    <p:spTree>
+      <p:nvGrpSpPr>
+        <p:cNvPr id="1" name=""/>
+        <p:cNvGrpSpPr/>
+        <p:nvPr/>
+      </p:nvGrpSpPr>
+      <p:grpSpPr>
+        <a:xfrm>
+          <a:off x="0" y="0"/>
+          <a:ext cx="0" cy="0"/>
+          <a:chOff x="0" y="0"/>
+          <a:chExt cx="0" cy="0"/>
+        </a:xfrm>
+      </p:grpSpPr>
+      <p:sp>
+        <p:nvSpPr>
+          <p:cNvPr id="2" name="Espaço Reservado para Texto 1"/>
+          <p:cNvSpPr>
+            <a:spLocks noGrp="1"/>
+          </p:cNvSpPr>
+          <p:nvPr>
+            <p:ph type="body" sz="quarter" idx="10"/>
+          </p:nvPr>
+        </p:nvSpPr>
+        <p:spPr/>
+        <p:txBody>
+          <a:bodyPr/>
+          <a:lstStyle/>
+          <a:p>
+            <a:r>
+              <a:rPr lang="pt-BR" dirty="0" smtClean="0"/>
+              <a:t>Formulário de confirmação</a:t>
+            </a:r>
+            <a:endParaRPr lang="pt-BR" dirty="0"/>
+          </a:p>
+        </p:txBody>
+      </p:sp>
+      <p:pic>
+        <p:nvPicPr>
+          <p:cNvPr id="4" name="Imagem 3"/>
+          <p:cNvPicPr>
+            <a:picLocks noChangeAspect="1"/>
+          </p:cNvPicPr>
+          <p:nvPr/>
+        </p:nvPicPr>
+        <p:blipFill>
+          <a:blip r:embed="rId2"/>
+          <a:stretch>
+            <a:fillRect/>
+          </a:stretch>
+        </p:blipFill>
+        <p:spPr>
+          <a:xfrm>
+            <a:off x="2408529" y="914401"/>
+            <a:ext cx="7305092" cy="5421234"/>
+          </a:xfrm>
+          <a:prstGeom prst="rect">
+            <a:avLst/>
+          </a:prstGeom>
+        </p:spPr>
+      </p:pic>
+    </p:spTree>
+    <p:extLst>
+      <p:ext uri="{BB962C8B-B14F-4D97-AF65-F5344CB8AC3E}">
+        <p14:creationId xmlns:p14="http://schemas.microsoft.com/office/powerpoint/2010/main" val="3913610773"/>
+      </p:ext>
+    </p:extLst>
+  </p:cSld>
+  <p:clrMapOvr>
+    <a:masterClrMapping/>
+  </p:clrMapOvr>
+  <p:timing>
+    <p:tnLst>
+      <p:par>
+        <p:cTn id="1" dur="indefinite" restart="never" nodeType="tmRoot"/>
+      </p:par>
+    </p:tnLst>
+  </p:timing>
+</p:sld>
+</file>
+
+<file path=ppt/slides/slide41.xml><?xml version="1.0" encoding="utf-8"?>
+<p:sld xmlns:a="http://schemas.openxmlformats.org/drawingml/2006/main" xmlns:r="http://schemas.openxmlformats.org/officeDocument/2006/relationships" xmlns:p="http://schemas.openxmlformats.org/presentationml/2006/main">
+  <p:cSld>
+    <p:spTree>
+      <p:nvGrpSpPr>
+        <p:cNvPr id="1" name=""/>
+        <p:cNvGrpSpPr/>
+        <p:nvPr/>
+      </p:nvGrpSpPr>
+      <p:grpSpPr>
+        <a:xfrm>
+          <a:off x="0" y="0"/>
+          <a:ext cx="0" cy="0"/>
+          <a:chOff x="0" y="0"/>
+          <a:chExt cx="0" cy="0"/>
+        </a:xfrm>
+      </p:grpSpPr>
+      <p:sp>
+        <p:nvSpPr>
+          <p:cNvPr id="2" name="Espaço Reservado para Texto 1"/>
+          <p:cNvSpPr>
+            <a:spLocks noGrp="1"/>
+          </p:cNvSpPr>
+          <p:nvPr>
+            <p:ph type="body" sz="quarter" idx="10"/>
+          </p:nvPr>
+        </p:nvSpPr>
+        <p:spPr/>
+        <p:txBody>
+          <a:bodyPr/>
+          <a:lstStyle/>
+          <a:p>
+            <a:r>
+              <a:rPr lang="pt-BR" dirty="0" smtClean="0"/>
+              <a:t>Página de agradecimento</a:t>
+            </a:r>
+            <a:endParaRPr lang="pt-BR" dirty="0"/>
+          </a:p>
+        </p:txBody>
+      </p:sp>
+      <p:pic>
+        <p:nvPicPr>
+          <p:cNvPr id="4" name="Imagem 3"/>
+          <p:cNvPicPr>
+            <a:picLocks noChangeAspect="1"/>
+          </p:cNvPicPr>
+          <p:nvPr/>
+        </p:nvPicPr>
+        <p:blipFill>
+          <a:blip r:embed="rId2"/>
+          <a:stretch>
+            <a:fillRect/>
+          </a:stretch>
+        </p:blipFill>
+        <p:spPr>
+          <a:xfrm>
+            <a:off x="2681287" y="1794101"/>
+            <a:ext cx="6512358" cy="2737078"/>
+          </a:xfrm>
+          <a:prstGeom prst="rect">
+            <a:avLst/>
+          </a:prstGeom>
+        </p:spPr>
+      </p:pic>
+    </p:spTree>
+    <p:extLst>
+      <p:ext uri="{BB962C8B-B14F-4D97-AF65-F5344CB8AC3E}">
+        <p14:creationId xmlns:p14="http://schemas.microsoft.com/office/powerpoint/2010/main" val="2644516771"/>
+      </p:ext>
+    </p:extLst>
+  </p:cSld>
+  <p:clrMapOvr>
+    <a:masterClrMapping/>
+  </p:clrMapOvr>
+  <p:timing>
+    <p:tnLst>
+      <p:par>
+        <p:cTn id="1" dur="indefinite" restart="never" nodeType="tmRoot"/>
+      </p:par>
+    </p:tnLst>
+  </p:timing>
+</p:sld>
+</file>
+
+<file path=ppt/slides/slide42.xml><?xml version="1.0" encoding="utf-8"?>
+<p:sld xmlns:a="http://schemas.openxmlformats.org/drawingml/2006/main" xmlns:r="http://schemas.openxmlformats.org/officeDocument/2006/relationships" xmlns:p="http://schemas.openxmlformats.org/presentationml/2006/main">
+  <p:cSld>
+    <p:spTree>
+      <p:nvGrpSpPr>
+        <p:cNvPr id="1" name=""/>
+        <p:cNvGrpSpPr/>
+        <p:nvPr/>
+      </p:nvGrpSpPr>
+      <p:grpSpPr>
+        <a:xfrm>
+          <a:off x="0" y="0"/>
+          <a:ext cx="0" cy="0"/>
+          <a:chOff x="0" y="0"/>
+          <a:chExt cx="0" cy="0"/>
+        </a:xfrm>
+      </p:grpSpPr>
+      <p:sp>
+        <p:nvSpPr>
+          <p:cNvPr id="2" name="Espaço Reservado para Texto 1"/>
+          <p:cNvSpPr>
+            <a:spLocks noGrp="1"/>
+          </p:cNvSpPr>
+          <p:nvPr>
+            <p:ph type="body" sz="quarter" idx="10"/>
+          </p:nvPr>
+        </p:nvSpPr>
+        <p:spPr/>
+        <p:txBody>
+          <a:bodyPr/>
+          <a:lstStyle/>
+          <a:p>
+            <a:r>
+              <a:rPr lang="pt-BR" dirty="0" err="1" smtClean="0"/>
+              <a:t>Entity</a:t>
+            </a:r>
+            <a:r>
+              <a:rPr lang="pt-BR" dirty="0" smtClean="0"/>
+              <a:t> Framework Core</a:t>
+            </a:r>
+            <a:endParaRPr lang="pt-BR" dirty="0"/>
+          </a:p>
+        </p:txBody>
+      </p:sp>
+      <p:sp>
+        <p:nvSpPr>
+          <p:cNvPr id="3" name="Espaço Reservado para Texto 2"/>
+          <p:cNvSpPr>
+            <a:spLocks noGrp="1"/>
+          </p:cNvSpPr>
+          <p:nvPr>
+            <p:ph type="body" sz="quarter" idx="11"/>
+          </p:nvPr>
+        </p:nvSpPr>
+        <p:spPr/>
+        <p:txBody>
+          <a:bodyPr/>
+          <a:lstStyle/>
+          <a:p>
+            <a:pPr marL="342900" indent="-342900">
+              <a:buFont typeface="Arial" panose="020B0604020202020204" pitchFamily="34" charset="0"/>
+              <a:buChar char="•"/>
+            </a:pPr>
+            <a:r>
+              <a:rPr lang="pt-BR" dirty="0" smtClean="0"/>
+              <a:t>Tecnologia para acesso a dados</a:t>
+            </a:r>
+          </a:p>
+          <a:p>
+            <a:pPr marL="342900" indent="-342900">
+              <a:buFont typeface="Arial" panose="020B0604020202020204" pitchFamily="34" charset="0"/>
+              <a:buChar char="•"/>
+            </a:pPr>
+            <a:r>
+              <a:rPr lang="pt-BR" dirty="0" smtClean="0"/>
+              <a:t>ORM (</a:t>
+            </a:r>
+            <a:r>
+              <a:rPr lang="pt-BR" dirty="0" err="1" smtClean="0"/>
+              <a:t>Object-relational</a:t>
+            </a:r>
+            <a:r>
+              <a:rPr lang="pt-BR" dirty="0" smtClean="0"/>
+              <a:t> </a:t>
+            </a:r>
+            <a:r>
+              <a:rPr lang="pt-BR" dirty="0" err="1" smtClean="0"/>
+              <a:t>mapper</a:t>
+            </a:r>
+            <a:r>
+              <a:rPr lang="pt-BR" dirty="0" smtClean="0"/>
+              <a:t>) para utilizar bancos de dados juntamente com classes</a:t>
+            </a:r>
+          </a:p>
+          <a:p>
+            <a:pPr marL="342900" indent="-342900">
+              <a:buFont typeface="Arial" panose="020B0604020202020204" pitchFamily="34" charset="0"/>
+              <a:buChar char="•"/>
+            </a:pPr>
+            <a:r>
+              <a:rPr lang="pt-BR" dirty="0" smtClean="0"/>
+              <a:t>SQL Server, </a:t>
+            </a:r>
+            <a:r>
+              <a:rPr lang="pt-BR" dirty="0" err="1" smtClean="0"/>
+              <a:t>SQLite</a:t>
+            </a:r>
+            <a:r>
+              <a:rPr lang="pt-BR" dirty="0" smtClean="0"/>
+              <a:t>, MySQL (com ASP .NET Core 1.0)</a:t>
+            </a:r>
+            <a:endParaRPr lang="pt-BR" u="sng" dirty="0" smtClean="0"/>
+          </a:p>
+          <a:p>
+            <a:pPr marL="342900" indent="-342900">
+              <a:buFont typeface="Arial" panose="020B0604020202020204" pitchFamily="34" charset="0"/>
+              <a:buChar char="•"/>
+            </a:pPr>
+            <a:endParaRPr lang="pt-BR" dirty="0" smtClean="0"/>
+          </a:p>
+          <a:p>
+            <a:pPr marL="342900" indent="-342900">
+              <a:buFont typeface="Arial" panose="020B0604020202020204" pitchFamily="34" charset="0"/>
+              <a:buChar char="•"/>
+            </a:pPr>
+            <a:endParaRPr lang="pt-BR" dirty="0"/>
+          </a:p>
+        </p:txBody>
+      </p:sp>
+    </p:spTree>
+    <p:extLst>
+      <p:ext uri="{BB962C8B-B14F-4D97-AF65-F5344CB8AC3E}">
+        <p14:creationId xmlns:p14="http://schemas.microsoft.com/office/powerpoint/2010/main" val="2123741223"/>
+      </p:ext>
+    </p:extLst>
+  </p:cSld>
+  <p:clrMapOvr>
+    <a:masterClrMapping/>
+  </p:clrMapOvr>
+</p:sld>
+</file>
+
+<file path=ppt/slides/slide43.xml><?xml version="1.0" encoding="utf-8"?>
+<p:sld xmlns:a="http://schemas.openxmlformats.org/drawingml/2006/main" xmlns:r="http://schemas.openxmlformats.org/officeDocument/2006/relationships" xmlns:p="http://schemas.openxmlformats.org/presentationml/2006/main">
+  <p:cSld>
+    <p:spTree>
+      <p:nvGrpSpPr>
+        <p:cNvPr id="1" name=""/>
+        <p:cNvGrpSpPr/>
+        <p:nvPr/>
+      </p:nvGrpSpPr>
+      <p:grpSpPr>
+        <a:xfrm>
+          <a:off x="0" y="0"/>
+          <a:ext cx="0" cy="0"/>
+          <a:chOff x="0" y="0"/>
+          <a:chExt cx="0" cy="0"/>
+        </a:xfrm>
+      </p:grpSpPr>
+      <p:sp>
+        <p:nvSpPr>
+          <p:cNvPr id="2" name="Espaço Reservado para Texto 1"/>
+          <p:cNvSpPr>
+            <a:spLocks noGrp="1"/>
+          </p:cNvSpPr>
+          <p:nvPr>
+            <p:ph type="body" sz="quarter" idx="10"/>
+          </p:nvPr>
+        </p:nvSpPr>
+        <p:spPr/>
+        <p:txBody>
+          <a:bodyPr/>
+          <a:lstStyle/>
+          <a:p>
+            <a:r>
+              <a:rPr lang="pt-BR" dirty="0" smtClean="0"/>
+              <a:t>Criação da tabela</a:t>
+            </a:r>
+            <a:endParaRPr lang="pt-BR" dirty="0"/>
+          </a:p>
+        </p:txBody>
+      </p:sp>
+      <p:pic>
+        <p:nvPicPr>
+          <p:cNvPr id="4" name="Imagem 3"/>
+          <p:cNvPicPr>
+            <a:picLocks noChangeAspect="1"/>
+          </p:cNvPicPr>
+          <p:nvPr/>
+        </p:nvPicPr>
+        <p:blipFill>
+          <a:blip r:embed="rId2"/>
+          <a:stretch>
+            <a:fillRect/>
+          </a:stretch>
+        </p:blipFill>
+        <p:spPr>
+          <a:xfrm>
+            <a:off x="498020" y="1310367"/>
+            <a:ext cx="3087371" cy="2706461"/>
+          </a:xfrm>
+          <a:prstGeom prst="rect">
+            <a:avLst/>
+          </a:prstGeom>
+        </p:spPr>
+      </p:pic>
+      <p:pic>
+        <p:nvPicPr>
+          <p:cNvPr id="5" name="Imagem 4"/>
+          <p:cNvPicPr>
+            <a:picLocks noChangeAspect="1"/>
+          </p:cNvPicPr>
+          <p:nvPr/>
+        </p:nvPicPr>
+        <p:blipFill>
+          <a:blip r:embed="rId3"/>
+          <a:stretch>
+            <a:fillRect/>
+          </a:stretch>
+        </p:blipFill>
+        <p:spPr>
+          <a:xfrm>
+            <a:off x="4194401" y="1310367"/>
+            <a:ext cx="4957763" cy="2831547"/>
+          </a:xfrm>
+          <a:prstGeom prst="rect">
+            <a:avLst/>
+          </a:prstGeom>
+        </p:spPr>
+      </p:pic>
+      <p:pic>
+        <p:nvPicPr>
+          <p:cNvPr id="6" name="Imagem 5"/>
+          <p:cNvPicPr>
+            <a:picLocks noChangeAspect="1"/>
+          </p:cNvPicPr>
+          <p:nvPr/>
+        </p:nvPicPr>
+        <p:blipFill>
+          <a:blip r:embed="rId4"/>
+          <a:stretch>
+            <a:fillRect/>
+          </a:stretch>
+        </p:blipFill>
+        <p:spPr>
+          <a:xfrm>
+            <a:off x="498021" y="4322989"/>
+            <a:ext cx="4010474" cy="1347108"/>
+          </a:xfrm>
+          <a:prstGeom prst="rect">
+            <a:avLst/>
+          </a:prstGeom>
+        </p:spPr>
+      </p:pic>
+    </p:spTree>
+    <p:extLst>
+      <p:ext uri="{BB962C8B-B14F-4D97-AF65-F5344CB8AC3E}">
+        <p14:creationId xmlns:p14="http://schemas.microsoft.com/office/powerpoint/2010/main" val="3595095228"/>
+      </p:ext>
+    </p:extLst>
+  </p:cSld>
+  <p:clrMapOvr>
+    <a:masterClrMapping/>
+  </p:clrMapOvr>
+</p:sld>
+</file>
+
+<file path=ppt/slides/slide44.xml><?xml version="1.0" encoding="utf-8"?>
+<p:sld xmlns:a="http://schemas.openxmlformats.org/drawingml/2006/main" xmlns:r="http://schemas.openxmlformats.org/officeDocument/2006/relationships" xmlns:p="http://schemas.openxmlformats.org/presentationml/2006/main">
+  <p:cSld>
+    <p:spTree>
+      <p:nvGrpSpPr>
+        <p:cNvPr id="1" name=""/>
+        <p:cNvGrpSpPr/>
+        <p:nvPr/>
+      </p:nvGrpSpPr>
+      <p:grpSpPr>
+        <a:xfrm>
+          <a:off x="0" y="0"/>
+          <a:ext cx="0" cy="0"/>
+          <a:chOff x="0" y="0"/>
+          <a:chExt cx="0" cy="0"/>
+        </a:xfrm>
+      </p:grpSpPr>
+      <p:sp>
+        <p:nvSpPr>
+          <p:cNvPr id="2" name="Espaço Reservado para Texto 1"/>
+          <p:cNvSpPr>
+            <a:spLocks noGrp="1"/>
+          </p:cNvSpPr>
+          <p:nvPr>
+            <p:ph type="body" sz="quarter" idx="10"/>
+          </p:nvPr>
+        </p:nvSpPr>
+        <p:spPr/>
+        <p:txBody>
+          <a:bodyPr/>
+          <a:lstStyle/>
+          <a:p>
+            <a:r>
+              <a:rPr lang="pt-BR" dirty="0" smtClean="0"/>
+              <a:t>Modelo de negócio</a:t>
+            </a:r>
+            <a:endParaRPr lang="pt-BR" dirty="0"/>
+          </a:p>
+        </p:txBody>
+      </p:sp>
+      <p:pic>
+        <p:nvPicPr>
+          <p:cNvPr id="4" name="Imagem 3"/>
+          <p:cNvPicPr>
+            <a:picLocks noChangeAspect="1"/>
+          </p:cNvPicPr>
+          <p:nvPr/>
+        </p:nvPicPr>
+        <p:blipFill>
+          <a:blip r:embed="rId2"/>
+          <a:stretch>
+            <a:fillRect/>
+          </a:stretch>
+        </p:blipFill>
+        <p:spPr>
+          <a:xfrm>
+            <a:off x="3528332" y="1662112"/>
+            <a:ext cx="4803006" cy="2664959"/>
+          </a:xfrm>
+          <a:prstGeom prst="rect">
+            <a:avLst/>
+          </a:prstGeom>
+        </p:spPr>
+      </p:pic>
+    </p:spTree>
+    <p:extLst>
+      <p:ext uri="{BB962C8B-B14F-4D97-AF65-F5344CB8AC3E}">
+        <p14:creationId xmlns:p14="http://schemas.microsoft.com/office/powerpoint/2010/main" val="2461242432"/>
+      </p:ext>
+    </p:extLst>
+  </p:cSld>
+  <p:clrMapOvr>
+    <a:masterClrMapping/>
+  </p:clrMapOvr>
+</p:sld>
+</file>
+
+<file path=ppt/slides/slide45.xml><?xml version="1.0" encoding="utf-8"?>
+<p:sld xmlns:a="http://schemas.openxmlformats.org/drawingml/2006/main" xmlns:r="http://schemas.openxmlformats.org/officeDocument/2006/relationships" xmlns:p="http://schemas.openxmlformats.org/presentationml/2006/main">
+  <p:cSld>
+    <p:spTree>
+      <p:nvGrpSpPr>
+        <p:cNvPr id="1" name=""/>
+        <p:cNvGrpSpPr/>
+        <p:nvPr/>
+      </p:nvGrpSpPr>
+      <p:grpSpPr>
+        <a:xfrm>
+          <a:off x="0" y="0"/>
+          <a:ext cx="0" cy="0"/>
+          <a:chOff x="0" y="0"/>
+          <a:chExt cx="0" cy="0"/>
+        </a:xfrm>
+      </p:grpSpPr>
+      <p:sp>
+        <p:nvSpPr>
+          <p:cNvPr id="2" name="Espaço Reservado para Texto 1"/>
+          <p:cNvSpPr>
+            <a:spLocks noGrp="1"/>
+          </p:cNvSpPr>
+          <p:nvPr>
+            <p:ph type="body" sz="quarter" idx="10"/>
+          </p:nvPr>
+        </p:nvSpPr>
+        <p:spPr/>
+        <p:txBody>
+          <a:bodyPr/>
+          <a:lstStyle/>
+          <a:p>
+            <a:r>
+              <a:rPr lang="pt-BR" dirty="0" smtClean="0"/>
+              <a:t>Configuração do </a:t>
+            </a:r>
+            <a:r>
+              <a:rPr lang="pt-BR" dirty="0" err="1" smtClean="0"/>
+              <a:t>DbContext</a:t>
+            </a:r>
+            <a:endParaRPr lang="pt-BR" dirty="0" smtClean="0"/>
+          </a:p>
+        </p:txBody>
+      </p:sp>
+      <p:pic>
+        <p:nvPicPr>
+          <p:cNvPr id="4" name="Imagem 3"/>
+          <p:cNvPicPr>
+            <a:picLocks noChangeAspect="1"/>
+          </p:cNvPicPr>
+          <p:nvPr/>
+        </p:nvPicPr>
+        <p:blipFill>
+          <a:blip r:embed="rId2"/>
+          <a:stretch>
+            <a:fillRect/>
+          </a:stretch>
+        </p:blipFill>
+        <p:spPr>
+          <a:xfrm>
+            <a:off x="1427194" y="1777773"/>
+            <a:ext cx="9267762" cy="2524806"/>
+          </a:xfrm>
+          <a:prstGeom prst="rect">
+            <a:avLst/>
+          </a:prstGeom>
+        </p:spPr>
+      </p:pic>
+    </p:spTree>
+    <p:extLst>
+      <p:ext uri="{BB962C8B-B14F-4D97-AF65-F5344CB8AC3E}">
+        <p14:creationId xmlns:p14="http://schemas.microsoft.com/office/powerpoint/2010/main" val="1574550792"/>
+      </p:ext>
+    </p:extLst>
+  </p:cSld>
+  <p:clrMapOvr>
+    <a:masterClrMapping/>
+  </p:clrMapOvr>
+</p:sld>
+</file>
+
+<file path=ppt/slides/slide46.xml><?xml version="1.0" encoding="utf-8"?>
+<p:sld xmlns:a="http://schemas.openxmlformats.org/drawingml/2006/main" xmlns:r="http://schemas.openxmlformats.org/officeDocument/2006/relationships" xmlns:p="http://schemas.openxmlformats.org/presentationml/2006/main">
+  <p:cSld>
+    <p:spTree>
+      <p:nvGrpSpPr>
+        <p:cNvPr id="1" name=""/>
+        <p:cNvGrpSpPr/>
+        <p:nvPr/>
+      </p:nvGrpSpPr>
+      <p:grpSpPr>
+        <a:xfrm>
+          <a:off x="0" y="0"/>
+          <a:ext cx="0" cy="0"/>
+          <a:chOff x="0" y="0"/>
+          <a:chExt cx="0" cy="0"/>
+        </a:xfrm>
+      </p:grpSpPr>
+      <p:sp>
+        <p:nvSpPr>
+          <p:cNvPr id="2" name="Espaço Reservado para Texto 1"/>
+          <p:cNvSpPr>
+            <a:spLocks noGrp="1"/>
+          </p:cNvSpPr>
+          <p:nvPr>
+            <p:ph type="body" sz="quarter" idx="10"/>
+          </p:nvPr>
+        </p:nvSpPr>
+        <p:spPr/>
+        <p:txBody>
+          <a:bodyPr/>
+          <a:lstStyle/>
+          <a:p>
+            <a:r>
+              <a:rPr lang="pt-BR" dirty="0" smtClean="0"/>
+              <a:t>Repositório</a:t>
+            </a:r>
+            <a:endParaRPr lang="pt-BR" dirty="0"/>
+          </a:p>
+        </p:txBody>
+      </p:sp>
+      <p:pic>
+        <p:nvPicPr>
+          <p:cNvPr id="4" name="Imagem 3"/>
+          <p:cNvPicPr>
+            <a:picLocks noChangeAspect="1"/>
+          </p:cNvPicPr>
+          <p:nvPr/>
+        </p:nvPicPr>
+        <p:blipFill>
+          <a:blip r:embed="rId2"/>
+          <a:stretch>
+            <a:fillRect/>
+          </a:stretch>
+        </p:blipFill>
+        <p:spPr>
+          <a:xfrm>
+            <a:off x="176892" y="1162050"/>
+            <a:ext cx="4731529" cy="2022021"/>
+          </a:xfrm>
+          <a:prstGeom prst="rect">
+            <a:avLst/>
+          </a:prstGeom>
+        </p:spPr>
+      </p:pic>
+      <p:pic>
+        <p:nvPicPr>
+          <p:cNvPr id="5" name="Imagem 4"/>
+          <p:cNvPicPr>
+            <a:picLocks noChangeAspect="1"/>
+          </p:cNvPicPr>
+          <p:nvPr/>
+        </p:nvPicPr>
+        <p:blipFill>
+          <a:blip r:embed="rId3"/>
+          <a:stretch>
+            <a:fillRect/>
+          </a:stretch>
+        </p:blipFill>
+        <p:spPr>
+          <a:xfrm>
+            <a:off x="5196568" y="1162050"/>
+            <a:ext cx="5505450" cy="5076825"/>
+          </a:xfrm>
+          <a:prstGeom prst="rect">
+            <a:avLst/>
+          </a:prstGeom>
+        </p:spPr>
+      </p:pic>
+    </p:spTree>
+    <p:extLst>
+      <p:ext uri="{BB962C8B-B14F-4D97-AF65-F5344CB8AC3E}">
+        <p14:creationId xmlns:p14="http://schemas.microsoft.com/office/powerpoint/2010/main" val="4017181113"/>
+      </p:ext>
+    </p:extLst>
+  </p:cSld>
+  <p:clrMapOvr>
+    <a:masterClrMapping/>
+  </p:clrMapOvr>
+</p:sld>
+</file>
+
+<file path=ppt/slides/slide47.xml><?xml version="1.0" encoding="utf-8"?>
+<p:sld xmlns:a="http://schemas.openxmlformats.org/drawingml/2006/main" xmlns:r="http://schemas.openxmlformats.org/officeDocument/2006/relationships" xmlns:p="http://schemas.openxmlformats.org/presentationml/2006/main">
+  <p:cSld>
+    <p:spTree>
+      <p:nvGrpSpPr>
+        <p:cNvPr id="1" name=""/>
+        <p:cNvGrpSpPr/>
+        <p:nvPr/>
+      </p:nvGrpSpPr>
+      <p:grpSpPr>
+        <a:xfrm>
+          <a:off x="0" y="0"/>
+          <a:ext cx="0" cy="0"/>
+          <a:chOff x="0" y="0"/>
+          <a:chExt cx="0" cy="0"/>
+        </a:xfrm>
+      </p:grpSpPr>
+      <p:sp>
+        <p:nvSpPr>
+          <p:cNvPr id="2" name="Espaço Reservado para Texto 1"/>
+          <p:cNvSpPr>
+            <a:spLocks noGrp="1"/>
+          </p:cNvSpPr>
+          <p:nvPr>
+            <p:ph type="body" sz="quarter" idx="10"/>
+          </p:nvPr>
+        </p:nvSpPr>
+        <p:spPr/>
+        <p:txBody>
+          <a:bodyPr/>
+          <a:lstStyle/>
+          <a:p>
+            <a:r>
+              <a:rPr lang="pt-BR" dirty="0" smtClean="0"/>
+              <a:t>Serviço de confirmação</a:t>
+            </a:r>
+            <a:endParaRPr lang="pt-BR" dirty="0"/>
+          </a:p>
+        </p:txBody>
+      </p:sp>
+      <p:pic>
+        <p:nvPicPr>
+          <p:cNvPr id="4" name="Imagem 3"/>
+          <p:cNvPicPr>
+            <a:picLocks noChangeAspect="1"/>
+          </p:cNvPicPr>
+          <p:nvPr/>
+        </p:nvPicPr>
+        <p:blipFill>
+          <a:blip r:embed="rId2"/>
+          <a:stretch>
+            <a:fillRect/>
+          </a:stretch>
+        </p:blipFill>
+        <p:spPr>
+          <a:xfrm>
+            <a:off x="417739" y="1592715"/>
+            <a:ext cx="4235904" cy="1208877"/>
+          </a:xfrm>
+          <a:prstGeom prst="rect">
+            <a:avLst/>
+          </a:prstGeom>
+        </p:spPr>
+      </p:pic>
+      <p:pic>
+        <p:nvPicPr>
+          <p:cNvPr id="6" name="Imagem 5"/>
+          <p:cNvPicPr>
+            <a:picLocks noChangeAspect="1"/>
+          </p:cNvPicPr>
+          <p:nvPr/>
+        </p:nvPicPr>
+        <p:blipFill>
+          <a:blip r:embed="rId3"/>
+          <a:stretch>
+            <a:fillRect/>
+          </a:stretch>
+        </p:blipFill>
+        <p:spPr>
+          <a:xfrm>
+            <a:off x="4901292" y="1592715"/>
+            <a:ext cx="5359848" cy="4048806"/>
+          </a:xfrm>
+          <a:prstGeom prst="rect">
+            <a:avLst/>
+          </a:prstGeom>
+        </p:spPr>
+      </p:pic>
+    </p:spTree>
+    <p:extLst>
+      <p:ext uri="{BB962C8B-B14F-4D97-AF65-F5344CB8AC3E}">
+        <p14:creationId xmlns:p14="http://schemas.microsoft.com/office/powerpoint/2010/main" val="3428650650"/>
+      </p:ext>
+    </p:extLst>
+  </p:cSld>
+  <p:clrMapOvr>
+    <a:masterClrMapping/>
+  </p:clrMapOvr>
+</p:sld>
+</file>
+
+<file path=ppt/slides/slide48.xml><?xml version="1.0" encoding="utf-8"?>
+<p:sld xmlns:a="http://schemas.openxmlformats.org/drawingml/2006/main" xmlns:r="http://schemas.openxmlformats.org/officeDocument/2006/relationships" xmlns:p="http://schemas.openxmlformats.org/presentationml/2006/main">
+  <p:cSld>
+    <p:spTree>
+      <p:nvGrpSpPr>
+        <p:cNvPr id="1" name=""/>
+        <p:cNvGrpSpPr/>
+        <p:nvPr/>
+      </p:nvGrpSpPr>
+      <p:grpSpPr>
+        <a:xfrm>
+          <a:off x="0" y="0"/>
+          <a:ext cx="0" cy="0"/>
+          <a:chOff x="0" y="0"/>
+          <a:chExt cx="0" cy="0"/>
+        </a:xfrm>
+      </p:grpSpPr>
+      <p:sp>
+        <p:nvSpPr>
+          <p:cNvPr id="2" name="Espaço Reservado para Texto 1"/>
+          <p:cNvSpPr>
+            <a:spLocks noGrp="1"/>
+          </p:cNvSpPr>
+          <p:nvPr>
+            <p:ph type="body" sz="quarter" idx="10"/>
+          </p:nvPr>
+        </p:nvSpPr>
+        <p:spPr/>
+        <p:txBody>
+          <a:bodyPr/>
+          <a:lstStyle/>
+          <a:p>
+            <a:r>
+              <a:rPr lang="pt-BR" dirty="0" smtClean="0"/>
+              <a:t>Utilização do </a:t>
+            </a:r>
+            <a:r>
+              <a:rPr lang="pt-BR" dirty="0" err="1" smtClean="0"/>
+              <a:t>service</a:t>
+            </a:r>
+            <a:endParaRPr lang="pt-BR" dirty="0"/>
+          </a:p>
+        </p:txBody>
+      </p:sp>
+      <p:pic>
+        <p:nvPicPr>
+          <p:cNvPr id="5" name="Imagem 4"/>
+          <p:cNvPicPr>
+            <a:picLocks noChangeAspect="1"/>
+          </p:cNvPicPr>
+          <p:nvPr/>
+        </p:nvPicPr>
+        <p:blipFill>
+          <a:blip r:embed="rId2"/>
+          <a:stretch>
+            <a:fillRect/>
+          </a:stretch>
+        </p:blipFill>
+        <p:spPr>
+          <a:xfrm>
+            <a:off x="390525" y="1153886"/>
+            <a:ext cx="5166074" cy="1768928"/>
+          </a:xfrm>
+          <a:prstGeom prst="rect">
+            <a:avLst/>
+          </a:prstGeom>
+        </p:spPr>
+      </p:pic>
+      <p:pic>
+        <p:nvPicPr>
+          <p:cNvPr id="6" name="Imagem 5"/>
+          <p:cNvPicPr>
+            <a:picLocks noChangeAspect="1"/>
+          </p:cNvPicPr>
+          <p:nvPr/>
+        </p:nvPicPr>
+        <p:blipFill>
+          <a:blip r:embed="rId3"/>
+          <a:stretch>
+            <a:fillRect/>
+          </a:stretch>
+        </p:blipFill>
+        <p:spPr>
+          <a:xfrm>
+            <a:off x="5793241" y="1153886"/>
+            <a:ext cx="5609745" cy="2495550"/>
+          </a:xfrm>
+          <a:prstGeom prst="rect">
+            <a:avLst/>
+          </a:prstGeom>
+        </p:spPr>
+      </p:pic>
+    </p:spTree>
+    <p:extLst>
+      <p:ext uri="{BB962C8B-B14F-4D97-AF65-F5344CB8AC3E}">
+        <p14:creationId xmlns:p14="http://schemas.microsoft.com/office/powerpoint/2010/main" val="2850430226"/>
+      </p:ext>
+    </p:extLst>
+  </p:cSld>
+  <p:clrMapOvr>
+    <a:masterClrMapping/>
+  </p:clrMapOvr>
+</p:sld>
+</file>
+
+<file path=ppt/slides/slide49.xml><?xml version="1.0" encoding="utf-8"?>
+<p:sld xmlns:a="http://schemas.openxmlformats.org/drawingml/2006/main" xmlns:r="http://schemas.openxmlformats.org/officeDocument/2006/relationships" xmlns:p="http://schemas.openxmlformats.org/presentationml/2006/main">
+  <p:cSld>
+    <p:spTree>
+      <p:nvGrpSpPr>
+        <p:cNvPr id="1" name=""/>
+        <p:cNvGrpSpPr/>
+        <p:nvPr/>
+      </p:nvGrpSpPr>
+      <p:grpSpPr>
+        <a:xfrm>
+          <a:off x="0" y="0"/>
+          <a:ext cx="0" cy="0"/>
+          <a:chOff x="0" y="0"/>
+          <a:chExt cx="0" cy="0"/>
+        </a:xfrm>
+      </p:grpSpPr>
+      <p:sp>
+        <p:nvSpPr>
+          <p:cNvPr id="2" name="Espaço Reservado para Texto 1"/>
+          <p:cNvSpPr>
+            <a:spLocks noGrp="1"/>
+          </p:cNvSpPr>
+          <p:nvPr>
+            <p:ph type="body" sz="quarter" idx="10"/>
+          </p:nvPr>
+        </p:nvSpPr>
+        <p:spPr/>
+        <p:txBody>
+          <a:bodyPr/>
+          <a:lstStyle/>
+          <a:p>
+            <a:r>
+              <a:rPr lang="pt-BR" dirty="0" smtClean="0"/>
+              <a:t>Injeção de dependências</a:t>
+            </a:r>
+            <a:endParaRPr lang="pt-BR" dirty="0"/>
+          </a:p>
+        </p:txBody>
+      </p:sp>
+      <p:sp>
+        <p:nvSpPr>
+          <p:cNvPr id="3" name="Espaço Reservado para Texto 2"/>
+          <p:cNvSpPr>
+            <a:spLocks noGrp="1"/>
+          </p:cNvSpPr>
+          <p:nvPr>
+            <p:ph type="body" sz="quarter" idx="11"/>
+          </p:nvPr>
+        </p:nvSpPr>
+        <p:spPr/>
+        <p:txBody>
+          <a:bodyPr/>
+          <a:lstStyle/>
+          <a:p>
+            <a:endParaRPr lang="pt-BR" dirty="0"/>
+          </a:p>
+        </p:txBody>
+      </p:sp>
+    </p:spTree>
+    <p:extLst>
+      <p:ext uri="{BB962C8B-B14F-4D97-AF65-F5344CB8AC3E}">
+        <p14:creationId xmlns:p14="http://schemas.microsoft.com/office/powerpoint/2010/main" val="608569562"/>
+      </p:ext>
+    </p:extLst>
+  </p:cSld>
+  <p:clrMapOvr>
+    <a:masterClrMapping/>
+  </p:clrMapOvr>
 </p:sld>
 </file>
 

</xml_diff>

<commit_message>
ConfirmacaoContext com injeção de dependência e IDisposable.
</commit_message>
<xml_diff>
--- a/workshop-aspnet-core-mvc.pptx
+++ b/workshop-aspnet-core-mvc.pptx
@@ -10864,20 +10864,457 @@
       </p:sp>
       <p:sp>
         <p:nvSpPr>
-          <p:cNvPr id="3" name="Espaço Reservado para Texto 2"/>
-          <p:cNvSpPr>
-            <a:spLocks noGrp="1"/>
-          </p:cNvSpPr>
-          <p:nvPr>
-            <p:ph type="body" sz="quarter" idx="11"/>
-          </p:nvPr>
+          <p:cNvPr id="4" name="Retângulo de cantos arredondados 3"/>
+          <p:cNvSpPr/>
+          <p:nvPr/>
         </p:nvSpPr>
-        <p:spPr/>
+        <p:spPr>
+          <a:xfrm>
+            <a:off x="3004458" y="1608364"/>
+            <a:ext cx="1880508" cy="979715"/>
+          </a:xfrm>
+          <a:prstGeom prst="roundRect">
+            <a:avLst/>
+          </a:prstGeom>
+        </p:spPr>
+        <p:style>
+          <a:lnRef idx="2">
+            <a:schemeClr val="accent1">
+              <a:shade val="50000"/>
+            </a:schemeClr>
+          </a:lnRef>
+          <a:fillRef idx="1">
+            <a:schemeClr val="accent1"/>
+          </a:fillRef>
+          <a:effectRef idx="0">
+            <a:schemeClr val="accent1"/>
+          </a:effectRef>
+          <a:fontRef idx="minor">
+            <a:schemeClr val="lt1"/>
+          </a:fontRef>
+        </p:style>
         <p:txBody>
-          <a:bodyPr/>
+          <a:bodyPr rtlCol="0" anchor="ctr"/>
           <a:lstStyle/>
           <a:p>
+            <a:pPr algn="ctr"/>
+            <a:r>
+              <a:rPr lang="pt-BR" dirty="0" smtClean="0"/>
+              <a:t>Classe</a:t>
+            </a:r>
             <a:endParaRPr lang="pt-BR" dirty="0"/>
+          </a:p>
+        </p:txBody>
+      </p:sp>
+      <p:sp>
+        <p:nvSpPr>
+          <p:cNvPr id="5" name="Retângulo de cantos arredondados 4"/>
+          <p:cNvSpPr/>
+          <p:nvPr/>
+        </p:nvSpPr>
+        <p:spPr>
+          <a:xfrm>
+            <a:off x="6675665" y="1608364"/>
+            <a:ext cx="1913164" cy="979715"/>
+          </a:xfrm>
+          <a:prstGeom prst="roundRect">
+            <a:avLst/>
+          </a:prstGeom>
+        </p:spPr>
+        <p:style>
+          <a:lnRef idx="2">
+            <a:schemeClr val="accent1">
+              <a:shade val="50000"/>
+            </a:schemeClr>
+          </a:lnRef>
+          <a:fillRef idx="1">
+            <a:schemeClr val="accent1"/>
+          </a:fillRef>
+          <a:effectRef idx="0">
+            <a:schemeClr val="accent1"/>
+          </a:effectRef>
+          <a:fontRef idx="minor">
+            <a:schemeClr val="lt1"/>
+          </a:fontRef>
+        </p:style>
+        <p:txBody>
+          <a:bodyPr rtlCol="0" anchor="ctr"/>
+          <a:lstStyle/>
+          <a:p>
+            <a:pPr algn="ctr"/>
+            <a:r>
+              <a:rPr lang="pt-BR" dirty="0" smtClean="0"/>
+              <a:t>Outra Classe</a:t>
+            </a:r>
+            <a:endParaRPr lang="pt-BR" dirty="0"/>
+          </a:p>
+        </p:txBody>
+      </p:sp>
+      <p:cxnSp>
+        <p:nvCxnSpPr>
+          <p:cNvPr id="7" name="Conector de seta reta 6"/>
+          <p:cNvCxnSpPr>
+            <a:stCxn id="4" idx="3"/>
+            <a:endCxn id="5" idx="1"/>
+          </p:cNvCxnSpPr>
+          <p:nvPr/>
+        </p:nvCxnSpPr>
+        <p:spPr>
+          <a:xfrm>
+            <a:off x="4884966" y="2098222"/>
+            <a:ext cx="1790699" cy="0"/>
+          </a:xfrm>
+          <a:prstGeom prst="straightConnector1">
+            <a:avLst/>
+          </a:prstGeom>
+          <a:ln w="19050">
+            <a:tailEnd type="triangle"/>
+          </a:ln>
+        </p:spPr>
+        <p:style>
+          <a:lnRef idx="1">
+            <a:schemeClr val="accent1"/>
+          </a:lnRef>
+          <a:fillRef idx="0">
+            <a:schemeClr val="accent1"/>
+          </a:fillRef>
+          <a:effectRef idx="0">
+            <a:schemeClr val="accent1"/>
+          </a:effectRef>
+          <a:fontRef idx="minor">
+            <a:schemeClr val="tx1"/>
+          </a:fontRef>
+        </p:style>
+      </p:cxnSp>
+      <p:sp>
+        <p:nvSpPr>
+          <p:cNvPr id="9" name="CaixaDeTexto 8"/>
+          <p:cNvSpPr txBox="1"/>
+          <p:nvPr/>
+        </p:nvSpPr>
+        <p:spPr>
+          <a:xfrm>
+            <a:off x="5419727" y="1665514"/>
+            <a:ext cx="767443" cy="383722"/>
+          </a:xfrm>
+          <a:prstGeom prst="rect">
+            <a:avLst/>
+          </a:prstGeom>
+          <a:noFill/>
+        </p:spPr>
+        <p:txBody>
+          <a:bodyPr wrap="square" rtlCol="0">
+            <a:spAutoFit/>
+          </a:bodyPr>
+          <a:lstStyle/>
+          <a:p>
+            <a:r>
+              <a:rPr lang="pt-BR" dirty="0" smtClean="0"/>
+              <a:t>Utiliza</a:t>
+            </a:r>
+            <a:endParaRPr lang="pt-BR" dirty="0"/>
+          </a:p>
+        </p:txBody>
+      </p:sp>
+      <p:cxnSp>
+        <p:nvCxnSpPr>
+          <p:cNvPr id="11" name="Conector de seta reta 10"/>
+          <p:cNvCxnSpPr/>
+          <p:nvPr/>
+        </p:nvCxnSpPr>
+        <p:spPr>
+          <a:xfrm flipV="1">
+            <a:off x="5780315" y="2294165"/>
+            <a:ext cx="0" cy="563335"/>
+          </a:xfrm>
+          <a:prstGeom prst="straightConnector1">
+            <a:avLst/>
+          </a:prstGeom>
+          <a:ln>
+            <a:solidFill>
+              <a:srgbClr val="FF0000"/>
+            </a:solidFill>
+            <a:tailEnd type="triangle"/>
+          </a:ln>
+        </p:spPr>
+        <p:style>
+          <a:lnRef idx="1">
+            <a:schemeClr val="accent1"/>
+          </a:lnRef>
+          <a:fillRef idx="0">
+            <a:schemeClr val="accent1"/>
+          </a:fillRef>
+          <a:effectRef idx="0">
+            <a:schemeClr val="accent1"/>
+          </a:effectRef>
+          <a:fontRef idx="minor">
+            <a:schemeClr val="tx1"/>
+          </a:fontRef>
+        </p:style>
+      </p:cxnSp>
+      <p:sp>
+        <p:nvSpPr>
+          <p:cNvPr id="12" name="CaixaDeTexto 11"/>
+          <p:cNvSpPr txBox="1"/>
+          <p:nvPr/>
+        </p:nvSpPr>
+        <p:spPr>
+          <a:xfrm>
+            <a:off x="5070020" y="2860611"/>
+            <a:ext cx="1453243" cy="369332"/>
+          </a:xfrm>
+          <a:prstGeom prst="rect">
+            <a:avLst/>
+          </a:prstGeom>
+          <a:noFill/>
+        </p:spPr>
+        <p:txBody>
+          <a:bodyPr wrap="square" rtlCol="0">
+            <a:spAutoFit/>
+          </a:bodyPr>
+          <a:lstStyle/>
+          <a:p>
+            <a:r>
+              <a:rPr lang="pt-BR" dirty="0" smtClean="0">
+                <a:solidFill>
+                  <a:srgbClr val="FF0000"/>
+                </a:solidFill>
+              </a:rPr>
+              <a:t>Dependência</a:t>
+            </a:r>
+            <a:endParaRPr lang="pt-BR" dirty="0">
+              <a:solidFill>
+                <a:srgbClr val="FF0000"/>
+              </a:solidFill>
+            </a:endParaRPr>
+          </a:p>
+        </p:txBody>
+      </p:sp>
+      <p:sp>
+        <p:nvSpPr>
+          <p:cNvPr id="16" name="Retângulo de cantos arredondados 15"/>
+          <p:cNvSpPr/>
+          <p:nvPr/>
+        </p:nvSpPr>
+        <p:spPr>
+          <a:xfrm>
+            <a:off x="3004458" y="3899807"/>
+            <a:ext cx="1880508" cy="979715"/>
+          </a:xfrm>
+          <a:prstGeom prst="roundRect">
+            <a:avLst/>
+          </a:prstGeom>
+        </p:spPr>
+        <p:style>
+          <a:lnRef idx="2">
+            <a:schemeClr val="accent1">
+              <a:shade val="50000"/>
+            </a:schemeClr>
+          </a:lnRef>
+          <a:fillRef idx="1">
+            <a:schemeClr val="accent1"/>
+          </a:fillRef>
+          <a:effectRef idx="0">
+            <a:schemeClr val="accent1"/>
+          </a:effectRef>
+          <a:fontRef idx="minor">
+            <a:schemeClr val="lt1"/>
+          </a:fontRef>
+        </p:style>
+        <p:txBody>
+          <a:bodyPr rtlCol="0" anchor="ctr"/>
+          <a:lstStyle/>
+          <a:p>
+            <a:pPr algn="ctr"/>
+            <a:r>
+              <a:rPr lang="pt-BR" dirty="0" smtClean="0"/>
+              <a:t>Service</a:t>
+            </a:r>
+            <a:endParaRPr lang="pt-BR" dirty="0"/>
+          </a:p>
+        </p:txBody>
+      </p:sp>
+      <p:sp>
+        <p:nvSpPr>
+          <p:cNvPr id="17" name="Retângulo de cantos arredondados 16"/>
+          <p:cNvSpPr/>
+          <p:nvPr/>
+        </p:nvSpPr>
+        <p:spPr>
+          <a:xfrm>
+            <a:off x="6675665" y="3899807"/>
+            <a:ext cx="1913164" cy="979715"/>
+          </a:xfrm>
+          <a:prstGeom prst="roundRect">
+            <a:avLst/>
+          </a:prstGeom>
+        </p:spPr>
+        <p:style>
+          <a:lnRef idx="2">
+            <a:schemeClr val="accent1">
+              <a:shade val="50000"/>
+            </a:schemeClr>
+          </a:lnRef>
+          <a:fillRef idx="1">
+            <a:schemeClr val="accent1"/>
+          </a:fillRef>
+          <a:effectRef idx="0">
+            <a:schemeClr val="accent1"/>
+          </a:effectRef>
+          <a:fontRef idx="minor">
+            <a:schemeClr val="lt1"/>
+          </a:fontRef>
+        </p:style>
+        <p:txBody>
+          <a:bodyPr rtlCol="0" anchor="ctr"/>
+          <a:lstStyle/>
+          <a:p>
+            <a:pPr algn="ctr"/>
+            <a:r>
+              <a:rPr lang="pt-BR" dirty="0" err="1" smtClean="0"/>
+              <a:t>Repository</a:t>
+            </a:r>
+            <a:endParaRPr lang="pt-BR" dirty="0"/>
+          </a:p>
+        </p:txBody>
+      </p:sp>
+      <p:cxnSp>
+        <p:nvCxnSpPr>
+          <p:cNvPr id="18" name="Conector de seta reta 17"/>
+          <p:cNvCxnSpPr>
+            <a:stCxn id="16" idx="3"/>
+            <a:endCxn id="17" idx="1"/>
+          </p:cNvCxnSpPr>
+          <p:nvPr/>
+        </p:nvCxnSpPr>
+        <p:spPr>
+          <a:xfrm>
+            <a:off x="4884966" y="4389665"/>
+            <a:ext cx="1790699" cy="0"/>
+          </a:xfrm>
+          <a:prstGeom prst="straightConnector1">
+            <a:avLst/>
+          </a:prstGeom>
+          <a:ln w="19050">
+            <a:tailEnd type="triangle"/>
+          </a:ln>
+        </p:spPr>
+        <p:style>
+          <a:lnRef idx="1">
+            <a:schemeClr val="accent1"/>
+          </a:lnRef>
+          <a:fillRef idx="0">
+            <a:schemeClr val="accent1"/>
+          </a:fillRef>
+          <a:effectRef idx="0">
+            <a:schemeClr val="accent1"/>
+          </a:effectRef>
+          <a:fontRef idx="minor">
+            <a:schemeClr val="tx1"/>
+          </a:fontRef>
+        </p:style>
+      </p:cxnSp>
+      <p:sp>
+        <p:nvSpPr>
+          <p:cNvPr id="19" name="CaixaDeTexto 18"/>
+          <p:cNvSpPr txBox="1"/>
+          <p:nvPr/>
+        </p:nvSpPr>
+        <p:spPr>
+          <a:xfrm>
+            <a:off x="5419727" y="3956957"/>
+            <a:ext cx="767443" cy="383722"/>
+          </a:xfrm>
+          <a:prstGeom prst="rect">
+            <a:avLst/>
+          </a:prstGeom>
+          <a:noFill/>
+        </p:spPr>
+        <p:txBody>
+          <a:bodyPr wrap="square" rtlCol="0">
+            <a:spAutoFit/>
+          </a:bodyPr>
+          <a:lstStyle/>
+          <a:p>
+            <a:r>
+              <a:rPr lang="pt-BR" dirty="0" smtClean="0"/>
+              <a:t>Utiliza</a:t>
+            </a:r>
+            <a:endParaRPr lang="pt-BR" dirty="0"/>
+          </a:p>
+        </p:txBody>
+      </p:sp>
+      <p:cxnSp>
+        <p:nvCxnSpPr>
+          <p:cNvPr id="20" name="Conector de seta reta 19"/>
+          <p:cNvCxnSpPr/>
+          <p:nvPr/>
+        </p:nvCxnSpPr>
+        <p:spPr>
+          <a:xfrm flipV="1">
+            <a:off x="5780315" y="4585608"/>
+            <a:ext cx="0" cy="563335"/>
+          </a:xfrm>
+          <a:prstGeom prst="straightConnector1">
+            <a:avLst/>
+          </a:prstGeom>
+          <a:ln>
+            <a:solidFill>
+              <a:srgbClr val="FF0000"/>
+            </a:solidFill>
+            <a:tailEnd type="triangle"/>
+          </a:ln>
+        </p:spPr>
+        <p:style>
+          <a:lnRef idx="1">
+            <a:schemeClr val="accent1"/>
+          </a:lnRef>
+          <a:fillRef idx="0">
+            <a:schemeClr val="accent1"/>
+          </a:fillRef>
+          <a:effectRef idx="0">
+            <a:schemeClr val="accent1"/>
+          </a:effectRef>
+          <a:fontRef idx="minor">
+            <a:schemeClr val="tx1"/>
+          </a:fontRef>
+        </p:style>
+      </p:cxnSp>
+      <p:sp>
+        <p:nvSpPr>
+          <p:cNvPr id="21" name="CaixaDeTexto 20"/>
+          <p:cNvSpPr txBox="1"/>
+          <p:nvPr/>
+        </p:nvSpPr>
+        <p:spPr>
+          <a:xfrm>
+            <a:off x="5070020" y="5152054"/>
+            <a:ext cx="1453243" cy="369332"/>
+          </a:xfrm>
+          <a:prstGeom prst="rect">
+            <a:avLst/>
+          </a:prstGeom>
+          <a:noFill/>
+        </p:spPr>
+        <p:txBody>
+          <a:bodyPr wrap="square" rtlCol="0">
+            <a:spAutoFit/>
+          </a:bodyPr>
+          <a:lstStyle/>
+          <a:p>
+            <a:r>
+              <a:rPr lang="pt-BR" dirty="0" smtClean="0">
+                <a:solidFill>
+                  <a:srgbClr val="FF0000"/>
+                </a:solidFill>
+              </a:rPr>
+              <a:t>Dependência</a:t>
+            </a:r>
+            <a:endParaRPr lang="pt-BR" dirty="0">
+              <a:solidFill>
+                <a:srgbClr val="FF0000"/>
+              </a:solidFill>
+            </a:endParaRPr>
           </a:p>
         </p:txBody>
       </p:sp>

</xml_diff>

<commit_message>
Ajustes no startup. Atualização da apresentação com injeção de dependências.
</commit_message>
<xml_diff>
--- a/workshop-aspnet-core-mvc.pptx
+++ b/workshop-aspnet-core-mvc.pptx
@@ -54,6 +54,14 @@
     <p:sldId id="297" r:id="rId48"/>
     <p:sldId id="307" r:id="rId49"/>
     <p:sldId id="306" r:id="rId50"/>
+    <p:sldId id="310" r:id="rId51"/>
+    <p:sldId id="311" r:id="rId52"/>
+    <p:sldId id="312" r:id="rId53"/>
+    <p:sldId id="308" r:id="rId54"/>
+    <p:sldId id="309" r:id="rId55"/>
+    <p:sldId id="313" r:id="rId56"/>
+    <p:sldId id="315" r:id="rId57"/>
+    <p:sldId id="316" r:id="rId58"/>
   </p:sldIdLst>
   <p:sldSz cx="12192000" cy="6858000"/>
   <p:notesSz cx="6858000" cy="9144000"/>
@@ -10819,6 +10827,13 @@
   <p:clrMapOvr>
     <a:masterClrMapping/>
   </p:clrMapOvr>
+  <p:timing>
+    <p:tnLst>
+      <p:par>
+        <p:cTn id="1" dur="indefinite" restart="never" nodeType="tmRoot"/>
+      </p:par>
+    </p:tnLst>
+  </p:timing>
 </p:sld>
 </file>
 
@@ -11128,7 +11143,7 @@
             <a:pPr algn="ctr"/>
             <a:r>
               <a:rPr lang="pt-BR" dirty="0" smtClean="0"/>
-              <a:t>Service</a:t>
+              <a:t>Repositório</a:t>
             </a:r>
             <a:endParaRPr lang="pt-BR" dirty="0"/>
           </a:p>
@@ -11172,7 +11187,7 @@
             <a:pPr algn="ctr"/>
             <a:r>
               <a:rPr lang="pt-BR" dirty="0" err="1" smtClean="0"/>
-              <a:t>Repository</a:t>
+              <a:t>Context</a:t>
             </a:r>
             <a:endParaRPr lang="pt-BR" dirty="0"/>
           </a:p>
@@ -11238,7 +11253,7 @@
           <a:p>
             <a:r>
               <a:rPr lang="pt-BR" dirty="0" smtClean="0"/>
-              <a:t>Utiliza</a:t>
+              <a:t>Busca</a:t>
             </a:r>
             <a:endParaRPr lang="pt-BR" dirty="0"/>
           </a:p>
@@ -11252,8 +11267,8 @@
         </p:nvCxnSpPr>
         <p:spPr>
           <a:xfrm flipV="1">
-            <a:off x="5780315" y="4585608"/>
-            <a:ext cx="0" cy="563335"/>
+            <a:off x="7624083" y="5055053"/>
+            <a:ext cx="0" cy="561976"/>
           </a:xfrm>
           <a:prstGeom prst="straightConnector1">
             <a:avLst/>
@@ -11288,7 +11303,7 @@
         </p:nvSpPr>
         <p:spPr>
           <a:xfrm>
-            <a:off x="5070020" y="5152054"/>
+            <a:off x="6897461" y="5708195"/>
             <a:ext cx="1453243" cy="369332"/>
           </a:xfrm>
           <a:prstGeom prst="rect">
@@ -11328,6 +11343,13 @@
   <p:clrMapOvr>
     <a:masterClrMapping/>
   </p:clrMapOvr>
+  <p:timing>
+    <p:tnLst>
+      <p:par>
+        <p:cTn id="1" dur="indefinite" restart="never" nodeType="tmRoot"/>
+      </p:par>
+    </p:tnLst>
+  </p:timing>
 </p:sld>
 </file>
 
@@ -11477,6 +11499,2881 @@
     <p:extLst>
       <p:ext uri="{BB962C8B-B14F-4D97-AF65-F5344CB8AC3E}">
         <p14:creationId xmlns:p14="http://schemas.microsoft.com/office/powerpoint/2010/main" val="2192656746"/>
+      </p:ext>
+    </p:extLst>
+  </p:cSld>
+  <p:clrMapOvr>
+    <a:masterClrMapping/>
+  </p:clrMapOvr>
+  <p:timing>
+    <p:tnLst>
+      <p:par>
+        <p:cTn id="1" dur="indefinite" restart="never" nodeType="tmRoot"/>
+      </p:par>
+    </p:tnLst>
+  </p:timing>
+</p:sld>
+</file>
+
+<file path=ppt/slides/slide50.xml><?xml version="1.0" encoding="utf-8"?>
+<p:sld xmlns:a="http://schemas.openxmlformats.org/drawingml/2006/main" xmlns:r="http://schemas.openxmlformats.org/officeDocument/2006/relationships" xmlns:p="http://schemas.openxmlformats.org/presentationml/2006/main">
+  <p:cSld>
+    <p:spTree>
+      <p:nvGrpSpPr>
+        <p:cNvPr id="1" name=""/>
+        <p:cNvGrpSpPr/>
+        <p:nvPr/>
+      </p:nvGrpSpPr>
+      <p:grpSpPr>
+        <a:xfrm>
+          <a:off x="0" y="0"/>
+          <a:ext cx="0" cy="0"/>
+          <a:chOff x="0" y="0"/>
+          <a:chExt cx="0" cy="0"/>
+        </a:xfrm>
+      </p:grpSpPr>
+      <p:sp>
+        <p:nvSpPr>
+          <p:cNvPr id="2" name="Espaço Reservado para Texto 1"/>
+          <p:cNvSpPr>
+            <a:spLocks noGrp="1"/>
+          </p:cNvSpPr>
+          <p:nvPr>
+            <p:ph type="body" sz="quarter" idx="10"/>
+          </p:nvPr>
+        </p:nvSpPr>
+        <p:spPr/>
+        <p:txBody>
+          <a:bodyPr/>
+          <a:lstStyle/>
+          <a:p>
+            <a:r>
+              <a:rPr lang="pt-BR" dirty="0" smtClean="0"/>
+              <a:t>Injeção de </a:t>
+            </a:r>
+            <a:r>
+              <a:rPr lang="pt-BR" dirty="0"/>
+              <a:t>dependências</a:t>
+            </a:r>
+          </a:p>
+        </p:txBody>
+      </p:sp>
+      <p:sp>
+        <p:nvSpPr>
+          <p:cNvPr id="3" name="Espaço Reservado para Texto 2"/>
+          <p:cNvSpPr>
+            <a:spLocks noGrp="1"/>
+          </p:cNvSpPr>
+          <p:nvPr>
+            <p:ph type="body" sz="quarter" idx="11"/>
+          </p:nvPr>
+        </p:nvSpPr>
+        <p:spPr/>
+        <p:txBody>
+          <a:bodyPr/>
+          <a:lstStyle/>
+          <a:p>
+            <a:pPr marL="342900" indent="-342900">
+              <a:buFont typeface="Arial" panose="020B0604020202020204" pitchFamily="34" charset="0"/>
+              <a:buChar char="•"/>
+            </a:pPr>
+            <a:r>
+              <a:rPr lang="pt-BR" dirty="0" smtClean="0"/>
+              <a:t>Objetos que uma determinada classe utiliza são inicializados (ou instanciados) por uma entidade externa</a:t>
+            </a:r>
+          </a:p>
+          <a:p>
+            <a:pPr marL="342900" indent="-342900">
+              <a:buFont typeface="Arial" panose="020B0604020202020204" pitchFamily="34" charset="0"/>
+              <a:buChar char="•"/>
+            </a:pPr>
+            <a:r>
+              <a:rPr lang="pt-BR" dirty="0" smtClean="0"/>
+              <a:t>A classe não necessita de instanciar outros objetos antes de utilizá-los</a:t>
+            </a:r>
+          </a:p>
+          <a:p>
+            <a:pPr marL="342900" indent="-342900">
+              <a:buFont typeface="Arial" panose="020B0604020202020204" pitchFamily="34" charset="0"/>
+              <a:buChar char="•"/>
+            </a:pPr>
+            <a:r>
+              <a:rPr lang="pt-BR" dirty="0" smtClean="0"/>
+              <a:t>As dependências são injetadas automaticamente</a:t>
+            </a:r>
+          </a:p>
+          <a:p>
+            <a:endParaRPr lang="pt-BR" dirty="0"/>
+          </a:p>
+        </p:txBody>
+      </p:sp>
+      <p:sp>
+        <p:nvSpPr>
+          <p:cNvPr id="4" name="Retângulo de cantos arredondados 3"/>
+          <p:cNvSpPr/>
+          <p:nvPr/>
+        </p:nvSpPr>
+        <p:spPr>
+          <a:xfrm>
+            <a:off x="3004458" y="3752849"/>
+            <a:ext cx="1880508" cy="979715"/>
+          </a:xfrm>
+          <a:prstGeom prst="roundRect">
+            <a:avLst/>
+          </a:prstGeom>
+        </p:spPr>
+        <p:style>
+          <a:lnRef idx="2">
+            <a:schemeClr val="accent1">
+              <a:shade val="50000"/>
+            </a:schemeClr>
+          </a:lnRef>
+          <a:fillRef idx="1">
+            <a:schemeClr val="accent1"/>
+          </a:fillRef>
+          <a:effectRef idx="0">
+            <a:schemeClr val="accent1"/>
+          </a:effectRef>
+          <a:fontRef idx="minor">
+            <a:schemeClr val="lt1"/>
+          </a:fontRef>
+        </p:style>
+        <p:txBody>
+          <a:bodyPr rtlCol="0" anchor="ctr"/>
+          <a:lstStyle/>
+          <a:p>
+            <a:pPr algn="ctr"/>
+            <a:r>
+              <a:rPr lang="pt-BR" dirty="0" smtClean="0"/>
+              <a:t>Repositório</a:t>
+            </a:r>
+            <a:endParaRPr lang="pt-BR" dirty="0"/>
+          </a:p>
+        </p:txBody>
+      </p:sp>
+      <p:sp>
+        <p:nvSpPr>
+          <p:cNvPr id="5" name="Retângulo de cantos arredondados 4"/>
+          <p:cNvSpPr/>
+          <p:nvPr/>
+        </p:nvSpPr>
+        <p:spPr>
+          <a:xfrm>
+            <a:off x="6675665" y="3752849"/>
+            <a:ext cx="1913164" cy="979715"/>
+          </a:xfrm>
+          <a:prstGeom prst="roundRect">
+            <a:avLst/>
+          </a:prstGeom>
+        </p:spPr>
+        <p:style>
+          <a:lnRef idx="2">
+            <a:schemeClr val="accent1">
+              <a:shade val="50000"/>
+            </a:schemeClr>
+          </a:lnRef>
+          <a:fillRef idx="1">
+            <a:schemeClr val="accent1"/>
+          </a:fillRef>
+          <a:effectRef idx="0">
+            <a:schemeClr val="accent1"/>
+          </a:effectRef>
+          <a:fontRef idx="minor">
+            <a:schemeClr val="lt1"/>
+          </a:fontRef>
+        </p:style>
+        <p:txBody>
+          <a:bodyPr rtlCol="0" anchor="ctr"/>
+          <a:lstStyle/>
+          <a:p>
+            <a:pPr algn="ctr"/>
+            <a:r>
+              <a:rPr lang="pt-BR" dirty="0" err="1" smtClean="0"/>
+              <a:t>Context</a:t>
+            </a:r>
+            <a:endParaRPr lang="pt-BR" dirty="0"/>
+          </a:p>
+        </p:txBody>
+      </p:sp>
+      <p:cxnSp>
+        <p:nvCxnSpPr>
+          <p:cNvPr id="6" name="Conector de seta reta 5"/>
+          <p:cNvCxnSpPr>
+            <a:stCxn id="4" idx="3"/>
+            <a:endCxn id="5" idx="1"/>
+          </p:cNvCxnSpPr>
+          <p:nvPr/>
+        </p:nvCxnSpPr>
+        <p:spPr>
+          <a:xfrm>
+            <a:off x="4884966" y="4242707"/>
+            <a:ext cx="1790699" cy="0"/>
+          </a:xfrm>
+          <a:prstGeom prst="straightConnector1">
+            <a:avLst/>
+          </a:prstGeom>
+          <a:ln w="19050">
+            <a:tailEnd type="triangle"/>
+          </a:ln>
+        </p:spPr>
+        <p:style>
+          <a:lnRef idx="1">
+            <a:schemeClr val="accent1"/>
+          </a:lnRef>
+          <a:fillRef idx="0">
+            <a:schemeClr val="accent1"/>
+          </a:fillRef>
+          <a:effectRef idx="0">
+            <a:schemeClr val="accent1"/>
+          </a:effectRef>
+          <a:fontRef idx="minor">
+            <a:schemeClr val="tx1"/>
+          </a:fontRef>
+        </p:style>
+      </p:cxnSp>
+      <p:sp>
+        <p:nvSpPr>
+          <p:cNvPr id="7" name="CaixaDeTexto 6"/>
+          <p:cNvSpPr txBox="1"/>
+          <p:nvPr/>
+        </p:nvSpPr>
+        <p:spPr>
+          <a:xfrm>
+            <a:off x="5419727" y="3809999"/>
+            <a:ext cx="767443" cy="383722"/>
+          </a:xfrm>
+          <a:prstGeom prst="rect">
+            <a:avLst/>
+          </a:prstGeom>
+          <a:noFill/>
+        </p:spPr>
+        <p:txBody>
+          <a:bodyPr wrap="square" rtlCol="0">
+            <a:spAutoFit/>
+          </a:bodyPr>
+          <a:lstStyle/>
+          <a:p>
+            <a:r>
+              <a:rPr lang="pt-BR" dirty="0" smtClean="0"/>
+              <a:t>Busca</a:t>
+            </a:r>
+            <a:endParaRPr lang="pt-BR" dirty="0"/>
+          </a:p>
+        </p:txBody>
+      </p:sp>
+      <p:cxnSp>
+        <p:nvCxnSpPr>
+          <p:cNvPr id="8" name="Conector de seta reta 7"/>
+          <p:cNvCxnSpPr/>
+          <p:nvPr/>
+        </p:nvCxnSpPr>
+        <p:spPr>
+          <a:xfrm flipV="1">
+            <a:off x="7624083" y="4908095"/>
+            <a:ext cx="0" cy="561976"/>
+          </a:xfrm>
+          <a:prstGeom prst="straightConnector1">
+            <a:avLst/>
+          </a:prstGeom>
+          <a:ln>
+            <a:solidFill>
+              <a:srgbClr val="FF0000"/>
+            </a:solidFill>
+            <a:tailEnd type="triangle"/>
+          </a:ln>
+        </p:spPr>
+        <p:style>
+          <a:lnRef idx="1">
+            <a:schemeClr val="accent1"/>
+          </a:lnRef>
+          <a:fillRef idx="0">
+            <a:schemeClr val="accent1"/>
+          </a:fillRef>
+          <a:effectRef idx="0">
+            <a:schemeClr val="accent1"/>
+          </a:effectRef>
+          <a:fontRef idx="minor">
+            <a:schemeClr val="tx1"/>
+          </a:fontRef>
+        </p:style>
+      </p:cxnSp>
+      <p:sp>
+        <p:nvSpPr>
+          <p:cNvPr id="9" name="CaixaDeTexto 8"/>
+          <p:cNvSpPr txBox="1"/>
+          <p:nvPr/>
+        </p:nvSpPr>
+        <p:spPr>
+          <a:xfrm>
+            <a:off x="6897461" y="5561237"/>
+            <a:ext cx="1453243" cy="369332"/>
+          </a:xfrm>
+          <a:prstGeom prst="rect">
+            <a:avLst/>
+          </a:prstGeom>
+          <a:noFill/>
+        </p:spPr>
+        <p:txBody>
+          <a:bodyPr wrap="square" rtlCol="0">
+            <a:spAutoFit/>
+          </a:bodyPr>
+          <a:lstStyle/>
+          <a:p>
+            <a:r>
+              <a:rPr lang="pt-BR" dirty="0" smtClean="0">
+                <a:solidFill>
+                  <a:srgbClr val="FF0000"/>
+                </a:solidFill>
+              </a:rPr>
+              <a:t>Dependência</a:t>
+            </a:r>
+            <a:endParaRPr lang="pt-BR" dirty="0">
+              <a:solidFill>
+                <a:srgbClr val="FF0000"/>
+              </a:solidFill>
+            </a:endParaRPr>
+          </a:p>
+        </p:txBody>
+      </p:sp>
+      <p:sp>
+        <p:nvSpPr>
+          <p:cNvPr id="29" name="Seta em curva para baixo 28"/>
+          <p:cNvSpPr/>
+          <p:nvPr/>
+        </p:nvSpPr>
+        <p:spPr>
+          <a:xfrm flipH="1">
+            <a:off x="4527097" y="2928255"/>
+            <a:ext cx="2370364" cy="743631"/>
+          </a:xfrm>
+          <a:prstGeom prst="curvedDownArrow">
+            <a:avLst>
+              <a:gd name="adj1" fmla="val 14192"/>
+              <a:gd name="adj2" fmla="val 25653"/>
+              <a:gd name="adj3" fmla="val 25000"/>
+            </a:avLst>
+          </a:prstGeom>
+          <a:solidFill>
+            <a:srgbClr val="FF0000"/>
+          </a:solidFill>
+          <a:ln w="6350"/>
+        </p:spPr>
+        <p:style>
+          <a:lnRef idx="2">
+            <a:schemeClr val="accent1">
+              <a:shade val="50000"/>
+            </a:schemeClr>
+          </a:lnRef>
+          <a:fillRef idx="1">
+            <a:schemeClr val="accent1"/>
+          </a:fillRef>
+          <a:effectRef idx="0">
+            <a:schemeClr val="accent1"/>
+          </a:effectRef>
+          <a:fontRef idx="minor">
+            <a:schemeClr val="lt1"/>
+          </a:fontRef>
+        </p:style>
+        <p:txBody>
+          <a:bodyPr rtlCol="0" anchor="ctr"/>
+          <a:lstStyle/>
+          <a:p>
+            <a:pPr algn="ctr"/>
+            <a:endParaRPr lang="pt-BR">
+              <a:solidFill>
+                <a:schemeClr val="tx1"/>
+              </a:solidFill>
+            </a:endParaRPr>
+          </a:p>
+        </p:txBody>
+      </p:sp>
+      <p:sp>
+        <p:nvSpPr>
+          <p:cNvPr id="30" name="CaixaDeTexto 29"/>
+          <p:cNvSpPr txBox="1"/>
+          <p:nvPr/>
+        </p:nvSpPr>
+        <p:spPr>
+          <a:xfrm>
+            <a:off x="5263241" y="3011072"/>
+            <a:ext cx="1012372" cy="369332"/>
+          </a:xfrm>
+          <a:prstGeom prst="rect">
+            <a:avLst/>
+          </a:prstGeom>
+          <a:noFill/>
+        </p:spPr>
+        <p:txBody>
+          <a:bodyPr wrap="square" rtlCol="0">
+            <a:spAutoFit/>
+          </a:bodyPr>
+          <a:lstStyle/>
+          <a:p>
+            <a:r>
+              <a:rPr lang="pt-BR" dirty="0" smtClean="0">
+                <a:solidFill>
+                  <a:srgbClr val="FF0000"/>
+                </a:solidFill>
+              </a:rPr>
+              <a:t>Injetado</a:t>
+            </a:r>
+            <a:endParaRPr lang="pt-BR" dirty="0">
+              <a:solidFill>
+                <a:srgbClr val="FF0000"/>
+              </a:solidFill>
+            </a:endParaRPr>
+          </a:p>
+        </p:txBody>
+      </p:sp>
+    </p:spTree>
+    <p:extLst>
+      <p:ext uri="{BB962C8B-B14F-4D97-AF65-F5344CB8AC3E}">
+        <p14:creationId xmlns:p14="http://schemas.microsoft.com/office/powerpoint/2010/main" val="1439613356"/>
+      </p:ext>
+    </p:extLst>
+  </p:cSld>
+  <p:clrMapOvr>
+    <a:masterClrMapping/>
+  </p:clrMapOvr>
+  <p:timing>
+    <p:tnLst>
+      <p:par>
+        <p:cTn id="1" dur="indefinite" restart="never" nodeType="tmRoot">
+          <p:childTnLst>
+            <p:seq concurrent="1" nextAc="seek">
+              <p:cTn id="2" dur="indefinite" nodeType="mainSeq">
+                <p:childTnLst>
+                  <p:par>
+                    <p:cTn id="3" fill="hold">
+                      <p:stCondLst>
+                        <p:cond delay="indefinite"/>
+                      </p:stCondLst>
+                      <p:childTnLst>
+                        <p:par>
+                          <p:cTn id="4" fill="hold">
+                            <p:stCondLst>
+                              <p:cond delay="0"/>
+                            </p:stCondLst>
+                            <p:childTnLst>
+                              <p:par>
+                                <p:cTn id="5" presetID="10" presetClass="entr" presetSubtype="0" fill="hold" grpId="0" nodeType="clickEffect">
+                                  <p:stCondLst>
+                                    <p:cond delay="0"/>
+                                  </p:stCondLst>
+                                  <p:childTnLst>
+                                    <p:set>
+                                      <p:cBhvr>
+                                        <p:cTn id="6" dur="1" fill="hold">
+                                          <p:stCondLst>
+                                            <p:cond delay="0"/>
+                                          </p:stCondLst>
+                                        </p:cTn>
+                                        <p:tgtEl>
+                                          <p:spTgt spid="4"/>
+                                        </p:tgtEl>
+                                        <p:attrNameLst>
+                                          <p:attrName>style.visibility</p:attrName>
+                                        </p:attrNameLst>
+                                      </p:cBhvr>
+                                      <p:to>
+                                        <p:strVal val="visible"/>
+                                      </p:to>
+                                    </p:set>
+                                    <p:animEffect transition="in" filter="fade">
+                                      <p:cBhvr>
+                                        <p:cTn id="7" dur="500"/>
+                                        <p:tgtEl>
+                                          <p:spTgt spid="4"/>
+                                        </p:tgtEl>
+                                      </p:cBhvr>
+                                    </p:animEffect>
+                                  </p:childTnLst>
+                                </p:cTn>
+                              </p:par>
+                              <p:par>
+                                <p:cTn id="8" presetID="10" presetClass="entr" presetSubtype="0" fill="hold" grpId="0" nodeType="withEffect">
+                                  <p:stCondLst>
+                                    <p:cond delay="0"/>
+                                  </p:stCondLst>
+                                  <p:childTnLst>
+                                    <p:set>
+                                      <p:cBhvr>
+                                        <p:cTn id="9" dur="1" fill="hold">
+                                          <p:stCondLst>
+                                            <p:cond delay="0"/>
+                                          </p:stCondLst>
+                                        </p:cTn>
+                                        <p:tgtEl>
+                                          <p:spTgt spid="5"/>
+                                        </p:tgtEl>
+                                        <p:attrNameLst>
+                                          <p:attrName>style.visibility</p:attrName>
+                                        </p:attrNameLst>
+                                      </p:cBhvr>
+                                      <p:to>
+                                        <p:strVal val="visible"/>
+                                      </p:to>
+                                    </p:set>
+                                    <p:animEffect transition="in" filter="fade">
+                                      <p:cBhvr>
+                                        <p:cTn id="10" dur="500"/>
+                                        <p:tgtEl>
+                                          <p:spTgt spid="5"/>
+                                        </p:tgtEl>
+                                      </p:cBhvr>
+                                    </p:animEffect>
+                                  </p:childTnLst>
+                                </p:cTn>
+                              </p:par>
+                              <p:par>
+                                <p:cTn id="11" presetID="10" presetClass="entr" presetSubtype="0" fill="hold" nodeType="withEffect">
+                                  <p:stCondLst>
+                                    <p:cond delay="0"/>
+                                  </p:stCondLst>
+                                  <p:childTnLst>
+                                    <p:set>
+                                      <p:cBhvr>
+                                        <p:cTn id="12" dur="1" fill="hold">
+                                          <p:stCondLst>
+                                            <p:cond delay="0"/>
+                                          </p:stCondLst>
+                                        </p:cTn>
+                                        <p:tgtEl>
+                                          <p:spTgt spid="6"/>
+                                        </p:tgtEl>
+                                        <p:attrNameLst>
+                                          <p:attrName>style.visibility</p:attrName>
+                                        </p:attrNameLst>
+                                      </p:cBhvr>
+                                      <p:to>
+                                        <p:strVal val="visible"/>
+                                      </p:to>
+                                    </p:set>
+                                    <p:animEffect transition="in" filter="fade">
+                                      <p:cBhvr>
+                                        <p:cTn id="13" dur="500"/>
+                                        <p:tgtEl>
+                                          <p:spTgt spid="6"/>
+                                        </p:tgtEl>
+                                      </p:cBhvr>
+                                    </p:animEffect>
+                                  </p:childTnLst>
+                                </p:cTn>
+                              </p:par>
+                              <p:par>
+                                <p:cTn id="14" presetID="10" presetClass="entr" presetSubtype="0" fill="hold" grpId="0" nodeType="withEffect">
+                                  <p:stCondLst>
+                                    <p:cond delay="0"/>
+                                  </p:stCondLst>
+                                  <p:childTnLst>
+                                    <p:set>
+                                      <p:cBhvr>
+                                        <p:cTn id="15" dur="1" fill="hold">
+                                          <p:stCondLst>
+                                            <p:cond delay="0"/>
+                                          </p:stCondLst>
+                                        </p:cTn>
+                                        <p:tgtEl>
+                                          <p:spTgt spid="7"/>
+                                        </p:tgtEl>
+                                        <p:attrNameLst>
+                                          <p:attrName>style.visibility</p:attrName>
+                                        </p:attrNameLst>
+                                      </p:cBhvr>
+                                      <p:to>
+                                        <p:strVal val="visible"/>
+                                      </p:to>
+                                    </p:set>
+                                    <p:animEffect transition="in" filter="fade">
+                                      <p:cBhvr>
+                                        <p:cTn id="16" dur="500"/>
+                                        <p:tgtEl>
+                                          <p:spTgt spid="7"/>
+                                        </p:tgtEl>
+                                      </p:cBhvr>
+                                    </p:animEffect>
+                                  </p:childTnLst>
+                                </p:cTn>
+                              </p:par>
+                              <p:par>
+                                <p:cTn id="17" presetID="10" presetClass="entr" presetSubtype="0" fill="hold" nodeType="withEffect">
+                                  <p:stCondLst>
+                                    <p:cond delay="0"/>
+                                  </p:stCondLst>
+                                  <p:childTnLst>
+                                    <p:set>
+                                      <p:cBhvr>
+                                        <p:cTn id="18" dur="1" fill="hold">
+                                          <p:stCondLst>
+                                            <p:cond delay="0"/>
+                                          </p:stCondLst>
+                                        </p:cTn>
+                                        <p:tgtEl>
+                                          <p:spTgt spid="8"/>
+                                        </p:tgtEl>
+                                        <p:attrNameLst>
+                                          <p:attrName>style.visibility</p:attrName>
+                                        </p:attrNameLst>
+                                      </p:cBhvr>
+                                      <p:to>
+                                        <p:strVal val="visible"/>
+                                      </p:to>
+                                    </p:set>
+                                    <p:animEffect transition="in" filter="fade">
+                                      <p:cBhvr>
+                                        <p:cTn id="19" dur="500"/>
+                                        <p:tgtEl>
+                                          <p:spTgt spid="8"/>
+                                        </p:tgtEl>
+                                      </p:cBhvr>
+                                    </p:animEffect>
+                                  </p:childTnLst>
+                                </p:cTn>
+                              </p:par>
+                              <p:par>
+                                <p:cTn id="20" presetID="10" presetClass="entr" presetSubtype="0" fill="hold" grpId="0" nodeType="withEffect">
+                                  <p:stCondLst>
+                                    <p:cond delay="0"/>
+                                  </p:stCondLst>
+                                  <p:childTnLst>
+                                    <p:set>
+                                      <p:cBhvr>
+                                        <p:cTn id="21" dur="1" fill="hold">
+                                          <p:stCondLst>
+                                            <p:cond delay="0"/>
+                                          </p:stCondLst>
+                                        </p:cTn>
+                                        <p:tgtEl>
+                                          <p:spTgt spid="9"/>
+                                        </p:tgtEl>
+                                        <p:attrNameLst>
+                                          <p:attrName>style.visibility</p:attrName>
+                                        </p:attrNameLst>
+                                      </p:cBhvr>
+                                      <p:to>
+                                        <p:strVal val="visible"/>
+                                      </p:to>
+                                    </p:set>
+                                    <p:animEffect transition="in" filter="fade">
+                                      <p:cBhvr>
+                                        <p:cTn id="22" dur="500"/>
+                                        <p:tgtEl>
+                                          <p:spTgt spid="9"/>
+                                        </p:tgtEl>
+                                      </p:cBhvr>
+                                    </p:animEffect>
+                                  </p:childTnLst>
+                                </p:cTn>
+                              </p:par>
+                            </p:childTnLst>
+                          </p:cTn>
+                        </p:par>
+                      </p:childTnLst>
+                    </p:cTn>
+                  </p:par>
+                  <p:par>
+                    <p:cTn id="23" fill="hold">
+                      <p:stCondLst>
+                        <p:cond delay="indefinite"/>
+                      </p:stCondLst>
+                      <p:childTnLst>
+                        <p:par>
+                          <p:cTn id="24" fill="hold">
+                            <p:stCondLst>
+                              <p:cond delay="0"/>
+                            </p:stCondLst>
+                            <p:childTnLst>
+                              <p:par>
+                                <p:cTn id="25" presetID="10" presetClass="entr" presetSubtype="0" fill="hold" grpId="0" nodeType="clickEffect">
+                                  <p:stCondLst>
+                                    <p:cond delay="0"/>
+                                  </p:stCondLst>
+                                  <p:childTnLst>
+                                    <p:set>
+                                      <p:cBhvr>
+                                        <p:cTn id="26" dur="1" fill="hold">
+                                          <p:stCondLst>
+                                            <p:cond delay="0"/>
+                                          </p:stCondLst>
+                                        </p:cTn>
+                                        <p:tgtEl>
+                                          <p:spTgt spid="29"/>
+                                        </p:tgtEl>
+                                        <p:attrNameLst>
+                                          <p:attrName>style.visibility</p:attrName>
+                                        </p:attrNameLst>
+                                      </p:cBhvr>
+                                      <p:to>
+                                        <p:strVal val="visible"/>
+                                      </p:to>
+                                    </p:set>
+                                    <p:animEffect transition="in" filter="fade">
+                                      <p:cBhvr>
+                                        <p:cTn id="27" dur="500"/>
+                                        <p:tgtEl>
+                                          <p:spTgt spid="29"/>
+                                        </p:tgtEl>
+                                      </p:cBhvr>
+                                    </p:animEffect>
+                                  </p:childTnLst>
+                                </p:cTn>
+                              </p:par>
+                              <p:par>
+                                <p:cTn id="28" presetID="10" presetClass="entr" presetSubtype="0" fill="hold" grpId="0" nodeType="withEffect">
+                                  <p:stCondLst>
+                                    <p:cond delay="0"/>
+                                  </p:stCondLst>
+                                  <p:childTnLst>
+                                    <p:set>
+                                      <p:cBhvr>
+                                        <p:cTn id="29" dur="1" fill="hold">
+                                          <p:stCondLst>
+                                            <p:cond delay="0"/>
+                                          </p:stCondLst>
+                                        </p:cTn>
+                                        <p:tgtEl>
+                                          <p:spTgt spid="30"/>
+                                        </p:tgtEl>
+                                        <p:attrNameLst>
+                                          <p:attrName>style.visibility</p:attrName>
+                                        </p:attrNameLst>
+                                      </p:cBhvr>
+                                      <p:to>
+                                        <p:strVal val="visible"/>
+                                      </p:to>
+                                    </p:set>
+                                    <p:animEffect transition="in" filter="fade">
+                                      <p:cBhvr>
+                                        <p:cTn id="30" dur="500"/>
+                                        <p:tgtEl>
+                                          <p:spTgt spid="30"/>
+                                        </p:tgtEl>
+                                      </p:cBhvr>
+                                    </p:animEffect>
+                                  </p:childTnLst>
+                                </p:cTn>
+                              </p:par>
+                            </p:childTnLst>
+                          </p:cTn>
+                        </p:par>
+                      </p:childTnLst>
+                    </p:cTn>
+                  </p:par>
+                </p:childTnLst>
+              </p:cTn>
+              <p:prevCondLst>
+                <p:cond evt="onPrev" delay="0">
+                  <p:tgtEl>
+                    <p:sldTgt/>
+                  </p:tgtEl>
+                </p:cond>
+              </p:prevCondLst>
+              <p:nextCondLst>
+                <p:cond evt="onNext" delay="0">
+                  <p:tgtEl>
+                    <p:sldTgt/>
+                  </p:tgtEl>
+                </p:cond>
+              </p:nextCondLst>
+            </p:seq>
+          </p:childTnLst>
+        </p:cTn>
+      </p:par>
+    </p:tnLst>
+    <p:bldLst>
+      <p:bldP spid="4" grpId="0" animBg="1"/>
+      <p:bldP spid="5" grpId="0" animBg="1"/>
+      <p:bldP spid="7" grpId="0"/>
+      <p:bldP spid="9" grpId="0"/>
+      <p:bldP spid="29" grpId="0" animBg="1"/>
+      <p:bldP spid="30" grpId="0"/>
+    </p:bldLst>
+  </p:timing>
+</p:sld>
+</file>
+
+<file path=ppt/slides/slide51.xml><?xml version="1.0" encoding="utf-8"?>
+<p:sld xmlns:a="http://schemas.openxmlformats.org/drawingml/2006/main" xmlns:r="http://schemas.openxmlformats.org/officeDocument/2006/relationships" xmlns:p="http://schemas.openxmlformats.org/presentationml/2006/main">
+  <p:cSld>
+    <p:spTree>
+      <p:nvGrpSpPr>
+        <p:cNvPr id="1" name=""/>
+        <p:cNvGrpSpPr/>
+        <p:nvPr/>
+      </p:nvGrpSpPr>
+      <p:grpSpPr>
+        <a:xfrm>
+          <a:off x="0" y="0"/>
+          <a:ext cx="0" cy="0"/>
+          <a:chOff x="0" y="0"/>
+          <a:chExt cx="0" cy="0"/>
+        </a:xfrm>
+      </p:grpSpPr>
+      <p:sp>
+        <p:nvSpPr>
+          <p:cNvPr id="2" name="Espaço Reservado para Texto 1"/>
+          <p:cNvSpPr>
+            <a:spLocks noGrp="1"/>
+          </p:cNvSpPr>
+          <p:nvPr>
+            <p:ph type="body" sz="quarter" idx="10"/>
+          </p:nvPr>
+        </p:nvSpPr>
+        <p:spPr/>
+        <p:txBody>
+          <a:bodyPr/>
+          <a:lstStyle/>
+          <a:p>
+            <a:r>
+              <a:rPr lang="pt-BR" dirty="0" smtClean="0"/>
+              <a:t>Injeção de dependências e Interfaces</a:t>
+            </a:r>
+            <a:endParaRPr lang="pt-BR" dirty="0"/>
+          </a:p>
+        </p:txBody>
+      </p:sp>
+      <p:sp>
+        <p:nvSpPr>
+          <p:cNvPr id="3" name="Espaço Reservado para Texto 2"/>
+          <p:cNvSpPr>
+            <a:spLocks noGrp="1"/>
+          </p:cNvSpPr>
+          <p:nvPr>
+            <p:ph type="body" sz="quarter" idx="11"/>
+          </p:nvPr>
+        </p:nvSpPr>
+        <p:spPr/>
+        <p:txBody>
+          <a:bodyPr/>
+          <a:lstStyle/>
+          <a:p>
+            <a:pPr marL="342900" indent="-342900">
+              <a:buFont typeface="Arial" panose="020B0604020202020204" pitchFamily="34" charset="0"/>
+              <a:buChar char="•"/>
+            </a:pPr>
+            <a:r>
+              <a:rPr lang="pt-BR" dirty="0" err="1" smtClean="0"/>
+              <a:t>Dependency</a:t>
+            </a:r>
+            <a:r>
+              <a:rPr lang="pt-BR" dirty="0" smtClean="0"/>
+              <a:t> </a:t>
+            </a:r>
+            <a:r>
+              <a:rPr lang="pt-BR" dirty="0" err="1" smtClean="0"/>
+              <a:t>Inversion</a:t>
+            </a:r>
+            <a:r>
+              <a:rPr lang="pt-BR" dirty="0" smtClean="0"/>
+              <a:t> </a:t>
+            </a:r>
+            <a:r>
+              <a:rPr lang="pt-BR" dirty="0" err="1" smtClean="0"/>
+              <a:t>Principle</a:t>
+            </a:r>
+            <a:endParaRPr lang="pt-BR" dirty="0"/>
+          </a:p>
+          <a:p>
+            <a:pPr marL="1085850" lvl="1" indent="-342900">
+              <a:buFont typeface="Arial" panose="020B0604020202020204" pitchFamily="34" charset="0"/>
+              <a:buChar char="•"/>
+            </a:pPr>
+            <a:r>
+              <a:rPr lang="pt-BR" sz="2200" dirty="0" smtClean="0">
+                <a:latin typeface="Arial" panose="020B0604020202020204" pitchFamily="34" charset="0"/>
+                <a:cs typeface="Arial" panose="020B0604020202020204" pitchFamily="34" charset="0"/>
+              </a:rPr>
+              <a:t>Uma classe deve depender de abstrações e não classes concretas.</a:t>
+            </a:r>
+          </a:p>
+          <a:p>
+            <a:endParaRPr lang="pt-BR" sz="2200" dirty="0" smtClean="0">
+              <a:latin typeface="Arial" panose="020B0604020202020204" pitchFamily="34" charset="0"/>
+              <a:cs typeface="Arial" panose="020B0604020202020204" pitchFamily="34" charset="0"/>
+            </a:endParaRPr>
+          </a:p>
+        </p:txBody>
+      </p:sp>
+      <p:sp>
+        <p:nvSpPr>
+          <p:cNvPr id="4" name="Retângulo de cantos arredondados 3"/>
+          <p:cNvSpPr/>
+          <p:nvPr/>
+        </p:nvSpPr>
+        <p:spPr>
+          <a:xfrm>
+            <a:off x="2496828" y="2579914"/>
+            <a:ext cx="1880508" cy="979715"/>
+          </a:xfrm>
+          <a:prstGeom prst="roundRect">
+            <a:avLst/>
+          </a:prstGeom>
+        </p:spPr>
+        <p:style>
+          <a:lnRef idx="2">
+            <a:schemeClr val="accent1">
+              <a:shade val="50000"/>
+            </a:schemeClr>
+          </a:lnRef>
+          <a:fillRef idx="1">
+            <a:schemeClr val="accent1"/>
+          </a:fillRef>
+          <a:effectRef idx="0">
+            <a:schemeClr val="accent1"/>
+          </a:effectRef>
+          <a:fontRef idx="minor">
+            <a:schemeClr val="lt1"/>
+          </a:fontRef>
+        </p:style>
+        <p:txBody>
+          <a:bodyPr rtlCol="0" anchor="ctr"/>
+          <a:lstStyle/>
+          <a:p>
+            <a:pPr algn="ctr"/>
+            <a:r>
+              <a:rPr lang="pt-BR" dirty="0" smtClean="0"/>
+              <a:t>Classe</a:t>
+            </a:r>
+            <a:endParaRPr lang="pt-BR" dirty="0"/>
+          </a:p>
+        </p:txBody>
+      </p:sp>
+      <p:sp>
+        <p:nvSpPr>
+          <p:cNvPr id="5" name="Retângulo de cantos arredondados 4"/>
+          <p:cNvSpPr/>
+          <p:nvPr/>
+        </p:nvSpPr>
+        <p:spPr>
+          <a:xfrm>
+            <a:off x="6935477" y="2579914"/>
+            <a:ext cx="1913164" cy="979715"/>
+          </a:xfrm>
+          <a:prstGeom prst="roundRect">
+            <a:avLst/>
+          </a:prstGeom>
+        </p:spPr>
+        <p:style>
+          <a:lnRef idx="2">
+            <a:schemeClr val="accent1">
+              <a:shade val="50000"/>
+            </a:schemeClr>
+          </a:lnRef>
+          <a:fillRef idx="1">
+            <a:schemeClr val="accent1"/>
+          </a:fillRef>
+          <a:effectRef idx="0">
+            <a:schemeClr val="accent1"/>
+          </a:effectRef>
+          <a:fontRef idx="minor">
+            <a:schemeClr val="lt1"/>
+          </a:fontRef>
+        </p:style>
+        <p:txBody>
+          <a:bodyPr rtlCol="0" anchor="ctr"/>
+          <a:lstStyle/>
+          <a:p>
+            <a:pPr algn="ctr"/>
+            <a:r>
+              <a:rPr lang="pt-BR" dirty="0" smtClean="0"/>
+              <a:t>Dependência</a:t>
+            </a:r>
+            <a:endParaRPr lang="pt-BR" dirty="0"/>
+          </a:p>
+        </p:txBody>
+      </p:sp>
+      <p:cxnSp>
+        <p:nvCxnSpPr>
+          <p:cNvPr id="6" name="Conector de seta reta 5"/>
+          <p:cNvCxnSpPr>
+            <a:stCxn id="4" idx="3"/>
+            <a:endCxn id="5" idx="1"/>
+          </p:cNvCxnSpPr>
+          <p:nvPr/>
+        </p:nvCxnSpPr>
+        <p:spPr>
+          <a:xfrm>
+            <a:off x="4377336" y="3069772"/>
+            <a:ext cx="2558141" cy="0"/>
+          </a:xfrm>
+          <a:prstGeom prst="straightConnector1">
+            <a:avLst/>
+          </a:prstGeom>
+          <a:ln w="19050">
+            <a:tailEnd type="triangle"/>
+          </a:ln>
+        </p:spPr>
+        <p:style>
+          <a:lnRef idx="1">
+            <a:schemeClr val="accent1"/>
+          </a:lnRef>
+          <a:fillRef idx="0">
+            <a:schemeClr val="accent1"/>
+          </a:fillRef>
+          <a:effectRef idx="0">
+            <a:schemeClr val="accent1"/>
+          </a:effectRef>
+          <a:fontRef idx="minor">
+            <a:schemeClr val="tx1"/>
+          </a:fontRef>
+        </p:style>
+      </p:cxnSp>
+      <p:sp>
+        <p:nvSpPr>
+          <p:cNvPr id="7" name="CaixaDeTexto 6"/>
+          <p:cNvSpPr txBox="1"/>
+          <p:nvPr/>
+        </p:nvSpPr>
+        <p:spPr>
+          <a:xfrm>
+            <a:off x="4948835" y="2638579"/>
+            <a:ext cx="1756680" cy="369332"/>
+          </a:xfrm>
+          <a:prstGeom prst="rect">
+            <a:avLst/>
+          </a:prstGeom>
+          <a:noFill/>
+        </p:spPr>
+        <p:txBody>
+          <a:bodyPr wrap="square" rtlCol="0">
+            <a:spAutoFit/>
+          </a:bodyPr>
+          <a:lstStyle/>
+          <a:p>
+            <a:r>
+              <a:rPr lang="pt-BR" dirty="0" smtClean="0"/>
+              <a:t>Dependência</a:t>
+            </a:r>
+            <a:endParaRPr lang="pt-BR" dirty="0"/>
+          </a:p>
+        </p:txBody>
+      </p:sp>
+      <p:sp>
+        <p:nvSpPr>
+          <p:cNvPr id="10" name="Retângulo de cantos arredondados 9"/>
+          <p:cNvSpPr/>
+          <p:nvPr/>
+        </p:nvSpPr>
+        <p:spPr>
+          <a:xfrm>
+            <a:off x="4699824" y="4261756"/>
+            <a:ext cx="1913164" cy="979715"/>
+          </a:xfrm>
+          <a:prstGeom prst="roundRect">
+            <a:avLst/>
+          </a:prstGeom>
+        </p:spPr>
+        <p:style>
+          <a:lnRef idx="2">
+            <a:schemeClr val="accent3">
+              <a:shade val="50000"/>
+            </a:schemeClr>
+          </a:lnRef>
+          <a:fillRef idx="1">
+            <a:schemeClr val="accent3"/>
+          </a:fillRef>
+          <a:effectRef idx="0">
+            <a:schemeClr val="accent3"/>
+          </a:effectRef>
+          <a:fontRef idx="minor">
+            <a:schemeClr val="lt1"/>
+          </a:fontRef>
+        </p:style>
+        <p:txBody>
+          <a:bodyPr rtlCol="0" anchor="ctr"/>
+          <a:lstStyle/>
+          <a:p>
+            <a:pPr algn="ctr"/>
+            <a:r>
+              <a:rPr lang="pt-BR" dirty="0" smtClean="0"/>
+              <a:t>Interface</a:t>
+            </a:r>
+            <a:endParaRPr lang="pt-BR" dirty="0"/>
+          </a:p>
+        </p:txBody>
+      </p:sp>
+      <p:sp>
+        <p:nvSpPr>
+          <p:cNvPr id="11" name="Multiplicar 10"/>
+          <p:cNvSpPr/>
+          <p:nvPr/>
+        </p:nvSpPr>
+        <p:spPr>
+          <a:xfrm>
+            <a:off x="4666754" y="2315570"/>
+            <a:ext cx="1979303" cy="1508401"/>
+          </a:xfrm>
+          <a:prstGeom prst="mathMultiply">
+            <a:avLst>
+              <a:gd name="adj1" fmla="val 5595"/>
+            </a:avLst>
+          </a:prstGeom>
+          <a:solidFill>
+            <a:srgbClr val="FF0000"/>
+          </a:solidFill>
+        </p:spPr>
+        <p:style>
+          <a:lnRef idx="2">
+            <a:schemeClr val="accent1">
+              <a:shade val="50000"/>
+            </a:schemeClr>
+          </a:lnRef>
+          <a:fillRef idx="1">
+            <a:schemeClr val="accent1"/>
+          </a:fillRef>
+          <a:effectRef idx="0">
+            <a:schemeClr val="accent1"/>
+          </a:effectRef>
+          <a:fontRef idx="minor">
+            <a:schemeClr val="lt1"/>
+          </a:fontRef>
+        </p:style>
+        <p:txBody>
+          <a:bodyPr rtlCol="0" anchor="ctr"/>
+          <a:lstStyle/>
+          <a:p>
+            <a:pPr algn="ctr"/>
+            <a:endParaRPr lang="pt-BR"/>
+          </a:p>
+        </p:txBody>
+      </p:sp>
+      <p:cxnSp>
+        <p:nvCxnSpPr>
+          <p:cNvPr id="14" name="Conector de seta reta 13"/>
+          <p:cNvCxnSpPr>
+            <a:stCxn id="4" idx="2"/>
+            <a:endCxn id="10" idx="1"/>
+          </p:cNvCxnSpPr>
+          <p:nvPr/>
+        </p:nvCxnSpPr>
+        <p:spPr>
+          <a:xfrm>
+            <a:off x="3437082" y="3559629"/>
+            <a:ext cx="1262742" cy="1191985"/>
+          </a:xfrm>
+          <a:prstGeom prst="straightConnector1">
+            <a:avLst/>
+          </a:prstGeom>
+          <a:ln w="19050">
+            <a:tailEnd type="triangle"/>
+          </a:ln>
+        </p:spPr>
+        <p:style>
+          <a:lnRef idx="1">
+            <a:schemeClr val="accent1"/>
+          </a:lnRef>
+          <a:fillRef idx="0">
+            <a:schemeClr val="accent1"/>
+          </a:fillRef>
+          <a:effectRef idx="0">
+            <a:schemeClr val="accent1"/>
+          </a:effectRef>
+          <a:fontRef idx="minor">
+            <a:schemeClr val="tx1"/>
+          </a:fontRef>
+        </p:style>
+      </p:cxnSp>
+      <p:sp>
+        <p:nvSpPr>
+          <p:cNvPr id="17" name="CaixaDeTexto 16"/>
+          <p:cNvSpPr txBox="1"/>
+          <p:nvPr/>
+        </p:nvSpPr>
+        <p:spPr>
+          <a:xfrm>
+            <a:off x="2976441" y="4077090"/>
+            <a:ext cx="1151466" cy="369332"/>
+          </a:xfrm>
+          <a:prstGeom prst="rect">
+            <a:avLst/>
+          </a:prstGeom>
+          <a:noFill/>
+        </p:spPr>
+        <p:txBody>
+          <a:bodyPr wrap="square" rtlCol="0">
+            <a:spAutoFit/>
+          </a:bodyPr>
+          <a:lstStyle/>
+          <a:p>
+            <a:r>
+              <a:rPr lang="pt-BR" dirty="0" smtClean="0"/>
+              <a:t>Depende</a:t>
+            </a:r>
+            <a:endParaRPr lang="pt-BR" dirty="0"/>
+          </a:p>
+        </p:txBody>
+      </p:sp>
+      <p:cxnSp>
+        <p:nvCxnSpPr>
+          <p:cNvPr id="18" name="Conector de seta reta 17"/>
+          <p:cNvCxnSpPr>
+            <a:stCxn id="5" idx="2"/>
+            <a:endCxn id="10" idx="3"/>
+          </p:cNvCxnSpPr>
+          <p:nvPr/>
+        </p:nvCxnSpPr>
+        <p:spPr>
+          <a:xfrm flipH="1">
+            <a:off x="6612988" y="3559629"/>
+            <a:ext cx="1279071" cy="1191985"/>
+          </a:xfrm>
+          <a:prstGeom prst="straightConnector1">
+            <a:avLst/>
+          </a:prstGeom>
+          <a:ln w="19050">
+            <a:tailEnd type="triangle"/>
+          </a:ln>
+        </p:spPr>
+        <p:style>
+          <a:lnRef idx="1">
+            <a:schemeClr val="accent1"/>
+          </a:lnRef>
+          <a:fillRef idx="0">
+            <a:schemeClr val="accent1"/>
+          </a:fillRef>
+          <a:effectRef idx="0">
+            <a:schemeClr val="accent1"/>
+          </a:effectRef>
+          <a:fontRef idx="minor">
+            <a:schemeClr val="tx1"/>
+          </a:fontRef>
+        </p:style>
+      </p:cxnSp>
+      <p:sp>
+        <p:nvSpPr>
+          <p:cNvPr id="21" name="CaixaDeTexto 20"/>
+          <p:cNvSpPr txBox="1"/>
+          <p:nvPr/>
+        </p:nvSpPr>
+        <p:spPr>
+          <a:xfrm>
+            <a:off x="7203806" y="4100485"/>
+            <a:ext cx="1322346" cy="369332"/>
+          </a:xfrm>
+          <a:prstGeom prst="rect">
+            <a:avLst/>
+          </a:prstGeom>
+          <a:noFill/>
+        </p:spPr>
+        <p:txBody>
+          <a:bodyPr wrap="square" rtlCol="0">
+            <a:spAutoFit/>
+          </a:bodyPr>
+          <a:lstStyle/>
+          <a:p>
+            <a:r>
+              <a:rPr lang="pt-BR" dirty="0" smtClean="0"/>
+              <a:t>Implementa</a:t>
+            </a:r>
+            <a:endParaRPr lang="pt-BR" dirty="0"/>
+          </a:p>
+        </p:txBody>
+      </p:sp>
+      <p:sp>
+        <p:nvSpPr>
+          <p:cNvPr id="22" name="CaixaDeTexto 21"/>
+          <p:cNvSpPr txBox="1"/>
+          <p:nvPr/>
+        </p:nvSpPr>
+        <p:spPr>
+          <a:xfrm>
+            <a:off x="4377336" y="5622960"/>
+            <a:ext cx="2634999" cy="461665"/>
+          </a:xfrm>
+          <a:prstGeom prst="rect">
+            <a:avLst/>
+          </a:prstGeom>
+          <a:noFill/>
+        </p:spPr>
+        <p:txBody>
+          <a:bodyPr wrap="square" rtlCol="0">
+            <a:spAutoFit/>
+          </a:bodyPr>
+          <a:lstStyle/>
+          <a:p>
+            <a:r>
+              <a:rPr lang="pt-BR" sz="2400" b="1" dirty="0" smtClean="0"/>
+              <a:t>Baixo acoplamento</a:t>
+            </a:r>
+            <a:endParaRPr lang="pt-BR" sz="2400" b="1" dirty="0"/>
+          </a:p>
+        </p:txBody>
+      </p:sp>
+    </p:spTree>
+    <p:extLst>
+      <p:ext uri="{BB962C8B-B14F-4D97-AF65-F5344CB8AC3E}">
+        <p14:creationId xmlns:p14="http://schemas.microsoft.com/office/powerpoint/2010/main" val="3130210142"/>
+      </p:ext>
+    </p:extLst>
+  </p:cSld>
+  <p:clrMapOvr>
+    <a:masterClrMapping/>
+  </p:clrMapOvr>
+  <p:timing>
+    <p:tnLst>
+      <p:par>
+        <p:cTn id="1" dur="indefinite" restart="never" nodeType="tmRoot">
+          <p:childTnLst>
+            <p:seq concurrent="1" nextAc="seek">
+              <p:cTn id="2" dur="indefinite" nodeType="mainSeq">
+                <p:childTnLst>
+                  <p:par>
+                    <p:cTn id="3" fill="hold">
+                      <p:stCondLst>
+                        <p:cond delay="indefinite"/>
+                      </p:stCondLst>
+                      <p:childTnLst>
+                        <p:par>
+                          <p:cTn id="4" fill="hold">
+                            <p:stCondLst>
+                              <p:cond delay="0"/>
+                            </p:stCondLst>
+                            <p:childTnLst>
+                              <p:par>
+                                <p:cTn id="5" presetID="10" presetClass="entr" presetSubtype="0" fill="hold" grpId="0" nodeType="clickEffect">
+                                  <p:stCondLst>
+                                    <p:cond delay="0"/>
+                                  </p:stCondLst>
+                                  <p:childTnLst>
+                                    <p:set>
+                                      <p:cBhvr>
+                                        <p:cTn id="6" dur="1" fill="hold">
+                                          <p:stCondLst>
+                                            <p:cond delay="0"/>
+                                          </p:stCondLst>
+                                        </p:cTn>
+                                        <p:tgtEl>
+                                          <p:spTgt spid="4"/>
+                                        </p:tgtEl>
+                                        <p:attrNameLst>
+                                          <p:attrName>style.visibility</p:attrName>
+                                        </p:attrNameLst>
+                                      </p:cBhvr>
+                                      <p:to>
+                                        <p:strVal val="visible"/>
+                                      </p:to>
+                                    </p:set>
+                                    <p:animEffect transition="in" filter="fade">
+                                      <p:cBhvr>
+                                        <p:cTn id="7" dur="500"/>
+                                        <p:tgtEl>
+                                          <p:spTgt spid="4"/>
+                                        </p:tgtEl>
+                                      </p:cBhvr>
+                                    </p:animEffect>
+                                  </p:childTnLst>
+                                </p:cTn>
+                              </p:par>
+                              <p:par>
+                                <p:cTn id="8" presetID="10" presetClass="entr" presetSubtype="0" fill="hold" nodeType="withEffect">
+                                  <p:stCondLst>
+                                    <p:cond delay="0"/>
+                                  </p:stCondLst>
+                                  <p:childTnLst>
+                                    <p:set>
+                                      <p:cBhvr>
+                                        <p:cTn id="9" dur="1" fill="hold">
+                                          <p:stCondLst>
+                                            <p:cond delay="0"/>
+                                          </p:stCondLst>
+                                        </p:cTn>
+                                        <p:tgtEl>
+                                          <p:spTgt spid="6"/>
+                                        </p:tgtEl>
+                                        <p:attrNameLst>
+                                          <p:attrName>style.visibility</p:attrName>
+                                        </p:attrNameLst>
+                                      </p:cBhvr>
+                                      <p:to>
+                                        <p:strVal val="visible"/>
+                                      </p:to>
+                                    </p:set>
+                                    <p:animEffect transition="in" filter="fade">
+                                      <p:cBhvr>
+                                        <p:cTn id="10" dur="500"/>
+                                        <p:tgtEl>
+                                          <p:spTgt spid="6"/>
+                                        </p:tgtEl>
+                                      </p:cBhvr>
+                                    </p:animEffect>
+                                  </p:childTnLst>
+                                </p:cTn>
+                              </p:par>
+                              <p:par>
+                                <p:cTn id="11" presetID="10" presetClass="entr" presetSubtype="0" fill="hold" grpId="0" nodeType="withEffect">
+                                  <p:stCondLst>
+                                    <p:cond delay="0"/>
+                                  </p:stCondLst>
+                                  <p:childTnLst>
+                                    <p:set>
+                                      <p:cBhvr>
+                                        <p:cTn id="12" dur="1" fill="hold">
+                                          <p:stCondLst>
+                                            <p:cond delay="0"/>
+                                          </p:stCondLst>
+                                        </p:cTn>
+                                        <p:tgtEl>
+                                          <p:spTgt spid="7"/>
+                                        </p:tgtEl>
+                                        <p:attrNameLst>
+                                          <p:attrName>style.visibility</p:attrName>
+                                        </p:attrNameLst>
+                                      </p:cBhvr>
+                                      <p:to>
+                                        <p:strVal val="visible"/>
+                                      </p:to>
+                                    </p:set>
+                                    <p:animEffect transition="in" filter="fade">
+                                      <p:cBhvr>
+                                        <p:cTn id="13" dur="500"/>
+                                        <p:tgtEl>
+                                          <p:spTgt spid="7"/>
+                                        </p:tgtEl>
+                                      </p:cBhvr>
+                                    </p:animEffect>
+                                  </p:childTnLst>
+                                </p:cTn>
+                              </p:par>
+                              <p:par>
+                                <p:cTn id="14" presetID="10" presetClass="entr" presetSubtype="0" fill="hold" grpId="0" nodeType="withEffect">
+                                  <p:stCondLst>
+                                    <p:cond delay="0"/>
+                                  </p:stCondLst>
+                                  <p:childTnLst>
+                                    <p:set>
+                                      <p:cBhvr>
+                                        <p:cTn id="15" dur="1" fill="hold">
+                                          <p:stCondLst>
+                                            <p:cond delay="0"/>
+                                          </p:stCondLst>
+                                        </p:cTn>
+                                        <p:tgtEl>
+                                          <p:spTgt spid="5"/>
+                                        </p:tgtEl>
+                                        <p:attrNameLst>
+                                          <p:attrName>style.visibility</p:attrName>
+                                        </p:attrNameLst>
+                                      </p:cBhvr>
+                                      <p:to>
+                                        <p:strVal val="visible"/>
+                                      </p:to>
+                                    </p:set>
+                                    <p:animEffect transition="in" filter="fade">
+                                      <p:cBhvr>
+                                        <p:cTn id="16" dur="500"/>
+                                        <p:tgtEl>
+                                          <p:spTgt spid="5"/>
+                                        </p:tgtEl>
+                                      </p:cBhvr>
+                                    </p:animEffect>
+                                  </p:childTnLst>
+                                </p:cTn>
+                              </p:par>
+                            </p:childTnLst>
+                          </p:cTn>
+                        </p:par>
+                      </p:childTnLst>
+                    </p:cTn>
+                  </p:par>
+                  <p:par>
+                    <p:cTn id="17" fill="hold">
+                      <p:stCondLst>
+                        <p:cond delay="indefinite"/>
+                      </p:stCondLst>
+                      <p:childTnLst>
+                        <p:par>
+                          <p:cTn id="18" fill="hold">
+                            <p:stCondLst>
+                              <p:cond delay="0"/>
+                            </p:stCondLst>
+                            <p:childTnLst>
+                              <p:par>
+                                <p:cTn id="19" presetID="2" presetClass="entr" presetSubtype="4" fill="hold" grpId="0" nodeType="clickEffect">
+                                  <p:stCondLst>
+                                    <p:cond delay="0"/>
+                                  </p:stCondLst>
+                                  <p:childTnLst>
+                                    <p:set>
+                                      <p:cBhvr>
+                                        <p:cTn id="20" dur="1" fill="hold">
+                                          <p:stCondLst>
+                                            <p:cond delay="0"/>
+                                          </p:stCondLst>
+                                        </p:cTn>
+                                        <p:tgtEl>
+                                          <p:spTgt spid="11"/>
+                                        </p:tgtEl>
+                                        <p:attrNameLst>
+                                          <p:attrName>style.visibility</p:attrName>
+                                        </p:attrNameLst>
+                                      </p:cBhvr>
+                                      <p:to>
+                                        <p:strVal val="visible"/>
+                                      </p:to>
+                                    </p:set>
+                                    <p:anim calcmode="lin" valueType="num">
+                                      <p:cBhvr additive="base">
+                                        <p:cTn id="21" dur="500" fill="hold"/>
+                                        <p:tgtEl>
+                                          <p:spTgt spid="11"/>
+                                        </p:tgtEl>
+                                        <p:attrNameLst>
+                                          <p:attrName>ppt_x</p:attrName>
+                                        </p:attrNameLst>
+                                      </p:cBhvr>
+                                      <p:tavLst>
+                                        <p:tav tm="0">
+                                          <p:val>
+                                            <p:strVal val="#ppt_x"/>
+                                          </p:val>
+                                        </p:tav>
+                                        <p:tav tm="100000">
+                                          <p:val>
+                                            <p:strVal val="#ppt_x"/>
+                                          </p:val>
+                                        </p:tav>
+                                      </p:tavLst>
+                                    </p:anim>
+                                    <p:anim calcmode="lin" valueType="num">
+                                      <p:cBhvr additive="base">
+                                        <p:cTn id="22" dur="500" fill="hold"/>
+                                        <p:tgtEl>
+                                          <p:spTgt spid="11"/>
+                                        </p:tgtEl>
+                                        <p:attrNameLst>
+                                          <p:attrName>ppt_y</p:attrName>
+                                        </p:attrNameLst>
+                                      </p:cBhvr>
+                                      <p:tavLst>
+                                        <p:tav tm="0">
+                                          <p:val>
+                                            <p:strVal val="1+#ppt_h/2"/>
+                                          </p:val>
+                                        </p:tav>
+                                        <p:tav tm="100000">
+                                          <p:val>
+                                            <p:strVal val="#ppt_y"/>
+                                          </p:val>
+                                        </p:tav>
+                                      </p:tavLst>
+                                    </p:anim>
+                                  </p:childTnLst>
+                                </p:cTn>
+                              </p:par>
+                            </p:childTnLst>
+                          </p:cTn>
+                        </p:par>
+                      </p:childTnLst>
+                    </p:cTn>
+                  </p:par>
+                  <p:par>
+                    <p:cTn id="23" fill="hold">
+                      <p:stCondLst>
+                        <p:cond delay="indefinite"/>
+                      </p:stCondLst>
+                      <p:childTnLst>
+                        <p:par>
+                          <p:cTn id="24" fill="hold">
+                            <p:stCondLst>
+                              <p:cond delay="0"/>
+                            </p:stCondLst>
+                            <p:childTnLst>
+                              <p:par>
+                                <p:cTn id="25" presetID="10" presetClass="entr" presetSubtype="0" fill="hold" grpId="0" nodeType="clickEffect">
+                                  <p:stCondLst>
+                                    <p:cond delay="0"/>
+                                  </p:stCondLst>
+                                  <p:childTnLst>
+                                    <p:set>
+                                      <p:cBhvr>
+                                        <p:cTn id="26" dur="1" fill="hold">
+                                          <p:stCondLst>
+                                            <p:cond delay="0"/>
+                                          </p:stCondLst>
+                                        </p:cTn>
+                                        <p:tgtEl>
+                                          <p:spTgt spid="17"/>
+                                        </p:tgtEl>
+                                        <p:attrNameLst>
+                                          <p:attrName>style.visibility</p:attrName>
+                                        </p:attrNameLst>
+                                      </p:cBhvr>
+                                      <p:to>
+                                        <p:strVal val="visible"/>
+                                      </p:to>
+                                    </p:set>
+                                    <p:animEffect transition="in" filter="fade">
+                                      <p:cBhvr>
+                                        <p:cTn id="27" dur="500"/>
+                                        <p:tgtEl>
+                                          <p:spTgt spid="17"/>
+                                        </p:tgtEl>
+                                      </p:cBhvr>
+                                    </p:animEffect>
+                                  </p:childTnLst>
+                                </p:cTn>
+                              </p:par>
+                              <p:par>
+                                <p:cTn id="28" presetID="10" presetClass="entr" presetSubtype="0" fill="hold" grpId="0" nodeType="withEffect">
+                                  <p:stCondLst>
+                                    <p:cond delay="0"/>
+                                  </p:stCondLst>
+                                  <p:childTnLst>
+                                    <p:set>
+                                      <p:cBhvr>
+                                        <p:cTn id="29" dur="1" fill="hold">
+                                          <p:stCondLst>
+                                            <p:cond delay="0"/>
+                                          </p:stCondLst>
+                                        </p:cTn>
+                                        <p:tgtEl>
+                                          <p:spTgt spid="10"/>
+                                        </p:tgtEl>
+                                        <p:attrNameLst>
+                                          <p:attrName>style.visibility</p:attrName>
+                                        </p:attrNameLst>
+                                      </p:cBhvr>
+                                      <p:to>
+                                        <p:strVal val="visible"/>
+                                      </p:to>
+                                    </p:set>
+                                    <p:animEffect transition="in" filter="fade">
+                                      <p:cBhvr>
+                                        <p:cTn id="30" dur="500"/>
+                                        <p:tgtEl>
+                                          <p:spTgt spid="10"/>
+                                        </p:tgtEl>
+                                      </p:cBhvr>
+                                    </p:animEffect>
+                                  </p:childTnLst>
+                                </p:cTn>
+                              </p:par>
+                              <p:par>
+                                <p:cTn id="31" presetID="1" presetClass="entr" presetSubtype="0" fill="hold" nodeType="withEffect">
+                                  <p:stCondLst>
+                                    <p:cond delay="0"/>
+                                  </p:stCondLst>
+                                  <p:childTnLst>
+                                    <p:set>
+                                      <p:cBhvr>
+                                        <p:cTn id="32" dur="1" fill="hold">
+                                          <p:stCondLst>
+                                            <p:cond delay="0"/>
+                                          </p:stCondLst>
+                                        </p:cTn>
+                                        <p:tgtEl>
+                                          <p:spTgt spid="14"/>
+                                        </p:tgtEl>
+                                        <p:attrNameLst>
+                                          <p:attrName>style.visibility</p:attrName>
+                                        </p:attrNameLst>
+                                      </p:cBhvr>
+                                      <p:to>
+                                        <p:strVal val="visible"/>
+                                      </p:to>
+                                    </p:set>
+                                  </p:childTnLst>
+                                </p:cTn>
+                              </p:par>
+                            </p:childTnLst>
+                          </p:cTn>
+                        </p:par>
+                      </p:childTnLst>
+                    </p:cTn>
+                  </p:par>
+                  <p:par>
+                    <p:cTn id="33" fill="hold">
+                      <p:stCondLst>
+                        <p:cond delay="indefinite"/>
+                      </p:stCondLst>
+                      <p:childTnLst>
+                        <p:par>
+                          <p:cTn id="34" fill="hold">
+                            <p:stCondLst>
+                              <p:cond delay="0"/>
+                            </p:stCondLst>
+                            <p:childTnLst>
+                              <p:par>
+                                <p:cTn id="35" presetID="10" presetClass="entr" presetSubtype="0" fill="hold" grpId="0" nodeType="clickEffect">
+                                  <p:stCondLst>
+                                    <p:cond delay="0"/>
+                                  </p:stCondLst>
+                                  <p:childTnLst>
+                                    <p:set>
+                                      <p:cBhvr>
+                                        <p:cTn id="36" dur="1" fill="hold">
+                                          <p:stCondLst>
+                                            <p:cond delay="0"/>
+                                          </p:stCondLst>
+                                        </p:cTn>
+                                        <p:tgtEl>
+                                          <p:spTgt spid="21"/>
+                                        </p:tgtEl>
+                                        <p:attrNameLst>
+                                          <p:attrName>style.visibility</p:attrName>
+                                        </p:attrNameLst>
+                                      </p:cBhvr>
+                                      <p:to>
+                                        <p:strVal val="visible"/>
+                                      </p:to>
+                                    </p:set>
+                                    <p:animEffect transition="in" filter="fade">
+                                      <p:cBhvr>
+                                        <p:cTn id="37" dur="500"/>
+                                        <p:tgtEl>
+                                          <p:spTgt spid="21"/>
+                                        </p:tgtEl>
+                                      </p:cBhvr>
+                                    </p:animEffect>
+                                  </p:childTnLst>
+                                </p:cTn>
+                              </p:par>
+                              <p:par>
+                                <p:cTn id="38" presetID="10" presetClass="entr" presetSubtype="0" fill="hold" nodeType="withEffect">
+                                  <p:stCondLst>
+                                    <p:cond delay="0"/>
+                                  </p:stCondLst>
+                                  <p:childTnLst>
+                                    <p:set>
+                                      <p:cBhvr>
+                                        <p:cTn id="39" dur="1" fill="hold">
+                                          <p:stCondLst>
+                                            <p:cond delay="0"/>
+                                          </p:stCondLst>
+                                        </p:cTn>
+                                        <p:tgtEl>
+                                          <p:spTgt spid="18"/>
+                                        </p:tgtEl>
+                                        <p:attrNameLst>
+                                          <p:attrName>style.visibility</p:attrName>
+                                        </p:attrNameLst>
+                                      </p:cBhvr>
+                                      <p:to>
+                                        <p:strVal val="visible"/>
+                                      </p:to>
+                                    </p:set>
+                                    <p:animEffect transition="in" filter="fade">
+                                      <p:cBhvr>
+                                        <p:cTn id="40" dur="500"/>
+                                        <p:tgtEl>
+                                          <p:spTgt spid="18"/>
+                                        </p:tgtEl>
+                                      </p:cBhvr>
+                                    </p:animEffect>
+                                  </p:childTnLst>
+                                </p:cTn>
+                              </p:par>
+                            </p:childTnLst>
+                          </p:cTn>
+                        </p:par>
+                      </p:childTnLst>
+                    </p:cTn>
+                  </p:par>
+                  <p:par>
+                    <p:cTn id="41" fill="hold">
+                      <p:stCondLst>
+                        <p:cond delay="indefinite"/>
+                      </p:stCondLst>
+                      <p:childTnLst>
+                        <p:par>
+                          <p:cTn id="42" fill="hold">
+                            <p:stCondLst>
+                              <p:cond delay="0"/>
+                            </p:stCondLst>
+                            <p:childTnLst>
+                              <p:par>
+                                <p:cTn id="43" presetID="10" presetClass="entr" presetSubtype="0" fill="hold" grpId="0" nodeType="clickEffect">
+                                  <p:stCondLst>
+                                    <p:cond delay="0"/>
+                                  </p:stCondLst>
+                                  <p:childTnLst>
+                                    <p:set>
+                                      <p:cBhvr>
+                                        <p:cTn id="44" dur="1" fill="hold">
+                                          <p:stCondLst>
+                                            <p:cond delay="0"/>
+                                          </p:stCondLst>
+                                        </p:cTn>
+                                        <p:tgtEl>
+                                          <p:spTgt spid="22"/>
+                                        </p:tgtEl>
+                                        <p:attrNameLst>
+                                          <p:attrName>style.visibility</p:attrName>
+                                        </p:attrNameLst>
+                                      </p:cBhvr>
+                                      <p:to>
+                                        <p:strVal val="visible"/>
+                                      </p:to>
+                                    </p:set>
+                                    <p:animEffect transition="in" filter="fade">
+                                      <p:cBhvr>
+                                        <p:cTn id="45" dur="500"/>
+                                        <p:tgtEl>
+                                          <p:spTgt spid="22"/>
+                                        </p:tgtEl>
+                                      </p:cBhvr>
+                                    </p:animEffect>
+                                  </p:childTnLst>
+                                </p:cTn>
+                              </p:par>
+                            </p:childTnLst>
+                          </p:cTn>
+                        </p:par>
+                      </p:childTnLst>
+                    </p:cTn>
+                  </p:par>
+                </p:childTnLst>
+              </p:cTn>
+              <p:prevCondLst>
+                <p:cond evt="onPrev" delay="0">
+                  <p:tgtEl>
+                    <p:sldTgt/>
+                  </p:tgtEl>
+                </p:cond>
+              </p:prevCondLst>
+              <p:nextCondLst>
+                <p:cond evt="onNext" delay="0">
+                  <p:tgtEl>
+                    <p:sldTgt/>
+                  </p:tgtEl>
+                </p:cond>
+              </p:nextCondLst>
+            </p:seq>
+          </p:childTnLst>
+        </p:cTn>
+      </p:par>
+    </p:tnLst>
+    <p:bldLst>
+      <p:bldP spid="4" grpId="0" animBg="1"/>
+      <p:bldP spid="5" grpId="0" animBg="1"/>
+      <p:bldP spid="7" grpId="0"/>
+      <p:bldP spid="10" grpId="0" animBg="1"/>
+      <p:bldP spid="11" grpId="0" animBg="1"/>
+      <p:bldP spid="17" grpId="0"/>
+      <p:bldP spid="21" grpId="0"/>
+      <p:bldP spid="22" grpId="0"/>
+    </p:bldLst>
+  </p:timing>
+</p:sld>
+</file>
+
+<file path=ppt/slides/slide52.xml><?xml version="1.0" encoding="utf-8"?>
+<p:sld xmlns:a="http://schemas.openxmlformats.org/drawingml/2006/main" xmlns:r="http://schemas.openxmlformats.org/officeDocument/2006/relationships" xmlns:p="http://schemas.openxmlformats.org/presentationml/2006/main">
+  <p:cSld>
+    <p:spTree>
+      <p:nvGrpSpPr>
+        <p:cNvPr id="1" name=""/>
+        <p:cNvGrpSpPr/>
+        <p:nvPr/>
+      </p:nvGrpSpPr>
+      <p:grpSpPr>
+        <a:xfrm>
+          <a:off x="0" y="0"/>
+          <a:ext cx="0" cy="0"/>
+          <a:chOff x="0" y="0"/>
+          <a:chExt cx="0" cy="0"/>
+        </a:xfrm>
+      </p:grpSpPr>
+      <p:sp>
+        <p:nvSpPr>
+          <p:cNvPr id="2" name="Espaço Reservado para Texto 1"/>
+          <p:cNvSpPr>
+            <a:spLocks noGrp="1"/>
+          </p:cNvSpPr>
+          <p:nvPr>
+            <p:ph type="body" sz="quarter" idx="10"/>
+          </p:nvPr>
+        </p:nvSpPr>
+        <p:spPr/>
+        <p:txBody>
+          <a:bodyPr/>
+          <a:lstStyle/>
+          <a:p>
+            <a:r>
+              <a:rPr lang="pt-BR" dirty="0" smtClean="0"/>
+              <a:t>Configuração das injeções</a:t>
+            </a:r>
+            <a:endParaRPr lang="pt-BR" dirty="0"/>
+          </a:p>
+        </p:txBody>
+      </p:sp>
+      <p:sp>
+        <p:nvSpPr>
+          <p:cNvPr id="3" name="Espaço Reservado para Texto 2"/>
+          <p:cNvSpPr>
+            <a:spLocks noGrp="1"/>
+          </p:cNvSpPr>
+          <p:nvPr>
+            <p:ph type="body" sz="quarter" idx="11"/>
+          </p:nvPr>
+        </p:nvSpPr>
+        <p:spPr/>
+        <p:txBody>
+          <a:bodyPr/>
+          <a:lstStyle/>
+          <a:p>
+            <a:pPr marL="342900" indent="-342900">
+              <a:buFont typeface="Arial" panose="020B0604020202020204" pitchFamily="34" charset="0"/>
+              <a:buChar char="•"/>
+            </a:pPr>
+            <a:r>
+              <a:rPr lang="pt-BR" dirty="0" smtClean="0"/>
+              <a:t>Service Container (ou </a:t>
+            </a:r>
+            <a:r>
+              <a:rPr lang="pt-BR" dirty="0" err="1" smtClean="0"/>
+              <a:t>Dependency</a:t>
+            </a:r>
+            <a:r>
+              <a:rPr lang="pt-BR" dirty="0" smtClean="0"/>
+              <a:t> </a:t>
+            </a:r>
+            <a:r>
+              <a:rPr lang="pt-BR" dirty="0" err="1" smtClean="0"/>
+              <a:t>Injection</a:t>
+            </a:r>
+            <a:r>
+              <a:rPr lang="pt-BR" dirty="0" smtClean="0"/>
+              <a:t> Container)</a:t>
+            </a:r>
+          </a:p>
+          <a:p>
+            <a:pPr marL="342900" indent="-342900">
+              <a:buFont typeface="Arial" panose="020B0604020202020204" pitchFamily="34" charset="0"/>
+              <a:buChar char="•"/>
+            </a:pPr>
+            <a:r>
+              <a:rPr lang="pt-BR" dirty="0" smtClean="0"/>
+              <a:t>Escopos:</a:t>
+            </a:r>
+          </a:p>
+          <a:p>
+            <a:pPr marL="1085850" lvl="1" indent="-342900">
+              <a:buFont typeface="Arial" panose="020B0604020202020204" pitchFamily="34" charset="0"/>
+              <a:buChar char="•"/>
+            </a:pPr>
+            <a:r>
+              <a:rPr lang="pt-BR" sz="2200" dirty="0" smtClean="0">
+                <a:latin typeface="Arial" panose="020B0604020202020204" pitchFamily="34" charset="0"/>
+                <a:cs typeface="Arial" panose="020B0604020202020204" pitchFamily="34" charset="0"/>
+              </a:rPr>
+              <a:t>Global (</a:t>
+            </a:r>
+            <a:r>
+              <a:rPr lang="pt-BR" sz="2200" dirty="0" err="1" smtClean="0">
+                <a:latin typeface="Arial" panose="020B0604020202020204" pitchFamily="34" charset="0"/>
+                <a:cs typeface="Arial" panose="020B0604020202020204" pitchFamily="34" charset="0"/>
+              </a:rPr>
+              <a:t>Singleton</a:t>
+            </a:r>
+            <a:r>
+              <a:rPr lang="pt-BR" sz="2200" dirty="0" smtClean="0">
+                <a:latin typeface="Arial" panose="020B0604020202020204" pitchFamily="34" charset="0"/>
+                <a:cs typeface="Arial" panose="020B0604020202020204" pitchFamily="34" charset="0"/>
+              </a:rPr>
+              <a:t>)</a:t>
+            </a:r>
+          </a:p>
+          <a:p>
+            <a:pPr marL="1085850" lvl="1" indent="-342900">
+              <a:buFont typeface="Arial" panose="020B0604020202020204" pitchFamily="34" charset="0"/>
+              <a:buChar char="•"/>
+            </a:pPr>
+            <a:r>
+              <a:rPr lang="pt-BR" sz="2200" dirty="0" smtClean="0">
+                <a:latin typeface="Arial" panose="020B0604020202020204" pitchFamily="34" charset="0"/>
+                <a:cs typeface="Arial" panose="020B0604020202020204" pitchFamily="34" charset="0"/>
+              </a:rPr>
+              <a:t>Por requisição (</a:t>
+            </a:r>
+            <a:r>
+              <a:rPr lang="pt-BR" sz="2200" dirty="0" err="1" smtClean="0">
+                <a:latin typeface="Arial" panose="020B0604020202020204" pitchFamily="34" charset="0"/>
+                <a:cs typeface="Arial" panose="020B0604020202020204" pitchFamily="34" charset="0"/>
+              </a:rPr>
+              <a:t>Scoped</a:t>
+            </a:r>
+            <a:r>
+              <a:rPr lang="pt-BR" sz="2200" dirty="0" smtClean="0">
+                <a:latin typeface="Arial" panose="020B0604020202020204" pitchFamily="34" charset="0"/>
+                <a:cs typeface="Arial" panose="020B0604020202020204" pitchFamily="34" charset="0"/>
+              </a:rPr>
+              <a:t>)</a:t>
+            </a:r>
+          </a:p>
+          <a:p>
+            <a:pPr marL="1085850" lvl="1" indent="-342900">
+              <a:buFont typeface="Arial" panose="020B0604020202020204" pitchFamily="34" charset="0"/>
+              <a:buChar char="•"/>
+            </a:pPr>
+            <a:r>
+              <a:rPr lang="pt-BR" sz="2200" dirty="0" smtClean="0">
+                <a:latin typeface="Arial" panose="020B0604020202020204" pitchFamily="34" charset="0"/>
+                <a:cs typeface="Arial" panose="020B0604020202020204" pitchFamily="34" charset="0"/>
+              </a:rPr>
+              <a:t>Momentâneo (</a:t>
+            </a:r>
+            <a:r>
+              <a:rPr lang="pt-BR" sz="2200" dirty="0" err="1" smtClean="0">
+                <a:latin typeface="Arial" panose="020B0604020202020204" pitchFamily="34" charset="0"/>
+                <a:cs typeface="Arial" panose="020B0604020202020204" pitchFamily="34" charset="0"/>
+              </a:rPr>
+              <a:t>Transient</a:t>
+            </a:r>
+            <a:r>
+              <a:rPr lang="pt-BR" sz="2200" dirty="0" smtClean="0">
+                <a:latin typeface="Arial" panose="020B0604020202020204" pitchFamily="34" charset="0"/>
+                <a:cs typeface="Arial" panose="020B0604020202020204" pitchFamily="34" charset="0"/>
+              </a:rPr>
+              <a:t>)</a:t>
+            </a:r>
+          </a:p>
+          <a:p>
+            <a:pPr marL="342900" indent="-342900">
+              <a:buFont typeface="Arial" panose="020B0604020202020204" pitchFamily="34" charset="0"/>
+              <a:buChar char="•"/>
+            </a:pPr>
+            <a:r>
+              <a:rPr lang="pt-BR" dirty="0" smtClean="0"/>
+              <a:t>Dependências são declaradas no construtor da classe</a:t>
+            </a:r>
+            <a:endParaRPr lang="pt-BR" dirty="0" smtClean="0">
+              <a:latin typeface="Arial" panose="020B0604020202020204" pitchFamily="34" charset="0"/>
+              <a:cs typeface="Arial" panose="020B0604020202020204" pitchFamily="34" charset="0"/>
+            </a:endParaRPr>
+          </a:p>
+          <a:p>
+            <a:pPr marL="342900" indent="-342900">
+              <a:buFont typeface="Arial" panose="020B0604020202020204" pitchFamily="34" charset="0"/>
+              <a:buChar char="•"/>
+            </a:pPr>
+            <a:endParaRPr lang="pt-BR" dirty="0"/>
+          </a:p>
+        </p:txBody>
+      </p:sp>
+      <p:pic>
+        <p:nvPicPr>
+          <p:cNvPr id="6" name="Imagem 5"/>
+          <p:cNvPicPr>
+            <a:picLocks noChangeAspect="1"/>
+          </p:cNvPicPr>
+          <p:nvPr/>
+        </p:nvPicPr>
+        <p:blipFill>
+          <a:blip r:embed="rId2"/>
+          <a:stretch>
+            <a:fillRect/>
+          </a:stretch>
+        </p:blipFill>
+        <p:spPr>
+          <a:xfrm>
+            <a:off x="4544264" y="2028824"/>
+            <a:ext cx="6125104" cy="902635"/>
+          </a:xfrm>
+          <a:prstGeom prst="rect">
+            <a:avLst/>
+          </a:prstGeom>
+        </p:spPr>
+      </p:pic>
+      <p:pic>
+        <p:nvPicPr>
+          <p:cNvPr id="7" name="Imagem 6"/>
+          <p:cNvPicPr>
+            <a:picLocks noChangeAspect="1"/>
+          </p:cNvPicPr>
+          <p:nvPr/>
+        </p:nvPicPr>
+        <p:blipFill>
+          <a:blip r:embed="rId3"/>
+          <a:stretch>
+            <a:fillRect/>
+          </a:stretch>
+        </p:blipFill>
+        <p:spPr>
+          <a:xfrm>
+            <a:off x="908517" y="3964920"/>
+            <a:ext cx="5558586" cy="2086256"/>
+          </a:xfrm>
+          <a:prstGeom prst="rect">
+            <a:avLst/>
+          </a:prstGeom>
+        </p:spPr>
+      </p:pic>
+    </p:spTree>
+    <p:extLst>
+      <p:ext uri="{BB962C8B-B14F-4D97-AF65-F5344CB8AC3E}">
+        <p14:creationId xmlns:p14="http://schemas.microsoft.com/office/powerpoint/2010/main" val="582000840"/>
+      </p:ext>
+    </p:extLst>
+  </p:cSld>
+  <p:clrMapOvr>
+    <a:masterClrMapping/>
+  </p:clrMapOvr>
+  <p:timing>
+    <p:tnLst>
+      <p:par>
+        <p:cTn id="1" dur="indefinite" restart="never" nodeType="tmRoot"/>
+      </p:par>
+    </p:tnLst>
+  </p:timing>
+</p:sld>
+</file>
+
+<file path=ppt/slides/slide53.xml><?xml version="1.0" encoding="utf-8"?>
+<p:sld xmlns:a="http://schemas.openxmlformats.org/drawingml/2006/main" xmlns:r="http://schemas.openxmlformats.org/officeDocument/2006/relationships" xmlns:p="http://schemas.openxmlformats.org/presentationml/2006/main">
+  <p:cSld>
+    <p:spTree>
+      <p:nvGrpSpPr>
+        <p:cNvPr id="1" name=""/>
+        <p:cNvGrpSpPr/>
+        <p:nvPr/>
+      </p:nvGrpSpPr>
+      <p:grpSpPr>
+        <a:xfrm>
+          <a:off x="0" y="0"/>
+          <a:ext cx="0" cy="0"/>
+          <a:chOff x="0" y="0"/>
+          <a:chExt cx="0" cy="0"/>
+        </a:xfrm>
+      </p:grpSpPr>
+      <p:sp>
+        <p:nvSpPr>
+          <p:cNvPr id="2" name="Espaço Reservado para Texto 1"/>
+          <p:cNvSpPr>
+            <a:spLocks noGrp="1"/>
+          </p:cNvSpPr>
+          <p:nvPr>
+            <p:ph type="body" sz="quarter" idx="10"/>
+          </p:nvPr>
+        </p:nvSpPr>
+        <p:spPr/>
+        <p:txBody>
+          <a:bodyPr/>
+          <a:lstStyle/>
+          <a:p>
+            <a:r>
+              <a:rPr lang="pt-BR" dirty="0" err="1" smtClean="0"/>
+              <a:t>Refatoração</a:t>
+            </a:r>
+            <a:endParaRPr lang="pt-BR" dirty="0"/>
+          </a:p>
+        </p:txBody>
+      </p:sp>
+      <p:pic>
+        <p:nvPicPr>
+          <p:cNvPr id="4" name="Imagem 3"/>
+          <p:cNvPicPr>
+            <a:picLocks noChangeAspect="1"/>
+          </p:cNvPicPr>
+          <p:nvPr/>
+        </p:nvPicPr>
+        <p:blipFill>
+          <a:blip r:embed="rId2"/>
+          <a:stretch>
+            <a:fillRect/>
+          </a:stretch>
+        </p:blipFill>
+        <p:spPr>
+          <a:xfrm>
+            <a:off x="6540978" y="914401"/>
+            <a:ext cx="5345319" cy="2024742"/>
+          </a:xfrm>
+          <a:prstGeom prst="rect">
+            <a:avLst/>
+          </a:prstGeom>
+        </p:spPr>
+      </p:pic>
+      <p:pic>
+        <p:nvPicPr>
+          <p:cNvPr id="6" name="Imagem 5"/>
+          <p:cNvPicPr>
+            <a:picLocks noChangeAspect="1"/>
+          </p:cNvPicPr>
+          <p:nvPr/>
+        </p:nvPicPr>
+        <p:blipFill>
+          <a:blip r:embed="rId3"/>
+          <a:stretch>
+            <a:fillRect/>
+          </a:stretch>
+        </p:blipFill>
+        <p:spPr>
+          <a:xfrm>
+            <a:off x="197556" y="914401"/>
+            <a:ext cx="6252230" cy="5709372"/>
+          </a:xfrm>
+          <a:prstGeom prst="rect">
+            <a:avLst/>
+          </a:prstGeom>
+        </p:spPr>
+      </p:pic>
+      <p:sp>
+        <p:nvSpPr>
+          <p:cNvPr id="9" name="Retângulo 8"/>
+          <p:cNvSpPr/>
+          <p:nvPr/>
+        </p:nvSpPr>
+        <p:spPr>
+          <a:xfrm>
+            <a:off x="5608864" y="1298121"/>
+            <a:ext cx="791935" cy="269422"/>
+          </a:xfrm>
+          <a:prstGeom prst="rect">
+            <a:avLst/>
+          </a:prstGeom>
+          <a:noFill/>
+          <a:ln>
+            <a:solidFill>
+              <a:srgbClr val="C00000"/>
+            </a:solidFill>
+          </a:ln>
+        </p:spPr>
+        <p:style>
+          <a:lnRef idx="2">
+            <a:schemeClr val="accent1">
+              <a:shade val="50000"/>
+            </a:schemeClr>
+          </a:lnRef>
+          <a:fillRef idx="1">
+            <a:schemeClr val="accent1"/>
+          </a:fillRef>
+          <a:effectRef idx="0">
+            <a:schemeClr val="accent1"/>
+          </a:effectRef>
+          <a:fontRef idx="minor">
+            <a:schemeClr val="lt1"/>
+          </a:fontRef>
+        </p:style>
+        <p:txBody>
+          <a:bodyPr rtlCol="0" anchor="ctr"/>
+          <a:lstStyle/>
+          <a:p>
+            <a:pPr algn="ctr"/>
+            <a:endParaRPr lang="pt-BR"/>
+          </a:p>
+        </p:txBody>
+      </p:sp>
+      <p:sp>
+        <p:nvSpPr>
+          <p:cNvPr id="11" name="Retângulo 10"/>
+          <p:cNvSpPr/>
+          <p:nvPr/>
+        </p:nvSpPr>
+        <p:spPr>
+          <a:xfrm>
+            <a:off x="699407" y="5679621"/>
+            <a:ext cx="1586593" cy="664029"/>
+          </a:xfrm>
+          <a:prstGeom prst="rect">
+            <a:avLst/>
+          </a:prstGeom>
+          <a:noFill/>
+          <a:ln>
+            <a:solidFill>
+              <a:srgbClr val="C00000"/>
+            </a:solidFill>
+          </a:ln>
+        </p:spPr>
+        <p:style>
+          <a:lnRef idx="2">
+            <a:schemeClr val="accent1">
+              <a:shade val="50000"/>
+            </a:schemeClr>
+          </a:lnRef>
+          <a:fillRef idx="1">
+            <a:schemeClr val="accent1"/>
+          </a:fillRef>
+          <a:effectRef idx="0">
+            <a:schemeClr val="accent1"/>
+          </a:effectRef>
+          <a:fontRef idx="minor">
+            <a:schemeClr val="lt1"/>
+          </a:fontRef>
+        </p:style>
+        <p:txBody>
+          <a:bodyPr rtlCol="0" anchor="ctr"/>
+          <a:lstStyle/>
+          <a:p>
+            <a:pPr algn="ctr"/>
+            <a:endParaRPr lang="pt-BR"/>
+          </a:p>
+        </p:txBody>
+      </p:sp>
+    </p:spTree>
+    <p:extLst>
+      <p:ext uri="{BB962C8B-B14F-4D97-AF65-F5344CB8AC3E}">
+        <p14:creationId xmlns:p14="http://schemas.microsoft.com/office/powerpoint/2010/main" val="312620628"/>
+      </p:ext>
+    </p:extLst>
+  </p:cSld>
+  <p:clrMapOvr>
+    <a:masterClrMapping/>
+  </p:clrMapOvr>
+  <p:timing>
+    <p:tnLst>
+      <p:par>
+        <p:cTn id="1" dur="indefinite" restart="never" nodeType="tmRoot">
+          <p:childTnLst>
+            <p:seq concurrent="1" nextAc="seek">
+              <p:cTn id="2" dur="indefinite" nodeType="mainSeq">
+                <p:childTnLst>
+                  <p:par>
+                    <p:cTn id="3" fill="hold">
+                      <p:stCondLst>
+                        <p:cond delay="indefinite"/>
+                      </p:stCondLst>
+                      <p:childTnLst>
+                        <p:par>
+                          <p:cTn id="4" fill="hold">
+                            <p:stCondLst>
+                              <p:cond delay="0"/>
+                            </p:stCondLst>
+                            <p:childTnLst>
+                              <p:par>
+                                <p:cTn id="5" presetID="10" presetClass="entr" presetSubtype="0" fill="hold" grpId="0" nodeType="clickEffect">
+                                  <p:stCondLst>
+                                    <p:cond delay="0"/>
+                                  </p:stCondLst>
+                                  <p:childTnLst>
+                                    <p:set>
+                                      <p:cBhvr>
+                                        <p:cTn id="6" dur="1" fill="hold">
+                                          <p:stCondLst>
+                                            <p:cond delay="0"/>
+                                          </p:stCondLst>
+                                        </p:cTn>
+                                        <p:tgtEl>
+                                          <p:spTgt spid="9"/>
+                                        </p:tgtEl>
+                                        <p:attrNameLst>
+                                          <p:attrName>style.visibility</p:attrName>
+                                        </p:attrNameLst>
+                                      </p:cBhvr>
+                                      <p:to>
+                                        <p:strVal val="visible"/>
+                                      </p:to>
+                                    </p:set>
+                                    <p:animEffect transition="in" filter="fade">
+                                      <p:cBhvr>
+                                        <p:cTn id="7" dur="500"/>
+                                        <p:tgtEl>
+                                          <p:spTgt spid="9"/>
+                                        </p:tgtEl>
+                                      </p:cBhvr>
+                                    </p:animEffect>
+                                  </p:childTnLst>
+                                </p:cTn>
+                              </p:par>
+                              <p:par>
+                                <p:cTn id="8" presetID="10" presetClass="entr" presetSubtype="0" fill="hold" grpId="0" nodeType="withEffect">
+                                  <p:stCondLst>
+                                    <p:cond delay="0"/>
+                                  </p:stCondLst>
+                                  <p:childTnLst>
+                                    <p:set>
+                                      <p:cBhvr>
+                                        <p:cTn id="9" dur="1" fill="hold">
+                                          <p:stCondLst>
+                                            <p:cond delay="0"/>
+                                          </p:stCondLst>
+                                        </p:cTn>
+                                        <p:tgtEl>
+                                          <p:spTgt spid="11"/>
+                                        </p:tgtEl>
+                                        <p:attrNameLst>
+                                          <p:attrName>style.visibility</p:attrName>
+                                        </p:attrNameLst>
+                                      </p:cBhvr>
+                                      <p:to>
+                                        <p:strVal val="visible"/>
+                                      </p:to>
+                                    </p:set>
+                                    <p:animEffect transition="in" filter="fade">
+                                      <p:cBhvr>
+                                        <p:cTn id="10" dur="500"/>
+                                        <p:tgtEl>
+                                          <p:spTgt spid="11"/>
+                                        </p:tgtEl>
+                                      </p:cBhvr>
+                                    </p:animEffect>
+                                  </p:childTnLst>
+                                </p:cTn>
+                              </p:par>
+                            </p:childTnLst>
+                          </p:cTn>
+                        </p:par>
+                      </p:childTnLst>
+                    </p:cTn>
+                  </p:par>
+                </p:childTnLst>
+              </p:cTn>
+              <p:prevCondLst>
+                <p:cond evt="onPrev" delay="0">
+                  <p:tgtEl>
+                    <p:sldTgt/>
+                  </p:tgtEl>
+                </p:cond>
+              </p:prevCondLst>
+              <p:nextCondLst>
+                <p:cond evt="onNext" delay="0">
+                  <p:tgtEl>
+                    <p:sldTgt/>
+                  </p:tgtEl>
+                </p:cond>
+              </p:nextCondLst>
+            </p:seq>
+          </p:childTnLst>
+        </p:cTn>
+      </p:par>
+    </p:tnLst>
+    <p:bldLst>
+      <p:bldP spid="9" grpId="0" animBg="1"/>
+      <p:bldP spid="11" grpId="0" animBg="1"/>
+    </p:bldLst>
+  </p:timing>
+</p:sld>
+</file>
+
+<file path=ppt/slides/slide54.xml><?xml version="1.0" encoding="utf-8"?>
+<p:sld xmlns:a="http://schemas.openxmlformats.org/drawingml/2006/main" xmlns:r="http://schemas.openxmlformats.org/officeDocument/2006/relationships" xmlns:p="http://schemas.openxmlformats.org/presentationml/2006/main">
+  <p:cSld>
+    <p:spTree>
+      <p:nvGrpSpPr>
+        <p:cNvPr id="1" name=""/>
+        <p:cNvGrpSpPr/>
+        <p:nvPr/>
+      </p:nvGrpSpPr>
+      <p:grpSpPr>
+        <a:xfrm>
+          <a:off x="0" y="0"/>
+          <a:ext cx="0" cy="0"/>
+          <a:chOff x="0" y="0"/>
+          <a:chExt cx="0" cy="0"/>
+        </a:xfrm>
+      </p:grpSpPr>
+      <p:sp>
+        <p:nvSpPr>
+          <p:cNvPr id="2" name="Espaço Reservado para Texto 1"/>
+          <p:cNvSpPr>
+            <a:spLocks noGrp="1"/>
+          </p:cNvSpPr>
+          <p:nvPr>
+            <p:ph type="body" sz="quarter" idx="10"/>
+          </p:nvPr>
+        </p:nvSpPr>
+        <p:spPr/>
+        <p:txBody>
+          <a:bodyPr/>
+          <a:lstStyle/>
+          <a:p>
+            <a:r>
+              <a:rPr lang="pt-BR" dirty="0" err="1" smtClean="0"/>
+              <a:t>Refatoração</a:t>
+            </a:r>
+            <a:endParaRPr lang="pt-BR" dirty="0"/>
+          </a:p>
+        </p:txBody>
+      </p:sp>
+      <p:pic>
+        <p:nvPicPr>
+          <p:cNvPr id="4" name="Imagem 3"/>
+          <p:cNvPicPr>
+            <a:picLocks noChangeAspect="1"/>
+          </p:cNvPicPr>
+          <p:nvPr/>
+        </p:nvPicPr>
+        <p:blipFill>
+          <a:blip r:embed="rId2"/>
+          <a:stretch>
+            <a:fillRect/>
+          </a:stretch>
+        </p:blipFill>
+        <p:spPr>
+          <a:xfrm>
+            <a:off x="658586" y="1208314"/>
+            <a:ext cx="7553325" cy="2238375"/>
+          </a:xfrm>
+          <a:prstGeom prst="rect">
+            <a:avLst/>
+          </a:prstGeom>
+        </p:spPr>
+      </p:pic>
+      <p:pic>
+        <p:nvPicPr>
+          <p:cNvPr id="7" name="Imagem 6"/>
+          <p:cNvPicPr>
+            <a:picLocks noChangeAspect="1"/>
+          </p:cNvPicPr>
+          <p:nvPr/>
+        </p:nvPicPr>
+        <p:blipFill>
+          <a:blip r:embed="rId3"/>
+          <a:stretch>
+            <a:fillRect/>
+          </a:stretch>
+        </p:blipFill>
+        <p:spPr>
+          <a:xfrm>
+            <a:off x="658586" y="3641951"/>
+            <a:ext cx="11039475" cy="1076325"/>
+          </a:xfrm>
+          <a:prstGeom prst="rect">
+            <a:avLst/>
+          </a:prstGeom>
+        </p:spPr>
+      </p:pic>
+    </p:spTree>
+    <p:extLst>
+      <p:ext uri="{BB962C8B-B14F-4D97-AF65-F5344CB8AC3E}">
+        <p14:creationId xmlns:p14="http://schemas.microsoft.com/office/powerpoint/2010/main" val="1655812110"/>
+      </p:ext>
+    </p:extLst>
+  </p:cSld>
+  <p:clrMapOvr>
+    <a:masterClrMapping/>
+  </p:clrMapOvr>
+  <p:timing>
+    <p:tnLst>
+      <p:par>
+        <p:cTn id="1" dur="indefinite" restart="never" nodeType="tmRoot"/>
+      </p:par>
+    </p:tnLst>
+  </p:timing>
+</p:sld>
+</file>
+
+<file path=ppt/slides/slide55.xml><?xml version="1.0" encoding="utf-8"?>
+<p:sld xmlns:a="http://schemas.openxmlformats.org/drawingml/2006/main" xmlns:r="http://schemas.openxmlformats.org/officeDocument/2006/relationships" xmlns:p="http://schemas.openxmlformats.org/presentationml/2006/main">
+  <p:cSld>
+    <p:spTree>
+      <p:nvGrpSpPr>
+        <p:cNvPr id="1" name=""/>
+        <p:cNvGrpSpPr/>
+        <p:nvPr/>
+      </p:nvGrpSpPr>
+      <p:grpSpPr>
+        <a:xfrm>
+          <a:off x="0" y="0"/>
+          <a:ext cx="0" cy="0"/>
+          <a:chOff x="0" y="0"/>
+          <a:chExt cx="0" cy="0"/>
+        </a:xfrm>
+      </p:grpSpPr>
+      <p:sp>
+        <p:nvSpPr>
+          <p:cNvPr id="2" name="Espaço Reservado para Texto 1"/>
+          <p:cNvSpPr>
+            <a:spLocks noGrp="1"/>
+          </p:cNvSpPr>
+          <p:nvPr>
+            <p:ph type="body" sz="quarter" idx="10"/>
+          </p:nvPr>
+        </p:nvSpPr>
+        <p:spPr/>
+        <p:txBody>
+          <a:bodyPr/>
+          <a:lstStyle/>
+          <a:p>
+            <a:r>
+              <a:rPr lang="pt-BR" dirty="0" err="1" smtClean="0"/>
+              <a:t>AutoMapper</a:t>
+            </a:r>
+            <a:endParaRPr lang="pt-BR" dirty="0"/>
+          </a:p>
+        </p:txBody>
+      </p:sp>
+      <p:sp>
+        <p:nvSpPr>
+          <p:cNvPr id="3" name="Espaço Reservado para Texto 2"/>
+          <p:cNvSpPr>
+            <a:spLocks noGrp="1"/>
+          </p:cNvSpPr>
+          <p:nvPr>
+            <p:ph type="body" sz="quarter" idx="11"/>
+          </p:nvPr>
+        </p:nvSpPr>
+        <p:spPr/>
+        <p:txBody>
+          <a:bodyPr/>
+          <a:lstStyle/>
+          <a:p>
+            <a:pPr marL="342900" indent="-342900">
+              <a:buFont typeface="Arial" panose="020B0604020202020204" pitchFamily="34" charset="0"/>
+              <a:buChar char="•"/>
+            </a:pPr>
+            <a:r>
+              <a:rPr lang="pt-BR" dirty="0" smtClean="0"/>
+              <a:t>Mapeamento de objeto para objeto</a:t>
+            </a:r>
+          </a:p>
+          <a:p>
+            <a:pPr marL="342900" indent="-342900">
+              <a:buFont typeface="Arial" panose="020B0604020202020204" pitchFamily="34" charset="0"/>
+              <a:buChar char="•"/>
+            </a:pPr>
+            <a:r>
+              <a:rPr lang="pt-BR" dirty="0" smtClean="0"/>
+              <a:t>Por padrão, propriedades de mesmo nome são mapeadas automaticamente</a:t>
+            </a:r>
+          </a:p>
+          <a:p>
+            <a:pPr marL="342900" indent="-342900">
+              <a:buFont typeface="Arial" panose="020B0604020202020204" pitchFamily="34" charset="0"/>
+              <a:buChar char="•"/>
+            </a:pPr>
+            <a:r>
+              <a:rPr lang="pt-BR" dirty="0" smtClean="0"/>
+              <a:t>Propriedades que serão mapeadas de maneira diferente do padrão devem ser configuradas separadamente.</a:t>
+            </a:r>
+          </a:p>
+          <a:p>
+            <a:pPr marL="342900" indent="-342900">
+              <a:buFont typeface="Arial" panose="020B0604020202020204" pitchFamily="34" charset="0"/>
+              <a:buChar char="•"/>
+            </a:pPr>
+            <a:r>
+              <a:rPr lang="pt-BR" dirty="0" smtClean="0"/>
+              <a:t>Disponível no </a:t>
+            </a:r>
+            <a:r>
+              <a:rPr lang="pt-BR" dirty="0" err="1" smtClean="0"/>
+              <a:t>NuGet</a:t>
+            </a:r>
+            <a:endParaRPr lang="pt-BR" dirty="0" smtClean="0"/>
+          </a:p>
+          <a:p>
+            <a:pPr marL="342900" indent="-342900">
+              <a:buFont typeface="Arial" panose="020B0604020202020204" pitchFamily="34" charset="0"/>
+              <a:buChar char="•"/>
+            </a:pPr>
+            <a:endParaRPr lang="pt-BR" dirty="0"/>
+          </a:p>
+        </p:txBody>
+      </p:sp>
+      <p:pic>
+        <p:nvPicPr>
+          <p:cNvPr id="5" name="Imagem 4"/>
+          <p:cNvPicPr>
+            <a:picLocks noChangeAspect="1"/>
+          </p:cNvPicPr>
+          <p:nvPr/>
+        </p:nvPicPr>
+        <p:blipFill>
+          <a:blip r:embed="rId2"/>
+          <a:stretch>
+            <a:fillRect/>
+          </a:stretch>
+        </p:blipFill>
+        <p:spPr>
+          <a:xfrm>
+            <a:off x="1911803" y="3388179"/>
+            <a:ext cx="8515350" cy="914400"/>
+          </a:xfrm>
+          <a:prstGeom prst="rect">
+            <a:avLst/>
+          </a:prstGeom>
+        </p:spPr>
+      </p:pic>
+    </p:spTree>
+    <p:extLst>
+      <p:ext uri="{BB962C8B-B14F-4D97-AF65-F5344CB8AC3E}">
+        <p14:creationId xmlns:p14="http://schemas.microsoft.com/office/powerpoint/2010/main" val="301161096"/>
+      </p:ext>
+    </p:extLst>
+  </p:cSld>
+  <p:clrMapOvr>
+    <a:masterClrMapping/>
+  </p:clrMapOvr>
+  <p:timing>
+    <p:tnLst>
+      <p:par>
+        <p:cTn id="1" dur="indefinite" restart="never" nodeType="tmRoot"/>
+      </p:par>
+    </p:tnLst>
+  </p:timing>
+</p:sld>
+</file>
+
+<file path=ppt/slides/slide56.xml><?xml version="1.0" encoding="utf-8"?>
+<p:sld xmlns:a="http://schemas.openxmlformats.org/drawingml/2006/main" xmlns:r="http://schemas.openxmlformats.org/officeDocument/2006/relationships" xmlns:p="http://schemas.openxmlformats.org/presentationml/2006/main">
+  <p:cSld>
+    <p:spTree>
+      <p:nvGrpSpPr>
+        <p:cNvPr id="1" name=""/>
+        <p:cNvGrpSpPr/>
+        <p:nvPr/>
+      </p:nvGrpSpPr>
+      <p:grpSpPr>
+        <a:xfrm>
+          <a:off x="0" y="0"/>
+          <a:ext cx="0" cy="0"/>
+          <a:chOff x="0" y="0"/>
+          <a:chExt cx="0" cy="0"/>
+        </a:xfrm>
+      </p:grpSpPr>
+      <p:sp>
+        <p:nvSpPr>
+          <p:cNvPr id="2" name="Espaço Reservado para Texto 1"/>
+          <p:cNvSpPr>
+            <a:spLocks noGrp="1"/>
+          </p:cNvSpPr>
+          <p:nvPr>
+            <p:ph type="body" sz="quarter" idx="10"/>
+          </p:nvPr>
+        </p:nvSpPr>
+        <p:spPr/>
+        <p:txBody>
+          <a:bodyPr/>
+          <a:lstStyle/>
+          <a:p>
+            <a:r>
+              <a:rPr lang="pt-BR" dirty="0" smtClean="0"/>
+              <a:t>Configuração do Mapeamento</a:t>
+            </a:r>
+            <a:endParaRPr lang="pt-BR" dirty="0"/>
+          </a:p>
+        </p:txBody>
+      </p:sp>
+      <p:pic>
+        <p:nvPicPr>
+          <p:cNvPr id="4" name="Imagem 3"/>
+          <p:cNvPicPr>
+            <a:picLocks noChangeAspect="1"/>
+          </p:cNvPicPr>
+          <p:nvPr/>
+        </p:nvPicPr>
+        <p:blipFill>
+          <a:blip r:embed="rId2"/>
+          <a:stretch>
+            <a:fillRect/>
+          </a:stretch>
+        </p:blipFill>
+        <p:spPr>
+          <a:xfrm>
+            <a:off x="3062287" y="2228850"/>
+            <a:ext cx="6067425" cy="2400300"/>
+          </a:xfrm>
+          <a:prstGeom prst="rect">
+            <a:avLst/>
+          </a:prstGeom>
+        </p:spPr>
+      </p:pic>
+    </p:spTree>
+    <p:extLst>
+      <p:ext uri="{BB962C8B-B14F-4D97-AF65-F5344CB8AC3E}">
+        <p14:creationId xmlns:p14="http://schemas.microsoft.com/office/powerpoint/2010/main" val="1689405397"/>
+      </p:ext>
+    </p:extLst>
+  </p:cSld>
+  <p:clrMapOvr>
+    <a:masterClrMapping/>
+  </p:clrMapOvr>
+  <p:timing>
+    <p:tnLst>
+      <p:par>
+        <p:cTn id="1" dur="indefinite" restart="never" nodeType="tmRoot"/>
+      </p:par>
+    </p:tnLst>
+  </p:timing>
+</p:sld>
+</file>
+
+<file path=ppt/slides/slide57.xml><?xml version="1.0" encoding="utf-8"?>
+<p:sld xmlns:a="http://schemas.openxmlformats.org/drawingml/2006/main" xmlns:r="http://schemas.openxmlformats.org/officeDocument/2006/relationships" xmlns:p="http://schemas.openxmlformats.org/presentationml/2006/main">
+  <p:cSld>
+    <p:spTree>
+      <p:nvGrpSpPr>
+        <p:cNvPr id="1" name=""/>
+        <p:cNvGrpSpPr/>
+        <p:nvPr/>
+      </p:nvGrpSpPr>
+      <p:grpSpPr>
+        <a:xfrm>
+          <a:off x="0" y="0"/>
+          <a:ext cx="0" cy="0"/>
+          <a:chOff x="0" y="0"/>
+          <a:chExt cx="0" cy="0"/>
+        </a:xfrm>
+      </p:grpSpPr>
+      <p:sp>
+        <p:nvSpPr>
+          <p:cNvPr id="2" name="Espaço Reservado para Texto 1"/>
+          <p:cNvSpPr>
+            <a:spLocks noGrp="1"/>
+          </p:cNvSpPr>
+          <p:nvPr>
+            <p:ph type="body" sz="quarter" idx="10"/>
+          </p:nvPr>
+        </p:nvSpPr>
+        <p:spPr/>
+        <p:txBody>
+          <a:bodyPr/>
+          <a:lstStyle/>
+          <a:p>
+            <a:r>
+              <a:rPr lang="pt-BR" dirty="0" err="1" smtClean="0"/>
+              <a:t>AutoMapper</a:t>
+            </a:r>
+            <a:r>
+              <a:rPr lang="pt-BR" dirty="0" smtClean="0"/>
+              <a:t> com injeção de dependências</a:t>
+            </a:r>
+            <a:endParaRPr lang="pt-BR" dirty="0"/>
+          </a:p>
+        </p:txBody>
+      </p:sp>
+      <p:pic>
+        <p:nvPicPr>
+          <p:cNvPr id="4" name="Imagem 3"/>
+          <p:cNvPicPr>
+            <a:picLocks noChangeAspect="1"/>
+          </p:cNvPicPr>
+          <p:nvPr/>
+        </p:nvPicPr>
+        <p:blipFill>
+          <a:blip r:embed="rId2"/>
+          <a:stretch>
+            <a:fillRect/>
+          </a:stretch>
+        </p:blipFill>
+        <p:spPr>
+          <a:xfrm>
+            <a:off x="1924729" y="1266825"/>
+            <a:ext cx="8391525" cy="666750"/>
+          </a:xfrm>
+          <a:prstGeom prst="rect">
+            <a:avLst/>
+          </a:prstGeom>
+        </p:spPr>
+      </p:pic>
+      <p:pic>
+        <p:nvPicPr>
+          <p:cNvPr id="5" name="Imagem 4"/>
+          <p:cNvPicPr>
+            <a:picLocks noChangeAspect="1"/>
+          </p:cNvPicPr>
+          <p:nvPr/>
+        </p:nvPicPr>
+        <p:blipFill>
+          <a:blip r:embed="rId3"/>
+          <a:stretch>
+            <a:fillRect/>
+          </a:stretch>
+        </p:blipFill>
+        <p:spPr>
+          <a:xfrm>
+            <a:off x="3041196" y="2285999"/>
+            <a:ext cx="5760842" cy="800781"/>
+          </a:xfrm>
+          <a:prstGeom prst="rect">
+            <a:avLst/>
+          </a:prstGeom>
+        </p:spPr>
+      </p:pic>
+    </p:spTree>
+    <p:extLst>
+      <p:ext uri="{BB962C8B-B14F-4D97-AF65-F5344CB8AC3E}">
+        <p14:creationId xmlns:p14="http://schemas.microsoft.com/office/powerpoint/2010/main" val="4226571498"/>
       </p:ext>
     </p:extLst>
   </p:cSld>

</xml_diff>